<commit_message>
RDD : Change slides 1 to 6 and move pdf
</commit_message>
<xml_diff>
--- a/module4/td1/td1-spark-rdd.pptx
+++ b/module4/td1/td1-spark-rdd.pptx
@@ -4,19 +4,23 @@
   <p:sldMasterIdLst>
     <p:sldMasterId id="2147483648" r:id="rId1"/>
   </p:sldMasterIdLst>
+  <p:notesMasterIdLst>
+    <p:notesMasterId r:id="rId15"/>
+  </p:notesMasterIdLst>
   <p:sldIdLst>
-    <p:sldId id="269" r:id="rId2"/>
-    <p:sldId id="258" r:id="rId3"/>
-    <p:sldId id="259" r:id="rId4"/>
-    <p:sldId id="260" r:id="rId5"/>
-    <p:sldId id="261" r:id="rId6"/>
-    <p:sldId id="268" r:id="rId7"/>
-    <p:sldId id="264" r:id="rId8"/>
-    <p:sldId id="263" r:id="rId9"/>
-    <p:sldId id="265" r:id="rId10"/>
-    <p:sldId id="266" r:id="rId11"/>
-    <p:sldId id="267" r:id="rId12"/>
-    <p:sldId id="262" r:id="rId13"/>
+    <p:sldId id="256" r:id="rId2"/>
+    <p:sldId id="269" r:id="rId3"/>
+    <p:sldId id="258" r:id="rId4"/>
+    <p:sldId id="259" r:id="rId5"/>
+    <p:sldId id="260" r:id="rId6"/>
+    <p:sldId id="261" r:id="rId7"/>
+    <p:sldId id="268" r:id="rId8"/>
+    <p:sldId id="264" r:id="rId9"/>
+    <p:sldId id="263" r:id="rId10"/>
+    <p:sldId id="265" r:id="rId11"/>
+    <p:sldId id="266" r:id="rId12"/>
+    <p:sldId id="267" r:id="rId13"/>
+    <p:sldId id="262" r:id="rId14"/>
   </p:sldIdLst>
   <p:sldSz cx="12192000" cy="6858000"/>
   <p:notesSz cx="6858000" cy="9144000"/>
@@ -123,6 +127,943 @@
 </p:presentation>
 </file>
 
+<file path=ppt/notesMasters/notesMaster1.xml><?xml version="1.0" encoding="utf-8"?>
+<p:notesMaster xmlns:a="http://schemas.openxmlformats.org/drawingml/2006/main" xmlns:r="http://schemas.openxmlformats.org/officeDocument/2006/relationships" xmlns:p="http://schemas.openxmlformats.org/presentationml/2006/main">
+  <p:cSld>
+    <p:bg>
+      <p:bgRef idx="1001">
+        <a:schemeClr val="bg1"/>
+      </p:bgRef>
+    </p:bg>
+    <p:spTree>
+      <p:nvGrpSpPr>
+        <p:cNvPr id="1" name=""/>
+        <p:cNvGrpSpPr/>
+        <p:nvPr/>
+      </p:nvGrpSpPr>
+      <p:grpSpPr>
+        <a:xfrm>
+          <a:off x="0" y="0"/>
+          <a:ext cx="0" cy="0"/>
+          <a:chOff x="0" y="0"/>
+          <a:chExt cx="0" cy="0"/>
+        </a:xfrm>
+      </p:grpSpPr>
+      <p:sp>
+        <p:nvSpPr>
+          <p:cNvPr id="2" name="Espace réservé de l'en-tête 1"/>
+          <p:cNvSpPr>
+            <a:spLocks noGrp="1"/>
+          </p:cNvSpPr>
+          <p:nvPr>
+            <p:ph type="hdr" sz="quarter"/>
+          </p:nvPr>
+        </p:nvSpPr>
+        <p:spPr>
+          <a:xfrm>
+            <a:off x="0" y="0"/>
+            <a:ext cx="2971800" cy="458788"/>
+          </a:xfrm>
+          <a:prstGeom prst="rect">
+            <a:avLst/>
+          </a:prstGeom>
+        </p:spPr>
+        <p:txBody>
+          <a:bodyPr vert="horz" lIns="91440" tIns="45720" rIns="91440" bIns="45720" rtlCol="0"/>
+          <a:lstStyle>
+            <a:lvl1pPr algn="l">
+              <a:defRPr sz="1200"/>
+            </a:lvl1pPr>
+          </a:lstStyle>
+          <a:p>
+            <a:endParaRPr lang="fr-FR"/>
+          </a:p>
+        </p:txBody>
+      </p:sp>
+      <p:sp>
+        <p:nvSpPr>
+          <p:cNvPr id="3" name="Espace réservé de la date 2"/>
+          <p:cNvSpPr>
+            <a:spLocks noGrp="1"/>
+          </p:cNvSpPr>
+          <p:nvPr>
+            <p:ph type="dt" idx="1"/>
+          </p:nvPr>
+        </p:nvSpPr>
+        <p:spPr>
+          <a:xfrm>
+            <a:off x="3884613" y="0"/>
+            <a:ext cx="2971800" cy="458788"/>
+          </a:xfrm>
+          <a:prstGeom prst="rect">
+            <a:avLst/>
+          </a:prstGeom>
+        </p:spPr>
+        <p:txBody>
+          <a:bodyPr vert="horz" lIns="91440" tIns="45720" rIns="91440" bIns="45720" rtlCol="0"/>
+          <a:lstStyle>
+            <a:lvl1pPr algn="r">
+              <a:defRPr sz="1200"/>
+            </a:lvl1pPr>
+          </a:lstStyle>
+          <a:p>
+            <a:fld id="{029E00FF-157E-4E67-8269-A10CC622D7A6}" type="datetimeFigureOut">
+              <a:rPr lang="fr-FR" smtClean="0"/>
+              <a:t>14/01/2022</a:t>
+            </a:fld>
+            <a:endParaRPr lang="fr-FR"/>
+          </a:p>
+        </p:txBody>
+      </p:sp>
+      <p:sp>
+        <p:nvSpPr>
+          <p:cNvPr id="4" name="Espace réservé de l'image des diapositives 3"/>
+          <p:cNvSpPr>
+            <a:spLocks noGrp="1" noRot="1" noChangeAspect="1"/>
+          </p:cNvSpPr>
+          <p:nvPr>
+            <p:ph type="sldImg" idx="2"/>
+          </p:nvPr>
+        </p:nvSpPr>
+        <p:spPr>
+          <a:xfrm>
+            <a:off x="685800" y="1143000"/>
+            <a:ext cx="5486400" cy="3086100"/>
+          </a:xfrm>
+          <a:prstGeom prst="rect">
+            <a:avLst/>
+          </a:prstGeom>
+          <a:noFill/>
+          <a:ln w="12700">
+            <a:solidFill>
+              <a:prstClr val="black"/>
+            </a:solidFill>
+          </a:ln>
+        </p:spPr>
+        <p:txBody>
+          <a:bodyPr vert="horz" lIns="91440" tIns="45720" rIns="91440" bIns="45720" rtlCol="0" anchor="ctr"/>
+          <a:lstStyle/>
+          <a:p>
+            <a:endParaRPr lang="fr-FR"/>
+          </a:p>
+        </p:txBody>
+      </p:sp>
+      <p:sp>
+        <p:nvSpPr>
+          <p:cNvPr id="5" name="Espace réservé des notes 4"/>
+          <p:cNvSpPr>
+            <a:spLocks noGrp="1"/>
+          </p:cNvSpPr>
+          <p:nvPr>
+            <p:ph type="body" sz="quarter" idx="3"/>
+          </p:nvPr>
+        </p:nvSpPr>
+        <p:spPr>
+          <a:xfrm>
+            <a:off x="685800" y="4400550"/>
+            <a:ext cx="5486400" cy="3600450"/>
+          </a:xfrm>
+          <a:prstGeom prst="rect">
+            <a:avLst/>
+          </a:prstGeom>
+        </p:spPr>
+        <p:txBody>
+          <a:bodyPr vert="horz" lIns="91440" tIns="45720" rIns="91440" bIns="45720" rtlCol="0"/>
+          <a:lstStyle/>
+          <a:p>
+            <a:pPr lvl="0"/>
+            <a:r>
+              <a:rPr lang="fr-FR"/>
+              <a:t>Cliquez pour modifier les styles du texte du masque</a:t>
+            </a:r>
+          </a:p>
+          <a:p>
+            <a:pPr lvl="1"/>
+            <a:r>
+              <a:rPr lang="fr-FR"/>
+              <a:t>Deuxième niveau</a:t>
+            </a:r>
+          </a:p>
+          <a:p>
+            <a:pPr lvl="2"/>
+            <a:r>
+              <a:rPr lang="fr-FR"/>
+              <a:t>Troisième niveau</a:t>
+            </a:r>
+          </a:p>
+          <a:p>
+            <a:pPr lvl="3"/>
+            <a:r>
+              <a:rPr lang="fr-FR"/>
+              <a:t>Quatrième niveau</a:t>
+            </a:r>
+          </a:p>
+          <a:p>
+            <a:pPr lvl="4"/>
+            <a:r>
+              <a:rPr lang="fr-FR"/>
+              <a:t>Cinquième niveau</a:t>
+            </a:r>
+          </a:p>
+        </p:txBody>
+      </p:sp>
+      <p:sp>
+        <p:nvSpPr>
+          <p:cNvPr id="6" name="Espace réservé du pied de page 5"/>
+          <p:cNvSpPr>
+            <a:spLocks noGrp="1"/>
+          </p:cNvSpPr>
+          <p:nvPr>
+            <p:ph type="ftr" sz="quarter" idx="4"/>
+          </p:nvPr>
+        </p:nvSpPr>
+        <p:spPr>
+          <a:xfrm>
+            <a:off x="0" y="8685213"/>
+            <a:ext cx="2971800" cy="458787"/>
+          </a:xfrm>
+          <a:prstGeom prst="rect">
+            <a:avLst/>
+          </a:prstGeom>
+        </p:spPr>
+        <p:txBody>
+          <a:bodyPr vert="horz" lIns="91440" tIns="45720" rIns="91440" bIns="45720" rtlCol="0" anchor="b"/>
+          <a:lstStyle>
+            <a:lvl1pPr algn="l">
+              <a:defRPr sz="1200"/>
+            </a:lvl1pPr>
+          </a:lstStyle>
+          <a:p>
+            <a:endParaRPr lang="fr-FR"/>
+          </a:p>
+        </p:txBody>
+      </p:sp>
+      <p:sp>
+        <p:nvSpPr>
+          <p:cNvPr id="7" name="Espace réservé du numéro de diapositive 6"/>
+          <p:cNvSpPr>
+            <a:spLocks noGrp="1"/>
+          </p:cNvSpPr>
+          <p:nvPr>
+            <p:ph type="sldNum" sz="quarter" idx="5"/>
+          </p:nvPr>
+        </p:nvSpPr>
+        <p:spPr>
+          <a:xfrm>
+            <a:off x="3884613" y="8685213"/>
+            <a:ext cx="2971800" cy="458787"/>
+          </a:xfrm>
+          <a:prstGeom prst="rect">
+            <a:avLst/>
+          </a:prstGeom>
+        </p:spPr>
+        <p:txBody>
+          <a:bodyPr vert="horz" lIns="91440" tIns="45720" rIns="91440" bIns="45720" rtlCol="0" anchor="b"/>
+          <a:lstStyle>
+            <a:lvl1pPr algn="r">
+              <a:defRPr sz="1200"/>
+            </a:lvl1pPr>
+          </a:lstStyle>
+          <a:p>
+            <a:fld id="{32DDDBA6-C58A-4FE7-89EE-251EB0240D98}" type="slidenum">
+              <a:rPr lang="fr-FR" smtClean="0"/>
+              <a:t>‹N°›</a:t>
+            </a:fld>
+            <a:endParaRPr lang="fr-FR"/>
+          </a:p>
+        </p:txBody>
+      </p:sp>
+    </p:spTree>
+    <p:extLst>
+      <p:ext uri="{BB962C8B-B14F-4D97-AF65-F5344CB8AC3E}">
+        <p14:creationId xmlns:p14="http://schemas.microsoft.com/office/powerpoint/2010/main" val="575052954"/>
+      </p:ext>
+    </p:extLst>
+  </p:cSld>
+  <p:clrMap bg1="lt1" tx1="dk1" bg2="lt2" tx2="dk2" accent1="accent1" accent2="accent2" accent3="accent3" accent4="accent4" accent5="accent5" accent6="accent6" hlink="hlink" folHlink="folHlink"/>
+  <p:notesStyle>
+    <a:lvl1pPr marL="0" algn="l" defTabSz="914400" rtl="0" eaLnBrk="1" latinLnBrk="0" hangingPunct="1">
+      <a:defRPr sz="1200" kern="1200">
+        <a:solidFill>
+          <a:schemeClr val="tx1"/>
+        </a:solidFill>
+        <a:latin typeface="+mn-lt"/>
+        <a:ea typeface="+mn-ea"/>
+        <a:cs typeface="+mn-cs"/>
+      </a:defRPr>
+    </a:lvl1pPr>
+    <a:lvl2pPr marL="457200" algn="l" defTabSz="914400" rtl="0" eaLnBrk="1" latinLnBrk="0" hangingPunct="1">
+      <a:defRPr sz="1200" kern="1200">
+        <a:solidFill>
+          <a:schemeClr val="tx1"/>
+        </a:solidFill>
+        <a:latin typeface="+mn-lt"/>
+        <a:ea typeface="+mn-ea"/>
+        <a:cs typeface="+mn-cs"/>
+      </a:defRPr>
+    </a:lvl2pPr>
+    <a:lvl3pPr marL="914400" algn="l" defTabSz="914400" rtl="0" eaLnBrk="1" latinLnBrk="0" hangingPunct="1">
+      <a:defRPr sz="1200" kern="1200">
+        <a:solidFill>
+          <a:schemeClr val="tx1"/>
+        </a:solidFill>
+        <a:latin typeface="+mn-lt"/>
+        <a:ea typeface="+mn-ea"/>
+        <a:cs typeface="+mn-cs"/>
+      </a:defRPr>
+    </a:lvl3pPr>
+    <a:lvl4pPr marL="1371600" algn="l" defTabSz="914400" rtl="0" eaLnBrk="1" latinLnBrk="0" hangingPunct="1">
+      <a:defRPr sz="1200" kern="1200">
+        <a:solidFill>
+          <a:schemeClr val="tx1"/>
+        </a:solidFill>
+        <a:latin typeface="+mn-lt"/>
+        <a:ea typeface="+mn-ea"/>
+        <a:cs typeface="+mn-cs"/>
+      </a:defRPr>
+    </a:lvl4pPr>
+    <a:lvl5pPr marL="1828800" algn="l" defTabSz="914400" rtl="0" eaLnBrk="1" latinLnBrk="0" hangingPunct="1">
+      <a:defRPr sz="1200" kern="1200">
+        <a:solidFill>
+          <a:schemeClr val="tx1"/>
+        </a:solidFill>
+        <a:latin typeface="+mn-lt"/>
+        <a:ea typeface="+mn-ea"/>
+        <a:cs typeface="+mn-cs"/>
+      </a:defRPr>
+    </a:lvl5pPr>
+    <a:lvl6pPr marL="2286000" algn="l" defTabSz="914400" rtl="0" eaLnBrk="1" latinLnBrk="0" hangingPunct="1">
+      <a:defRPr sz="1200" kern="1200">
+        <a:solidFill>
+          <a:schemeClr val="tx1"/>
+        </a:solidFill>
+        <a:latin typeface="+mn-lt"/>
+        <a:ea typeface="+mn-ea"/>
+        <a:cs typeface="+mn-cs"/>
+      </a:defRPr>
+    </a:lvl6pPr>
+    <a:lvl7pPr marL="2743200" algn="l" defTabSz="914400" rtl="0" eaLnBrk="1" latinLnBrk="0" hangingPunct="1">
+      <a:defRPr sz="1200" kern="1200">
+        <a:solidFill>
+          <a:schemeClr val="tx1"/>
+        </a:solidFill>
+        <a:latin typeface="+mn-lt"/>
+        <a:ea typeface="+mn-ea"/>
+        <a:cs typeface="+mn-cs"/>
+      </a:defRPr>
+    </a:lvl7pPr>
+    <a:lvl8pPr marL="3200400" algn="l" defTabSz="914400" rtl="0" eaLnBrk="1" latinLnBrk="0" hangingPunct="1">
+      <a:defRPr sz="1200" kern="1200">
+        <a:solidFill>
+          <a:schemeClr val="tx1"/>
+        </a:solidFill>
+        <a:latin typeface="+mn-lt"/>
+        <a:ea typeface="+mn-ea"/>
+        <a:cs typeface="+mn-cs"/>
+      </a:defRPr>
+    </a:lvl8pPr>
+    <a:lvl9pPr marL="3657600" algn="l" defTabSz="914400" rtl="0" eaLnBrk="1" latinLnBrk="0" hangingPunct="1">
+      <a:defRPr sz="1200" kern="1200">
+        <a:solidFill>
+          <a:schemeClr val="tx1"/>
+        </a:solidFill>
+        <a:latin typeface="+mn-lt"/>
+        <a:ea typeface="+mn-ea"/>
+        <a:cs typeface="+mn-cs"/>
+      </a:defRPr>
+    </a:lvl9pPr>
+  </p:notesStyle>
+</p:notesMaster>
+</file>
+
+<file path=ppt/notesSlides/notesSlide1.xml><?xml version="1.0" encoding="utf-8"?>
+<p:notes xmlns:a="http://schemas.openxmlformats.org/drawingml/2006/main" xmlns:r="http://schemas.openxmlformats.org/officeDocument/2006/relationships" xmlns:p="http://schemas.openxmlformats.org/presentationml/2006/main">
+  <p:cSld>
+    <p:spTree>
+      <p:nvGrpSpPr>
+        <p:cNvPr id="1" name=""/>
+        <p:cNvGrpSpPr/>
+        <p:nvPr/>
+      </p:nvGrpSpPr>
+      <p:grpSpPr>
+        <a:xfrm>
+          <a:off x="0" y="0"/>
+          <a:ext cx="0" cy="0"/>
+          <a:chOff x="0" y="0"/>
+          <a:chExt cx="0" cy="0"/>
+        </a:xfrm>
+      </p:grpSpPr>
+      <p:sp>
+        <p:nvSpPr>
+          <p:cNvPr id="2" name="Espace réservé de l'image des diapositives 1"/>
+          <p:cNvSpPr>
+            <a:spLocks noGrp="1" noRot="1" noChangeAspect="1"/>
+          </p:cNvSpPr>
+          <p:nvPr>
+            <p:ph type="sldImg"/>
+          </p:nvPr>
+        </p:nvSpPr>
+        <p:spPr/>
+      </p:sp>
+      <p:sp>
+        <p:nvSpPr>
+          <p:cNvPr id="3" name="Espace réservé des notes 2"/>
+          <p:cNvSpPr>
+            <a:spLocks noGrp="1"/>
+          </p:cNvSpPr>
+          <p:nvPr>
+            <p:ph type="body" idx="1"/>
+          </p:nvPr>
+        </p:nvSpPr>
+        <p:spPr/>
+        <p:txBody>
+          <a:bodyPr/>
+          <a:lstStyle/>
+          <a:p>
+            <a:r>
+              <a:rPr lang="fr-FR" dirty="0"/>
+              <a:t>To </a:t>
+            </a:r>
+            <a:r>
+              <a:rPr lang="fr-FR" dirty="0" err="1"/>
+              <a:t>create</a:t>
+            </a:r>
+            <a:r>
+              <a:rPr lang="fr-FR" dirty="0"/>
+              <a:t> a </a:t>
+            </a:r>
+            <a:r>
+              <a:rPr lang="fr-FR" dirty="0" err="1"/>
+              <a:t>map</a:t>
+            </a:r>
+            <a:r>
+              <a:rPr lang="fr-FR" dirty="0"/>
+              <a:t> </a:t>
+            </a:r>
+            <a:r>
+              <a:rPr lang="fr-FR" dirty="0" err="1"/>
+              <a:t>reduce</a:t>
+            </a:r>
+            <a:r>
+              <a:rPr lang="fr-FR" dirty="0"/>
+              <a:t> job, lots of </a:t>
+            </a:r>
+            <a:r>
+              <a:rPr lang="fr-FR" dirty="0" err="1"/>
+              <a:t>boilerplate</a:t>
+            </a:r>
+            <a:r>
+              <a:rPr lang="fr-FR" dirty="0"/>
+              <a:t> </a:t>
+            </a:r>
+            <a:r>
+              <a:rPr lang="fr-FR" dirty="0" err="1"/>
+              <a:t>going</a:t>
+            </a:r>
+            <a:r>
+              <a:rPr lang="fr-FR" dirty="0"/>
+              <a:t> on : </a:t>
+            </a:r>
+            <a:r>
+              <a:rPr lang="fr-FR" dirty="0" err="1"/>
+              <a:t>need</a:t>
+            </a:r>
+            <a:r>
+              <a:rPr lang="fr-FR" dirty="0"/>
+              <a:t> to </a:t>
+            </a:r>
+            <a:r>
+              <a:rPr lang="fr-FR" dirty="0" err="1"/>
+              <a:t>create</a:t>
+            </a:r>
+            <a:r>
+              <a:rPr lang="fr-FR" dirty="0"/>
+              <a:t> class for mapper and </a:t>
+            </a:r>
+            <a:r>
+              <a:rPr lang="fr-FR" dirty="0" err="1"/>
+              <a:t>reducer</a:t>
+            </a:r>
+            <a:r>
+              <a:rPr lang="fr-FR" dirty="0"/>
+              <a:t> for </a:t>
+            </a:r>
+            <a:r>
+              <a:rPr lang="fr-FR" dirty="0" err="1"/>
+              <a:t>each</a:t>
+            </a:r>
+            <a:r>
+              <a:rPr lang="fr-FR" dirty="0"/>
+              <a:t> job, classes for data input / output…</a:t>
+            </a:r>
+          </a:p>
+          <a:p>
+            <a:r>
+              <a:rPr lang="fr-FR" dirty="0"/>
+              <a:t>In MapReduce, </a:t>
+            </a:r>
+            <a:r>
+              <a:rPr lang="fr-FR" dirty="0" err="1"/>
+              <a:t>you</a:t>
+            </a:r>
+            <a:r>
+              <a:rPr lang="fr-FR" dirty="0"/>
+              <a:t> </a:t>
+            </a:r>
+            <a:r>
+              <a:rPr lang="fr-FR" dirty="0" err="1"/>
+              <a:t>get</a:t>
+            </a:r>
+            <a:r>
+              <a:rPr lang="fr-FR" dirty="0"/>
+              <a:t> IO </a:t>
+            </a:r>
+            <a:r>
+              <a:rPr lang="fr-FR" dirty="0" err="1"/>
+              <a:t>between</a:t>
+            </a:r>
+            <a:r>
+              <a:rPr lang="fr-FR" dirty="0"/>
+              <a:t> </a:t>
+            </a:r>
+            <a:r>
+              <a:rPr lang="fr-FR" dirty="0" err="1"/>
+              <a:t>each</a:t>
+            </a:r>
+            <a:r>
+              <a:rPr lang="fr-FR" dirty="0"/>
+              <a:t> jobs. </a:t>
+            </a:r>
+            <a:r>
+              <a:rPr lang="fr-FR" dirty="0" err="1"/>
+              <a:t>Here</a:t>
+            </a:r>
+            <a:r>
+              <a:rPr lang="fr-FR" dirty="0"/>
+              <a:t> </a:t>
+            </a:r>
+            <a:r>
+              <a:rPr lang="fr-FR" dirty="0" err="1"/>
+              <a:t>we</a:t>
+            </a:r>
+            <a:r>
+              <a:rPr lang="fr-FR" dirty="0"/>
+              <a:t> can </a:t>
+            </a:r>
+            <a:r>
+              <a:rPr lang="fr-FR" dirty="0" err="1"/>
+              <a:t>keep</a:t>
+            </a:r>
+            <a:r>
+              <a:rPr lang="fr-FR" dirty="0"/>
+              <a:t> the data in memory, </a:t>
+            </a:r>
+            <a:r>
+              <a:rPr lang="fr-FR" dirty="0" err="1"/>
+              <a:t>which</a:t>
+            </a:r>
+            <a:r>
+              <a:rPr lang="fr-FR" dirty="0"/>
+              <a:t> </a:t>
+            </a:r>
+            <a:r>
+              <a:rPr lang="fr-FR" dirty="0" err="1"/>
+              <a:t>eases</a:t>
+            </a:r>
+            <a:r>
+              <a:rPr lang="fr-FR" dirty="0"/>
+              <a:t> a lots </a:t>
+            </a:r>
+            <a:r>
+              <a:rPr lang="fr-FR" dirty="0" err="1"/>
+              <a:t>iterative</a:t>
+            </a:r>
+            <a:r>
+              <a:rPr lang="fr-FR" dirty="0"/>
+              <a:t> </a:t>
+            </a:r>
+            <a:r>
+              <a:rPr lang="fr-FR" dirty="0" err="1"/>
+              <a:t>algorithms</a:t>
+            </a:r>
+            <a:r>
+              <a:rPr lang="fr-FR" dirty="0"/>
+              <a:t>, like </a:t>
+            </a:r>
+            <a:r>
+              <a:rPr lang="fr-FR" dirty="0" err="1"/>
+              <a:t>learning</a:t>
+            </a:r>
+            <a:r>
+              <a:rPr lang="fr-FR" dirty="0"/>
+              <a:t> </a:t>
+            </a:r>
+            <a:r>
+              <a:rPr lang="fr-FR" dirty="0" err="1"/>
+              <a:t>tasks</a:t>
+            </a:r>
+            <a:r>
+              <a:rPr lang="fr-FR" dirty="0"/>
+              <a:t>.</a:t>
+            </a:r>
+          </a:p>
+          <a:p>
+            <a:r>
+              <a:rPr lang="fr-FR" dirty="0"/>
+              <a:t>Scala REPL, lots of </a:t>
+            </a:r>
+            <a:r>
+              <a:rPr lang="fr-FR" dirty="0" err="1"/>
+              <a:t>supported</a:t>
+            </a:r>
+            <a:r>
+              <a:rPr lang="fr-FR" dirty="0"/>
+              <a:t> </a:t>
+            </a:r>
+            <a:r>
+              <a:rPr lang="fr-FR" dirty="0" err="1"/>
+              <a:t>languages</a:t>
+            </a:r>
+            <a:r>
+              <a:rPr lang="fr-FR" dirty="0"/>
+              <a:t>. Python notebooks.</a:t>
+            </a:r>
+          </a:p>
+          <a:p>
+            <a:r>
+              <a:rPr lang="fr-FR" dirty="0" err="1"/>
+              <a:t>Internally</a:t>
+            </a:r>
+            <a:r>
+              <a:rPr lang="fr-FR" dirty="0"/>
+              <a:t>, </a:t>
+            </a:r>
+            <a:r>
+              <a:rPr lang="fr-FR" dirty="0" err="1"/>
+              <a:t>spark</a:t>
+            </a:r>
+            <a:r>
+              <a:rPr lang="fr-FR" dirty="0"/>
+              <a:t> </a:t>
+            </a:r>
+            <a:r>
+              <a:rPr lang="fr-FR" dirty="0" err="1"/>
+              <a:t>is</a:t>
+            </a:r>
+            <a:r>
+              <a:rPr lang="fr-FR" dirty="0"/>
+              <a:t> </a:t>
+            </a:r>
+            <a:r>
+              <a:rPr lang="fr-FR" dirty="0" err="1"/>
+              <a:t>implemented</a:t>
+            </a:r>
+            <a:r>
+              <a:rPr lang="fr-FR" dirty="0"/>
+              <a:t> in Java.</a:t>
+            </a:r>
+          </a:p>
+        </p:txBody>
+      </p:sp>
+      <p:sp>
+        <p:nvSpPr>
+          <p:cNvPr id="4" name="Espace réservé du numéro de diapositive 3"/>
+          <p:cNvSpPr>
+            <a:spLocks noGrp="1"/>
+          </p:cNvSpPr>
+          <p:nvPr>
+            <p:ph type="sldNum" sz="quarter" idx="5"/>
+          </p:nvPr>
+        </p:nvSpPr>
+        <p:spPr/>
+        <p:txBody>
+          <a:bodyPr/>
+          <a:lstStyle/>
+          <a:p>
+            <a:fld id="{32DDDBA6-C58A-4FE7-89EE-251EB0240D98}" type="slidenum">
+              <a:rPr lang="fr-FR" smtClean="0"/>
+              <a:t>2</a:t>
+            </a:fld>
+            <a:endParaRPr lang="fr-FR"/>
+          </a:p>
+        </p:txBody>
+      </p:sp>
+    </p:spTree>
+    <p:extLst>
+      <p:ext uri="{BB962C8B-B14F-4D97-AF65-F5344CB8AC3E}">
+        <p14:creationId xmlns:p14="http://schemas.microsoft.com/office/powerpoint/2010/main" val="1433829885"/>
+      </p:ext>
+    </p:extLst>
+  </p:cSld>
+  <p:clrMapOvr>
+    <a:masterClrMapping/>
+  </p:clrMapOvr>
+</p:notes>
+</file>
+
+<file path=ppt/notesSlides/notesSlide2.xml><?xml version="1.0" encoding="utf-8"?>
+<p:notes xmlns:a="http://schemas.openxmlformats.org/drawingml/2006/main" xmlns:r="http://schemas.openxmlformats.org/officeDocument/2006/relationships" xmlns:p="http://schemas.openxmlformats.org/presentationml/2006/main">
+  <p:cSld>
+    <p:spTree>
+      <p:nvGrpSpPr>
+        <p:cNvPr id="1" name=""/>
+        <p:cNvGrpSpPr/>
+        <p:nvPr/>
+      </p:nvGrpSpPr>
+      <p:grpSpPr>
+        <a:xfrm>
+          <a:off x="0" y="0"/>
+          <a:ext cx="0" cy="0"/>
+          <a:chOff x="0" y="0"/>
+          <a:chExt cx="0" cy="0"/>
+        </a:xfrm>
+      </p:grpSpPr>
+      <p:sp>
+        <p:nvSpPr>
+          <p:cNvPr id="2" name="Espace réservé de l'image des diapositives 1"/>
+          <p:cNvSpPr>
+            <a:spLocks noGrp="1" noRot="1" noChangeAspect="1"/>
+          </p:cNvSpPr>
+          <p:nvPr>
+            <p:ph type="sldImg"/>
+          </p:nvPr>
+        </p:nvSpPr>
+        <p:spPr/>
+      </p:sp>
+      <p:sp>
+        <p:nvSpPr>
+          <p:cNvPr id="3" name="Espace réservé des notes 2"/>
+          <p:cNvSpPr>
+            <a:spLocks noGrp="1"/>
+          </p:cNvSpPr>
+          <p:nvPr>
+            <p:ph type="body" idx="1"/>
+          </p:nvPr>
+        </p:nvSpPr>
+        <p:spPr/>
+        <p:txBody>
+          <a:bodyPr/>
+          <a:lstStyle/>
+          <a:p>
+            <a:r>
+              <a:rPr lang="fr-FR" dirty="0"/>
+              <a:t>Client mode : for small interactive jobs ; driver runs </a:t>
+            </a:r>
+            <a:r>
+              <a:rPr lang="fr-FR" dirty="0" err="1"/>
+              <a:t>locally</a:t>
+            </a:r>
+            <a:endParaRPr lang="fr-FR" dirty="0"/>
+          </a:p>
+          <a:p>
+            <a:r>
+              <a:rPr lang="fr-FR" dirty="0"/>
+              <a:t>Cluster mode : for </a:t>
+            </a:r>
+            <a:r>
+              <a:rPr lang="fr-FR" dirty="0" err="1"/>
+              <a:t>bigger</a:t>
+            </a:r>
+            <a:r>
+              <a:rPr lang="fr-FR" dirty="0"/>
+              <a:t> jobs ; driver runs in </a:t>
+            </a:r>
+            <a:r>
+              <a:rPr lang="fr-FR"/>
+              <a:t>a container</a:t>
+            </a:r>
+          </a:p>
+          <a:p>
+            <a:r>
+              <a:rPr lang="fr-FR" dirty="0"/>
+              <a:t>Spark </a:t>
+            </a:r>
+            <a:r>
+              <a:rPr lang="fr-FR" dirty="0" err="1"/>
+              <a:t>is</a:t>
+            </a:r>
+            <a:r>
+              <a:rPr lang="fr-FR" dirty="0"/>
+              <a:t> </a:t>
+            </a:r>
+            <a:r>
+              <a:rPr lang="fr-FR" dirty="0" err="1"/>
+              <a:t>developped</a:t>
+            </a:r>
+            <a:r>
+              <a:rPr lang="fr-FR" dirty="0"/>
+              <a:t> in JAVA. Driver and </a:t>
+            </a:r>
+            <a:r>
+              <a:rPr lang="fr-FR" dirty="0" err="1"/>
+              <a:t>executors</a:t>
+            </a:r>
+            <a:r>
+              <a:rPr lang="fr-FR" dirty="0"/>
+              <a:t> are running in java process.</a:t>
+            </a:r>
+          </a:p>
+        </p:txBody>
+      </p:sp>
+      <p:sp>
+        <p:nvSpPr>
+          <p:cNvPr id="4" name="Espace réservé du numéro de diapositive 3"/>
+          <p:cNvSpPr>
+            <a:spLocks noGrp="1"/>
+          </p:cNvSpPr>
+          <p:nvPr>
+            <p:ph type="sldNum" sz="quarter" idx="5"/>
+          </p:nvPr>
+        </p:nvSpPr>
+        <p:spPr/>
+        <p:txBody>
+          <a:bodyPr/>
+          <a:lstStyle/>
+          <a:p>
+            <a:fld id="{32DDDBA6-C58A-4FE7-89EE-251EB0240D98}" type="slidenum">
+              <a:rPr lang="fr-FR" smtClean="0"/>
+              <a:t>4</a:t>
+            </a:fld>
+            <a:endParaRPr lang="fr-FR"/>
+          </a:p>
+        </p:txBody>
+      </p:sp>
+    </p:spTree>
+    <p:extLst>
+      <p:ext uri="{BB962C8B-B14F-4D97-AF65-F5344CB8AC3E}">
+        <p14:creationId xmlns:p14="http://schemas.microsoft.com/office/powerpoint/2010/main" val="3572909432"/>
+      </p:ext>
+    </p:extLst>
+  </p:cSld>
+  <p:clrMapOvr>
+    <a:masterClrMapping/>
+  </p:clrMapOvr>
+</p:notes>
+</file>
+
+<file path=ppt/notesSlides/notesSlide3.xml><?xml version="1.0" encoding="utf-8"?>
+<p:notes xmlns:a="http://schemas.openxmlformats.org/drawingml/2006/main" xmlns:r="http://schemas.openxmlformats.org/officeDocument/2006/relationships" xmlns:p="http://schemas.openxmlformats.org/presentationml/2006/main">
+  <p:cSld>
+    <p:spTree>
+      <p:nvGrpSpPr>
+        <p:cNvPr id="1" name=""/>
+        <p:cNvGrpSpPr/>
+        <p:nvPr/>
+      </p:nvGrpSpPr>
+      <p:grpSpPr>
+        <a:xfrm>
+          <a:off x="0" y="0"/>
+          <a:ext cx="0" cy="0"/>
+          <a:chOff x="0" y="0"/>
+          <a:chExt cx="0" cy="0"/>
+        </a:xfrm>
+      </p:grpSpPr>
+      <p:sp>
+        <p:nvSpPr>
+          <p:cNvPr id="2" name="Espace réservé de l'image des diapositives 1"/>
+          <p:cNvSpPr>
+            <a:spLocks noGrp="1" noRot="1" noChangeAspect="1"/>
+          </p:cNvSpPr>
+          <p:nvPr>
+            <p:ph type="sldImg"/>
+          </p:nvPr>
+        </p:nvSpPr>
+        <p:spPr/>
+      </p:sp>
+      <p:sp>
+        <p:nvSpPr>
+          <p:cNvPr id="3" name="Espace réservé des notes 2"/>
+          <p:cNvSpPr>
+            <a:spLocks noGrp="1"/>
+          </p:cNvSpPr>
+          <p:nvPr>
+            <p:ph type="body" idx="1"/>
+          </p:nvPr>
+        </p:nvSpPr>
+        <p:spPr/>
+        <p:txBody>
+          <a:bodyPr/>
+          <a:lstStyle/>
+          <a:p>
+            <a:r>
+              <a:rPr lang="fr-FR" dirty="0" err="1"/>
+              <a:t>Fault</a:t>
+            </a:r>
+            <a:r>
+              <a:rPr lang="fr-FR" dirty="0"/>
+              <a:t> </a:t>
+            </a:r>
+            <a:r>
+              <a:rPr lang="fr-FR" dirty="0" err="1"/>
+              <a:t>Tolerance</a:t>
+            </a:r>
+            <a:r>
+              <a:rPr lang="fr-FR" dirty="0"/>
+              <a:t> </a:t>
+            </a:r>
+            <a:r>
+              <a:rPr lang="fr-FR" dirty="0" err="1"/>
+              <a:t>is</a:t>
+            </a:r>
+            <a:r>
+              <a:rPr lang="fr-FR" dirty="0"/>
+              <a:t> </a:t>
+            </a:r>
+            <a:r>
+              <a:rPr lang="fr-FR" dirty="0" err="1"/>
+              <a:t>also</a:t>
+            </a:r>
+            <a:r>
+              <a:rPr lang="fr-FR" dirty="0"/>
+              <a:t> </a:t>
+            </a:r>
+            <a:r>
+              <a:rPr lang="fr-FR" dirty="0" err="1"/>
+              <a:t>built-in</a:t>
+            </a:r>
+            <a:r>
+              <a:rPr lang="fr-FR" dirty="0"/>
+              <a:t> in MapReduce.</a:t>
+            </a:r>
+          </a:p>
+        </p:txBody>
+      </p:sp>
+      <p:sp>
+        <p:nvSpPr>
+          <p:cNvPr id="4" name="Espace réservé du numéro de diapositive 3"/>
+          <p:cNvSpPr>
+            <a:spLocks noGrp="1"/>
+          </p:cNvSpPr>
+          <p:nvPr>
+            <p:ph type="sldNum" sz="quarter" idx="5"/>
+          </p:nvPr>
+        </p:nvSpPr>
+        <p:spPr/>
+        <p:txBody>
+          <a:bodyPr/>
+          <a:lstStyle/>
+          <a:p>
+            <a:fld id="{32DDDBA6-C58A-4FE7-89EE-251EB0240D98}" type="slidenum">
+              <a:rPr lang="fr-FR" smtClean="0"/>
+              <a:t>5</a:t>
+            </a:fld>
+            <a:endParaRPr lang="fr-FR"/>
+          </a:p>
+        </p:txBody>
+      </p:sp>
+    </p:spTree>
+    <p:extLst>
+      <p:ext uri="{BB962C8B-B14F-4D97-AF65-F5344CB8AC3E}">
+        <p14:creationId xmlns:p14="http://schemas.microsoft.com/office/powerpoint/2010/main" val="1977290359"/>
+      </p:ext>
+    </p:extLst>
+  </p:cSld>
+  <p:clrMapOvr>
+    <a:masterClrMapping/>
+  </p:clrMapOvr>
+</p:notes>
+</file>
+
 <file path=ppt/slideLayouts/slideLayout1.xml><?xml version="1.0" encoding="utf-8"?>
 <p:sldLayout xmlns:a="http://schemas.openxmlformats.org/drawingml/2006/main" xmlns:r="http://schemas.openxmlformats.org/officeDocument/2006/relationships" xmlns:p="http://schemas.openxmlformats.org/presentationml/2006/main" type="title" preserve="1">
   <p:cSld name="Title Slide">
@@ -270,7 +1211,7 @@
           <a:p>
             <a:fld id="{97D5A493-CCC9-418E-861C-802A9D3B9980}" type="datetimeFigureOut">
               <a:rPr lang="en-US" smtClean="0"/>
-              <a:t>10/6/2020</a:t>
+              <a:t>1/14/2022</a:t>
             </a:fld>
             <a:endParaRPr lang="en-US"/>
           </a:p>
@@ -468,7 +1409,7 @@
           <a:p>
             <a:fld id="{97D5A493-CCC9-418E-861C-802A9D3B9980}" type="datetimeFigureOut">
               <a:rPr lang="en-US" smtClean="0"/>
-              <a:t>10/6/2020</a:t>
+              <a:t>1/14/2022</a:t>
             </a:fld>
             <a:endParaRPr lang="en-US"/>
           </a:p>
@@ -676,7 +1617,7 @@
           <a:p>
             <a:fld id="{97D5A493-CCC9-418E-861C-802A9D3B9980}" type="datetimeFigureOut">
               <a:rPr lang="en-US" smtClean="0"/>
-              <a:t>10/6/2020</a:t>
+              <a:t>1/14/2022</a:t>
             </a:fld>
             <a:endParaRPr lang="en-US"/>
           </a:p>
@@ -874,7 +1815,7 @@
           <a:p>
             <a:fld id="{97D5A493-CCC9-418E-861C-802A9D3B9980}" type="datetimeFigureOut">
               <a:rPr lang="en-US" smtClean="0"/>
-              <a:t>10/6/2020</a:t>
+              <a:t>1/14/2022</a:t>
             </a:fld>
             <a:endParaRPr lang="en-US"/>
           </a:p>
@@ -1149,7 +2090,7 @@
           <a:p>
             <a:fld id="{97D5A493-CCC9-418E-861C-802A9D3B9980}" type="datetimeFigureOut">
               <a:rPr lang="en-US" smtClean="0"/>
-              <a:t>10/6/2020</a:t>
+              <a:t>1/14/2022</a:t>
             </a:fld>
             <a:endParaRPr lang="en-US"/>
           </a:p>
@@ -1414,7 +2355,7 @@
           <a:p>
             <a:fld id="{97D5A493-CCC9-418E-861C-802A9D3B9980}" type="datetimeFigureOut">
               <a:rPr lang="en-US" smtClean="0"/>
-              <a:t>10/6/2020</a:t>
+              <a:t>1/14/2022</a:t>
             </a:fld>
             <a:endParaRPr lang="en-US"/>
           </a:p>
@@ -1826,7 +2767,7 @@
           <a:p>
             <a:fld id="{97D5A493-CCC9-418E-861C-802A9D3B9980}" type="datetimeFigureOut">
               <a:rPr lang="en-US" smtClean="0"/>
-              <a:t>10/6/2020</a:t>
+              <a:t>1/14/2022</a:t>
             </a:fld>
             <a:endParaRPr lang="en-US"/>
           </a:p>
@@ -1967,7 +2908,7 @@
           <a:p>
             <a:fld id="{97D5A493-CCC9-418E-861C-802A9D3B9980}" type="datetimeFigureOut">
               <a:rPr lang="en-US" smtClean="0"/>
-              <a:t>10/6/2020</a:t>
+              <a:t>1/14/2022</a:t>
             </a:fld>
             <a:endParaRPr lang="en-US"/>
           </a:p>
@@ -2080,7 +3021,7 @@
           <a:p>
             <a:fld id="{97D5A493-CCC9-418E-861C-802A9D3B9980}" type="datetimeFigureOut">
               <a:rPr lang="en-US" smtClean="0"/>
-              <a:t>10/6/2020</a:t>
+              <a:t>1/14/2022</a:t>
             </a:fld>
             <a:endParaRPr lang="en-US"/>
           </a:p>
@@ -2391,7 +3332,7 @@
           <a:p>
             <a:fld id="{97D5A493-CCC9-418E-861C-802A9D3B9980}" type="datetimeFigureOut">
               <a:rPr lang="en-US" smtClean="0"/>
-              <a:t>10/6/2020</a:t>
+              <a:t>1/14/2022</a:t>
             </a:fld>
             <a:endParaRPr lang="en-US"/>
           </a:p>
@@ -2679,7 +3620,7 @@
           <a:p>
             <a:fld id="{97D5A493-CCC9-418E-861C-802A9D3B9980}" type="datetimeFigureOut">
               <a:rPr lang="en-US" smtClean="0"/>
-              <a:t>10/6/2020</a:t>
+              <a:t>1/14/2022</a:t>
             </a:fld>
             <a:endParaRPr lang="en-US"/>
           </a:p>
@@ -2920,7 +3861,7 @@
           <a:p>
             <a:fld id="{97D5A493-CCC9-418E-861C-802A9D3B9980}" type="datetimeFigureOut">
               <a:rPr lang="en-US" smtClean="0"/>
-              <a:t>10/6/2020</a:t>
+              <a:t>1/14/2022</a:t>
             </a:fld>
             <a:endParaRPr lang="en-US"/>
           </a:p>
@@ -3339,10 +4280,95 @@
       </p:grpSpPr>
       <p:sp>
         <p:nvSpPr>
+          <p:cNvPr id="2" name="object 2"/>
+          <p:cNvSpPr txBox="1">
+            <a:spLocks noGrp="1"/>
+          </p:cNvSpPr>
+          <p:nvPr>
+            <p:ph type="title"/>
+          </p:nvPr>
+        </p:nvSpPr>
+        <p:spPr>
+          <a:xfrm>
+            <a:off x="2271493" y="2592883"/>
+            <a:ext cx="7575491" cy="1672740"/>
+          </a:xfrm>
+          <a:prstGeom prst="rect">
+            <a:avLst/>
+          </a:prstGeom>
+        </p:spPr>
+        <p:txBody>
+          <a:bodyPr vert="horz" wrap="square" lIns="0" tIns="13310" rIns="0" bIns="0" rtlCol="0" anchor="ctr">
+            <a:spAutoFit/>
+          </a:bodyPr>
+          <a:lstStyle/>
+          <a:p>
+            <a:pPr marL="12677" algn="ctr">
+              <a:lnSpc>
+                <a:spcPct val="100000"/>
+              </a:lnSpc>
+              <a:spcBef>
+                <a:spcPts val="105"/>
+              </a:spcBef>
+            </a:pPr>
+            <a:r>
+              <a:rPr lang="en-US" sz="3594" b="1" spc="-5" dirty="0">
+                <a:latin typeface="Verdana"/>
+                <a:cs typeface="Verdana"/>
+              </a:rPr>
+              <a:t>Systems, paradigms and algorithms for Big Data</a:t>
+            </a:r>
+            <a:br>
+              <a:rPr lang="en-US" sz="3594" b="1" spc="-5" dirty="0">
+                <a:latin typeface="Verdana"/>
+                <a:cs typeface="Verdana"/>
+              </a:rPr>
+            </a:br>
+            <a:r>
+              <a:rPr lang="en-US" sz="3594" b="1" spc="-5" dirty="0">
+                <a:latin typeface="Verdana"/>
+                <a:cs typeface="Verdana"/>
+              </a:rPr>
+              <a:t>TD 1</a:t>
+            </a:r>
+            <a:endParaRPr sz="3594" dirty="0">
+              <a:latin typeface="Verdana"/>
+              <a:cs typeface="Verdana"/>
+            </a:endParaRPr>
+          </a:p>
+        </p:txBody>
+      </p:sp>
+    </p:spTree>
+  </p:cSld>
+  <p:clrMapOvr>
+    <a:masterClrMapping/>
+  </p:clrMapOvr>
+</p:sld>
+</file>
+
+<file path=ppt/slides/slide10.xml><?xml version="1.0" encoding="utf-8"?>
+<p:sld xmlns:a="http://schemas.openxmlformats.org/drawingml/2006/main" xmlns:r="http://schemas.openxmlformats.org/officeDocument/2006/relationships" xmlns:p="http://schemas.openxmlformats.org/presentationml/2006/main">
+  <p:cSld>
+    <p:spTree>
+      <p:nvGrpSpPr>
+        <p:cNvPr id="1" name=""/>
+        <p:cNvGrpSpPr/>
+        <p:nvPr/>
+      </p:nvGrpSpPr>
+      <p:grpSpPr>
+        <a:xfrm>
+          <a:off x="0" y="0"/>
+          <a:ext cx="0" cy="0"/>
+          <a:chOff x="0" y="0"/>
+          <a:chExt cx="0" cy="0"/>
+        </a:xfrm>
+      </p:grpSpPr>
+      <p:sp>
+        <p:nvSpPr>
           <p:cNvPr id="2" name="Title 1">
             <a:extLst>
               <a:ext uri="{FF2B5EF4-FFF2-40B4-BE49-F238E27FC236}">
-                <a16:creationId xmlns:a16="http://schemas.microsoft.com/office/drawing/2014/main" id="{7C192A2F-BC20-4193-8F18-3055256C342F}"/>
+                <a16:creationId xmlns:a16="http://schemas.microsoft.com/office/drawing/2014/main" id="{1EF77BFB-B82D-46E7-9ED3-A723BCC0A39C}"/>
               </a:ext>
             </a:extLst>
           </p:cNvPr>
@@ -3359,234 +4385,1020 @@
           <a:lstStyle/>
           <a:p>
             <a:r>
-              <a:rPr lang="fr-FR" dirty="0" err="1">
-                <a:latin typeface="+mn-lt"/>
-              </a:rPr>
-              <a:t>Why</a:t>
-            </a:r>
-            <a:r>
-              <a:rPr lang="fr-FR" dirty="0">
-                <a:latin typeface="+mn-lt"/>
-              </a:rPr>
-              <a:t> Spark ?</a:t>
-            </a:r>
-            <a:endParaRPr lang="en-US" dirty="0">
-              <a:latin typeface="+mn-lt"/>
-            </a:endParaRPr>
+              <a:rPr lang="fr-FR" dirty="0"/>
+              <a:t>RDD API</a:t>
+            </a:r>
+            <a:endParaRPr lang="en-US" dirty="0"/>
           </a:p>
         </p:txBody>
       </p:sp>
       <p:sp>
         <p:nvSpPr>
-          <p:cNvPr id="5" name="TextBox 4">
-            <a:extLst>
-              <a:ext uri="{FF2B5EF4-FFF2-40B4-BE49-F238E27FC236}">
-                <a16:creationId xmlns:a16="http://schemas.microsoft.com/office/drawing/2014/main" id="{E38B5AA2-A99E-4BC2-9CE0-A20E18D62DAC}"/>
-              </a:ext>
-            </a:extLst>
-          </p:cNvPr>
-          <p:cNvSpPr txBox="1"/>
+          <p:cNvPr id="8" name="Rectangle: Rounded Corners 7">
+            <a:extLst>
+              <a:ext uri="{FF2B5EF4-FFF2-40B4-BE49-F238E27FC236}">
+                <a16:creationId xmlns:a16="http://schemas.microsoft.com/office/drawing/2014/main" id="{4773AFED-7574-4502-B5B1-B2BE28D6B693}"/>
+              </a:ext>
+            </a:extLst>
+          </p:cNvPr>
+          <p:cNvSpPr/>
           <p:nvPr/>
         </p:nvSpPr>
         <p:spPr>
           <a:xfrm>
-            <a:off x="1036948" y="1432874"/>
-            <a:ext cx="10058400" cy="2677656"/>
+            <a:off x="6096000" y="1741022"/>
+            <a:ext cx="2374085" cy="780176"/>
           </a:xfrm>
-          <a:prstGeom prst="rect">
+          <a:prstGeom prst="roundRect">
             <a:avLst/>
           </a:prstGeom>
-          <a:noFill/>
         </p:spPr>
+        <p:style>
+          <a:lnRef idx="2">
+            <a:schemeClr val="accent1">
+              <a:shade val="50000"/>
+            </a:schemeClr>
+          </a:lnRef>
+          <a:fillRef idx="1">
+            <a:schemeClr val="accent1"/>
+          </a:fillRef>
+          <a:effectRef idx="0">
+            <a:schemeClr val="accent1"/>
+          </a:effectRef>
+          <a:fontRef idx="minor">
+            <a:schemeClr val="lt1"/>
+          </a:fontRef>
+        </p:style>
         <p:txBody>
-          <a:bodyPr wrap="square" rtlCol="0">
-            <a:spAutoFit/>
-          </a:bodyPr>
+          <a:bodyPr rtlCol="0" anchor="ctr"/>
           <a:lstStyle/>
           <a:p>
-            <a:pPr marL="285750" indent="-285750">
-              <a:buFontTx/>
-              <a:buChar char="-"/>
-            </a:pPr>
-            <a:r>
-              <a:rPr lang="fr-FR" sz="2400" dirty="0"/>
-              <a:t>Support </a:t>
-            </a:r>
-            <a:r>
-              <a:rPr lang="fr-FR" sz="2400" dirty="0" err="1"/>
-              <a:t>iterative</a:t>
-            </a:r>
-            <a:r>
-              <a:rPr lang="fr-FR" sz="2400" dirty="0"/>
-              <a:t> </a:t>
-            </a:r>
-            <a:r>
-              <a:rPr lang="fr-FR" sz="2400" dirty="0" err="1"/>
-              <a:t>algorithms</a:t>
-            </a:r>
-            <a:r>
-              <a:rPr lang="fr-FR" sz="2400" dirty="0"/>
-              <a:t>, like gradient </a:t>
-            </a:r>
-            <a:r>
-              <a:rPr lang="fr-FR" sz="2400" dirty="0" err="1"/>
-              <a:t>descent</a:t>
-            </a:r>
-            <a:endParaRPr lang="fr-FR" sz="2400" dirty="0"/>
-          </a:p>
-          <a:p>
-            <a:pPr marL="742950" lvl="1" indent="-285750">
-              <a:buFontTx/>
-              <a:buChar char="-"/>
-            </a:pPr>
-            <a:r>
-              <a:rPr lang="fr-FR" sz="2400" dirty="0"/>
-              <a:t>In memory </a:t>
-            </a:r>
-            <a:r>
-              <a:rPr lang="fr-FR" sz="2400" dirty="0" err="1"/>
-              <a:t>processing</a:t>
-            </a:r>
-            <a:endParaRPr lang="fr-FR" sz="2400" dirty="0"/>
-          </a:p>
-          <a:p>
-            <a:pPr marL="742950" lvl="1" indent="-285750">
-              <a:buFontTx/>
-              <a:buChar char="-"/>
-            </a:pPr>
-            <a:r>
-              <a:rPr lang="fr-FR" sz="2400" dirty="0" err="1"/>
-              <a:t>Built-in</a:t>
-            </a:r>
-            <a:r>
-              <a:rPr lang="fr-FR" sz="2400" dirty="0"/>
-              <a:t> broadcast</a:t>
-            </a:r>
-          </a:p>
-          <a:p>
-            <a:pPr marL="285750" indent="-285750">
-              <a:buFontTx/>
-              <a:buChar char="-"/>
-            </a:pPr>
-            <a:r>
-              <a:rPr lang="fr-FR" sz="2400" dirty="0" err="1"/>
-              <a:t>Make</a:t>
-            </a:r>
-            <a:r>
-              <a:rPr lang="fr-FR" sz="2400" dirty="0"/>
-              <a:t> </a:t>
-            </a:r>
-            <a:r>
-              <a:rPr lang="fr-FR" sz="2400" dirty="0" err="1"/>
-              <a:t>it</a:t>
-            </a:r>
-            <a:r>
-              <a:rPr lang="fr-FR" sz="2400" dirty="0"/>
-              <a:t> </a:t>
-            </a:r>
-            <a:r>
-              <a:rPr lang="fr-FR" sz="2400" dirty="0" err="1"/>
-              <a:t>easier</a:t>
-            </a:r>
-            <a:r>
-              <a:rPr lang="fr-FR" sz="2400" dirty="0"/>
-              <a:t> to explore data </a:t>
-            </a:r>
-            <a:r>
-              <a:rPr lang="fr-FR" sz="2400" dirty="0" err="1"/>
-              <a:t>interactively</a:t>
-            </a:r>
-            <a:endParaRPr lang="fr-FR" sz="2400" dirty="0"/>
-          </a:p>
-          <a:p>
-            <a:pPr marL="742950" lvl="1" indent="-285750">
-              <a:buFontTx/>
-              <a:buChar char="-"/>
-            </a:pPr>
-            <a:r>
-              <a:rPr lang="fr-FR" sz="2400" dirty="0" err="1"/>
-              <a:t>Developer</a:t>
-            </a:r>
-            <a:r>
-              <a:rPr lang="fr-FR" sz="2400" dirty="0"/>
-              <a:t> </a:t>
-            </a:r>
-            <a:r>
-              <a:rPr lang="fr-FR" sz="2400" dirty="0" err="1"/>
-              <a:t>friendly</a:t>
-            </a:r>
-            <a:r>
-              <a:rPr lang="fr-FR" sz="2400" dirty="0"/>
-              <a:t>, no </a:t>
-            </a:r>
-            <a:r>
-              <a:rPr lang="fr-FR" sz="2400" dirty="0" err="1"/>
-              <a:t>need</a:t>
-            </a:r>
-            <a:r>
-              <a:rPr lang="fr-FR" sz="2400" dirty="0"/>
-              <a:t> to </a:t>
-            </a:r>
-            <a:r>
-              <a:rPr lang="fr-FR" sz="2400" dirty="0" err="1"/>
-              <a:t>create</a:t>
-            </a:r>
-            <a:r>
-              <a:rPr lang="fr-FR" sz="2400" dirty="0"/>
-              <a:t> tons of classes and jobs…</a:t>
-            </a:r>
-          </a:p>
-          <a:p>
-            <a:pPr marL="742950" lvl="1" indent="-285750">
-              <a:buFontTx/>
-              <a:buChar char="-"/>
-            </a:pPr>
-            <a:r>
-              <a:rPr lang="fr-FR" sz="2400" dirty="0" err="1"/>
-              <a:t>Repl</a:t>
-            </a:r>
-            <a:r>
-              <a:rPr lang="fr-FR" sz="2400" dirty="0"/>
-              <a:t> mode</a:t>
-            </a:r>
-          </a:p>
-          <a:p>
-            <a:pPr marL="742950" lvl="1" indent="-285750">
-              <a:buFontTx/>
-              <a:buChar char="-"/>
-            </a:pPr>
-            <a:r>
-              <a:rPr lang="fr-FR" sz="2400" dirty="0"/>
-              <a:t>Scala/Python API </a:t>
-            </a:r>
-            <a:r>
-              <a:rPr lang="fr-FR" sz="2400" dirty="0" err="1"/>
-              <a:t>similar</a:t>
-            </a:r>
-            <a:r>
-              <a:rPr lang="fr-FR" sz="2400" dirty="0"/>
-              <a:t> to </a:t>
-            </a:r>
-            <a:r>
-              <a:rPr lang="fr-FR" sz="2400" dirty="0" err="1"/>
-              <a:t>functional</a:t>
-            </a:r>
-            <a:r>
-              <a:rPr lang="fr-FR" sz="2400" dirty="0"/>
-              <a:t> </a:t>
-            </a:r>
-            <a:r>
-              <a:rPr lang="fr-FR" sz="2400" dirty="0" err="1"/>
-              <a:t>programming</a:t>
-            </a:r>
-            <a:endParaRPr lang="fr-FR" sz="2400" dirty="0"/>
+            <a:pPr algn="ctr"/>
+            <a:r>
+              <a:rPr lang="fr-FR" dirty="0" err="1"/>
+              <a:t>flatmap</a:t>
+            </a:r>
+            <a:r>
+              <a:rPr lang="fr-FR" dirty="0"/>
+              <a:t>(x </a:t>
+            </a:r>
+            <a:r>
+              <a:rPr lang="fr-FR" dirty="0">
+                <a:sym typeface="Wingdings" panose="05000000000000000000" pitchFamily="2" charset="2"/>
+              </a:rPr>
+              <a:t> x[‘genres’].split(‘;’))</a:t>
+            </a:r>
+            <a:endParaRPr lang="en-US" dirty="0"/>
           </a:p>
         </p:txBody>
       </p:sp>
+      <p:cxnSp>
+        <p:nvCxnSpPr>
+          <p:cNvPr id="14" name="Straight Arrow Connector 13">
+            <a:extLst>
+              <a:ext uri="{FF2B5EF4-FFF2-40B4-BE49-F238E27FC236}">
+                <a16:creationId xmlns:a16="http://schemas.microsoft.com/office/drawing/2014/main" id="{B592BA22-0F53-4B16-BBAD-238ECEFD8784}"/>
+              </a:ext>
+            </a:extLst>
+          </p:cNvPr>
+          <p:cNvCxnSpPr>
+            <a:cxnSpLocks/>
+          </p:cNvCxnSpPr>
+          <p:nvPr/>
+        </p:nvCxnSpPr>
+        <p:spPr>
+          <a:xfrm>
+            <a:off x="5626217" y="2156583"/>
+            <a:ext cx="469783" cy="0"/>
+          </a:xfrm>
+          <a:prstGeom prst="straightConnector1">
+            <a:avLst/>
+          </a:prstGeom>
+          <a:ln>
+            <a:tailEnd type="triangle"/>
+          </a:ln>
+        </p:spPr>
+        <p:style>
+          <a:lnRef idx="1">
+            <a:schemeClr val="accent1"/>
+          </a:lnRef>
+          <a:fillRef idx="0">
+            <a:schemeClr val="accent1"/>
+          </a:fillRef>
+          <a:effectRef idx="0">
+            <a:schemeClr val="accent1"/>
+          </a:effectRef>
+          <a:fontRef idx="minor">
+            <a:schemeClr val="tx1"/>
+          </a:fontRef>
+        </p:style>
+      </p:cxnSp>
+      <p:cxnSp>
+        <p:nvCxnSpPr>
+          <p:cNvPr id="23" name="Straight Arrow Connector 22">
+            <a:extLst>
+              <a:ext uri="{FF2B5EF4-FFF2-40B4-BE49-F238E27FC236}">
+                <a16:creationId xmlns:a16="http://schemas.microsoft.com/office/drawing/2014/main" id="{768D8282-A543-43E0-8A54-C42479213D0D}"/>
+              </a:ext>
+            </a:extLst>
+          </p:cNvPr>
+          <p:cNvCxnSpPr>
+            <a:cxnSpLocks/>
+          </p:cNvCxnSpPr>
+          <p:nvPr/>
+        </p:nvCxnSpPr>
+        <p:spPr>
+          <a:xfrm>
+            <a:off x="8470085" y="2147888"/>
+            <a:ext cx="469783" cy="0"/>
+          </a:xfrm>
+          <a:prstGeom prst="straightConnector1">
+            <a:avLst/>
+          </a:prstGeom>
+          <a:ln>
+            <a:tailEnd type="triangle"/>
+          </a:ln>
+        </p:spPr>
+        <p:style>
+          <a:lnRef idx="1">
+            <a:schemeClr val="accent1"/>
+          </a:lnRef>
+          <a:fillRef idx="0">
+            <a:schemeClr val="accent1"/>
+          </a:fillRef>
+          <a:effectRef idx="0">
+            <a:schemeClr val="accent1"/>
+          </a:effectRef>
+          <a:fontRef idx="minor">
+            <a:schemeClr val="tx1"/>
+          </a:fontRef>
+        </p:style>
+      </p:cxnSp>
+      <p:graphicFrame>
+        <p:nvGraphicFramePr>
+          <p:cNvPr id="24" name="Table 6">
+            <a:extLst>
+              <a:ext uri="{FF2B5EF4-FFF2-40B4-BE49-F238E27FC236}">
+                <a16:creationId xmlns:a16="http://schemas.microsoft.com/office/drawing/2014/main" id="{7E32E247-CDE4-408B-9A0E-98DA9FCC0084}"/>
+              </a:ext>
+            </a:extLst>
+          </p:cNvPr>
+          <p:cNvGraphicFramePr>
+            <a:graphicFrameLocks noGrp="1"/>
+          </p:cNvGraphicFramePr>
+          <p:nvPr>
+            <p:extLst>
+              <p:ext uri="{D42A27DB-BD31-4B8C-83A1-F6EECF244321}">
+                <p14:modId xmlns:p14="http://schemas.microsoft.com/office/powerpoint/2010/main" val="3247897374"/>
+              </p:ext>
+            </p:extLst>
+          </p:nvPr>
+        </p:nvGraphicFramePr>
+        <p:xfrm>
+          <a:off x="9158680" y="913788"/>
+          <a:ext cx="1435267" cy="2485589"/>
+        </p:xfrm>
+        <a:graphic>
+          <a:graphicData uri="http://schemas.openxmlformats.org/drawingml/2006/table">
+            <a:tbl>
+              <a:tblPr firstRow="1" bandRow="1">
+                <a:tableStyleId>{5C22544A-7EE6-4342-B048-85BDC9FD1C3A}</a:tableStyleId>
+              </a:tblPr>
+              <a:tblGrid>
+                <a:gridCol w="1435267">
+                  <a:extLst>
+                    <a:ext uri="{9D8B030D-6E8A-4147-A177-3AD203B41FA5}">
+                      <a16:colId xmlns:a16="http://schemas.microsoft.com/office/drawing/2014/main" val="2061391393"/>
+                    </a:ext>
+                  </a:extLst>
+                </a:gridCol>
+              </a:tblGrid>
+              <a:tr h="473909">
+                <a:tc>
+                  <a:txBody>
+                    <a:bodyPr/>
+                    <a:lstStyle/>
+                    <a:p>
+                      <a:r>
+                        <a:rPr lang="fr-FR" sz="1600" dirty="0"/>
+                        <a:t>Row</a:t>
+                      </a:r>
+                      <a:endParaRPr lang="en-US" sz="1600" dirty="0"/>
+                    </a:p>
+                  </a:txBody>
+                  <a:tcPr/>
+                </a:tc>
+                <a:extLst>
+                  <a:ext uri="{0D108BD9-81ED-4DB2-BD59-A6C34878D82A}">
+                    <a16:rowId xmlns:a16="http://schemas.microsoft.com/office/drawing/2014/main" val="235972142"/>
+                  </a:ext>
+                </a:extLst>
+              </a:tr>
+              <a:tr h="283885">
+                <a:tc>
+                  <a:txBody>
+                    <a:bodyPr/>
+                    <a:lstStyle/>
+                    <a:p>
+                      <a:r>
+                        <a:rPr lang="fr-FR" sz="1600" dirty="0"/>
+                        <a:t>cyberpunk</a:t>
+                      </a:r>
+                      <a:endParaRPr lang="en-US" sz="1600" dirty="0"/>
+                    </a:p>
+                  </a:txBody>
+                  <a:tcPr/>
+                </a:tc>
+                <a:extLst>
+                  <a:ext uri="{0D108BD9-81ED-4DB2-BD59-A6C34878D82A}">
+                    <a16:rowId xmlns:a16="http://schemas.microsoft.com/office/drawing/2014/main" val="1215558195"/>
+                  </a:ext>
+                </a:extLst>
+              </a:tr>
+              <a:tr h="283885">
+                <a:tc>
+                  <a:txBody>
+                    <a:bodyPr/>
+                    <a:lstStyle/>
+                    <a:p>
+                      <a:r>
+                        <a:rPr lang="fr-FR" sz="1600" dirty="0" err="1"/>
+                        <a:t>scifi</a:t>
+                      </a:r>
+                      <a:endParaRPr lang="en-US" sz="1600" dirty="0"/>
+                    </a:p>
+                  </a:txBody>
+                  <a:tcPr/>
+                </a:tc>
+                <a:extLst>
+                  <a:ext uri="{0D108BD9-81ED-4DB2-BD59-A6C34878D82A}">
+                    <a16:rowId xmlns:a16="http://schemas.microsoft.com/office/drawing/2014/main" val="3821773839"/>
+                  </a:ext>
+                </a:extLst>
+              </a:tr>
+              <a:tr h="283885">
+                <a:tc>
+                  <a:txBody>
+                    <a:bodyPr/>
+                    <a:lstStyle/>
+                    <a:p>
+                      <a:pPr marL="0" marR="0" lvl="0" indent="0" algn="l" defTabSz="914400" rtl="0" eaLnBrk="1" fontAlgn="auto" latinLnBrk="0" hangingPunct="1">
+                        <a:lnSpc>
+                          <a:spcPct val="100000"/>
+                        </a:lnSpc>
+                        <a:spcBef>
+                          <a:spcPts val="0"/>
+                        </a:spcBef>
+                        <a:spcAft>
+                          <a:spcPts val="0"/>
+                        </a:spcAft>
+                        <a:buClrTx/>
+                        <a:buSzTx/>
+                        <a:buFontTx/>
+                        <a:buNone/>
+                        <a:tabLst/>
+                        <a:defRPr/>
+                      </a:pPr>
+                      <a:r>
+                        <a:rPr lang="fr-FR" sz="1600" dirty="0"/>
+                        <a:t>action</a:t>
+                      </a:r>
+                      <a:endParaRPr lang="en-US" sz="1600" dirty="0"/>
+                    </a:p>
+                  </a:txBody>
+                  <a:tcPr/>
+                </a:tc>
+                <a:extLst>
+                  <a:ext uri="{0D108BD9-81ED-4DB2-BD59-A6C34878D82A}">
+                    <a16:rowId xmlns:a16="http://schemas.microsoft.com/office/drawing/2014/main" val="1188895231"/>
+                  </a:ext>
+                </a:extLst>
+              </a:tr>
+              <a:tr h="283885">
+                <a:tc>
+                  <a:txBody>
+                    <a:bodyPr/>
+                    <a:lstStyle/>
+                    <a:p>
+                      <a:pPr marL="0" marR="0" lvl="0" indent="0" algn="l" defTabSz="914400" rtl="0" eaLnBrk="1" fontAlgn="auto" latinLnBrk="0" hangingPunct="1">
+                        <a:lnSpc>
+                          <a:spcPct val="100000"/>
+                        </a:lnSpc>
+                        <a:spcBef>
+                          <a:spcPts val="0"/>
+                        </a:spcBef>
+                        <a:spcAft>
+                          <a:spcPts val="0"/>
+                        </a:spcAft>
+                        <a:buClrTx/>
+                        <a:buSzTx/>
+                        <a:buFontTx/>
+                        <a:buNone/>
+                        <a:tabLst/>
+                        <a:defRPr/>
+                      </a:pPr>
+                      <a:r>
+                        <a:rPr lang="fr-FR" sz="1600" dirty="0"/>
+                        <a:t>music</a:t>
+                      </a:r>
+                      <a:endParaRPr lang="en-US" sz="1600" dirty="0"/>
+                    </a:p>
+                  </a:txBody>
+                  <a:tcPr/>
+                </a:tc>
+                <a:extLst>
+                  <a:ext uri="{0D108BD9-81ED-4DB2-BD59-A6C34878D82A}">
+                    <a16:rowId xmlns:a16="http://schemas.microsoft.com/office/drawing/2014/main" val="4129262335"/>
+                  </a:ext>
+                </a:extLst>
+              </a:tr>
+              <a:tr h="283885">
+                <a:tc>
+                  <a:txBody>
+                    <a:bodyPr/>
+                    <a:lstStyle/>
+                    <a:p>
+                      <a:pPr marL="0" marR="0" lvl="0" indent="0" algn="l" defTabSz="914400" rtl="0" eaLnBrk="1" fontAlgn="auto" latinLnBrk="0" hangingPunct="1">
+                        <a:lnSpc>
+                          <a:spcPct val="100000"/>
+                        </a:lnSpc>
+                        <a:spcBef>
+                          <a:spcPts val="0"/>
+                        </a:spcBef>
+                        <a:spcAft>
+                          <a:spcPts val="0"/>
+                        </a:spcAft>
+                        <a:buClrTx/>
+                        <a:buSzTx/>
+                        <a:buFontTx/>
+                        <a:buNone/>
+                        <a:tabLst/>
+                        <a:defRPr/>
+                      </a:pPr>
+                      <a:r>
+                        <a:rPr lang="fr-FR" sz="1600" dirty="0"/>
+                        <a:t>danse</a:t>
+                      </a:r>
+                      <a:endParaRPr lang="en-US" sz="1600" dirty="0"/>
+                    </a:p>
+                  </a:txBody>
+                  <a:tcPr/>
+                </a:tc>
+                <a:extLst>
+                  <a:ext uri="{0D108BD9-81ED-4DB2-BD59-A6C34878D82A}">
+                    <a16:rowId xmlns:a16="http://schemas.microsoft.com/office/drawing/2014/main" val="260357178"/>
+                  </a:ext>
+                </a:extLst>
+              </a:tr>
+              <a:tr h="283885">
+                <a:tc>
+                  <a:txBody>
+                    <a:bodyPr/>
+                    <a:lstStyle/>
+                    <a:p>
+                      <a:pPr marL="0" marR="0" lvl="0" indent="0" algn="l" defTabSz="914400" rtl="0" eaLnBrk="1" fontAlgn="auto" latinLnBrk="0" hangingPunct="1">
+                        <a:lnSpc>
+                          <a:spcPct val="100000"/>
+                        </a:lnSpc>
+                        <a:spcBef>
+                          <a:spcPts val="0"/>
+                        </a:spcBef>
+                        <a:spcAft>
+                          <a:spcPts val="0"/>
+                        </a:spcAft>
+                        <a:buClrTx/>
+                        <a:buSzTx/>
+                        <a:buFontTx/>
+                        <a:buNone/>
+                        <a:tabLst/>
+                        <a:defRPr/>
+                      </a:pPr>
+                      <a:r>
+                        <a:rPr lang="fr-FR" sz="1600" dirty="0"/>
+                        <a:t>romance</a:t>
+                      </a:r>
+                      <a:endParaRPr lang="en-US" sz="1600" dirty="0"/>
+                    </a:p>
+                  </a:txBody>
+                  <a:tcPr/>
+                </a:tc>
+                <a:extLst>
+                  <a:ext uri="{0D108BD9-81ED-4DB2-BD59-A6C34878D82A}">
+                    <a16:rowId xmlns:a16="http://schemas.microsoft.com/office/drawing/2014/main" val="2108214487"/>
+                  </a:ext>
+                </a:extLst>
+              </a:tr>
+            </a:tbl>
+          </a:graphicData>
+        </a:graphic>
+      </p:graphicFrame>
+      <p:graphicFrame>
+        <p:nvGraphicFramePr>
+          <p:cNvPr id="25" name="Table 6">
+            <a:extLst>
+              <a:ext uri="{FF2B5EF4-FFF2-40B4-BE49-F238E27FC236}">
+                <a16:creationId xmlns:a16="http://schemas.microsoft.com/office/drawing/2014/main" id="{C2C3C58D-C422-4434-9370-660117429EC9}"/>
+              </a:ext>
+            </a:extLst>
+          </p:cNvPr>
+          <p:cNvGraphicFramePr>
+            <a:graphicFrameLocks noGrp="1"/>
+          </p:cNvGraphicFramePr>
+          <p:nvPr>
+            <p:extLst>
+              <p:ext uri="{D42A27DB-BD31-4B8C-83A1-F6EECF244321}">
+                <p14:modId xmlns:p14="http://schemas.microsoft.com/office/powerpoint/2010/main" val="3626838375"/>
+              </p:ext>
+            </p:extLst>
+          </p:nvPr>
+        </p:nvGraphicFramePr>
+        <p:xfrm>
+          <a:off x="336282" y="1371359"/>
+          <a:ext cx="5192063" cy="1144469"/>
+        </p:xfrm>
+        <a:graphic>
+          <a:graphicData uri="http://schemas.openxmlformats.org/drawingml/2006/table">
+            <a:tbl>
+              <a:tblPr firstRow="1" bandRow="1">
+                <a:tableStyleId>{5C22544A-7EE6-4342-B048-85BDC9FD1C3A}</a:tableStyleId>
+              </a:tblPr>
+              <a:tblGrid>
+                <a:gridCol w="5192063">
+                  <a:extLst>
+                    <a:ext uri="{9D8B030D-6E8A-4147-A177-3AD203B41FA5}">
+                      <a16:colId xmlns:a16="http://schemas.microsoft.com/office/drawing/2014/main" val="2061391393"/>
+                    </a:ext>
+                  </a:extLst>
+                </a:gridCol>
+              </a:tblGrid>
+              <a:tr h="473909">
+                <a:tc>
+                  <a:txBody>
+                    <a:bodyPr/>
+                    <a:lstStyle/>
+                    <a:p>
+                      <a:r>
+                        <a:rPr lang="fr-FR" sz="1600" dirty="0"/>
+                        <a:t>Row</a:t>
+                      </a:r>
+                      <a:endParaRPr lang="en-US" sz="1600" dirty="0"/>
+                    </a:p>
+                  </a:txBody>
+                  <a:tcPr/>
+                </a:tc>
+                <a:extLst>
+                  <a:ext uri="{0D108BD9-81ED-4DB2-BD59-A6C34878D82A}">
+                    <a16:rowId xmlns:a16="http://schemas.microsoft.com/office/drawing/2014/main" val="235972142"/>
+                  </a:ext>
+                </a:extLst>
+              </a:tr>
+              <a:tr h="283885">
+                <a:tc>
+                  <a:txBody>
+                    <a:bodyPr/>
+                    <a:lstStyle/>
+                    <a:p>
+                      <a:r>
+                        <a:rPr lang="en-US" sz="1600" dirty="0"/>
+                        <a:t>{"</a:t>
+                      </a:r>
+                      <a:r>
+                        <a:rPr lang="en-US" sz="1600" dirty="0" err="1"/>
+                        <a:t>movie":"Blade</a:t>
+                      </a:r>
+                      <a:r>
+                        <a:rPr lang="en-US" sz="1600" dirty="0"/>
+                        <a:t> Runner", “genres":”</a:t>
+                      </a:r>
+                      <a:r>
+                        <a:rPr lang="en-US" sz="1600" dirty="0" err="1"/>
+                        <a:t>cyberpunk;scifi;action</a:t>
+                      </a:r>
+                      <a:r>
+                        <a:rPr lang="en-US" sz="1600" dirty="0"/>
+                        <a:t>”}</a:t>
+                      </a:r>
+                    </a:p>
+                  </a:txBody>
+                  <a:tcPr/>
+                </a:tc>
+                <a:extLst>
+                  <a:ext uri="{0D108BD9-81ED-4DB2-BD59-A6C34878D82A}">
+                    <a16:rowId xmlns:a16="http://schemas.microsoft.com/office/drawing/2014/main" val="1215558195"/>
+                  </a:ext>
+                </a:extLst>
+              </a:tr>
+              <a:tr h="283885">
+                <a:tc>
+                  <a:txBody>
+                    <a:bodyPr/>
+                    <a:lstStyle/>
+                    <a:p>
+                      <a:r>
+                        <a:rPr lang="en-US" sz="1600" dirty="0"/>
+                        <a:t>{"</a:t>
+                      </a:r>
+                      <a:r>
+                        <a:rPr lang="en-US" sz="1600" dirty="0" err="1"/>
+                        <a:t>movie":"Dirty</a:t>
+                      </a:r>
+                      <a:r>
+                        <a:rPr lang="en-US" sz="1600" dirty="0"/>
+                        <a:t> dancing", “genres":”</a:t>
+                      </a:r>
+                      <a:r>
+                        <a:rPr lang="en-US" sz="1600" dirty="0" err="1"/>
+                        <a:t>music;danse;romance</a:t>
+                      </a:r>
+                      <a:r>
+                        <a:rPr lang="en-US" sz="1600" dirty="0"/>
+                        <a:t>”}</a:t>
+                      </a:r>
+                    </a:p>
+                  </a:txBody>
+                  <a:tcPr/>
+                </a:tc>
+                <a:extLst>
+                  <a:ext uri="{0D108BD9-81ED-4DB2-BD59-A6C34878D82A}">
+                    <a16:rowId xmlns:a16="http://schemas.microsoft.com/office/drawing/2014/main" val="3821773839"/>
+                  </a:ext>
+                </a:extLst>
+              </a:tr>
+            </a:tbl>
+          </a:graphicData>
+        </a:graphic>
+      </p:graphicFrame>
+      <p:sp>
+        <p:nvSpPr>
+          <p:cNvPr id="18" name="Rectangle: Rounded Corners 17">
+            <a:extLst>
+              <a:ext uri="{FF2B5EF4-FFF2-40B4-BE49-F238E27FC236}">
+                <a16:creationId xmlns:a16="http://schemas.microsoft.com/office/drawing/2014/main" id="{0E934C05-667D-494A-A255-E7EAB65FD2C8}"/>
+              </a:ext>
+            </a:extLst>
+          </p:cNvPr>
+          <p:cNvSpPr/>
+          <p:nvPr/>
+        </p:nvSpPr>
+        <p:spPr>
+          <a:xfrm>
+            <a:off x="6087611" y="4035399"/>
+            <a:ext cx="2374085" cy="780176"/>
+          </a:xfrm>
+          <a:prstGeom prst="roundRect">
+            <a:avLst/>
+          </a:prstGeom>
+        </p:spPr>
+        <p:style>
+          <a:lnRef idx="2">
+            <a:schemeClr val="accent1">
+              <a:shade val="50000"/>
+            </a:schemeClr>
+          </a:lnRef>
+          <a:fillRef idx="1">
+            <a:schemeClr val="accent1"/>
+          </a:fillRef>
+          <a:effectRef idx="0">
+            <a:schemeClr val="accent1"/>
+          </a:effectRef>
+          <a:fontRef idx="minor">
+            <a:schemeClr val="lt1"/>
+          </a:fontRef>
+        </p:style>
+        <p:txBody>
+          <a:bodyPr rtlCol="0" anchor="ctr"/>
+          <a:lstStyle/>
+          <a:p>
+            <a:pPr algn="ctr"/>
+            <a:r>
+              <a:rPr lang="fr-FR" dirty="0" err="1"/>
+              <a:t>filter</a:t>
+            </a:r>
+            <a:r>
+              <a:rPr lang="fr-FR" dirty="0"/>
+              <a:t>(x </a:t>
+            </a:r>
+            <a:r>
+              <a:rPr lang="fr-FR" dirty="0">
+                <a:sym typeface="Wingdings" panose="05000000000000000000" pitchFamily="2" charset="2"/>
+              </a:rPr>
+              <a:t> x[‘rating’]&gt;4.0)</a:t>
+            </a:r>
+            <a:endParaRPr lang="en-US" dirty="0"/>
+          </a:p>
+        </p:txBody>
+      </p:sp>
+      <p:cxnSp>
+        <p:nvCxnSpPr>
+          <p:cNvPr id="19" name="Straight Arrow Connector 18">
+            <a:extLst>
+              <a:ext uri="{FF2B5EF4-FFF2-40B4-BE49-F238E27FC236}">
+                <a16:creationId xmlns:a16="http://schemas.microsoft.com/office/drawing/2014/main" id="{33BA8CE7-A48F-4E95-9A00-C05EC8349F08}"/>
+              </a:ext>
+            </a:extLst>
+          </p:cNvPr>
+          <p:cNvCxnSpPr>
+            <a:cxnSpLocks/>
+          </p:cNvCxnSpPr>
+          <p:nvPr/>
+        </p:nvCxnSpPr>
+        <p:spPr>
+          <a:xfrm>
+            <a:off x="5617828" y="4450960"/>
+            <a:ext cx="469783" cy="0"/>
+          </a:xfrm>
+          <a:prstGeom prst="straightConnector1">
+            <a:avLst/>
+          </a:prstGeom>
+          <a:ln>
+            <a:tailEnd type="triangle"/>
+          </a:ln>
+        </p:spPr>
+        <p:style>
+          <a:lnRef idx="1">
+            <a:schemeClr val="accent1"/>
+          </a:lnRef>
+          <a:fillRef idx="0">
+            <a:schemeClr val="accent1"/>
+          </a:fillRef>
+          <a:effectRef idx="0">
+            <a:schemeClr val="accent1"/>
+          </a:effectRef>
+          <a:fontRef idx="minor">
+            <a:schemeClr val="tx1"/>
+          </a:fontRef>
+        </p:style>
+      </p:cxnSp>
+      <p:cxnSp>
+        <p:nvCxnSpPr>
+          <p:cNvPr id="20" name="Straight Arrow Connector 19">
+            <a:extLst>
+              <a:ext uri="{FF2B5EF4-FFF2-40B4-BE49-F238E27FC236}">
+                <a16:creationId xmlns:a16="http://schemas.microsoft.com/office/drawing/2014/main" id="{3734846F-0C85-40BD-BF94-E4A2790A599F}"/>
+              </a:ext>
+            </a:extLst>
+          </p:cNvPr>
+          <p:cNvCxnSpPr>
+            <a:cxnSpLocks/>
+          </p:cNvCxnSpPr>
+          <p:nvPr/>
+        </p:nvCxnSpPr>
+        <p:spPr>
+          <a:xfrm>
+            <a:off x="8461696" y="4442265"/>
+            <a:ext cx="469783" cy="0"/>
+          </a:xfrm>
+          <a:prstGeom prst="straightConnector1">
+            <a:avLst/>
+          </a:prstGeom>
+          <a:ln>
+            <a:tailEnd type="triangle"/>
+          </a:ln>
+        </p:spPr>
+        <p:style>
+          <a:lnRef idx="1">
+            <a:schemeClr val="accent1"/>
+          </a:lnRef>
+          <a:fillRef idx="0">
+            <a:schemeClr val="accent1"/>
+          </a:fillRef>
+          <a:effectRef idx="0">
+            <a:schemeClr val="accent1"/>
+          </a:effectRef>
+          <a:fontRef idx="minor">
+            <a:schemeClr val="tx1"/>
+          </a:fontRef>
+        </p:style>
+      </p:cxnSp>
+      <p:graphicFrame>
+        <p:nvGraphicFramePr>
+          <p:cNvPr id="21" name="Table 6">
+            <a:extLst>
+              <a:ext uri="{FF2B5EF4-FFF2-40B4-BE49-F238E27FC236}">
+                <a16:creationId xmlns:a16="http://schemas.microsoft.com/office/drawing/2014/main" id="{3B363A25-A424-4A7F-AC1C-675D5AA95527}"/>
+              </a:ext>
+            </a:extLst>
+          </p:cNvPr>
+          <p:cNvGraphicFramePr>
+            <a:graphicFrameLocks noGrp="1"/>
+          </p:cNvGraphicFramePr>
+          <p:nvPr>
+            <p:extLst>
+              <p:ext uri="{D42A27DB-BD31-4B8C-83A1-F6EECF244321}">
+                <p14:modId xmlns:p14="http://schemas.microsoft.com/office/powerpoint/2010/main" val="54888848"/>
+              </p:ext>
+            </p:extLst>
+          </p:nvPr>
+        </p:nvGraphicFramePr>
+        <p:xfrm>
+          <a:off x="9060086" y="3884384"/>
+          <a:ext cx="2804021" cy="1133151"/>
+        </p:xfrm>
+        <a:graphic>
+          <a:graphicData uri="http://schemas.openxmlformats.org/drawingml/2006/table">
+            <a:tbl>
+              <a:tblPr firstRow="1" bandRow="1">
+                <a:tableStyleId>{5C22544A-7EE6-4342-B048-85BDC9FD1C3A}</a:tableStyleId>
+              </a:tblPr>
+              <a:tblGrid>
+                <a:gridCol w="2804021">
+                  <a:extLst>
+                    <a:ext uri="{9D8B030D-6E8A-4147-A177-3AD203B41FA5}">
+                      <a16:colId xmlns:a16="http://schemas.microsoft.com/office/drawing/2014/main" val="2061391393"/>
+                    </a:ext>
+                  </a:extLst>
+                </a:gridCol>
+              </a:tblGrid>
+              <a:tr h="462591">
+                <a:tc>
+                  <a:txBody>
+                    <a:bodyPr/>
+                    <a:lstStyle/>
+                    <a:p>
+                      <a:r>
+                        <a:rPr lang="fr-FR" sz="1600" dirty="0"/>
+                        <a:t>Row</a:t>
+                      </a:r>
+                      <a:endParaRPr lang="en-US" sz="1600" dirty="0"/>
+                    </a:p>
+                  </a:txBody>
+                  <a:tcPr/>
+                </a:tc>
+                <a:extLst>
+                  <a:ext uri="{0D108BD9-81ED-4DB2-BD59-A6C34878D82A}">
+                    <a16:rowId xmlns:a16="http://schemas.microsoft.com/office/drawing/2014/main" val="235972142"/>
+                  </a:ext>
+                </a:extLst>
+              </a:tr>
+              <a:tr h="283885">
+                <a:tc>
+                  <a:txBody>
+                    <a:bodyPr/>
+                    <a:lstStyle/>
+                    <a:p>
+                      <a:r>
+                        <a:rPr lang="en-US" sz="1600" dirty="0"/>
+                        <a:t>{"</a:t>
+                      </a:r>
+                      <a:r>
+                        <a:rPr lang="en-US" sz="1600" dirty="0" err="1"/>
+                        <a:t>user":"John</a:t>
+                      </a:r>
+                      <a:r>
+                        <a:rPr lang="en-US" sz="1600" dirty="0"/>
+                        <a:t>", "</a:t>
+                      </a:r>
+                      <a:r>
+                        <a:rPr lang="en-US" sz="1600" dirty="0" err="1"/>
+                        <a:t>movie":"Bl</a:t>
+                      </a:r>
+                      <a:r>
+                        <a:rPr lang="en-US" sz="1600" dirty="0"/>
+                        <a:t>…</a:t>
+                      </a:r>
+                    </a:p>
+                  </a:txBody>
+                  <a:tcPr/>
+                </a:tc>
+                <a:extLst>
+                  <a:ext uri="{0D108BD9-81ED-4DB2-BD59-A6C34878D82A}">
+                    <a16:rowId xmlns:a16="http://schemas.microsoft.com/office/drawing/2014/main" val="1215558195"/>
+                  </a:ext>
+                </a:extLst>
+              </a:tr>
+              <a:tr h="283885">
+                <a:tc>
+                  <a:txBody>
+                    <a:bodyPr/>
+                    <a:lstStyle/>
+                    <a:p>
+                      <a:r>
+                        <a:rPr lang="en-US" sz="1600" dirty="0"/>
+                        <a:t>{"</a:t>
+                      </a:r>
+                      <a:r>
+                        <a:rPr lang="en-US" sz="1600" dirty="0" err="1"/>
+                        <a:t>user":"Louise</a:t>
+                      </a:r>
+                      <a:r>
+                        <a:rPr lang="en-US" sz="1600" dirty="0"/>
+                        <a:t>", "</a:t>
+                      </a:r>
+                      <a:r>
+                        <a:rPr lang="en-US" sz="1600" dirty="0" err="1"/>
+                        <a:t>movie":"Dir</a:t>
+                      </a:r>
+                      <a:r>
+                        <a:rPr lang="en-US" sz="1600" dirty="0"/>
+                        <a:t>…</a:t>
+                      </a:r>
+                    </a:p>
+                  </a:txBody>
+                  <a:tcPr/>
+                </a:tc>
+                <a:extLst>
+                  <a:ext uri="{0D108BD9-81ED-4DB2-BD59-A6C34878D82A}">
+                    <a16:rowId xmlns:a16="http://schemas.microsoft.com/office/drawing/2014/main" val="3821773839"/>
+                  </a:ext>
+                </a:extLst>
+              </a:tr>
+            </a:tbl>
+          </a:graphicData>
+        </a:graphic>
+      </p:graphicFrame>
+      <p:graphicFrame>
+        <p:nvGraphicFramePr>
+          <p:cNvPr id="22" name="Table 6">
+            <a:extLst>
+              <a:ext uri="{FF2B5EF4-FFF2-40B4-BE49-F238E27FC236}">
+                <a16:creationId xmlns:a16="http://schemas.microsoft.com/office/drawing/2014/main" id="{14F2891B-DE06-4BA6-B53E-8E439C13B6B4}"/>
+              </a:ext>
+            </a:extLst>
+          </p:cNvPr>
+          <p:cNvGraphicFramePr>
+            <a:graphicFrameLocks noGrp="1"/>
+          </p:cNvGraphicFramePr>
+          <p:nvPr>
+            <p:extLst>
+              <p:ext uri="{D42A27DB-BD31-4B8C-83A1-F6EECF244321}">
+                <p14:modId xmlns:p14="http://schemas.microsoft.com/office/powerpoint/2010/main" val="3214289153"/>
+              </p:ext>
+            </p:extLst>
+          </p:nvPr>
+        </p:nvGraphicFramePr>
+        <p:xfrm>
+          <a:off x="327893" y="3665736"/>
+          <a:ext cx="5015893" cy="1479749"/>
+        </p:xfrm>
+        <a:graphic>
+          <a:graphicData uri="http://schemas.openxmlformats.org/drawingml/2006/table">
+            <a:tbl>
+              <a:tblPr firstRow="1" bandRow="1">
+                <a:tableStyleId>{5C22544A-7EE6-4342-B048-85BDC9FD1C3A}</a:tableStyleId>
+              </a:tblPr>
+              <a:tblGrid>
+                <a:gridCol w="5015893">
+                  <a:extLst>
+                    <a:ext uri="{9D8B030D-6E8A-4147-A177-3AD203B41FA5}">
+                      <a16:colId xmlns:a16="http://schemas.microsoft.com/office/drawing/2014/main" val="2061391393"/>
+                    </a:ext>
+                  </a:extLst>
+                </a:gridCol>
+              </a:tblGrid>
+              <a:tr h="473909">
+                <a:tc>
+                  <a:txBody>
+                    <a:bodyPr/>
+                    <a:lstStyle/>
+                    <a:p>
+                      <a:r>
+                        <a:rPr lang="fr-FR" sz="1600" dirty="0"/>
+                        <a:t>Row</a:t>
+                      </a:r>
+                      <a:endParaRPr lang="en-US" sz="1600" dirty="0"/>
+                    </a:p>
+                  </a:txBody>
+                  <a:tcPr/>
+                </a:tc>
+                <a:extLst>
+                  <a:ext uri="{0D108BD9-81ED-4DB2-BD59-A6C34878D82A}">
+                    <a16:rowId xmlns:a16="http://schemas.microsoft.com/office/drawing/2014/main" val="235972142"/>
+                  </a:ext>
+                </a:extLst>
+              </a:tr>
+              <a:tr h="283885">
+                <a:tc>
+                  <a:txBody>
+                    <a:bodyPr/>
+                    <a:lstStyle/>
+                    <a:p>
+                      <a:r>
+                        <a:rPr lang="en-US" sz="1600" dirty="0"/>
+                        <a:t>{"</a:t>
+                      </a:r>
+                      <a:r>
+                        <a:rPr lang="en-US" sz="1600" dirty="0" err="1"/>
+                        <a:t>user":"John</a:t>
+                      </a:r>
+                      <a:r>
+                        <a:rPr lang="en-US" sz="1600" dirty="0"/>
+                        <a:t>", "</a:t>
+                      </a:r>
+                      <a:r>
+                        <a:rPr lang="en-US" sz="1600" dirty="0" err="1"/>
+                        <a:t>movie":"Blade</a:t>
+                      </a:r>
+                      <a:r>
+                        <a:rPr lang="en-US" sz="1600" dirty="0"/>
+                        <a:t> Runner", "rating":5.0}</a:t>
+                      </a:r>
+                    </a:p>
+                  </a:txBody>
+                  <a:tcPr/>
+                </a:tc>
+                <a:extLst>
+                  <a:ext uri="{0D108BD9-81ED-4DB2-BD59-A6C34878D82A}">
+                    <a16:rowId xmlns:a16="http://schemas.microsoft.com/office/drawing/2014/main" val="1215558195"/>
+                  </a:ext>
+                </a:extLst>
+              </a:tr>
+              <a:tr h="283885">
+                <a:tc>
+                  <a:txBody>
+                    <a:bodyPr/>
+                    <a:lstStyle/>
+                    <a:p>
+                      <a:r>
+                        <a:rPr lang="en-US" sz="1600" dirty="0"/>
+                        <a:t>{"</a:t>
+                      </a:r>
+                      <a:r>
+                        <a:rPr lang="en-US" sz="1600" dirty="0" err="1"/>
+                        <a:t>user":"Louise</a:t>
+                      </a:r>
+                      <a:r>
+                        <a:rPr lang="en-US" sz="1600" dirty="0"/>
+                        <a:t>", "</a:t>
+                      </a:r>
+                      <a:r>
+                        <a:rPr lang="en-US" sz="1600" dirty="0" err="1"/>
+                        <a:t>movie":"Dirty</a:t>
+                      </a:r>
+                      <a:r>
+                        <a:rPr lang="en-US" sz="1600" dirty="0"/>
+                        <a:t> dancing", "rating":5.0}</a:t>
+                      </a:r>
+                    </a:p>
+                  </a:txBody>
+                  <a:tcPr/>
+                </a:tc>
+                <a:extLst>
+                  <a:ext uri="{0D108BD9-81ED-4DB2-BD59-A6C34878D82A}">
+                    <a16:rowId xmlns:a16="http://schemas.microsoft.com/office/drawing/2014/main" val="3821773839"/>
+                  </a:ext>
+                </a:extLst>
+              </a:tr>
+              <a:tr h="283885">
+                <a:tc>
+                  <a:txBody>
+                    <a:bodyPr/>
+                    <a:lstStyle/>
+                    <a:p>
+                      <a:pPr marL="0" marR="0" lvl="0" indent="0" algn="l" defTabSz="914400" rtl="0" eaLnBrk="1" fontAlgn="auto" latinLnBrk="0" hangingPunct="1">
+                        <a:lnSpc>
+                          <a:spcPct val="100000"/>
+                        </a:lnSpc>
+                        <a:spcBef>
+                          <a:spcPts val="0"/>
+                        </a:spcBef>
+                        <a:spcAft>
+                          <a:spcPts val="0"/>
+                        </a:spcAft>
+                        <a:buClrTx/>
+                        <a:buSzTx/>
+                        <a:buFontTx/>
+                        <a:buNone/>
+                        <a:tabLst/>
+                        <a:defRPr/>
+                      </a:pPr>
+                      <a:r>
+                        <a:rPr lang="en-US" sz="1600" dirty="0"/>
+                        <a:t>{"</a:t>
+                      </a:r>
+                      <a:r>
+                        <a:rPr lang="en-US" sz="1600" dirty="0" err="1"/>
+                        <a:t>user":“Sam</a:t>
+                      </a:r>
+                      <a:r>
+                        <a:rPr lang="en-US" sz="1600" dirty="0"/>
+                        <a:t>", "</a:t>
+                      </a:r>
+                      <a:r>
+                        <a:rPr lang="en-US" sz="1600" dirty="0" err="1"/>
+                        <a:t>movie":“Blade</a:t>
+                      </a:r>
+                      <a:r>
+                        <a:rPr lang="en-US" sz="1600" dirty="0"/>
+                        <a:t> Runner", "rating":3.5}</a:t>
+                      </a:r>
+                    </a:p>
+                  </a:txBody>
+                  <a:tcPr/>
+                </a:tc>
+                <a:extLst>
+                  <a:ext uri="{0D108BD9-81ED-4DB2-BD59-A6C34878D82A}">
+                    <a16:rowId xmlns:a16="http://schemas.microsoft.com/office/drawing/2014/main" val="1188895231"/>
+                  </a:ext>
+                </a:extLst>
+              </a:tr>
+            </a:tbl>
+          </a:graphicData>
+        </a:graphic>
+      </p:graphicFrame>
     </p:spTree>
     <p:extLst>
       <p:ext uri="{BB962C8B-B14F-4D97-AF65-F5344CB8AC3E}">
-        <p14:creationId xmlns:p14="http://schemas.microsoft.com/office/powerpoint/2010/main" val="682765932"/>
+        <p14:creationId xmlns:p14="http://schemas.microsoft.com/office/powerpoint/2010/main" val="2482890917"/>
       </p:ext>
     </p:extLst>
   </p:cSld>
@@ -3596,7 +5408,7 @@
 </p:sld>
 </file>
 
-<file path=ppt/slides/slide10.xml><?xml version="1.0" encoding="utf-8"?>
+<file path=ppt/slides/slide11.xml><?xml version="1.0" encoding="utf-8"?>
 <p:sld xmlns:a="http://schemas.openxmlformats.org/drawingml/2006/main" xmlns:r="http://schemas.openxmlformats.org/officeDocument/2006/relationships" xmlns:p="http://schemas.openxmlformats.org/presentationml/2006/main">
   <p:cSld>
     <p:spTree>
@@ -4457,7 +6269,7 @@
 </p:sld>
 </file>
 
-<file path=ppt/slides/slide11.xml><?xml version="1.0" encoding="utf-8"?>
+<file path=ppt/slides/slide12.xml><?xml version="1.0" encoding="utf-8"?>
 <p:sld xmlns:a="http://schemas.openxmlformats.org/drawingml/2006/main" xmlns:r="http://schemas.openxmlformats.org/officeDocument/2006/relationships" xmlns:p="http://schemas.openxmlformats.org/presentationml/2006/main">
   <p:cSld>
     <p:spTree>
@@ -4624,7 +6436,7 @@
 </p:sld>
 </file>
 
-<file path=ppt/slides/slide12.xml><?xml version="1.0" encoding="utf-8"?>
+<file path=ppt/slides/slide13.xml><?xml version="1.0" encoding="utf-8"?>
 <p:sld xmlns:a="http://schemas.openxmlformats.org/drawingml/2006/main" xmlns:r="http://schemas.openxmlformats.org/officeDocument/2006/relationships" xmlns:p="http://schemas.openxmlformats.org/presentationml/2006/main">
   <p:cSld>
     <p:spTree>
@@ -4742,36 +6554,6 @@
           <a:chExt cx="0" cy="0"/>
         </a:xfrm>
       </p:grpSpPr>
-      <p:pic>
-        <p:nvPicPr>
-          <p:cNvPr id="4" name="Picture 3">
-            <a:extLst>
-              <a:ext uri="{FF2B5EF4-FFF2-40B4-BE49-F238E27FC236}">
-                <a16:creationId xmlns:a16="http://schemas.microsoft.com/office/drawing/2014/main" id="{C3D39D79-09D9-41E5-B4D2-B9DA61B0B584}"/>
-              </a:ext>
-            </a:extLst>
-          </p:cNvPr>
-          <p:cNvPicPr>
-            <a:picLocks noChangeAspect="1"/>
-          </p:cNvPicPr>
-          <p:nvPr/>
-        </p:nvPicPr>
-        <p:blipFill>
-          <a:blip r:embed="rId2"/>
-          <a:stretch>
-            <a:fillRect/>
-          </a:stretch>
-        </p:blipFill>
-        <p:spPr>
-          <a:xfrm>
-            <a:off x="1876369" y="1046376"/>
-            <a:ext cx="8439262" cy="5002584"/>
-          </a:xfrm>
-          <a:prstGeom prst="rect">
-            <a:avLst/>
-          </a:prstGeom>
-        </p:spPr>
-      </p:pic>
       <p:sp>
         <p:nvSpPr>
           <p:cNvPr id="2" name="Title 1">
@@ -4794,21 +6576,262 @@
           <a:lstStyle/>
           <a:p>
             <a:r>
+              <a:rPr lang="fr-FR" dirty="0" err="1">
+                <a:latin typeface="+mn-lt"/>
+              </a:rPr>
+              <a:t>Why</a:t>
+            </a:r>
+            <a:r>
               <a:rPr lang="fr-FR" dirty="0">
                 <a:latin typeface="+mn-lt"/>
               </a:rPr>
-              <a:t>Main Components</a:t>
+              <a:t> Spark ?</a:t>
             </a:r>
             <a:endParaRPr lang="en-US" dirty="0">
               <a:latin typeface="+mn-lt"/>
             </a:endParaRPr>
+          </a:p>
+        </p:txBody>
+      </p:sp>
+      <p:sp>
+        <p:nvSpPr>
+          <p:cNvPr id="5" name="TextBox 4">
+            <a:extLst>
+              <a:ext uri="{FF2B5EF4-FFF2-40B4-BE49-F238E27FC236}">
+                <a16:creationId xmlns:a16="http://schemas.microsoft.com/office/drawing/2014/main" id="{E38B5AA2-A99E-4BC2-9CE0-A20E18D62DAC}"/>
+              </a:ext>
+            </a:extLst>
+          </p:cNvPr>
+          <p:cNvSpPr txBox="1"/>
+          <p:nvPr/>
+        </p:nvSpPr>
+        <p:spPr>
+          <a:xfrm>
+            <a:off x="1036948" y="1432874"/>
+            <a:ext cx="10058400" cy="2677656"/>
+          </a:xfrm>
+          <a:prstGeom prst="rect">
+            <a:avLst/>
+          </a:prstGeom>
+          <a:noFill/>
+        </p:spPr>
+        <p:txBody>
+          <a:bodyPr wrap="square" rtlCol="0">
+            <a:spAutoFit/>
+          </a:bodyPr>
+          <a:lstStyle/>
+          <a:p>
+            <a:pPr marL="342900" indent="-342900">
+              <a:buFont typeface="Arial" panose="020B0604020202020204" pitchFamily="34" charset="0"/>
+              <a:buChar char="•"/>
+            </a:pPr>
+            <a:r>
+              <a:rPr lang="fr-FR" sz="2400" dirty="0" err="1"/>
+              <a:t>Ease</a:t>
+            </a:r>
+            <a:r>
+              <a:rPr lang="fr-FR" sz="2400" dirty="0"/>
+              <a:t> </a:t>
+            </a:r>
+            <a:r>
+              <a:rPr lang="fr-FR" sz="2400" dirty="0" err="1"/>
+              <a:t>creation</a:t>
+            </a:r>
+            <a:r>
+              <a:rPr lang="fr-FR" sz="2400" dirty="0"/>
+              <a:t> of </a:t>
+            </a:r>
+            <a:r>
+              <a:rPr lang="fr-FR" sz="2400" dirty="0" err="1"/>
+              <a:t>complicated</a:t>
+            </a:r>
+            <a:r>
+              <a:rPr lang="fr-FR" sz="2400" dirty="0"/>
+              <a:t> data </a:t>
+            </a:r>
+            <a:r>
+              <a:rPr lang="fr-FR" sz="2400" dirty="0" err="1"/>
+              <a:t>analysis</a:t>
+            </a:r>
+            <a:r>
+              <a:rPr lang="fr-FR" sz="2400" dirty="0"/>
+              <a:t> </a:t>
+            </a:r>
+            <a:r>
+              <a:rPr lang="fr-FR" sz="2400" dirty="0" err="1"/>
+              <a:t>task</a:t>
+            </a:r>
+            <a:endParaRPr lang="fr-FR" sz="2400" dirty="0"/>
+          </a:p>
+          <a:p>
+            <a:pPr marL="342900" indent="-342900">
+              <a:buFont typeface="Arial" panose="020B0604020202020204" pitchFamily="34" charset="0"/>
+              <a:buChar char="•"/>
+            </a:pPr>
+            <a:r>
+              <a:rPr lang="fr-FR" sz="2400" dirty="0"/>
+              <a:t>Support </a:t>
+            </a:r>
+            <a:r>
+              <a:rPr lang="fr-FR" sz="2400" dirty="0" err="1"/>
+              <a:t>iterative</a:t>
+            </a:r>
+            <a:r>
+              <a:rPr lang="fr-FR" sz="2400" dirty="0"/>
+              <a:t> </a:t>
+            </a:r>
+            <a:r>
+              <a:rPr lang="fr-FR" sz="2400" dirty="0" err="1"/>
+              <a:t>algorithms</a:t>
+            </a:r>
+            <a:r>
+              <a:rPr lang="fr-FR" sz="2400" dirty="0"/>
+              <a:t>, like gradient </a:t>
+            </a:r>
+            <a:r>
+              <a:rPr lang="fr-FR" sz="2400" dirty="0" err="1"/>
+              <a:t>descent</a:t>
+            </a:r>
+            <a:endParaRPr lang="fr-FR" sz="2400" dirty="0"/>
+          </a:p>
+          <a:p>
+            <a:pPr marL="342900" indent="-342900">
+              <a:buFont typeface="Arial" panose="020B0604020202020204" pitchFamily="34" charset="0"/>
+              <a:buChar char="•"/>
+            </a:pPr>
+            <a:r>
+              <a:rPr lang="fr-FR" sz="2400" dirty="0" err="1"/>
+              <a:t>Ease</a:t>
+            </a:r>
+            <a:r>
+              <a:rPr lang="fr-FR" sz="2400" dirty="0"/>
+              <a:t> data exploration</a:t>
+            </a:r>
+          </a:p>
+          <a:p>
+            <a:pPr marL="285750" indent="-285750">
+              <a:buFontTx/>
+              <a:buChar char="-"/>
+            </a:pPr>
+            <a:r>
+              <a:rPr lang="fr-FR" sz="2400" dirty="0" err="1"/>
+              <a:t>Make</a:t>
+            </a:r>
+            <a:r>
+              <a:rPr lang="fr-FR" sz="2400" dirty="0"/>
+              <a:t> </a:t>
+            </a:r>
+            <a:r>
+              <a:rPr lang="fr-FR" sz="2400" dirty="0" err="1"/>
+              <a:t>it</a:t>
+            </a:r>
+            <a:r>
+              <a:rPr lang="fr-FR" sz="2400" dirty="0"/>
+              <a:t> </a:t>
+            </a:r>
+            <a:r>
+              <a:rPr lang="fr-FR" sz="2400" dirty="0" err="1"/>
+              <a:t>easier</a:t>
+            </a:r>
+            <a:r>
+              <a:rPr lang="fr-FR" sz="2400" dirty="0"/>
+              <a:t> to explore data </a:t>
+            </a:r>
+            <a:r>
+              <a:rPr lang="fr-FR" sz="2400" dirty="0" err="1"/>
+              <a:t>interactively</a:t>
+            </a:r>
+            <a:endParaRPr lang="fr-FR" sz="2400" dirty="0"/>
+          </a:p>
+          <a:p>
+            <a:pPr marL="742950" lvl="1" indent="-285750">
+              <a:buFontTx/>
+              <a:buChar char="-"/>
+            </a:pPr>
+            <a:r>
+              <a:rPr lang="fr-FR" sz="2400" dirty="0" err="1"/>
+              <a:t>Developer</a:t>
+            </a:r>
+            <a:r>
+              <a:rPr lang="fr-FR" sz="2400" dirty="0"/>
+              <a:t> </a:t>
+            </a:r>
+            <a:r>
+              <a:rPr lang="fr-FR" sz="2400" dirty="0" err="1"/>
+              <a:t>friendly</a:t>
+            </a:r>
+            <a:r>
+              <a:rPr lang="fr-FR" sz="2400" dirty="0"/>
+              <a:t>, no </a:t>
+            </a:r>
+            <a:r>
+              <a:rPr lang="fr-FR" sz="2400" dirty="0" err="1"/>
+              <a:t>need</a:t>
+            </a:r>
+            <a:r>
+              <a:rPr lang="fr-FR" sz="2400" dirty="0"/>
+              <a:t> to </a:t>
+            </a:r>
+            <a:r>
+              <a:rPr lang="fr-FR" sz="2400" dirty="0" err="1"/>
+              <a:t>create</a:t>
+            </a:r>
+            <a:r>
+              <a:rPr lang="fr-FR" sz="2400" dirty="0"/>
+              <a:t> tons of classes and jobs…</a:t>
+            </a:r>
+          </a:p>
+          <a:p>
+            <a:pPr marL="742950" lvl="1" indent="-285750">
+              <a:buFontTx/>
+              <a:buChar char="-"/>
+            </a:pPr>
+            <a:r>
+              <a:rPr lang="fr-FR" sz="2400" dirty="0" err="1"/>
+              <a:t>Repl</a:t>
+            </a:r>
+            <a:r>
+              <a:rPr lang="fr-FR" sz="2400" dirty="0"/>
+              <a:t> mode</a:t>
+            </a:r>
+          </a:p>
+          <a:p>
+            <a:pPr marL="742950" lvl="1" indent="-285750">
+              <a:buFontTx/>
+              <a:buChar char="-"/>
+            </a:pPr>
+            <a:r>
+              <a:rPr lang="fr-FR" sz="2400" dirty="0"/>
+              <a:t>Scala/Python API </a:t>
+            </a:r>
+            <a:r>
+              <a:rPr lang="fr-FR" sz="2400" dirty="0" err="1"/>
+              <a:t>similar</a:t>
+            </a:r>
+            <a:r>
+              <a:rPr lang="fr-FR" sz="2400" dirty="0"/>
+              <a:t> to </a:t>
+            </a:r>
+            <a:r>
+              <a:rPr lang="fr-FR" sz="2400" dirty="0" err="1"/>
+              <a:t>functional</a:t>
+            </a:r>
+            <a:r>
+              <a:rPr lang="fr-FR" sz="2400" dirty="0"/>
+              <a:t> </a:t>
+            </a:r>
+            <a:r>
+              <a:rPr lang="fr-FR" sz="2400" dirty="0" err="1"/>
+              <a:t>programming</a:t>
+            </a:r>
+            <a:endParaRPr lang="fr-FR" sz="2400" dirty="0"/>
           </a:p>
         </p:txBody>
       </p:sp>
     </p:spTree>
     <p:extLst>
       <p:ext uri="{BB962C8B-B14F-4D97-AF65-F5344CB8AC3E}">
-        <p14:creationId xmlns:p14="http://schemas.microsoft.com/office/powerpoint/2010/main" val="2915842474"/>
+        <p14:creationId xmlns:p14="http://schemas.microsoft.com/office/powerpoint/2010/main" val="682765932"/>
       </p:ext>
     </p:extLst>
   </p:cSld>
@@ -4835,6 +6858,36 @@
           <a:chExt cx="0" cy="0"/>
         </a:xfrm>
       </p:grpSpPr>
+      <p:pic>
+        <p:nvPicPr>
+          <p:cNvPr id="4" name="Picture 3">
+            <a:extLst>
+              <a:ext uri="{FF2B5EF4-FFF2-40B4-BE49-F238E27FC236}">
+                <a16:creationId xmlns:a16="http://schemas.microsoft.com/office/drawing/2014/main" id="{C3D39D79-09D9-41E5-B4D2-B9DA61B0B584}"/>
+              </a:ext>
+            </a:extLst>
+          </p:cNvPr>
+          <p:cNvPicPr>
+            <a:picLocks noChangeAspect="1"/>
+          </p:cNvPicPr>
+          <p:nvPr/>
+        </p:nvPicPr>
+        <p:blipFill>
+          <a:blip r:embed="rId2"/>
+          <a:stretch>
+            <a:fillRect/>
+          </a:stretch>
+        </p:blipFill>
+        <p:spPr>
+          <a:xfrm>
+            <a:off x="1876369" y="1046376"/>
+            <a:ext cx="8439262" cy="5002584"/>
+          </a:xfrm>
+          <a:prstGeom prst="rect">
+            <a:avLst/>
+          </a:prstGeom>
+        </p:spPr>
+      </p:pic>
       <p:sp>
         <p:nvSpPr>
           <p:cNvPr id="2" name="Title 1">
@@ -4860,6 +6913,69 @@
               <a:rPr lang="fr-FR" dirty="0">
                 <a:latin typeface="+mn-lt"/>
               </a:rPr>
+              <a:t>Main Components</a:t>
+            </a:r>
+            <a:endParaRPr lang="en-US" dirty="0">
+              <a:latin typeface="+mn-lt"/>
+            </a:endParaRPr>
+          </a:p>
+        </p:txBody>
+      </p:sp>
+    </p:spTree>
+    <p:extLst>
+      <p:ext uri="{BB962C8B-B14F-4D97-AF65-F5344CB8AC3E}">
+        <p14:creationId xmlns:p14="http://schemas.microsoft.com/office/powerpoint/2010/main" val="2915842474"/>
+      </p:ext>
+    </p:extLst>
+  </p:cSld>
+  <p:clrMapOvr>
+    <a:masterClrMapping/>
+  </p:clrMapOvr>
+</p:sld>
+</file>
+
+<file path=ppt/slides/slide4.xml><?xml version="1.0" encoding="utf-8"?>
+<p:sld xmlns:a="http://schemas.openxmlformats.org/drawingml/2006/main" xmlns:r="http://schemas.openxmlformats.org/officeDocument/2006/relationships" xmlns:p="http://schemas.openxmlformats.org/presentationml/2006/main">
+  <p:cSld>
+    <p:spTree>
+      <p:nvGrpSpPr>
+        <p:cNvPr id="1" name=""/>
+        <p:cNvGrpSpPr/>
+        <p:nvPr/>
+      </p:nvGrpSpPr>
+      <p:grpSpPr>
+        <a:xfrm>
+          <a:off x="0" y="0"/>
+          <a:ext cx="0" cy="0"/>
+          <a:chOff x="0" y="0"/>
+          <a:chExt cx="0" cy="0"/>
+        </a:xfrm>
+      </p:grpSpPr>
+      <p:sp>
+        <p:nvSpPr>
+          <p:cNvPr id="2" name="Title 1">
+            <a:extLst>
+              <a:ext uri="{FF2B5EF4-FFF2-40B4-BE49-F238E27FC236}">
+                <a16:creationId xmlns:a16="http://schemas.microsoft.com/office/drawing/2014/main" id="{7C192A2F-BC20-4193-8F18-3055256C342F}"/>
+              </a:ext>
+            </a:extLst>
+          </p:cNvPr>
+          <p:cNvSpPr>
+            <a:spLocks noGrp="1"/>
+          </p:cNvSpPr>
+          <p:nvPr>
+            <p:ph type="title"/>
+          </p:nvPr>
+        </p:nvSpPr>
+        <p:spPr/>
+        <p:txBody>
+          <a:bodyPr/>
+          <a:lstStyle/>
+          <a:p>
+            <a:r>
+              <a:rPr lang="fr-FR" dirty="0">
+                <a:latin typeface="+mn-lt"/>
+              </a:rPr>
               <a:t>How to run </a:t>
             </a:r>
             <a:r>
@@ -4889,7 +7005,7 @@
         <p:spPr>
           <a:xfrm>
             <a:off x="1036948" y="1432874"/>
-            <a:ext cx="10058400" cy="923330"/>
+            <a:ext cx="10058400" cy="1200329"/>
           </a:xfrm>
           <a:prstGeom prst="rect">
             <a:avLst/>
@@ -4987,6 +7103,20 @@
             <a:r>
               <a:rPr lang="fr-FR" dirty="0"/>
               <a:t>Api for Java, Scala, Python.</a:t>
+            </a:r>
+          </a:p>
+          <a:p>
+            <a:pPr marL="285750" indent="-285750">
+              <a:buFontTx/>
+              <a:buChar char="-"/>
+            </a:pPr>
+            <a:r>
+              <a:rPr lang="fr-FR" dirty="0" err="1"/>
+              <a:t>Deploy</a:t>
+            </a:r>
+            <a:r>
+              <a:rPr lang="fr-FR" dirty="0"/>
+              <a:t> Mode : client vs cluster</a:t>
             </a:r>
           </a:p>
         </p:txBody>
@@ -5182,7 +7312,7 @@
 </p:sld>
 </file>
 
-<file path=ppt/slides/slide4.xml><?xml version="1.0" encoding="utf-8"?>
+<file path=ppt/slides/slide5.xml><?xml version="1.0" encoding="utf-8"?>
 <p:sld xmlns:a="http://schemas.openxmlformats.org/drawingml/2006/main" xmlns:r="http://schemas.openxmlformats.org/officeDocument/2006/relationships" xmlns:p="http://schemas.openxmlformats.org/presentationml/2006/main">
   <p:cSld>
     <p:spTree>
@@ -5247,7 +7377,7 @@
         <p:spPr>
           <a:xfrm>
             <a:off x="1036948" y="1432874"/>
-            <a:ext cx="10058400" cy="3693319"/>
+            <a:ext cx="10058400" cy="3970318"/>
           </a:xfrm>
           <a:prstGeom prst="rect">
             <a:avLst/>
@@ -5260,23 +7390,37 @@
           </a:bodyPr>
           <a:lstStyle/>
           <a:p>
+            <a:r>
+              <a:rPr lang="fr-FR" b="1" dirty="0" err="1"/>
+              <a:t>Resilient</a:t>
+            </a:r>
+            <a:r>
+              <a:rPr lang="fr-FR" b="1" dirty="0"/>
+              <a:t> Distributed </a:t>
+            </a:r>
+            <a:r>
+              <a:rPr lang="fr-FR" b="1" dirty="0" err="1"/>
+              <a:t>Dataset</a:t>
+            </a:r>
+            <a:endParaRPr lang="fr-FR" b="1" dirty="0"/>
+          </a:p>
+          <a:p>
             <a:pPr marL="285750" indent="-285750">
               <a:buFontTx/>
               <a:buChar char="-"/>
             </a:pPr>
             <a:r>
-              <a:rPr lang="fr-FR" b="1" dirty="0" err="1"/>
-              <a:t>Resilient</a:t>
-            </a:r>
-            <a:r>
-              <a:rPr lang="fr-FR" b="1" dirty="0"/>
-              <a:t> Distributed </a:t>
-            </a:r>
-            <a:r>
-              <a:rPr lang="fr-FR" b="1" dirty="0" err="1"/>
-              <a:t>Dataset</a:t>
-            </a:r>
-            <a:endParaRPr lang="fr-FR" b="1" dirty="0"/>
+              <a:rPr lang="fr-FR" dirty="0"/>
+              <a:t>The base building block of </a:t>
+            </a:r>
+            <a:r>
+              <a:rPr lang="fr-FR" dirty="0" err="1"/>
+              <a:t>your</a:t>
+            </a:r>
+            <a:r>
+              <a:rPr lang="fr-FR" dirty="0"/>
+              <a:t> application</a:t>
+            </a:r>
           </a:p>
           <a:p>
             <a:pPr marL="285750" indent="-285750">
@@ -5284,16 +7428,76 @@
               <a:buChar char="-"/>
             </a:pPr>
             <a:r>
-              <a:rPr lang="fr-FR" dirty="0"/>
-              <a:t>The base building block of </a:t>
-            </a:r>
-            <a:r>
               <a:rPr lang="fr-FR" dirty="0" err="1"/>
-              <a:t>your</a:t>
-            </a:r>
-            <a:r>
-              <a:rPr lang="fr-FR" dirty="0"/>
-              <a:t> application</a:t>
+              <a:t>Lazy</a:t>
+            </a:r>
+            <a:r>
+              <a:rPr lang="fr-FR" dirty="0"/>
+              <a:t> : </a:t>
+            </a:r>
+            <a:r>
+              <a:rPr lang="fr-FR" dirty="0" err="1"/>
+              <a:t>doesn’t</a:t>
+            </a:r>
+            <a:r>
+              <a:rPr lang="fr-FR" dirty="0"/>
+              <a:t> </a:t>
+            </a:r>
+            <a:r>
+              <a:rPr lang="fr-FR" dirty="0" err="1"/>
+              <a:t>compute</a:t>
+            </a:r>
+            <a:r>
+              <a:rPr lang="fr-FR" dirty="0"/>
+              <a:t> </a:t>
+            </a:r>
+            <a:r>
+              <a:rPr lang="fr-FR" dirty="0" err="1"/>
+              <a:t>anything</a:t>
+            </a:r>
+            <a:r>
+              <a:rPr lang="fr-FR" dirty="0"/>
+              <a:t> </a:t>
+            </a:r>
+            <a:r>
+              <a:rPr lang="fr-FR" dirty="0" err="1"/>
+              <a:t>before</a:t>
+            </a:r>
+            <a:r>
+              <a:rPr lang="fr-FR" dirty="0"/>
+              <a:t> </a:t>
+            </a:r>
+            <a:r>
+              <a:rPr lang="fr-FR" dirty="0" err="1"/>
+              <a:t>it</a:t>
+            </a:r>
+            <a:r>
+              <a:rPr lang="fr-FR" dirty="0"/>
+              <a:t> </a:t>
+            </a:r>
+            <a:r>
+              <a:rPr lang="fr-FR" dirty="0" err="1"/>
+              <a:t>really</a:t>
+            </a:r>
+            <a:r>
+              <a:rPr lang="fr-FR" dirty="0"/>
+              <a:t> </a:t>
+            </a:r>
+            <a:r>
+              <a:rPr lang="fr-FR" dirty="0" err="1"/>
+              <a:t>needs</a:t>
+            </a:r>
+            <a:r>
+              <a:rPr lang="fr-FR" dirty="0"/>
+              <a:t> to do </a:t>
+            </a:r>
+            <a:r>
+              <a:rPr lang="fr-FR" dirty="0" err="1"/>
+              <a:t>so</a:t>
+            </a:r>
+            <a:r>
+              <a:rPr lang="fr-FR" dirty="0"/>
+              <a:t>.</a:t>
             </a:r>
           </a:p>
           <a:p>
@@ -5302,12 +7506,8 @@
               <a:buChar char="-"/>
             </a:pPr>
             <a:r>
-              <a:rPr lang="fr-FR" dirty="0" err="1"/>
-              <a:t>Lazy</a:t>
-            </a:r>
-            <a:r>
-              <a:rPr lang="fr-FR" dirty="0"/>
-              <a:t> : </a:t>
+              <a:rPr lang="fr-FR" dirty="0"/>
+              <a:t>Immutable : a transformation </a:t>
             </a:r>
             <a:r>
               <a:rPr lang="fr-FR" dirty="0" err="1"/>
@@ -5315,31 +7515,7 @@
             </a:r>
             <a:r>
               <a:rPr lang="fr-FR" dirty="0"/>
-              <a:t> </a:t>
-            </a:r>
-            <a:r>
-              <a:rPr lang="fr-FR" dirty="0" err="1"/>
-              <a:t>compute</a:t>
-            </a:r>
-            <a:r>
-              <a:rPr lang="fr-FR" dirty="0"/>
-              <a:t> </a:t>
-            </a:r>
-            <a:r>
-              <a:rPr lang="fr-FR" dirty="0" err="1"/>
-              <a:t>anything</a:t>
-            </a:r>
-            <a:r>
-              <a:rPr lang="fr-FR" dirty="0"/>
-              <a:t> </a:t>
-            </a:r>
-            <a:r>
-              <a:rPr lang="fr-FR" dirty="0" err="1"/>
-              <a:t>before</a:t>
-            </a:r>
-            <a:r>
-              <a:rPr lang="fr-FR" dirty="0"/>
-              <a:t> </a:t>
+              <a:t> change the data set, </a:t>
             </a:r>
             <a:r>
               <a:rPr lang="fr-FR" dirty="0" err="1"/>
@@ -5351,27 +7527,11 @@
             </a:r>
             <a:r>
               <a:rPr lang="fr-FR" dirty="0" err="1"/>
-              <a:t>really</a:t>
-            </a:r>
-            <a:r>
-              <a:rPr lang="fr-FR" dirty="0"/>
-              <a:t> </a:t>
-            </a:r>
-            <a:r>
-              <a:rPr lang="fr-FR" dirty="0" err="1"/>
-              <a:t>needs</a:t>
-            </a:r>
-            <a:r>
-              <a:rPr lang="fr-FR" dirty="0"/>
-              <a:t> to do </a:t>
-            </a:r>
-            <a:r>
-              <a:rPr lang="fr-FR" dirty="0" err="1"/>
-              <a:t>so</a:t>
-            </a:r>
-            <a:r>
-              <a:rPr lang="fr-FR" dirty="0"/>
-              <a:t>.</a:t>
+              <a:t>returns</a:t>
+            </a:r>
+            <a:r>
+              <a:rPr lang="fr-FR" dirty="0"/>
+              <a:t> a new RDD.</a:t>
             </a:r>
           </a:p>
           <a:p>
@@ -5380,32 +7540,17 @@
               <a:buChar char="-"/>
             </a:pPr>
             <a:r>
-              <a:rPr lang="fr-FR" dirty="0"/>
-              <a:t>Immutable : a transformation </a:t>
-            </a:r>
-            <a:r>
-              <a:rPr lang="fr-FR" dirty="0" err="1"/>
-              <a:t>doesn’t</a:t>
-            </a:r>
-            <a:r>
-              <a:rPr lang="fr-FR" dirty="0"/>
-              <a:t> change the data set, </a:t>
-            </a:r>
-            <a:r>
-              <a:rPr lang="fr-FR" dirty="0" err="1"/>
-              <a:t>it</a:t>
-            </a:r>
-            <a:r>
-              <a:rPr lang="fr-FR" dirty="0"/>
-              <a:t> </a:t>
-            </a:r>
-            <a:r>
-              <a:rPr lang="fr-FR" dirty="0" err="1"/>
-              <a:t>returns</a:t>
-            </a:r>
-            <a:r>
-              <a:rPr lang="fr-FR" dirty="0"/>
-              <a:t> a new RDD.</a:t>
+              <a:rPr lang="en-US" dirty="0"/>
+              <a:t>Fault Tolerant : partition can be recomputed in case of failure</a:t>
+            </a:r>
+          </a:p>
+          <a:p>
+            <a:endParaRPr lang="fr-FR" dirty="0"/>
+          </a:p>
+          <a:p>
+            <a:r>
+              <a:rPr lang="fr-FR" b="1" dirty="0"/>
+              <a:t>Graph</a:t>
             </a:r>
           </a:p>
           <a:p>
@@ -5414,23 +7559,6 @@
               <a:buChar char="-"/>
             </a:pPr>
             <a:r>
-              <a:rPr lang="en-US" dirty="0"/>
-              <a:t>Fault Tolerant : partition can be recomputed in case of failure</a:t>
-            </a:r>
-          </a:p>
-          <a:p>
-            <a:pPr marL="285750" indent="-285750">
-              <a:buFontTx/>
-              <a:buChar char="-"/>
-            </a:pPr>
-            <a:endParaRPr lang="fr-FR" dirty="0"/>
-          </a:p>
-          <a:p>
-            <a:pPr marL="285750" indent="-285750">
-              <a:buFontTx/>
-              <a:buChar char="-"/>
-            </a:pPr>
-            <a:r>
               <a:rPr lang="fr-FR" dirty="0" err="1"/>
               <a:t>Conceptually</a:t>
             </a:r>
@@ -5444,11 +7572,19 @@
             </a:r>
             <a:r>
               <a:rPr lang="fr-FR" dirty="0"/>
-              <a:t> a graph a </a:t>
+              <a:t> a </a:t>
             </a:r>
             <a:r>
               <a:rPr lang="fr-FR" dirty="0" err="1"/>
-              <a:t>function</a:t>
+              <a:t>node</a:t>
+            </a:r>
+            <a:r>
+              <a:rPr lang="fr-FR" dirty="0"/>
+              <a:t> of a graph of </a:t>
+            </a:r>
+            <a:r>
+              <a:rPr lang="fr-FR" dirty="0" err="1"/>
+              <a:t>functions</a:t>
             </a:r>
             <a:r>
               <a:rPr lang="fr-FR" dirty="0"/>
@@ -5680,7 +7816,7 @@
 </p:sld>
 </file>
 
-<file path=ppt/slides/slide5.xml><?xml version="1.0" encoding="utf-8"?>
+<file path=ppt/slides/slide6.xml><?xml version="1.0" encoding="utf-8"?>
 <p:sld xmlns:a="http://schemas.openxmlformats.org/drawingml/2006/main" xmlns:r="http://schemas.openxmlformats.org/officeDocument/2006/relationships" xmlns:p="http://schemas.openxmlformats.org/presentationml/2006/main">
   <p:cSld>
     <p:spTree>
@@ -5896,7 +8032,7 @@
 </p:sld>
 </file>
 
-<file path=ppt/slides/slide6.xml><?xml version="1.0" encoding="utf-8"?>
+<file path=ppt/slides/slide7.xml><?xml version="1.0" encoding="utf-8"?>
 <p:sld xmlns:a="http://schemas.openxmlformats.org/drawingml/2006/main" xmlns:r="http://schemas.openxmlformats.org/officeDocument/2006/relationships" xmlns:p="http://schemas.openxmlformats.org/presentationml/2006/main">
   <p:cSld>
     <p:spTree>
@@ -6025,7 +8161,7 @@
 </p:sld>
 </file>
 
-<file path=ppt/slides/slide7.xml><?xml version="1.0" encoding="utf-8"?>
+<file path=ppt/slides/slide8.xml><?xml version="1.0" encoding="utf-8"?>
 <p:sld xmlns:a="http://schemas.openxmlformats.org/drawingml/2006/main" xmlns:r="http://schemas.openxmlformats.org/officeDocument/2006/relationships" xmlns:p="http://schemas.openxmlformats.org/presentationml/2006/main">
   <p:cSld>
     <p:spTree>
@@ -7306,7 +9442,7 @@
 </p:sld>
 </file>
 
-<file path=ppt/slides/slide8.xml><?xml version="1.0" encoding="utf-8"?>
+<file path=ppt/slides/slide9.xml><?xml version="1.0" encoding="utf-8"?>
 <p:sld xmlns:a="http://schemas.openxmlformats.org/drawingml/2006/main" xmlns:r="http://schemas.openxmlformats.org/officeDocument/2006/relationships" xmlns:p="http://schemas.openxmlformats.org/presentationml/2006/main">
   <p:cSld>
     <p:spTree>
@@ -8741,1068 +10877,6 @@
     <p:extLst>
       <p:ext uri="{BB962C8B-B14F-4D97-AF65-F5344CB8AC3E}">
         <p14:creationId xmlns:p14="http://schemas.microsoft.com/office/powerpoint/2010/main" val="3771985612"/>
-      </p:ext>
-    </p:extLst>
-  </p:cSld>
-  <p:clrMapOvr>
-    <a:masterClrMapping/>
-  </p:clrMapOvr>
-</p:sld>
-</file>
-
-<file path=ppt/slides/slide9.xml><?xml version="1.0" encoding="utf-8"?>
-<p:sld xmlns:a="http://schemas.openxmlformats.org/drawingml/2006/main" xmlns:r="http://schemas.openxmlformats.org/officeDocument/2006/relationships" xmlns:p="http://schemas.openxmlformats.org/presentationml/2006/main">
-  <p:cSld>
-    <p:spTree>
-      <p:nvGrpSpPr>
-        <p:cNvPr id="1" name=""/>
-        <p:cNvGrpSpPr/>
-        <p:nvPr/>
-      </p:nvGrpSpPr>
-      <p:grpSpPr>
-        <a:xfrm>
-          <a:off x="0" y="0"/>
-          <a:ext cx="0" cy="0"/>
-          <a:chOff x="0" y="0"/>
-          <a:chExt cx="0" cy="0"/>
-        </a:xfrm>
-      </p:grpSpPr>
-      <p:sp>
-        <p:nvSpPr>
-          <p:cNvPr id="2" name="Title 1">
-            <a:extLst>
-              <a:ext uri="{FF2B5EF4-FFF2-40B4-BE49-F238E27FC236}">
-                <a16:creationId xmlns:a16="http://schemas.microsoft.com/office/drawing/2014/main" id="{1EF77BFB-B82D-46E7-9ED3-A723BCC0A39C}"/>
-              </a:ext>
-            </a:extLst>
-          </p:cNvPr>
-          <p:cNvSpPr>
-            <a:spLocks noGrp="1"/>
-          </p:cNvSpPr>
-          <p:nvPr>
-            <p:ph type="title"/>
-          </p:nvPr>
-        </p:nvSpPr>
-        <p:spPr/>
-        <p:txBody>
-          <a:bodyPr/>
-          <a:lstStyle/>
-          <a:p>
-            <a:r>
-              <a:rPr lang="fr-FR" dirty="0"/>
-              <a:t>RDD API</a:t>
-            </a:r>
-            <a:endParaRPr lang="en-US" dirty="0"/>
-          </a:p>
-        </p:txBody>
-      </p:sp>
-      <p:sp>
-        <p:nvSpPr>
-          <p:cNvPr id="8" name="Rectangle: Rounded Corners 7">
-            <a:extLst>
-              <a:ext uri="{FF2B5EF4-FFF2-40B4-BE49-F238E27FC236}">
-                <a16:creationId xmlns:a16="http://schemas.microsoft.com/office/drawing/2014/main" id="{4773AFED-7574-4502-B5B1-B2BE28D6B693}"/>
-              </a:ext>
-            </a:extLst>
-          </p:cNvPr>
-          <p:cNvSpPr/>
-          <p:nvPr/>
-        </p:nvSpPr>
-        <p:spPr>
-          <a:xfrm>
-            <a:off x="6096000" y="1741022"/>
-            <a:ext cx="2374085" cy="780176"/>
-          </a:xfrm>
-          <a:prstGeom prst="roundRect">
-            <a:avLst/>
-          </a:prstGeom>
-        </p:spPr>
-        <p:style>
-          <a:lnRef idx="2">
-            <a:schemeClr val="accent1">
-              <a:shade val="50000"/>
-            </a:schemeClr>
-          </a:lnRef>
-          <a:fillRef idx="1">
-            <a:schemeClr val="accent1"/>
-          </a:fillRef>
-          <a:effectRef idx="0">
-            <a:schemeClr val="accent1"/>
-          </a:effectRef>
-          <a:fontRef idx="minor">
-            <a:schemeClr val="lt1"/>
-          </a:fontRef>
-        </p:style>
-        <p:txBody>
-          <a:bodyPr rtlCol="0" anchor="ctr"/>
-          <a:lstStyle/>
-          <a:p>
-            <a:pPr algn="ctr"/>
-            <a:r>
-              <a:rPr lang="fr-FR" dirty="0" err="1"/>
-              <a:t>flatmap</a:t>
-            </a:r>
-            <a:r>
-              <a:rPr lang="fr-FR" dirty="0"/>
-              <a:t>(x </a:t>
-            </a:r>
-            <a:r>
-              <a:rPr lang="fr-FR" dirty="0">
-                <a:sym typeface="Wingdings" panose="05000000000000000000" pitchFamily="2" charset="2"/>
-              </a:rPr>
-              <a:t> x[‘genres’].split(‘;’))</a:t>
-            </a:r>
-            <a:endParaRPr lang="en-US" dirty="0"/>
-          </a:p>
-        </p:txBody>
-      </p:sp>
-      <p:cxnSp>
-        <p:nvCxnSpPr>
-          <p:cNvPr id="14" name="Straight Arrow Connector 13">
-            <a:extLst>
-              <a:ext uri="{FF2B5EF4-FFF2-40B4-BE49-F238E27FC236}">
-                <a16:creationId xmlns:a16="http://schemas.microsoft.com/office/drawing/2014/main" id="{B592BA22-0F53-4B16-BBAD-238ECEFD8784}"/>
-              </a:ext>
-            </a:extLst>
-          </p:cNvPr>
-          <p:cNvCxnSpPr>
-            <a:cxnSpLocks/>
-          </p:cNvCxnSpPr>
-          <p:nvPr/>
-        </p:nvCxnSpPr>
-        <p:spPr>
-          <a:xfrm>
-            <a:off x="5626217" y="2156583"/>
-            <a:ext cx="469783" cy="0"/>
-          </a:xfrm>
-          <a:prstGeom prst="straightConnector1">
-            <a:avLst/>
-          </a:prstGeom>
-          <a:ln>
-            <a:tailEnd type="triangle"/>
-          </a:ln>
-        </p:spPr>
-        <p:style>
-          <a:lnRef idx="1">
-            <a:schemeClr val="accent1"/>
-          </a:lnRef>
-          <a:fillRef idx="0">
-            <a:schemeClr val="accent1"/>
-          </a:fillRef>
-          <a:effectRef idx="0">
-            <a:schemeClr val="accent1"/>
-          </a:effectRef>
-          <a:fontRef idx="minor">
-            <a:schemeClr val="tx1"/>
-          </a:fontRef>
-        </p:style>
-      </p:cxnSp>
-      <p:cxnSp>
-        <p:nvCxnSpPr>
-          <p:cNvPr id="23" name="Straight Arrow Connector 22">
-            <a:extLst>
-              <a:ext uri="{FF2B5EF4-FFF2-40B4-BE49-F238E27FC236}">
-                <a16:creationId xmlns:a16="http://schemas.microsoft.com/office/drawing/2014/main" id="{768D8282-A543-43E0-8A54-C42479213D0D}"/>
-              </a:ext>
-            </a:extLst>
-          </p:cNvPr>
-          <p:cNvCxnSpPr>
-            <a:cxnSpLocks/>
-          </p:cNvCxnSpPr>
-          <p:nvPr/>
-        </p:nvCxnSpPr>
-        <p:spPr>
-          <a:xfrm>
-            <a:off x="8470085" y="2147888"/>
-            <a:ext cx="469783" cy="0"/>
-          </a:xfrm>
-          <a:prstGeom prst="straightConnector1">
-            <a:avLst/>
-          </a:prstGeom>
-          <a:ln>
-            <a:tailEnd type="triangle"/>
-          </a:ln>
-        </p:spPr>
-        <p:style>
-          <a:lnRef idx="1">
-            <a:schemeClr val="accent1"/>
-          </a:lnRef>
-          <a:fillRef idx="0">
-            <a:schemeClr val="accent1"/>
-          </a:fillRef>
-          <a:effectRef idx="0">
-            <a:schemeClr val="accent1"/>
-          </a:effectRef>
-          <a:fontRef idx="minor">
-            <a:schemeClr val="tx1"/>
-          </a:fontRef>
-        </p:style>
-      </p:cxnSp>
-      <p:graphicFrame>
-        <p:nvGraphicFramePr>
-          <p:cNvPr id="24" name="Table 6">
-            <a:extLst>
-              <a:ext uri="{FF2B5EF4-FFF2-40B4-BE49-F238E27FC236}">
-                <a16:creationId xmlns:a16="http://schemas.microsoft.com/office/drawing/2014/main" id="{7E32E247-CDE4-408B-9A0E-98DA9FCC0084}"/>
-              </a:ext>
-            </a:extLst>
-          </p:cNvPr>
-          <p:cNvGraphicFramePr>
-            <a:graphicFrameLocks noGrp="1"/>
-          </p:cNvGraphicFramePr>
-          <p:nvPr>
-            <p:extLst>
-              <p:ext uri="{D42A27DB-BD31-4B8C-83A1-F6EECF244321}">
-                <p14:modId xmlns:p14="http://schemas.microsoft.com/office/powerpoint/2010/main" val="3247897374"/>
-              </p:ext>
-            </p:extLst>
-          </p:nvPr>
-        </p:nvGraphicFramePr>
-        <p:xfrm>
-          <a:off x="9158680" y="913788"/>
-          <a:ext cx="1435267" cy="2485589"/>
-        </p:xfrm>
-        <a:graphic>
-          <a:graphicData uri="http://schemas.openxmlformats.org/drawingml/2006/table">
-            <a:tbl>
-              <a:tblPr firstRow="1" bandRow="1">
-                <a:tableStyleId>{5C22544A-7EE6-4342-B048-85BDC9FD1C3A}</a:tableStyleId>
-              </a:tblPr>
-              <a:tblGrid>
-                <a:gridCol w="1435267">
-                  <a:extLst>
-                    <a:ext uri="{9D8B030D-6E8A-4147-A177-3AD203B41FA5}">
-                      <a16:colId xmlns:a16="http://schemas.microsoft.com/office/drawing/2014/main" val="2061391393"/>
-                    </a:ext>
-                  </a:extLst>
-                </a:gridCol>
-              </a:tblGrid>
-              <a:tr h="473909">
-                <a:tc>
-                  <a:txBody>
-                    <a:bodyPr/>
-                    <a:lstStyle/>
-                    <a:p>
-                      <a:r>
-                        <a:rPr lang="fr-FR" sz="1600" dirty="0"/>
-                        <a:t>Row</a:t>
-                      </a:r>
-                      <a:endParaRPr lang="en-US" sz="1600" dirty="0"/>
-                    </a:p>
-                  </a:txBody>
-                  <a:tcPr/>
-                </a:tc>
-                <a:extLst>
-                  <a:ext uri="{0D108BD9-81ED-4DB2-BD59-A6C34878D82A}">
-                    <a16:rowId xmlns:a16="http://schemas.microsoft.com/office/drawing/2014/main" val="235972142"/>
-                  </a:ext>
-                </a:extLst>
-              </a:tr>
-              <a:tr h="283885">
-                <a:tc>
-                  <a:txBody>
-                    <a:bodyPr/>
-                    <a:lstStyle/>
-                    <a:p>
-                      <a:r>
-                        <a:rPr lang="fr-FR" sz="1600" dirty="0"/>
-                        <a:t>cyberpunk</a:t>
-                      </a:r>
-                      <a:endParaRPr lang="en-US" sz="1600" dirty="0"/>
-                    </a:p>
-                  </a:txBody>
-                  <a:tcPr/>
-                </a:tc>
-                <a:extLst>
-                  <a:ext uri="{0D108BD9-81ED-4DB2-BD59-A6C34878D82A}">
-                    <a16:rowId xmlns:a16="http://schemas.microsoft.com/office/drawing/2014/main" val="1215558195"/>
-                  </a:ext>
-                </a:extLst>
-              </a:tr>
-              <a:tr h="283885">
-                <a:tc>
-                  <a:txBody>
-                    <a:bodyPr/>
-                    <a:lstStyle/>
-                    <a:p>
-                      <a:r>
-                        <a:rPr lang="fr-FR" sz="1600" dirty="0" err="1"/>
-                        <a:t>scifi</a:t>
-                      </a:r>
-                      <a:endParaRPr lang="en-US" sz="1600" dirty="0"/>
-                    </a:p>
-                  </a:txBody>
-                  <a:tcPr/>
-                </a:tc>
-                <a:extLst>
-                  <a:ext uri="{0D108BD9-81ED-4DB2-BD59-A6C34878D82A}">
-                    <a16:rowId xmlns:a16="http://schemas.microsoft.com/office/drawing/2014/main" val="3821773839"/>
-                  </a:ext>
-                </a:extLst>
-              </a:tr>
-              <a:tr h="283885">
-                <a:tc>
-                  <a:txBody>
-                    <a:bodyPr/>
-                    <a:lstStyle/>
-                    <a:p>
-                      <a:pPr marL="0" marR="0" lvl="0" indent="0" algn="l" defTabSz="914400" rtl="0" eaLnBrk="1" fontAlgn="auto" latinLnBrk="0" hangingPunct="1">
-                        <a:lnSpc>
-                          <a:spcPct val="100000"/>
-                        </a:lnSpc>
-                        <a:spcBef>
-                          <a:spcPts val="0"/>
-                        </a:spcBef>
-                        <a:spcAft>
-                          <a:spcPts val="0"/>
-                        </a:spcAft>
-                        <a:buClrTx/>
-                        <a:buSzTx/>
-                        <a:buFontTx/>
-                        <a:buNone/>
-                        <a:tabLst/>
-                        <a:defRPr/>
-                      </a:pPr>
-                      <a:r>
-                        <a:rPr lang="fr-FR" sz="1600" dirty="0"/>
-                        <a:t>action</a:t>
-                      </a:r>
-                      <a:endParaRPr lang="en-US" sz="1600" dirty="0"/>
-                    </a:p>
-                  </a:txBody>
-                  <a:tcPr/>
-                </a:tc>
-                <a:extLst>
-                  <a:ext uri="{0D108BD9-81ED-4DB2-BD59-A6C34878D82A}">
-                    <a16:rowId xmlns:a16="http://schemas.microsoft.com/office/drawing/2014/main" val="1188895231"/>
-                  </a:ext>
-                </a:extLst>
-              </a:tr>
-              <a:tr h="283885">
-                <a:tc>
-                  <a:txBody>
-                    <a:bodyPr/>
-                    <a:lstStyle/>
-                    <a:p>
-                      <a:pPr marL="0" marR="0" lvl="0" indent="0" algn="l" defTabSz="914400" rtl="0" eaLnBrk="1" fontAlgn="auto" latinLnBrk="0" hangingPunct="1">
-                        <a:lnSpc>
-                          <a:spcPct val="100000"/>
-                        </a:lnSpc>
-                        <a:spcBef>
-                          <a:spcPts val="0"/>
-                        </a:spcBef>
-                        <a:spcAft>
-                          <a:spcPts val="0"/>
-                        </a:spcAft>
-                        <a:buClrTx/>
-                        <a:buSzTx/>
-                        <a:buFontTx/>
-                        <a:buNone/>
-                        <a:tabLst/>
-                        <a:defRPr/>
-                      </a:pPr>
-                      <a:r>
-                        <a:rPr lang="fr-FR" sz="1600" dirty="0"/>
-                        <a:t>music</a:t>
-                      </a:r>
-                      <a:endParaRPr lang="en-US" sz="1600" dirty="0"/>
-                    </a:p>
-                  </a:txBody>
-                  <a:tcPr/>
-                </a:tc>
-                <a:extLst>
-                  <a:ext uri="{0D108BD9-81ED-4DB2-BD59-A6C34878D82A}">
-                    <a16:rowId xmlns:a16="http://schemas.microsoft.com/office/drawing/2014/main" val="4129262335"/>
-                  </a:ext>
-                </a:extLst>
-              </a:tr>
-              <a:tr h="283885">
-                <a:tc>
-                  <a:txBody>
-                    <a:bodyPr/>
-                    <a:lstStyle/>
-                    <a:p>
-                      <a:pPr marL="0" marR="0" lvl="0" indent="0" algn="l" defTabSz="914400" rtl="0" eaLnBrk="1" fontAlgn="auto" latinLnBrk="0" hangingPunct="1">
-                        <a:lnSpc>
-                          <a:spcPct val="100000"/>
-                        </a:lnSpc>
-                        <a:spcBef>
-                          <a:spcPts val="0"/>
-                        </a:spcBef>
-                        <a:spcAft>
-                          <a:spcPts val="0"/>
-                        </a:spcAft>
-                        <a:buClrTx/>
-                        <a:buSzTx/>
-                        <a:buFontTx/>
-                        <a:buNone/>
-                        <a:tabLst/>
-                        <a:defRPr/>
-                      </a:pPr>
-                      <a:r>
-                        <a:rPr lang="fr-FR" sz="1600" dirty="0"/>
-                        <a:t>danse</a:t>
-                      </a:r>
-                      <a:endParaRPr lang="en-US" sz="1600" dirty="0"/>
-                    </a:p>
-                  </a:txBody>
-                  <a:tcPr/>
-                </a:tc>
-                <a:extLst>
-                  <a:ext uri="{0D108BD9-81ED-4DB2-BD59-A6C34878D82A}">
-                    <a16:rowId xmlns:a16="http://schemas.microsoft.com/office/drawing/2014/main" val="260357178"/>
-                  </a:ext>
-                </a:extLst>
-              </a:tr>
-              <a:tr h="283885">
-                <a:tc>
-                  <a:txBody>
-                    <a:bodyPr/>
-                    <a:lstStyle/>
-                    <a:p>
-                      <a:pPr marL="0" marR="0" lvl="0" indent="0" algn="l" defTabSz="914400" rtl="0" eaLnBrk="1" fontAlgn="auto" latinLnBrk="0" hangingPunct="1">
-                        <a:lnSpc>
-                          <a:spcPct val="100000"/>
-                        </a:lnSpc>
-                        <a:spcBef>
-                          <a:spcPts val="0"/>
-                        </a:spcBef>
-                        <a:spcAft>
-                          <a:spcPts val="0"/>
-                        </a:spcAft>
-                        <a:buClrTx/>
-                        <a:buSzTx/>
-                        <a:buFontTx/>
-                        <a:buNone/>
-                        <a:tabLst/>
-                        <a:defRPr/>
-                      </a:pPr>
-                      <a:r>
-                        <a:rPr lang="fr-FR" sz="1600" dirty="0"/>
-                        <a:t>romance</a:t>
-                      </a:r>
-                      <a:endParaRPr lang="en-US" sz="1600" dirty="0"/>
-                    </a:p>
-                  </a:txBody>
-                  <a:tcPr/>
-                </a:tc>
-                <a:extLst>
-                  <a:ext uri="{0D108BD9-81ED-4DB2-BD59-A6C34878D82A}">
-                    <a16:rowId xmlns:a16="http://schemas.microsoft.com/office/drawing/2014/main" val="2108214487"/>
-                  </a:ext>
-                </a:extLst>
-              </a:tr>
-            </a:tbl>
-          </a:graphicData>
-        </a:graphic>
-      </p:graphicFrame>
-      <p:graphicFrame>
-        <p:nvGraphicFramePr>
-          <p:cNvPr id="25" name="Table 6">
-            <a:extLst>
-              <a:ext uri="{FF2B5EF4-FFF2-40B4-BE49-F238E27FC236}">
-                <a16:creationId xmlns:a16="http://schemas.microsoft.com/office/drawing/2014/main" id="{C2C3C58D-C422-4434-9370-660117429EC9}"/>
-              </a:ext>
-            </a:extLst>
-          </p:cNvPr>
-          <p:cNvGraphicFramePr>
-            <a:graphicFrameLocks noGrp="1"/>
-          </p:cNvGraphicFramePr>
-          <p:nvPr>
-            <p:extLst>
-              <p:ext uri="{D42A27DB-BD31-4B8C-83A1-F6EECF244321}">
-                <p14:modId xmlns:p14="http://schemas.microsoft.com/office/powerpoint/2010/main" val="3626838375"/>
-              </p:ext>
-            </p:extLst>
-          </p:nvPr>
-        </p:nvGraphicFramePr>
-        <p:xfrm>
-          <a:off x="336282" y="1371359"/>
-          <a:ext cx="5192063" cy="1144469"/>
-        </p:xfrm>
-        <a:graphic>
-          <a:graphicData uri="http://schemas.openxmlformats.org/drawingml/2006/table">
-            <a:tbl>
-              <a:tblPr firstRow="1" bandRow="1">
-                <a:tableStyleId>{5C22544A-7EE6-4342-B048-85BDC9FD1C3A}</a:tableStyleId>
-              </a:tblPr>
-              <a:tblGrid>
-                <a:gridCol w="5192063">
-                  <a:extLst>
-                    <a:ext uri="{9D8B030D-6E8A-4147-A177-3AD203B41FA5}">
-                      <a16:colId xmlns:a16="http://schemas.microsoft.com/office/drawing/2014/main" val="2061391393"/>
-                    </a:ext>
-                  </a:extLst>
-                </a:gridCol>
-              </a:tblGrid>
-              <a:tr h="473909">
-                <a:tc>
-                  <a:txBody>
-                    <a:bodyPr/>
-                    <a:lstStyle/>
-                    <a:p>
-                      <a:r>
-                        <a:rPr lang="fr-FR" sz="1600" dirty="0"/>
-                        <a:t>Row</a:t>
-                      </a:r>
-                      <a:endParaRPr lang="en-US" sz="1600" dirty="0"/>
-                    </a:p>
-                  </a:txBody>
-                  <a:tcPr/>
-                </a:tc>
-                <a:extLst>
-                  <a:ext uri="{0D108BD9-81ED-4DB2-BD59-A6C34878D82A}">
-                    <a16:rowId xmlns:a16="http://schemas.microsoft.com/office/drawing/2014/main" val="235972142"/>
-                  </a:ext>
-                </a:extLst>
-              </a:tr>
-              <a:tr h="283885">
-                <a:tc>
-                  <a:txBody>
-                    <a:bodyPr/>
-                    <a:lstStyle/>
-                    <a:p>
-                      <a:r>
-                        <a:rPr lang="en-US" sz="1600" dirty="0"/>
-                        <a:t>{"</a:t>
-                      </a:r>
-                      <a:r>
-                        <a:rPr lang="en-US" sz="1600" dirty="0" err="1"/>
-                        <a:t>movie":"Blade</a:t>
-                      </a:r>
-                      <a:r>
-                        <a:rPr lang="en-US" sz="1600" dirty="0"/>
-                        <a:t> Runner", “genres":”</a:t>
-                      </a:r>
-                      <a:r>
-                        <a:rPr lang="en-US" sz="1600" dirty="0" err="1"/>
-                        <a:t>cyberpunk;scifi;action</a:t>
-                      </a:r>
-                      <a:r>
-                        <a:rPr lang="en-US" sz="1600" dirty="0"/>
-                        <a:t>”}</a:t>
-                      </a:r>
-                    </a:p>
-                  </a:txBody>
-                  <a:tcPr/>
-                </a:tc>
-                <a:extLst>
-                  <a:ext uri="{0D108BD9-81ED-4DB2-BD59-A6C34878D82A}">
-                    <a16:rowId xmlns:a16="http://schemas.microsoft.com/office/drawing/2014/main" val="1215558195"/>
-                  </a:ext>
-                </a:extLst>
-              </a:tr>
-              <a:tr h="283885">
-                <a:tc>
-                  <a:txBody>
-                    <a:bodyPr/>
-                    <a:lstStyle/>
-                    <a:p>
-                      <a:r>
-                        <a:rPr lang="en-US" sz="1600" dirty="0"/>
-                        <a:t>{"</a:t>
-                      </a:r>
-                      <a:r>
-                        <a:rPr lang="en-US" sz="1600" dirty="0" err="1"/>
-                        <a:t>movie":"Dirty</a:t>
-                      </a:r>
-                      <a:r>
-                        <a:rPr lang="en-US" sz="1600" dirty="0"/>
-                        <a:t> dancing", “genres":”</a:t>
-                      </a:r>
-                      <a:r>
-                        <a:rPr lang="en-US" sz="1600" dirty="0" err="1"/>
-                        <a:t>music;danse;romance</a:t>
-                      </a:r>
-                      <a:r>
-                        <a:rPr lang="en-US" sz="1600" dirty="0"/>
-                        <a:t>”}</a:t>
-                      </a:r>
-                    </a:p>
-                  </a:txBody>
-                  <a:tcPr/>
-                </a:tc>
-                <a:extLst>
-                  <a:ext uri="{0D108BD9-81ED-4DB2-BD59-A6C34878D82A}">
-                    <a16:rowId xmlns:a16="http://schemas.microsoft.com/office/drawing/2014/main" val="3821773839"/>
-                  </a:ext>
-                </a:extLst>
-              </a:tr>
-            </a:tbl>
-          </a:graphicData>
-        </a:graphic>
-      </p:graphicFrame>
-      <p:sp>
-        <p:nvSpPr>
-          <p:cNvPr id="18" name="Rectangle: Rounded Corners 17">
-            <a:extLst>
-              <a:ext uri="{FF2B5EF4-FFF2-40B4-BE49-F238E27FC236}">
-                <a16:creationId xmlns:a16="http://schemas.microsoft.com/office/drawing/2014/main" id="{0E934C05-667D-494A-A255-E7EAB65FD2C8}"/>
-              </a:ext>
-            </a:extLst>
-          </p:cNvPr>
-          <p:cNvSpPr/>
-          <p:nvPr/>
-        </p:nvSpPr>
-        <p:spPr>
-          <a:xfrm>
-            <a:off x="6087611" y="4035399"/>
-            <a:ext cx="2374085" cy="780176"/>
-          </a:xfrm>
-          <a:prstGeom prst="roundRect">
-            <a:avLst/>
-          </a:prstGeom>
-        </p:spPr>
-        <p:style>
-          <a:lnRef idx="2">
-            <a:schemeClr val="accent1">
-              <a:shade val="50000"/>
-            </a:schemeClr>
-          </a:lnRef>
-          <a:fillRef idx="1">
-            <a:schemeClr val="accent1"/>
-          </a:fillRef>
-          <a:effectRef idx="0">
-            <a:schemeClr val="accent1"/>
-          </a:effectRef>
-          <a:fontRef idx="minor">
-            <a:schemeClr val="lt1"/>
-          </a:fontRef>
-        </p:style>
-        <p:txBody>
-          <a:bodyPr rtlCol="0" anchor="ctr"/>
-          <a:lstStyle/>
-          <a:p>
-            <a:pPr algn="ctr"/>
-            <a:r>
-              <a:rPr lang="fr-FR" dirty="0" err="1"/>
-              <a:t>filter</a:t>
-            </a:r>
-            <a:r>
-              <a:rPr lang="fr-FR" dirty="0"/>
-              <a:t>(x </a:t>
-            </a:r>
-            <a:r>
-              <a:rPr lang="fr-FR" dirty="0">
-                <a:sym typeface="Wingdings" panose="05000000000000000000" pitchFamily="2" charset="2"/>
-              </a:rPr>
-              <a:t> x[‘rating’]&gt;4.0)</a:t>
-            </a:r>
-            <a:endParaRPr lang="en-US" dirty="0"/>
-          </a:p>
-        </p:txBody>
-      </p:sp>
-      <p:cxnSp>
-        <p:nvCxnSpPr>
-          <p:cNvPr id="19" name="Straight Arrow Connector 18">
-            <a:extLst>
-              <a:ext uri="{FF2B5EF4-FFF2-40B4-BE49-F238E27FC236}">
-                <a16:creationId xmlns:a16="http://schemas.microsoft.com/office/drawing/2014/main" id="{33BA8CE7-A48F-4E95-9A00-C05EC8349F08}"/>
-              </a:ext>
-            </a:extLst>
-          </p:cNvPr>
-          <p:cNvCxnSpPr>
-            <a:cxnSpLocks/>
-          </p:cNvCxnSpPr>
-          <p:nvPr/>
-        </p:nvCxnSpPr>
-        <p:spPr>
-          <a:xfrm>
-            <a:off x="5617828" y="4450960"/>
-            <a:ext cx="469783" cy="0"/>
-          </a:xfrm>
-          <a:prstGeom prst="straightConnector1">
-            <a:avLst/>
-          </a:prstGeom>
-          <a:ln>
-            <a:tailEnd type="triangle"/>
-          </a:ln>
-        </p:spPr>
-        <p:style>
-          <a:lnRef idx="1">
-            <a:schemeClr val="accent1"/>
-          </a:lnRef>
-          <a:fillRef idx="0">
-            <a:schemeClr val="accent1"/>
-          </a:fillRef>
-          <a:effectRef idx="0">
-            <a:schemeClr val="accent1"/>
-          </a:effectRef>
-          <a:fontRef idx="minor">
-            <a:schemeClr val="tx1"/>
-          </a:fontRef>
-        </p:style>
-      </p:cxnSp>
-      <p:cxnSp>
-        <p:nvCxnSpPr>
-          <p:cNvPr id="20" name="Straight Arrow Connector 19">
-            <a:extLst>
-              <a:ext uri="{FF2B5EF4-FFF2-40B4-BE49-F238E27FC236}">
-                <a16:creationId xmlns:a16="http://schemas.microsoft.com/office/drawing/2014/main" id="{3734846F-0C85-40BD-BF94-E4A2790A599F}"/>
-              </a:ext>
-            </a:extLst>
-          </p:cNvPr>
-          <p:cNvCxnSpPr>
-            <a:cxnSpLocks/>
-          </p:cNvCxnSpPr>
-          <p:nvPr/>
-        </p:nvCxnSpPr>
-        <p:spPr>
-          <a:xfrm>
-            <a:off x="8461696" y="4442265"/>
-            <a:ext cx="469783" cy="0"/>
-          </a:xfrm>
-          <a:prstGeom prst="straightConnector1">
-            <a:avLst/>
-          </a:prstGeom>
-          <a:ln>
-            <a:tailEnd type="triangle"/>
-          </a:ln>
-        </p:spPr>
-        <p:style>
-          <a:lnRef idx="1">
-            <a:schemeClr val="accent1"/>
-          </a:lnRef>
-          <a:fillRef idx="0">
-            <a:schemeClr val="accent1"/>
-          </a:fillRef>
-          <a:effectRef idx="0">
-            <a:schemeClr val="accent1"/>
-          </a:effectRef>
-          <a:fontRef idx="minor">
-            <a:schemeClr val="tx1"/>
-          </a:fontRef>
-        </p:style>
-      </p:cxnSp>
-      <p:graphicFrame>
-        <p:nvGraphicFramePr>
-          <p:cNvPr id="21" name="Table 6">
-            <a:extLst>
-              <a:ext uri="{FF2B5EF4-FFF2-40B4-BE49-F238E27FC236}">
-                <a16:creationId xmlns:a16="http://schemas.microsoft.com/office/drawing/2014/main" id="{3B363A25-A424-4A7F-AC1C-675D5AA95527}"/>
-              </a:ext>
-            </a:extLst>
-          </p:cNvPr>
-          <p:cNvGraphicFramePr>
-            <a:graphicFrameLocks noGrp="1"/>
-          </p:cNvGraphicFramePr>
-          <p:nvPr>
-            <p:extLst>
-              <p:ext uri="{D42A27DB-BD31-4B8C-83A1-F6EECF244321}">
-                <p14:modId xmlns:p14="http://schemas.microsoft.com/office/powerpoint/2010/main" val="54888848"/>
-              </p:ext>
-            </p:extLst>
-          </p:nvPr>
-        </p:nvGraphicFramePr>
-        <p:xfrm>
-          <a:off x="9060086" y="3884384"/>
-          <a:ext cx="2804021" cy="1133151"/>
-        </p:xfrm>
-        <a:graphic>
-          <a:graphicData uri="http://schemas.openxmlformats.org/drawingml/2006/table">
-            <a:tbl>
-              <a:tblPr firstRow="1" bandRow="1">
-                <a:tableStyleId>{5C22544A-7EE6-4342-B048-85BDC9FD1C3A}</a:tableStyleId>
-              </a:tblPr>
-              <a:tblGrid>
-                <a:gridCol w="2804021">
-                  <a:extLst>
-                    <a:ext uri="{9D8B030D-6E8A-4147-A177-3AD203B41FA5}">
-                      <a16:colId xmlns:a16="http://schemas.microsoft.com/office/drawing/2014/main" val="2061391393"/>
-                    </a:ext>
-                  </a:extLst>
-                </a:gridCol>
-              </a:tblGrid>
-              <a:tr h="462591">
-                <a:tc>
-                  <a:txBody>
-                    <a:bodyPr/>
-                    <a:lstStyle/>
-                    <a:p>
-                      <a:r>
-                        <a:rPr lang="fr-FR" sz="1600" dirty="0"/>
-                        <a:t>Row</a:t>
-                      </a:r>
-                      <a:endParaRPr lang="en-US" sz="1600" dirty="0"/>
-                    </a:p>
-                  </a:txBody>
-                  <a:tcPr/>
-                </a:tc>
-                <a:extLst>
-                  <a:ext uri="{0D108BD9-81ED-4DB2-BD59-A6C34878D82A}">
-                    <a16:rowId xmlns:a16="http://schemas.microsoft.com/office/drawing/2014/main" val="235972142"/>
-                  </a:ext>
-                </a:extLst>
-              </a:tr>
-              <a:tr h="283885">
-                <a:tc>
-                  <a:txBody>
-                    <a:bodyPr/>
-                    <a:lstStyle/>
-                    <a:p>
-                      <a:r>
-                        <a:rPr lang="en-US" sz="1600" dirty="0"/>
-                        <a:t>{"</a:t>
-                      </a:r>
-                      <a:r>
-                        <a:rPr lang="en-US" sz="1600" dirty="0" err="1"/>
-                        <a:t>user":"John</a:t>
-                      </a:r>
-                      <a:r>
-                        <a:rPr lang="en-US" sz="1600" dirty="0"/>
-                        <a:t>", "</a:t>
-                      </a:r>
-                      <a:r>
-                        <a:rPr lang="en-US" sz="1600" dirty="0" err="1"/>
-                        <a:t>movie":"Bl</a:t>
-                      </a:r>
-                      <a:r>
-                        <a:rPr lang="en-US" sz="1600" dirty="0"/>
-                        <a:t>…</a:t>
-                      </a:r>
-                    </a:p>
-                  </a:txBody>
-                  <a:tcPr/>
-                </a:tc>
-                <a:extLst>
-                  <a:ext uri="{0D108BD9-81ED-4DB2-BD59-A6C34878D82A}">
-                    <a16:rowId xmlns:a16="http://schemas.microsoft.com/office/drawing/2014/main" val="1215558195"/>
-                  </a:ext>
-                </a:extLst>
-              </a:tr>
-              <a:tr h="283885">
-                <a:tc>
-                  <a:txBody>
-                    <a:bodyPr/>
-                    <a:lstStyle/>
-                    <a:p>
-                      <a:r>
-                        <a:rPr lang="en-US" sz="1600" dirty="0"/>
-                        <a:t>{"</a:t>
-                      </a:r>
-                      <a:r>
-                        <a:rPr lang="en-US" sz="1600" dirty="0" err="1"/>
-                        <a:t>user":"Louise</a:t>
-                      </a:r>
-                      <a:r>
-                        <a:rPr lang="en-US" sz="1600" dirty="0"/>
-                        <a:t>", "</a:t>
-                      </a:r>
-                      <a:r>
-                        <a:rPr lang="en-US" sz="1600" dirty="0" err="1"/>
-                        <a:t>movie":"Dir</a:t>
-                      </a:r>
-                      <a:r>
-                        <a:rPr lang="en-US" sz="1600" dirty="0"/>
-                        <a:t>…</a:t>
-                      </a:r>
-                    </a:p>
-                  </a:txBody>
-                  <a:tcPr/>
-                </a:tc>
-                <a:extLst>
-                  <a:ext uri="{0D108BD9-81ED-4DB2-BD59-A6C34878D82A}">
-                    <a16:rowId xmlns:a16="http://schemas.microsoft.com/office/drawing/2014/main" val="3821773839"/>
-                  </a:ext>
-                </a:extLst>
-              </a:tr>
-            </a:tbl>
-          </a:graphicData>
-        </a:graphic>
-      </p:graphicFrame>
-      <p:graphicFrame>
-        <p:nvGraphicFramePr>
-          <p:cNvPr id="22" name="Table 6">
-            <a:extLst>
-              <a:ext uri="{FF2B5EF4-FFF2-40B4-BE49-F238E27FC236}">
-                <a16:creationId xmlns:a16="http://schemas.microsoft.com/office/drawing/2014/main" id="{14F2891B-DE06-4BA6-B53E-8E439C13B6B4}"/>
-              </a:ext>
-            </a:extLst>
-          </p:cNvPr>
-          <p:cNvGraphicFramePr>
-            <a:graphicFrameLocks noGrp="1"/>
-          </p:cNvGraphicFramePr>
-          <p:nvPr>
-            <p:extLst>
-              <p:ext uri="{D42A27DB-BD31-4B8C-83A1-F6EECF244321}">
-                <p14:modId xmlns:p14="http://schemas.microsoft.com/office/powerpoint/2010/main" val="3214289153"/>
-              </p:ext>
-            </p:extLst>
-          </p:nvPr>
-        </p:nvGraphicFramePr>
-        <p:xfrm>
-          <a:off x="327893" y="3665736"/>
-          <a:ext cx="5015893" cy="1479749"/>
-        </p:xfrm>
-        <a:graphic>
-          <a:graphicData uri="http://schemas.openxmlformats.org/drawingml/2006/table">
-            <a:tbl>
-              <a:tblPr firstRow="1" bandRow="1">
-                <a:tableStyleId>{5C22544A-7EE6-4342-B048-85BDC9FD1C3A}</a:tableStyleId>
-              </a:tblPr>
-              <a:tblGrid>
-                <a:gridCol w="5015893">
-                  <a:extLst>
-                    <a:ext uri="{9D8B030D-6E8A-4147-A177-3AD203B41FA5}">
-                      <a16:colId xmlns:a16="http://schemas.microsoft.com/office/drawing/2014/main" val="2061391393"/>
-                    </a:ext>
-                  </a:extLst>
-                </a:gridCol>
-              </a:tblGrid>
-              <a:tr h="473909">
-                <a:tc>
-                  <a:txBody>
-                    <a:bodyPr/>
-                    <a:lstStyle/>
-                    <a:p>
-                      <a:r>
-                        <a:rPr lang="fr-FR" sz="1600" dirty="0"/>
-                        <a:t>Row</a:t>
-                      </a:r>
-                      <a:endParaRPr lang="en-US" sz="1600" dirty="0"/>
-                    </a:p>
-                  </a:txBody>
-                  <a:tcPr/>
-                </a:tc>
-                <a:extLst>
-                  <a:ext uri="{0D108BD9-81ED-4DB2-BD59-A6C34878D82A}">
-                    <a16:rowId xmlns:a16="http://schemas.microsoft.com/office/drawing/2014/main" val="235972142"/>
-                  </a:ext>
-                </a:extLst>
-              </a:tr>
-              <a:tr h="283885">
-                <a:tc>
-                  <a:txBody>
-                    <a:bodyPr/>
-                    <a:lstStyle/>
-                    <a:p>
-                      <a:r>
-                        <a:rPr lang="en-US" sz="1600" dirty="0"/>
-                        <a:t>{"</a:t>
-                      </a:r>
-                      <a:r>
-                        <a:rPr lang="en-US" sz="1600" dirty="0" err="1"/>
-                        <a:t>user":"John</a:t>
-                      </a:r>
-                      <a:r>
-                        <a:rPr lang="en-US" sz="1600" dirty="0"/>
-                        <a:t>", "</a:t>
-                      </a:r>
-                      <a:r>
-                        <a:rPr lang="en-US" sz="1600" dirty="0" err="1"/>
-                        <a:t>movie":"Blade</a:t>
-                      </a:r>
-                      <a:r>
-                        <a:rPr lang="en-US" sz="1600" dirty="0"/>
-                        <a:t> Runner", "rating":5.0}</a:t>
-                      </a:r>
-                    </a:p>
-                  </a:txBody>
-                  <a:tcPr/>
-                </a:tc>
-                <a:extLst>
-                  <a:ext uri="{0D108BD9-81ED-4DB2-BD59-A6C34878D82A}">
-                    <a16:rowId xmlns:a16="http://schemas.microsoft.com/office/drawing/2014/main" val="1215558195"/>
-                  </a:ext>
-                </a:extLst>
-              </a:tr>
-              <a:tr h="283885">
-                <a:tc>
-                  <a:txBody>
-                    <a:bodyPr/>
-                    <a:lstStyle/>
-                    <a:p>
-                      <a:r>
-                        <a:rPr lang="en-US" sz="1600" dirty="0"/>
-                        <a:t>{"</a:t>
-                      </a:r>
-                      <a:r>
-                        <a:rPr lang="en-US" sz="1600" dirty="0" err="1"/>
-                        <a:t>user":"Louise</a:t>
-                      </a:r>
-                      <a:r>
-                        <a:rPr lang="en-US" sz="1600" dirty="0"/>
-                        <a:t>", "</a:t>
-                      </a:r>
-                      <a:r>
-                        <a:rPr lang="en-US" sz="1600" dirty="0" err="1"/>
-                        <a:t>movie":"Dirty</a:t>
-                      </a:r>
-                      <a:r>
-                        <a:rPr lang="en-US" sz="1600" dirty="0"/>
-                        <a:t> dancing", "rating":5.0}</a:t>
-                      </a:r>
-                    </a:p>
-                  </a:txBody>
-                  <a:tcPr/>
-                </a:tc>
-                <a:extLst>
-                  <a:ext uri="{0D108BD9-81ED-4DB2-BD59-A6C34878D82A}">
-                    <a16:rowId xmlns:a16="http://schemas.microsoft.com/office/drawing/2014/main" val="3821773839"/>
-                  </a:ext>
-                </a:extLst>
-              </a:tr>
-              <a:tr h="283885">
-                <a:tc>
-                  <a:txBody>
-                    <a:bodyPr/>
-                    <a:lstStyle/>
-                    <a:p>
-                      <a:pPr marL="0" marR="0" lvl="0" indent="0" algn="l" defTabSz="914400" rtl="0" eaLnBrk="1" fontAlgn="auto" latinLnBrk="0" hangingPunct="1">
-                        <a:lnSpc>
-                          <a:spcPct val="100000"/>
-                        </a:lnSpc>
-                        <a:spcBef>
-                          <a:spcPts val="0"/>
-                        </a:spcBef>
-                        <a:spcAft>
-                          <a:spcPts val="0"/>
-                        </a:spcAft>
-                        <a:buClrTx/>
-                        <a:buSzTx/>
-                        <a:buFontTx/>
-                        <a:buNone/>
-                        <a:tabLst/>
-                        <a:defRPr/>
-                      </a:pPr>
-                      <a:r>
-                        <a:rPr lang="en-US" sz="1600" dirty="0"/>
-                        <a:t>{"</a:t>
-                      </a:r>
-                      <a:r>
-                        <a:rPr lang="en-US" sz="1600" dirty="0" err="1"/>
-                        <a:t>user":“Sam</a:t>
-                      </a:r>
-                      <a:r>
-                        <a:rPr lang="en-US" sz="1600" dirty="0"/>
-                        <a:t>", "</a:t>
-                      </a:r>
-                      <a:r>
-                        <a:rPr lang="en-US" sz="1600" dirty="0" err="1"/>
-                        <a:t>movie":“Blade</a:t>
-                      </a:r>
-                      <a:r>
-                        <a:rPr lang="en-US" sz="1600" dirty="0"/>
-                        <a:t> Runner", "rating":3.5}</a:t>
-                      </a:r>
-                    </a:p>
-                  </a:txBody>
-                  <a:tcPr/>
-                </a:tc>
-                <a:extLst>
-                  <a:ext uri="{0D108BD9-81ED-4DB2-BD59-A6C34878D82A}">
-                    <a16:rowId xmlns:a16="http://schemas.microsoft.com/office/drawing/2014/main" val="1188895231"/>
-                  </a:ext>
-                </a:extLst>
-              </a:tr>
-            </a:tbl>
-          </a:graphicData>
-        </a:graphic>
-      </p:graphicFrame>
-    </p:spTree>
-    <p:extLst>
-      <p:ext uri="{BB962C8B-B14F-4D97-AF65-F5344CB8AC3E}">
-        <p14:creationId xmlns:p14="http://schemas.microsoft.com/office/powerpoint/2010/main" val="2482890917"/>
       </p:ext>
     </p:extLst>
   </p:cSld>
@@ -10105,4 +11179,299 @@
     </a:ext>
   </a:extLst>
 </a:theme>
+</file>
+
+<file path=ppt/theme/theme2.xml><?xml version="1.0" encoding="utf-8"?>
+<a:theme xmlns:a="http://schemas.openxmlformats.org/drawingml/2006/main" name="Thème Office">
+  <a:themeElements>
+    <a:clrScheme name="Office">
+      <a:dk1>
+        <a:sysClr val="windowText" lastClr="000000"/>
+      </a:dk1>
+      <a:lt1>
+        <a:sysClr val="window" lastClr="FFFFFF"/>
+      </a:lt1>
+      <a:dk2>
+        <a:srgbClr val="44546A"/>
+      </a:dk2>
+      <a:lt2>
+        <a:srgbClr val="E7E6E6"/>
+      </a:lt2>
+      <a:accent1>
+        <a:srgbClr val="4472C4"/>
+      </a:accent1>
+      <a:accent2>
+        <a:srgbClr val="ED7D31"/>
+      </a:accent2>
+      <a:accent3>
+        <a:srgbClr val="A5A5A5"/>
+      </a:accent3>
+      <a:accent4>
+        <a:srgbClr val="FFC000"/>
+      </a:accent4>
+      <a:accent5>
+        <a:srgbClr val="5B9BD5"/>
+      </a:accent5>
+      <a:accent6>
+        <a:srgbClr val="70AD47"/>
+      </a:accent6>
+      <a:hlink>
+        <a:srgbClr val="0563C1"/>
+      </a:hlink>
+      <a:folHlink>
+        <a:srgbClr val="954F72"/>
+      </a:folHlink>
+    </a:clrScheme>
+    <a:fontScheme name="Office">
+      <a:majorFont>
+        <a:latin typeface="Calibri Light" panose="020F0302020204030204"/>
+        <a:ea typeface=""/>
+        <a:cs typeface=""/>
+        <a:font script="Jpan" typeface="游ゴシック Light"/>
+        <a:font script="Hang" typeface="맑은 고딕"/>
+        <a:font script="Hans" typeface="等线 Light"/>
+        <a:font script="Hant" typeface="新細明體"/>
+        <a:font script="Arab" typeface="Times New Roman"/>
+        <a:font script="Hebr" typeface="Times New Roman"/>
+        <a:font script="Thai" typeface="Angsana New"/>
+        <a:font script="Ethi" typeface="Nyala"/>
+        <a:font script="Beng" typeface="Vrinda"/>
+        <a:font script="Gujr" typeface="Shruti"/>
+        <a:font script="Khmr" typeface="MoolBoran"/>
+        <a:font script="Knda" typeface="Tunga"/>
+        <a:font script="Guru" typeface="Raavi"/>
+        <a:font script="Cans" typeface="Euphemia"/>
+        <a:font script="Cher" typeface="Plantagenet Cherokee"/>
+        <a:font script="Yiii" typeface="Microsoft Yi Baiti"/>
+        <a:font script="Tibt" typeface="Microsoft Himalaya"/>
+        <a:font script="Thaa" typeface="MV Boli"/>
+        <a:font script="Deva" typeface="Mangal"/>
+        <a:font script="Telu" typeface="Gautami"/>
+        <a:font script="Taml" typeface="Latha"/>
+        <a:font script="Syrc" typeface="Estrangelo Edessa"/>
+        <a:font script="Orya" typeface="Kalinga"/>
+        <a:font script="Mlym" typeface="Kartika"/>
+        <a:font script="Laoo" typeface="DokChampa"/>
+        <a:font script="Sinh" typeface="Iskoola Pota"/>
+        <a:font script="Mong" typeface="Mongolian Baiti"/>
+        <a:font script="Viet" typeface="Times New Roman"/>
+        <a:font script="Uigh" typeface="Microsoft Uighur"/>
+        <a:font script="Geor" typeface="Sylfaen"/>
+        <a:font script="Armn" typeface="Arial"/>
+        <a:font script="Bugi" typeface="Leelawadee UI"/>
+        <a:font script="Bopo" typeface="Microsoft JhengHei"/>
+        <a:font script="Java" typeface="Javanese Text"/>
+        <a:font script="Lisu" typeface="Segoe UI"/>
+        <a:font script="Mymr" typeface="Myanmar Text"/>
+        <a:font script="Nkoo" typeface="Ebrima"/>
+        <a:font script="Olck" typeface="Nirmala UI"/>
+        <a:font script="Osma" typeface="Ebrima"/>
+        <a:font script="Phag" typeface="Phagspa"/>
+        <a:font script="Syrn" typeface="Estrangelo Edessa"/>
+        <a:font script="Syrj" typeface="Estrangelo Edessa"/>
+        <a:font script="Syre" typeface="Estrangelo Edessa"/>
+        <a:font script="Sora" typeface="Nirmala UI"/>
+        <a:font script="Tale" typeface="Microsoft Tai Le"/>
+        <a:font script="Talu" typeface="Microsoft New Tai Lue"/>
+        <a:font script="Tfng" typeface="Ebrima"/>
+      </a:majorFont>
+      <a:minorFont>
+        <a:latin typeface="Calibri" panose="020F0502020204030204"/>
+        <a:ea typeface=""/>
+        <a:cs typeface=""/>
+        <a:font script="Jpan" typeface="游ゴシック"/>
+        <a:font script="Hang" typeface="맑은 고딕"/>
+        <a:font script="Hans" typeface="等线"/>
+        <a:font script="Hant" typeface="新細明體"/>
+        <a:font script="Arab" typeface="Arial"/>
+        <a:font script="Hebr" typeface="Arial"/>
+        <a:font script="Thai" typeface="Cordia New"/>
+        <a:font script="Ethi" typeface="Nyala"/>
+        <a:font script="Beng" typeface="Vrinda"/>
+        <a:font script="Gujr" typeface="Shruti"/>
+        <a:font script="Khmr" typeface="DaunPenh"/>
+        <a:font script="Knda" typeface="Tunga"/>
+        <a:font script="Guru" typeface="Raavi"/>
+        <a:font script="Cans" typeface="Euphemia"/>
+        <a:font script="Cher" typeface="Plantagenet Cherokee"/>
+        <a:font script="Yiii" typeface="Microsoft Yi Baiti"/>
+        <a:font script="Tibt" typeface="Microsoft Himalaya"/>
+        <a:font script="Thaa" typeface="MV Boli"/>
+        <a:font script="Deva" typeface="Mangal"/>
+        <a:font script="Telu" typeface="Gautami"/>
+        <a:font script="Taml" typeface="Latha"/>
+        <a:font script="Syrc" typeface="Estrangelo Edessa"/>
+        <a:font script="Orya" typeface="Kalinga"/>
+        <a:font script="Mlym" typeface="Kartika"/>
+        <a:font script="Laoo" typeface="DokChampa"/>
+        <a:font script="Sinh" typeface="Iskoola Pota"/>
+        <a:font script="Mong" typeface="Mongolian Baiti"/>
+        <a:font script="Viet" typeface="Arial"/>
+        <a:font script="Uigh" typeface="Microsoft Uighur"/>
+        <a:font script="Geor" typeface="Sylfaen"/>
+        <a:font script="Armn" typeface="Arial"/>
+        <a:font script="Bugi" typeface="Leelawadee UI"/>
+        <a:font script="Bopo" typeface="Microsoft JhengHei"/>
+        <a:font script="Java" typeface="Javanese Text"/>
+        <a:font script="Lisu" typeface="Segoe UI"/>
+        <a:font script="Mymr" typeface="Myanmar Text"/>
+        <a:font script="Nkoo" typeface="Ebrima"/>
+        <a:font script="Olck" typeface="Nirmala UI"/>
+        <a:font script="Osma" typeface="Ebrima"/>
+        <a:font script="Phag" typeface="Phagspa"/>
+        <a:font script="Syrn" typeface="Estrangelo Edessa"/>
+        <a:font script="Syrj" typeface="Estrangelo Edessa"/>
+        <a:font script="Syre" typeface="Estrangelo Edessa"/>
+        <a:font script="Sora" typeface="Nirmala UI"/>
+        <a:font script="Tale" typeface="Microsoft Tai Le"/>
+        <a:font script="Talu" typeface="Microsoft New Tai Lue"/>
+        <a:font script="Tfng" typeface="Ebrima"/>
+      </a:minorFont>
+    </a:fontScheme>
+    <a:fmtScheme name="Office">
+      <a:fillStyleLst>
+        <a:solidFill>
+          <a:schemeClr val="phClr"/>
+        </a:solidFill>
+        <a:gradFill rotWithShape="1">
+          <a:gsLst>
+            <a:gs pos="0">
+              <a:schemeClr val="phClr">
+                <a:lumMod val="110000"/>
+                <a:satMod val="105000"/>
+                <a:tint val="67000"/>
+              </a:schemeClr>
+            </a:gs>
+            <a:gs pos="50000">
+              <a:schemeClr val="phClr">
+                <a:lumMod val="105000"/>
+                <a:satMod val="103000"/>
+                <a:tint val="73000"/>
+              </a:schemeClr>
+            </a:gs>
+            <a:gs pos="100000">
+              <a:schemeClr val="phClr">
+                <a:lumMod val="105000"/>
+                <a:satMod val="109000"/>
+                <a:tint val="81000"/>
+              </a:schemeClr>
+            </a:gs>
+          </a:gsLst>
+          <a:lin ang="5400000" scaled="0"/>
+        </a:gradFill>
+        <a:gradFill rotWithShape="1">
+          <a:gsLst>
+            <a:gs pos="0">
+              <a:schemeClr val="phClr">
+                <a:satMod val="103000"/>
+                <a:lumMod val="102000"/>
+                <a:tint val="94000"/>
+              </a:schemeClr>
+            </a:gs>
+            <a:gs pos="50000">
+              <a:schemeClr val="phClr">
+                <a:satMod val="110000"/>
+                <a:lumMod val="100000"/>
+                <a:shade val="100000"/>
+              </a:schemeClr>
+            </a:gs>
+            <a:gs pos="100000">
+              <a:schemeClr val="phClr">
+                <a:lumMod val="99000"/>
+                <a:satMod val="120000"/>
+                <a:shade val="78000"/>
+              </a:schemeClr>
+            </a:gs>
+          </a:gsLst>
+          <a:lin ang="5400000" scaled="0"/>
+        </a:gradFill>
+      </a:fillStyleLst>
+      <a:lnStyleLst>
+        <a:ln w="6350" cap="flat" cmpd="sng" algn="ctr">
+          <a:solidFill>
+            <a:schemeClr val="phClr"/>
+          </a:solidFill>
+          <a:prstDash val="solid"/>
+          <a:miter lim="800000"/>
+        </a:ln>
+        <a:ln w="12700" cap="flat" cmpd="sng" algn="ctr">
+          <a:solidFill>
+            <a:schemeClr val="phClr"/>
+          </a:solidFill>
+          <a:prstDash val="solid"/>
+          <a:miter lim="800000"/>
+        </a:ln>
+        <a:ln w="19050" cap="flat" cmpd="sng" algn="ctr">
+          <a:solidFill>
+            <a:schemeClr val="phClr"/>
+          </a:solidFill>
+          <a:prstDash val="solid"/>
+          <a:miter lim="800000"/>
+        </a:ln>
+      </a:lnStyleLst>
+      <a:effectStyleLst>
+        <a:effectStyle>
+          <a:effectLst/>
+        </a:effectStyle>
+        <a:effectStyle>
+          <a:effectLst/>
+        </a:effectStyle>
+        <a:effectStyle>
+          <a:effectLst>
+            <a:outerShdw blurRad="57150" dist="19050" dir="5400000" algn="ctr" rotWithShape="0">
+              <a:srgbClr val="000000">
+                <a:alpha val="63000"/>
+              </a:srgbClr>
+            </a:outerShdw>
+          </a:effectLst>
+        </a:effectStyle>
+      </a:effectStyleLst>
+      <a:bgFillStyleLst>
+        <a:solidFill>
+          <a:schemeClr val="phClr"/>
+        </a:solidFill>
+        <a:solidFill>
+          <a:schemeClr val="phClr">
+            <a:tint val="95000"/>
+            <a:satMod val="170000"/>
+          </a:schemeClr>
+        </a:solidFill>
+        <a:gradFill rotWithShape="1">
+          <a:gsLst>
+            <a:gs pos="0">
+              <a:schemeClr val="phClr">
+                <a:tint val="93000"/>
+                <a:satMod val="150000"/>
+                <a:shade val="98000"/>
+                <a:lumMod val="102000"/>
+              </a:schemeClr>
+            </a:gs>
+            <a:gs pos="50000">
+              <a:schemeClr val="phClr">
+                <a:tint val="98000"/>
+                <a:satMod val="130000"/>
+                <a:shade val="90000"/>
+                <a:lumMod val="103000"/>
+              </a:schemeClr>
+            </a:gs>
+            <a:gs pos="100000">
+              <a:schemeClr val="phClr">
+                <a:shade val="63000"/>
+                <a:satMod val="120000"/>
+              </a:schemeClr>
+            </a:gs>
+          </a:gsLst>
+          <a:lin ang="5400000" scaled="0"/>
+        </a:gradFill>
+      </a:bgFillStyleLst>
+    </a:fmtScheme>
+  </a:themeElements>
+  <a:objectDefaults/>
+  <a:extraClrSchemeLst/>
+  <a:extLst>
+    <a:ext uri="{05A4C25C-085E-4340-85A3-A5531E510DB2}">
+      <thm15:themeFamily xmlns:thm15="http://schemas.microsoft.com/office/thememl/2012/main" name="Office Theme" id="{62F939B6-93AF-4DB8-9C6B-D6C7DFDC589F}" vid="{4A3C46E8-61CC-4603-A589-7422A47A8E4A}"/>
+    </a:ext>
+  </a:extLst>
+</a:theme>
 </file>
</xml_diff>

<commit_message>
[Module 4] Update the slides of TD1a
</commit_message>
<xml_diff>
--- a/module4/td1/td1-spark-rdd.pptx
+++ b/module4/td1/td1-spark-rdd.pptx
@@ -127,6 +127,14 @@
 </p:presentation>
 </file>
 
+<file path=ppt/revisionInfo.xml><?xml version="1.0" encoding="utf-8"?>
+<p1510:revInfo xmlns:a="http://schemas.openxmlformats.org/drawingml/2006/main" xmlns:r="http://schemas.openxmlformats.org/officeDocument/2006/relationships" xmlns:p1510="http://schemas.microsoft.com/office/powerpoint/2015/10/main">
+  <p1510:revLst>
+    <p1510:client id="{1537914A-0B49-494C-7AAE-13EE3912A367}" v="559" dt="2022-12-09T08:40:36.219"/>
+  </p1510:revLst>
+</p1510:revInfo>
+</file>
+
 <file path=ppt/notesMasters/notesMaster1.xml><?xml version="1.0" encoding="utf-8"?>
 <p:notesMaster xmlns:a="http://schemas.openxmlformats.org/drawingml/2006/main" xmlns:r="http://schemas.openxmlformats.org/officeDocument/2006/relationships" xmlns:p="http://schemas.openxmlformats.org/presentationml/2006/main">
   <p:cSld>
@@ -209,7 +217,7 @@
           <a:p>
             <a:fld id="{029E00FF-157E-4E67-8269-A10CC622D7A6}" type="datetimeFigureOut">
               <a:rPr lang="fr-FR" smtClean="0"/>
-              <a:t>14/01/2022</a:t>
+              <a:t>14/12/2022</a:t>
             </a:fld>
             <a:endParaRPr lang="fr-FR"/>
           </a:p>
@@ -367,7 +375,7 @@
           <a:p>
             <a:fld id="{32DDDBA6-C58A-4FE7-89EE-251EB0240D98}" type="slidenum">
               <a:rPr lang="fr-FR" smtClean="0"/>
-              <a:t>‹N°›</a:t>
+              <a:t>‹#›</a:t>
             </a:fld>
             <a:endParaRPr lang="fr-FR"/>
           </a:p>
@@ -1211,7 +1219,7 @@
           <a:p>
             <a:fld id="{97D5A493-CCC9-418E-861C-802A9D3B9980}" type="datetimeFigureOut">
               <a:rPr lang="en-US" smtClean="0"/>
-              <a:t>1/14/2022</a:t>
+              <a:t>12/14/2022</a:t>
             </a:fld>
             <a:endParaRPr lang="en-US"/>
           </a:p>
@@ -1265,7 +1273,7 @@
           <a:p>
             <a:fld id="{EAF0293D-07D2-48DC-BE8F-8E4761C07219}" type="slidenum">
               <a:rPr lang="en-US" smtClean="0"/>
-              <a:t>‹N°›</a:t>
+              <a:t>‹#›</a:t>
             </a:fld>
             <a:endParaRPr lang="en-US"/>
           </a:p>
@@ -1409,7 +1417,7 @@
           <a:p>
             <a:fld id="{97D5A493-CCC9-418E-861C-802A9D3B9980}" type="datetimeFigureOut">
               <a:rPr lang="en-US" smtClean="0"/>
-              <a:t>1/14/2022</a:t>
+              <a:t>12/14/2022</a:t>
             </a:fld>
             <a:endParaRPr lang="en-US"/>
           </a:p>
@@ -1463,7 +1471,7 @@
           <a:p>
             <a:fld id="{EAF0293D-07D2-48DC-BE8F-8E4761C07219}" type="slidenum">
               <a:rPr lang="en-US" smtClean="0"/>
-              <a:t>‹N°›</a:t>
+              <a:t>‹#›</a:t>
             </a:fld>
             <a:endParaRPr lang="en-US"/>
           </a:p>
@@ -1617,7 +1625,7 @@
           <a:p>
             <a:fld id="{97D5A493-CCC9-418E-861C-802A9D3B9980}" type="datetimeFigureOut">
               <a:rPr lang="en-US" smtClean="0"/>
-              <a:t>1/14/2022</a:t>
+              <a:t>12/14/2022</a:t>
             </a:fld>
             <a:endParaRPr lang="en-US"/>
           </a:p>
@@ -1671,7 +1679,7 @@
           <a:p>
             <a:fld id="{EAF0293D-07D2-48DC-BE8F-8E4761C07219}" type="slidenum">
               <a:rPr lang="en-US" smtClean="0"/>
-              <a:t>‹N°›</a:t>
+              <a:t>‹#›</a:t>
             </a:fld>
             <a:endParaRPr lang="en-US"/>
           </a:p>
@@ -1815,7 +1823,7 @@
           <a:p>
             <a:fld id="{97D5A493-CCC9-418E-861C-802A9D3B9980}" type="datetimeFigureOut">
               <a:rPr lang="en-US" smtClean="0"/>
-              <a:t>1/14/2022</a:t>
+              <a:t>12/14/2022</a:t>
             </a:fld>
             <a:endParaRPr lang="en-US"/>
           </a:p>
@@ -1869,7 +1877,7 @@
           <a:p>
             <a:fld id="{EAF0293D-07D2-48DC-BE8F-8E4761C07219}" type="slidenum">
               <a:rPr lang="en-US" smtClean="0"/>
-              <a:t>‹N°›</a:t>
+              <a:t>‹#›</a:t>
             </a:fld>
             <a:endParaRPr lang="en-US"/>
           </a:p>
@@ -2090,7 +2098,7 @@
           <a:p>
             <a:fld id="{97D5A493-CCC9-418E-861C-802A9D3B9980}" type="datetimeFigureOut">
               <a:rPr lang="en-US" smtClean="0"/>
-              <a:t>1/14/2022</a:t>
+              <a:t>12/14/2022</a:t>
             </a:fld>
             <a:endParaRPr lang="en-US"/>
           </a:p>
@@ -2144,7 +2152,7 @@
           <a:p>
             <a:fld id="{EAF0293D-07D2-48DC-BE8F-8E4761C07219}" type="slidenum">
               <a:rPr lang="en-US" smtClean="0"/>
-              <a:t>‹N°›</a:t>
+              <a:t>‹#›</a:t>
             </a:fld>
             <a:endParaRPr lang="en-US"/>
           </a:p>
@@ -2355,7 +2363,7 @@
           <a:p>
             <a:fld id="{97D5A493-CCC9-418E-861C-802A9D3B9980}" type="datetimeFigureOut">
               <a:rPr lang="en-US" smtClean="0"/>
-              <a:t>1/14/2022</a:t>
+              <a:t>12/14/2022</a:t>
             </a:fld>
             <a:endParaRPr lang="en-US"/>
           </a:p>
@@ -2409,7 +2417,7 @@
           <a:p>
             <a:fld id="{EAF0293D-07D2-48DC-BE8F-8E4761C07219}" type="slidenum">
               <a:rPr lang="en-US" smtClean="0"/>
-              <a:t>‹N°›</a:t>
+              <a:t>‹#›</a:t>
             </a:fld>
             <a:endParaRPr lang="en-US"/>
           </a:p>
@@ -2767,7 +2775,7 @@
           <a:p>
             <a:fld id="{97D5A493-CCC9-418E-861C-802A9D3B9980}" type="datetimeFigureOut">
               <a:rPr lang="en-US" smtClean="0"/>
-              <a:t>1/14/2022</a:t>
+              <a:t>12/14/2022</a:t>
             </a:fld>
             <a:endParaRPr lang="en-US"/>
           </a:p>
@@ -2821,7 +2829,7 @@
           <a:p>
             <a:fld id="{EAF0293D-07D2-48DC-BE8F-8E4761C07219}" type="slidenum">
               <a:rPr lang="en-US" smtClean="0"/>
-              <a:t>‹N°›</a:t>
+              <a:t>‹#›</a:t>
             </a:fld>
             <a:endParaRPr lang="en-US"/>
           </a:p>
@@ -2908,7 +2916,7 @@
           <a:p>
             <a:fld id="{97D5A493-CCC9-418E-861C-802A9D3B9980}" type="datetimeFigureOut">
               <a:rPr lang="en-US" smtClean="0"/>
-              <a:t>1/14/2022</a:t>
+              <a:t>12/14/2022</a:t>
             </a:fld>
             <a:endParaRPr lang="en-US"/>
           </a:p>
@@ -2962,7 +2970,7 @@
           <a:p>
             <a:fld id="{EAF0293D-07D2-48DC-BE8F-8E4761C07219}" type="slidenum">
               <a:rPr lang="en-US" smtClean="0"/>
-              <a:t>‹N°›</a:t>
+              <a:t>‹#›</a:t>
             </a:fld>
             <a:endParaRPr lang="en-US"/>
           </a:p>
@@ -3021,7 +3029,7 @@
           <a:p>
             <a:fld id="{97D5A493-CCC9-418E-861C-802A9D3B9980}" type="datetimeFigureOut">
               <a:rPr lang="en-US" smtClean="0"/>
-              <a:t>1/14/2022</a:t>
+              <a:t>12/14/2022</a:t>
             </a:fld>
             <a:endParaRPr lang="en-US"/>
           </a:p>
@@ -3075,7 +3083,7 @@
           <a:p>
             <a:fld id="{EAF0293D-07D2-48DC-BE8F-8E4761C07219}" type="slidenum">
               <a:rPr lang="en-US" smtClean="0"/>
-              <a:t>‹N°›</a:t>
+              <a:t>‹#›</a:t>
             </a:fld>
             <a:endParaRPr lang="en-US"/>
           </a:p>
@@ -3332,7 +3340,7 @@
           <a:p>
             <a:fld id="{97D5A493-CCC9-418E-861C-802A9D3B9980}" type="datetimeFigureOut">
               <a:rPr lang="en-US" smtClean="0"/>
-              <a:t>1/14/2022</a:t>
+              <a:t>12/14/2022</a:t>
             </a:fld>
             <a:endParaRPr lang="en-US"/>
           </a:p>
@@ -3386,7 +3394,7 @@
           <a:p>
             <a:fld id="{EAF0293D-07D2-48DC-BE8F-8E4761C07219}" type="slidenum">
               <a:rPr lang="en-US" smtClean="0"/>
-              <a:t>‹N°›</a:t>
+              <a:t>‹#›</a:t>
             </a:fld>
             <a:endParaRPr lang="en-US"/>
           </a:p>
@@ -3620,7 +3628,7 @@
           <a:p>
             <a:fld id="{97D5A493-CCC9-418E-861C-802A9D3B9980}" type="datetimeFigureOut">
               <a:rPr lang="en-US" smtClean="0"/>
-              <a:t>1/14/2022</a:t>
+              <a:t>12/14/2022</a:t>
             </a:fld>
             <a:endParaRPr lang="en-US"/>
           </a:p>
@@ -3674,7 +3682,7 @@
           <a:p>
             <a:fld id="{EAF0293D-07D2-48DC-BE8F-8E4761C07219}" type="slidenum">
               <a:rPr lang="en-US" smtClean="0"/>
-              <a:t>‹N°›</a:t>
+              <a:t>‹#›</a:t>
             </a:fld>
             <a:endParaRPr lang="en-US"/>
           </a:p>
@@ -3861,7 +3869,7 @@
           <a:p>
             <a:fld id="{97D5A493-CCC9-418E-861C-802A9D3B9980}" type="datetimeFigureOut">
               <a:rPr lang="en-US" smtClean="0"/>
-              <a:t>1/14/2022</a:t>
+              <a:t>12/14/2022</a:t>
             </a:fld>
             <a:endParaRPr lang="en-US"/>
           </a:p>
@@ -3951,7 +3959,7 @@
           <a:p>
             <a:fld id="{EAF0293D-07D2-48DC-BE8F-8E4761C07219}" type="slidenum">
               <a:rPr lang="en-US" smtClean="0"/>
-              <a:t>‹N°›</a:t>
+              <a:t>‹#›</a:t>
             </a:fld>
             <a:endParaRPr lang="en-US"/>
           </a:p>
@@ -4385,10 +4393,12 @@
           <a:lstStyle/>
           <a:p>
             <a:r>
-              <a:rPr lang="fr-FR" dirty="0"/>
-              <a:t>RDD API</a:t>
-            </a:r>
-            <a:endParaRPr lang="en-US" dirty="0"/>
+              <a:rPr lang="fr-FR" dirty="0">
+                <a:ea typeface="+mj-lt"/>
+                <a:cs typeface="+mj-lt"/>
+              </a:rPr>
+              <a:t>RDD API - Transformations</a:t>
+            </a:r>
           </a:p>
         </p:txBody>
       </p:sp>
@@ -4430,25 +4440,44 @@
           </a:fontRef>
         </p:style>
         <p:txBody>
-          <a:bodyPr rtlCol="0" anchor="ctr"/>
+          <a:bodyPr lIns="91440" tIns="45720" rIns="91440" bIns="45720" rtlCol="0" anchor="ctr"/>
           <a:lstStyle/>
           <a:p>
             <a:pPr algn="ctr"/>
             <a:r>
-              <a:rPr lang="fr-FR" dirty="0" err="1"/>
+              <a:rPr lang="fr-FR" b="1" dirty="0" err="1"/>
               <a:t>flatmap</a:t>
             </a:r>
             <a:r>
-              <a:rPr lang="fr-FR" dirty="0"/>
-              <a:t>(x </a:t>
-            </a:r>
-            <a:r>
-              <a:rPr lang="fr-FR" dirty="0">
+              <a:rPr lang="fr-FR" b="1" dirty="0"/>
+              <a:t>(</a:t>
+            </a:r>
+            <a:r>
+              <a:rPr lang="fr-FR" b="1" dirty="0">
+                <a:ea typeface="+mn-lt"/>
+                <a:cs typeface="+mn-lt"/>
+              </a:rPr>
+              <a:t>lambda x:</a:t>
+            </a:r>
+            <a:r>
+              <a:rPr lang="fr-FR" b="1" dirty="0"/>
+              <a:t> </a:t>
+            </a:r>
+            <a:endParaRPr lang="en-US" b="1" dirty="0">
+              <a:cs typeface="Calibri"/>
+            </a:endParaRPr>
+          </a:p>
+          <a:p>
+            <a:pPr algn="ctr"/>
+            <a:r>
+              <a:rPr lang="fr-FR" b="1" dirty="0">
                 <a:sym typeface="Wingdings" panose="05000000000000000000" pitchFamily="2" charset="2"/>
               </a:rPr>
-              <a:t> x[‘genres’].split(‘;’))</a:t>
-            </a:r>
-            <a:endParaRPr lang="en-US" dirty="0"/>
+              <a:t>x[‘genres’].split(';'))</a:t>
+            </a:r>
+            <a:endParaRPr lang="en-US" b="1" dirty="0">
+              <a:cs typeface="Calibri" panose="020F0502020204030204"/>
+            </a:endParaRPr>
           </a:p>
         </p:txBody>
       </p:sp>
@@ -4549,7 +4578,7 @@
           <p:nvPr>
             <p:extLst>
               <p:ext uri="{D42A27DB-BD31-4B8C-83A1-F6EECF244321}">
-                <p14:modId xmlns:p14="http://schemas.microsoft.com/office/powerpoint/2010/main" val="3247897374"/>
+                <p14:modId xmlns:p14="http://schemas.microsoft.com/office/powerpoint/2010/main" val="103659150"/>
               </p:ext>
             </p:extLst>
           </p:nvPr>
@@ -4579,11 +4608,16 @@
                     <a:bodyPr/>
                     <a:lstStyle/>
                     <a:p>
-                      <a:r>
-                        <a:rPr lang="fr-FR" sz="1600" dirty="0"/>
-                        <a:t>Row</a:t>
-                      </a:r>
-                      <a:endParaRPr lang="en-US" sz="1600" dirty="0"/>
+                      <a:pPr lvl="0">
+                        <a:buNone/>
+                      </a:pPr>
+                      <a:r>
+                        <a:rPr lang="fr-FR" sz="1600" b="1" i="0" u="none" strike="noStrike" noProof="0" dirty="0">
+                          <a:latin typeface="Calibri"/>
+                        </a:rPr>
+                        <a:t>RDD</a:t>
+                      </a:r>
+                      <a:endParaRPr lang="en-US" dirty="0"/>
                     </a:p>
                   </a:txBody>
                   <a:tcPr/>
@@ -4602,7 +4636,7 @@
                     <a:p>
                       <a:r>
                         <a:rPr lang="fr-FR" sz="1600" dirty="0"/>
-                        <a:t>cyberpunk</a:t>
+                        <a:t>"cyberpunk"</a:t>
                       </a:r>
                       <a:endParaRPr lang="en-US" sz="1600" dirty="0"/>
                     </a:p>
@@ -4621,9 +4655,24 @@
                     <a:bodyPr/>
                     <a:lstStyle/>
                     <a:p>
+                      <a:pPr lvl="0">
+                        <a:buNone/>
+                      </a:pPr>
+                      <a:r>
+                        <a:rPr lang="fr-FR" sz="1600" b="0" i="0" u="none" strike="noStrike" noProof="0" dirty="0">
+                          <a:latin typeface="Calibri"/>
+                        </a:rPr>
+                        <a:t>"</a:t>
+                      </a:r>
                       <a:r>
                         <a:rPr lang="fr-FR" sz="1600" dirty="0" err="1"/>
                         <a:t>scifi</a:t>
+                      </a:r>
+                      <a:r>
+                        <a:rPr lang="fr-FR" sz="1600" b="0" i="0" u="none" strike="noStrike" noProof="0" dirty="0">
+                          <a:latin typeface="Calibri"/>
+                        </a:rPr>
+                        <a:t>"</a:t>
                       </a:r>
                       <a:endParaRPr lang="en-US" sz="1600" dirty="0"/>
                     </a:p>
@@ -4642,7 +4691,7 @@
                     <a:bodyPr/>
                     <a:lstStyle/>
                     <a:p>
-                      <a:pPr marL="0" marR="0" lvl="0" indent="0" algn="l" defTabSz="914400" rtl="0" eaLnBrk="1" fontAlgn="auto" latinLnBrk="0" hangingPunct="1">
+                      <a:pPr marL="0" marR="0" lvl="0" indent="0" algn="l" defTabSz="914400">
                         <a:lnSpc>
                           <a:spcPct val="100000"/>
                         </a:lnSpc>
@@ -4652,16 +4701,25 @@
                         <a:spcAft>
                           <a:spcPts val="0"/>
                         </a:spcAft>
-                        <a:buClrTx/>
-                        <a:buSzTx/>
-                        <a:buFontTx/>
                         <a:buNone/>
                         <a:tabLst/>
                         <a:defRPr/>
                       </a:pPr>
                       <a:r>
+                        <a:rPr lang="fr-FR" sz="1600" b="0" i="0" u="none" strike="noStrike" noProof="0" dirty="0">
+                          <a:latin typeface="Calibri"/>
+                        </a:rPr>
+                        <a:t>"</a:t>
+                      </a:r>
+                      <a:r>
                         <a:rPr lang="fr-FR" sz="1600" dirty="0"/>
                         <a:t>action</a:t>
+                      </a:r>
+                      <a:r>
+                        <a:rPr lang="fr-FR" sz="1600" b="0" i="0" u="none" strike="noStrike" noProof="0" dirty="0">
+                          <a:latin typeface="Calibri"/>
+                        </a:rPr>
+                        <a:t>"</a:t>
                       </a:r>
                       <a:endParaRPr lang="en-US" sz="1600" dirty="0"/>
                     </a:p>
@@ -4701,6 +4759,12 @@
                         <a:rPr lang="fr-FR" sz="1600" dirty="0"/>
                         <a:t>music</a:t>
                       </a:r>
+                      <a:r>
+                        <a:rPr lang="fr-FR" sz="1600" b="0" i="0" u="none" strike="noStrike" noProof="0" dirty="0">
+                          <a:latin typeface="Calibri"/>
+                        </a:rPr>
+                        <a:t>"</a:t>
+                      </a:r>
                       <a:endParaRPr lang="en-US" sz="1600" dirty="0"/>
                     </a:p>
                   </a:txBody>
@@ -4718,7 +4782,7 @@
                     <a:bodyPr/>
                     <a:lstStyle/>
                     <a:p>
-                      <a:pPr marL="0" marR="0" lvl="0" indent="0" algn="l" defTabSz="914400" rtl="0" eaLnBrk="1" fontAlgn="auto" latinLnBrk="0" hangingPunct="1">
+                      <a:pPr marL="0" marR="0" lvl="0" indent="0" algn="l" defTabSz="914400">
                         <a:lnSpc>
                           <a:spcPct val="100000"/>
                         </a:lnSpc>
@@ -4728,16 +4792,25 @@
                         <a:spcAft>
                           <a:spcPts val="0"/>
                         </a:spcAft>
-                        <a:buClrTx/>
-                        <a:buSzTx/>
-                        <a:buFontTx/>
                         <a:buNone/>
                         <a:tabLst/>
                         <a:defRPr/>
                       </a:pPr>
                       <a:r>
+                        <a:rPr lang="fr-FR" sz="1600" b="0" i="0" u="none" strike="noStrike" noProof="0" dirty="0">
+                          <a:latin typeface="Calibri"/>
+                        </a:rPr>
+                        <a:t>"</a:t>
+                      </a:r>
+                      <a:r>
                         <a:rPr lang="fr-FR" sz="1600" dirty="0"/>
                         <a:t>danse</a:t>
+                      </a:r>
+                      <a:r>
+                        <a:rPr lang="fr-FR" sz="1600" b="0" i="0" u="none" strike="noStrike" noProof="0" dirty="0">
+                          <a:latin typeface="Calibri"/>
+                        </a:rPr>
+                        <a:t>"</a:t>
                       </a:r>
                       <a:endParaRPr lang="en-US" sz="1600" dirty="0"/>
                     </a:p>
@@ -4756,7 +4829,7 @@
                     <a:bodyPr/>
                     <a:lstStyle/>
                     <a:p>
-                      <a:pPr marL="0" marR="0" lvl="0" indent="0" algn="l" defTabSz="914400" rtl="0" eaLnBrk="1" fontAlgn="auto" latinLnBrk="0" hangingPunct="1">
+                      <a:pPr marL="0" marR="0" lvl="0" indent="0" algn="l" defTabSz="914400">
                         <a:lnSpc>
                           <a:spcPct val="100000"/>
                         </a:lnSpc>
@@ -4766,16 +4839,25 @@
                         <a:spcAft>
                           <a:spcPts val="0"/>
                         </a:spcAft>
-                        <a:buClrTx/>
-                        <a:buSzTx/>
-                        <a:buFontTx/>
                         <a:buNone/>
                         <a:tabLst/>
                         <a:defRPr/>
                       </a:pPr>
                       <a:r>
+                        <a:rPr lang="fr-FR" sz="1600" b="0" i="0" u="none" strike="noStrike" noProof="0" dirty="0">
+                          <a:latin typeface="Calibri"/>
+                        </a:rPr>
+                        <a:t>"</a:t>
+                      </a:r>
+                      <a:r>
                         <a:rPr lang="fr-FR" sz="1600" dirty="0"/>
                         <a:t>romance</a:t>
+                      </a:r>
+                      <a:r>
+                        <a:rPr lang="fr-FR" sz="1600" b="0" i="0" u="none" strike="noStrike" noProof="0" dirty="0">
+                          <a:latin typeface="Calibri"/>
+                        </a:rPr>
+                        <a:t>"</a:t>
                       </a:r>
                       <a:endParaRPr lang="en-US" sz="1600" dirty="0"/>
                     </a:p>
@@ -4807,7 +4889,7 @@
           <p:nvPr>
             <p:extLst>
               <p:ext uri="{D42A27DB-BD31-4B8C-83A1-F6EECF244321}">
-                <p14:modId xmlns:p14="http://schemas.microsoft.com/office/powerpoint/2010/main" val="3626838375"/>
+                <p14:modId xmlns:p14="http://schemas.microsoft.com/office/powerpoint/2010/main" val="1877307008"/>
               </p:ext>
             </p:extLst>
           </p:nvPr>
@@ -4837,11 +4919,16 @@
                     <a:bodyPr/>
                     <a:lstStyle/>
                     <a:p>
-                      <a:r>
-                        <a:rPr lang="fr-FR" sz="1600" dirty="0"/>
-                        <a:t>Row</a:t>
-                      </a:r>
-                      <a:endParaRPr lang="en-US" sz="1600" dirty="0"/>
+                      <a:pPr lvl="0">
+                        <a:buNone/>
+                      </a:pPr>
+                      <a:r>
+                        <a:rPr lang="fr-FR" sz="1600" b="1" i="0" u="none" strike="noStrike" noProof="0" dirty="0">
+                          <a:latin typeface="Calibri"/>
+                        </a:rPr>
+                        <a:t>RDD</a:t>
+                      </a:r>
+                      <a:endParaRPr lang="en-US" dirty="0"/>
                     </a:p>
                   </a:txBody>
                   <a:tcPr/>
@@ -4868,15 +4955,37 @@
                       </a:r>
                       <a:r>
                         <a:rPr lang="en-US" sz="1600" dirty="0"/>
-                        <a:t> Runner", “genres":”</a:t>
+                        <a:t> Runner", </a:t>
+                      </a:r>
+                      <a:r>
+                        <a:rPr lang="en-US" sz="1600" b="0" i="0" u="none" strike="noStrike" noProof="0" dirty="0">
+                          <a:latin typeface="Calibri"/>
+                        </a:rPr>
+                        <a:t>"</a:t>
+                      </a:r>
+                      <a:r>
+                        <a:rPr lang="en-US" sz="1600" dirty="0"/>
+                        <a:t>genres":</a:t>
+                      </a:r>
+                      <a:r>
+                        <a:rPr lang="en-US" sz="1600" b="0" i="0" u="none" strike="noStrike" noProof="0" dirty="0">
+                          <a:latin typeface="Calibri"/>
+                        </a:rPr>
+                        <a:t>"</a:t>
                       </a:r>
                       <a:r>
                         <a:rPr lang="en-US" sz="1600" dirty="0" err="1"/>
                         <a:t>cyberpunk;scifi;action</a:t>
                       </a:r>
                       <a:r>
+                        <a:rPr lang="en-US" sz="1600" b="0" i="0" u="none" strike="noStrike" noProof="0" dirty="0">
+                          <a:latin typeface="Calibri"/>
+                        </a:rPr>
+                        <a:t>"</a:t>
+                      </a:r>
+                      <a:r>
                         <a:rPr lang="en-US" sz="1600" dirty="0"/>
-                        <a:t>”}</a:t>
+                        <a:t>}</a:t>
                       </a:r>
                     </a:p>
                   </a:txBody>
@@ -4904,15 +5013,37 @@
                       </a:r>
                       <a:r>
                         <a:rPr lang="en-US" sz="1600" dirty="0"/>
-                        <a:t> dancing", “genres":”</a:t>
+                        <a:t> dancing", </a:t>
+                      </a:r>
+                      <a:r>
+                        <a:rPr lang="en-US" sz="1600" b="0" i="0" u="none" strike="noStrike" noProof="0" dirty="0">
+                          <a:latin typeface="Calibri"/>
+                        </a:rPr>
+                        <a:t>"</a:t>
+                      </a:r>
+                      <a:r>
+                        <a:rPr lang="en-US" sz="1600" dirty="0"/>
+                        <a:t>genres":</a:t>
+                      </a:r>
+                      <a:r>
+                        <a:rPr lang="en-US" sz="1600" b="0" i="0" u="none" strike="noStrike" noProof="0" dirty="0">
+                          <a:latin typeface="Calibri"/>
+                        </a:rPr>
+                        <a:t>"</a:t>
                       </a:r>
                       <a:r>
                         <a:rPr lang="en-US" sz="1600" dirty="0" err="1"/>
                         <a:t>music;danse;romance</a:t>
                       </a:r>
                       <a:r>
+                        <a:rPr lang="en-US" sz="1600" b="0" i="0" u="none" strike="noStrike" noProof="0" dirty="0">
+                          <a:latin typeface="Calibri"/>
+                        </a:rPr>
+                        <a:t>"</a:t>
+                      </a:r>
+                      <a:r>
                         <a:rPr lang="en-US" sz="1600" dirty="0"/>
-                        <a:t>”}</a:t>
+                        <a:t>}</a:t>
                       </a:r>
                     </a:p>
                   </a:txBody>
@@ -4966,25 +5097,47 @@
           </a:fontRef>
         </p:style>
         <p:txBody>
-          <a:bodyPr rtlCol="0" anchor="ctr"/>
+          <a:bodyPr lIns="91440" tIns="45720" rIns="91440" bIns="45720" rtlCol="0" anchor="ctr"/>
           <a:lstStyle/>
           <a:p>
             <a:pPr algn="ctr"/>
             <a:r>
-              <a:rPr lang="fr-FR" dirty="0" err="1"/>
+              <a:rPr lang="fr-FR" b="1" dirty="0" err="1"/>
               <a:t>filter</a:t>
             </a:r>
             <a:r>
-              <a:rPr lang="fr-FR" dirty="0"/>
-              <a:t>(x </a:t>
-            </a:r>
-            <a:r>
-              <a:rPr lang="fr-FR" dirty="0">
+              <a:rPr lang="fr-FR" b="1" dirty="0"/>
+              <a:t>(</a:t>
+            </a:r>
+            <a:r>
+              <a:rPr lang="fr-FR" b="1" dirty="0">
+                <a:ea typeface="+mn-lt"/>
+                <a:cs typeface="+mn-lt"/>
                 <a:sym typeface="Wingdings" panose="05000000000000000000" pitchFamily="2" charset="2"/>
               </a:rPr>
-              <a:t> x[‘rating’]&gt;4.0)</a:t>
-            </a:r>
-            <a:endParaRPr lang="en-US" dirty="0"/>
+              <a:t>lambda x:</a:t>
+            </a:r>
+            <a:r>
+              <a:rPr lang="fr-FR" b="1" dirty="0">
+                <a:sym typeface="Wingdings" panose="05000000000000000000" pitchFamily="2" charset="2"/>
+              </a:rPr>
+              <a:t> </a:t>
+            </a:r>
+            <a:endParaRPr lang="en-US" b="1" dirty="0">
+              <a:cs typeface="Calibri"/>
+            </a:endParaRPr>
+          </a:p>
+          <a:p>
+            <a:pPr algn="ctr"/>
+            <a:r>
+              <a:rPr lang="fr-FR" b="1" dirty="0">
+                <a:sym typeface="Wingdings" panose="05000000000000000000" pitchFamily="2" charset="2"/>
+              </a:rPr>
+              <a:t>x['rating']&gt;4.0)</a:t>
+            </a:r>
+            <a:endParaRPr lang="en-US" b="1" dirty="0">
+              <a:cs typeface="Calibri"/>
+            </a:endParaRPr>
           </a:p>
         </p:txBody>
       </p:sp>
@@ -5085,7 +5238,7 @@
           <p:nvPr>
             <p:extLst>
               <p:ext uri="{D42A27DB-BD31-4B8C-83A1-F6EECF244321}">
-                <p14:modId xmlns:p14="http://schemas.microsoft.com/office/powerpoint/2010/main" val="54888848"/>
+                <p14:modId xmlns:p14="http://schemas.microsoft.com/office/powerpoint/2010/main" val="4059399256"/>
               </p:ext>
             </p:extLst>
           </p:nvPr>
@@ -5115,11 +5268,16 @@
                     <a:bodyPr/>
                     <a:lstStyle/>
                     <a:p>
-                      <a:r>
-                        <a:rPr lang="fr-FR" sz="1600" dirty="0"/>
-                        <a:t>Row</a:t>
-                      </a:r>
-                      <a:endParaRPr lang="en-US" sz="1600" dirty="0"/>
+                      <a:pPr lvl="0">
+                        <a:buNone/>
+                      </a:pPr>
+                      <a:r>
+                        <a:rPr lang="fr-FR" sz="1600" b="1" i="0" u="none" strike="noStrike" noProof="0" dirty="0">
+                          <a:latin typeface="Calibri"/>
+                        </a:rPr>
+                        <a:t>RDD</a:t>
+                      </a:r>
+                      <a:endParaRPr lang="en-US" dirty="0"/>
                     </a:p>
                   </a:txBody>
                   <a:tcPr/>
@@ -5221,7 +5379,7 @@
           <p:nvPr>
             <p:extLst>
               <p:ext uri="{D42A27DB-BD31-4B8C-83A1-F6EECF244321}">
-                <p14:modId xmlns:p14="http://schemas.microsoft.com/office/powerpoint/2010/main" val="3214289153"/>
+                <p14:modId xmlns:p14="http://schemas.microsoft.com/office/powerpoint/2010/main" val="1196572337"/>
               </p:ext>
             </p:extLst>
           </p:nvPr>
@@ -5251,11 +5409,16 @@
                     <a:bodyPr/>
                     <a:lstStyle/>
                     <a:p>
-                      <a:r>
-                        <a:rPr lang="fr-FR" sz="1600" dirty="0"/>
-                        <a:t>Row</a:t>
-                      </a:r>
-                      <a:endParaRPr lang="en-US" sz="1600" dirty="0"/>
+                      <a:pPr lvl="0">
+                        <a:buNone/>
+                      </a:pPr>
+                      <a:r>
+                        <a:rPr lang="fr-FR" sz="1600" b="1" i="0" u="none" strike="noStrike" noProof="0" dirty="0">
+                          <a:latin typeface="Calibri"/>
+                        </a:rPr>
+                        <a:t>RDD</a:t>
+                      </a:r>
+                      <a:endParaRPr lang="en-US" dirty="0"/>
                     </a:p>
                   </a:txBody>
                   <a:tcPr/>
@@ -5448,13 +5611,18 @@
           <a:p>
             <a:r>
               <a:rPr lang="fr-FR" dirty="0"/>
-              <a:t>RDD API - </a:t>
-            </a:r>
-            <a:r>
-              <a:rPr lang="fr-FR" dirty="0" err="1"/>
-              <a:t>Aggregations</a:t>
-            </a:r>
-            <a:endParaRPr lang="en-US" dirty="0"/>
+              <a:t>RDD API – </a:t>
+            </a:r>
+            <a:r>
+              <a:rPr lang="fr-FR" dirty="0">
+                <a:ea typeface="+mj-lt"/>
+                <a:cs typeface="+mj-lt"/>
+              </a:rPr>
+              <a:t>Actions</a:t>
+            </a:r>
+            <a:endParaRPr lang="fr-FR" dirty="0">
+              <a:cs typeface="Calibri Light"/>
+            </a:endParaRPr>
           </a:p>
         </p:txBody>
       </p:sp>
@@ -5496,45 +5664,53 @@
           </a:fontRef>
         </p:style>
         <p:txBody>
-          <a:bodyPr rtlCol="0" anchor="ctr"/>
+          <a:bodyPr lIns="91440" tIns="45720" rIns="91440" bIns="45720" rtlCol="0" anchor="ctr"/>
           <a:lstStyle/>
           <a:p>
             <a:pPr algn="ctr"/>
-            <a:r>
-              <a:rPr lang="fr-FR" dirty="0" err="1"/>
-              <a:t>Reduce</a:t>
-            </a:r>
-            <a:r>
-              <a:rPr lang="fr-FR" dirty="0"/>
-              <a:t>(</a:t>
-            </a:r>
-            <a:r>
-              <a:rPr lang="fr-FR" dirty="0" err="1"/>
-              <a:t>x,y</a:t>
-            </a:r>
-            <a:r>
-              <a:rPr lang="fr-FR" dirty="0"/>
-              <a:t> </a:t>
-            </a:r>
-            <a:r>
-              <a:rPr lang="fr-FR" dirty="0">
-                <a:sym typeface="Wingdings" panose="05000000000000000000" pitchFamily="2" charset="2"/>
+            <a:br>
+              <a:rPr lang="fr-FR" b="1" dirty="0">
+                <a:ea typeface="+mn-lt"/>
+                <a:cs typeface="+mn-lt"/>
               </a:rPr>
-              <a:t> </a:t>
-            </a:r>
-            <a:r>
-              <a:rPr lang="fr-FR" dirty="0" err="1">
-                <a:sym typeface="Wingdings" panose="05000000000000000000" pitchFamily="2" charset="2"/>
+            </a:br>
+            <a:r>
+              <a:rPr lang="fr-FR" b="1" dirty="0" err="1">
+                <a:ea typeface="+mn-lt"/>
+                <a:cs typeface="+mn-lt"/>
+              </a:rPr>
+              <a:t>reduce</a:t>
+            </a:r>
+            <a:r>
+              <a:rPr lang="fr-FR" b="1" dirty="0">
+                <a:ea typeface="+mn-lt"/>
+                <a:cs typeface="+mn-lt"/>
+              </a:rPr>
+              <a:t>(lambda x, y: </a:t>
+            </a:r>
+            <a:r>
+              <a:rPr lang="fr-FR" b="1" dirty="0" err="1">
+                <a:ea typeface="+mn-lt"/>
+                <a:cs typeface="+mn-lt"/>
               </a:rPr>
               <a:t>x+y</a:t>
             </a:r>
             <a:r>
-              <a:rPr lang="fr-FR" dirty="0">
-                <a:sym typeface="Wingdings" panose="05000000000000000000" pitchFamily="2" charset="2"/>
+              <a:rPr lang="fr-FR" b="1" dirty="0">
+                <a:ea typeface="+mn-lt"/>
+                <a:cs typeface="+mn-lt"/>
               </a:rPr>
               <a:t>)</a:t>
             </a:r>
-            <a:endParaRPr lang="en-US" dirty="0"/>
+            <a:endParaRPr lang="en-US" b="1">
+              <a:cs typeface="Calibri"/>
+            </a:endParaRPr>
+          </a:p>
+          <a:p>
+            <a:pPr algn="ctr"/>
+            <a:endParaRPr lang="fr-FR" dirty="0">
+              <a:cs typeface="Calibri"/>
+            </a:endParaRPr>
           </a:p>
         </p:txBody>
       </p:sp>
@@ -5622,10 +5798,10 @@
       </p:cxnSp>
       <p:graphicFrame>
         <p:nvGraphicFramePr>
-          <p:cNvPr id="21" name="Table 6">
-            <a:extLst>
-              <a:ext uri="{FF2B5EF4-FFF2-40B4-BE49-F238E27FC236}">
-                <a16:creationId xmlns:a16="http://schemas.microsoft.com/office/drawing/2014/main" id="{3B363A25-A424-4A7F-AC1C-675D5AA95527}"/>
+          <p:cNvPr id="22" name="Table 6">
+            <a:extLst>
+              <a:ext uri="{FF2B5EF4-FFF2-40B4-BE49-F238E27FC236}">
+                <a16:creationId xmlns:a16="http://schemas.microsoft.com/office/drawing/2014/main" id="{14F2891B-DE06-4BA6-B53E-8E439C13B6B4}"/>
               </a:ext>
             </a:extLst>
           </p:cNvPr>
@@ -5635,91 +5811,7 @@
           <p:nvPr>
             <p:extLst>
               <p:ext uri="{D42A27DB-BD31-4B8C-83A1-F6EECF244321}">
-                <p14:modId xmlns:p14="http://schemas.microsoft.com/office/powerpoint/2010/main" val="643400388"/>
-              </p:ext>
-            </p:extLst>
-          </p:nvPr>
-        </p:nvGraphicFramePr>
-        <p:xfrm>
-          <a:off x="9118809" y="1661301"/>
-          <a:ext cx="2804021" cy="797871"/>
-        </p:xfrm>
-        <a:graphic>
-          <a:graphicData uri="http://schemas.openxmlformats.org/drawingml/2006/table">
-            <a:tbl>
-              <a:tblPr firstRow="1" bandRow="1">
-                <a:tableStyleId>{5C22544A-7EE6-4342-B048-85BDC9FD1C3A}</a:tableStyleId>
-              </a:tblPr>
-              <a:tblGrid>
-                <a:gridCol w="2804021">
-                  <a:extLst>
-                    <a:ext uri="{9D8B030D-6E8A-4147-A177-3AD203B41FA5}">
-                      <a16:colId xmlns:a16="http://schemas.microsoft.com/office/drawing/2014/main" val="2061391393"/>
-                    </a:ext>
-                  </a:extLst>
-                </a:gridCol>
-              </a:tblGrid>
-              <a:tr h="462591">
-                <a:tc>
-                  <a:txBody>
-                    <a:bodyPr/>
-                    <a:lstStyle/>
-                    <a:p>
-                      <a:r>
-                        <a:rPr lang="fr-FR" sz="1600" dirty="0"/>
-                        <a:t>Row</a:t>
-                      </a:r>
-                      <a:endParaRPr lang="en-US" sz="1600" dirty="0"/>
-                    </a:p>
-                  </a:txBody>
-                  <a:tcPr/>
-                </a:tc>
-                <a:extLst>
-                  <a:ext uri="{0D108BD9-81ED-4DB2-BD59-A6C34878D82A}">
-                    <a16:rowId xmlns:a16="http://schemas.microsoft.com/office/drawing/2014/main" val="235972142"/>
-                  </a:ext>
-                </a:extLst>
-              </a:tr>
-              <a:tr h="283885">
-                <a:tc>
-                  <a:txBody>
-                    <a:bodyPr/>
-                    <a:lstStyle/>
-                    <a:p>
-                      <a:r>
-                        <a:rPr lang="en-US" sz="1600" dirty="0"/>
-                        <a:t>13.5</a:t>
-                      </a:r>
-                    </a:p>
-                  </a:txBody>
-                  <a:tcPr/>
-                </a:tc>
-                <a:extLst>
-                  <a:ext uri="{0D108BD9-81ED-4DB2-BD59-A6C34878D82A}">
-                    <a16:rowId xmlns:a16="http://schemas.microsoft.com/office/drawing/2014/main" val="1215558195"/>
-                  </a:ext>
-                </a:extLst>
-              </a:tr>
-            </a:tbl>
-          </a:graphicData>
-        </a:graphic>
-      </p:graphicFrame>
-      <p:graphicFrame>
-        <p:nvGraphicFramePr>
-          <p:cNvPr id="22" name="Table 6">
-            <a:extLst>
-              <a:ext uri="{FF2B5EF4-FFF2-40B4-BE49-F238E27FC236}">
-                <a16:creationId xmlns:a16="http://schemas.microsoft.com/office/drawing/2014/main" id="{14F2891B-DE06-4BA6-B53E-8E439C13B6B4}"/>
-              </a:ext>
-            </a:extLst>
-          </p:cNvPr>
-          <p:cNvGraphicFramePr>
-            <a:graphicFrameLocks noGrp="1"/>
-          </p:cNvGraphicFramePr>
-          <p:nvPr>
-            <p:extLst>
-              <p:ext uri="{D42A27DB-BD31-4B8C-83A1-F6EECF244321}">
-                <p14:modId xmlns:p14="http://schemas.microsoft.com/office/powerpoint/2010/main" val="3615470561"/>
+                <p14:modId xmlns:p14="http://schemas.microsoft.com/office/powerpoint/2010/main" val="2800062869"/>
               </p:ext>
             </p:extLst>
           </p:nvPr>
@@ -5751,9 +5843,8 @@
                     <a:p>
                       <a:r>
                         <a:rPr lang="fr-FR" sz="1600" dirty="0"/>
-                        <a:t>Row</a:t>
-                      </a:r>
-                      <a:endParaRPr lang="en-US" sz="1600" dirty="0"/>
+                        <a:t>RDD</a:t>
+                      </a:r>
                     </a:p>
                   </a:txBody>
                   <a:tcPr/>
@@ -5863,8 +5954,8 @@
         </p:nvSpPr>
         <p:spPr>
           <a:xfrm>
-            <a:off x="6087611" y="4035399"/>
-            <a:ext cx="2374085" cy="780176"/>
+            <a:off x="5938715" y="4035399"/>
+            <a:ext cx="2750705" cy="780176"/>
           </a:xfrm>
           <a:prstGeom prst="roundRect">
             <a:avLst/>
@@ -5887,45 +5978,40 @@
           </a:fontRef>
         </p:style>
         <p:txBody>
-          <a:bodyPr rtlCol="0" anchor="ctr"/>
+          <a:bodyPr lIns="91440" tIns="45720" rIns="91440" bIns="45720" rtlCol="0" anchor="ctr"/>
           <a:lstStyle/>
           <a:p>
             <a:pPr algn="ctr"/>
             <a:r>
-              <a:rPr lang="fr-FR" dirty="0" err="1"/>
+              <a:rPr lang="fr-FR" b="1" dirty="0" err="1">
+                <a:cs typeface="Calibri"/>
+              </a:rPr>
               <a:t>reduceByKey</a:t>
             </a:r>
             <a:r>
-              <a:rPr lang="fr-FR" dirty="0"/>
-              <a:t>(</a:t>
-            </a:r>
-            <a:r>
-              <a:rPr lang="fr-FR" dirty="0" err="1"/>
-              <a:t>x,y</a:t>
-            </a:r>
-            <a:r>
-              <a:rPr lang="fr-FR" dirty="0"/>
-              <a:t> </a:t>
-            </a:r>
-            <a:r>
-              <a:rPr lang="fr-FR" dirty="0">
-                <a:sym typeface="Wingdings" panose="05000000000000000000" pitchFamily="2" charset="2"/>
+              <a:rPr lang="fr-FR" b="1" dirty="0">
+                <a:ea typeface="+mn-lt"/>
+                <a:cs typeface="+mn-lt"/>
               </a:rPr>
-              <a:t> </a:t>
-            </a:r>
-            <a:r>
-              <a:rPr lang="fr-FR" dirty="0" err="1">
-                <a:sym typeface="Wingdings" panose="05000000000000000000" pitchFamily="2" charset="2"/>
+              <a:t>(lambda x, y: </a:t>
+            </a:r>
+            <a:r>
+              <a:rPr lang="fr-FR" b="1" dirty="0" err="1">
+                <a:ea typeface="+mn-lt"/>
+                <a:cs typeface="+mn-lt"/>
               </a:rPr>
               <a:t>x+y</a:t>
             </a:r>
             <a:r>
-              <a:rPr lang="fr-FR" dirty="0">
-                <a:sym typeface="Wingdings" panose="05000000000000000000" pitchFamily="2" charset="2"/>
+              <a:rPr lang="fr-FR" b="1" dirty="0">
+                <a:ea typeface="+mn-lt"/>
+                <a:cs typeface="+mn-lt"/>
               </a:rPr>
               <a:t>)</a:t>
             </a:r>
-            <a:endParaRPr lang="en-US" dirty="0"/>
+            <a:endParaRPr lang="fr-FR" b="1">
+              <a:cs typeface="Calibri"/>
+            </a:endParaRPr>
           </a:p>
         </p:txBody>
       </p:sp>
@@ -5945,7 +6031,7 @@
         </p:nvCxnSpPr>
         <p:spPr>
           <a:xfrm>
-            <a:off x="5617828" y="4450960"/>
+            <a:off x="5468931" y="4468477"/>
             <a:ext cx="469783" cy="0"/>
           </a:xfrm>
           <a:prstGeom prst="straightConnector1">
@@ -5986,7 +6072,7 @@
         </p:nvCxnSpPr>
         <p:spPr>
           <a:xfrm>
-            <a:off x="8461696" y="4442265"/>
+            <a:off x="8593075" y="4424748"/>
             <a:ext cx="469783" cy="0"/>
           </a:xfrm>
           <a:prstGeom prst="straightConnector1">
@@ -6026,7 +6112,7 @@
           <p:nvPr>
             <p:extLst>
               <p:ext uri="{D42A27DB-BD31-4B8C-83A1-F6EECF244321}">
-                <p14:modId xmlns:p14="http://schemas.microsoft.com/office/powerpoint/2010/main" val="2762088367"/>
+                <p14:modId xmlns:p14="http://schemas.microsoft.com/office/powerpoint/2010/main" val="1995673279"/>
               </p:ext>
             </p:extLst>
           </p:nvPr>
@@ -6056,11 +6142,20 @@
                     <a:bodyPr/>
                     <a:lstStyle/>
                     <a:p>
-                      <a:r>
-                        <a:rPr lang="fr-FR" sz="1600" dirty="0"/>
-                        <a:t>Row</a:t>
-                      </a:r>
-                      <a:endParaRPr lang="en-US" sz="1600" dirty="0"/>
+                      <a:pPr lvl="0">
+                        <a:buNone/>
+                      </a:pPr>
+                      <a:r>
+                        <a:rPr lang="fr-FR" sz="1600" b="1" i="0" u="none" strike="noStrike" noProof="0" dirty="0">
+                          <a:latin typeface="Calibri"/>
+                        </a:rPr>
+                        <a:t>RDD </a:t>
+                      </a:r>
+                      <a:r>
+                        <a:rPr lang="fr-FR" sz="1600" b="1" i="0" u="none" strike="noStrike" noProof="0" dirty="0"/>
+                        <a:t>of (K, V) pairs</a:t>
+                      </a:r>
+                      <a:endParaRPr lang="en-US" dirty="0"/>
                     </a:p>
                   </a:txBody>
                   <a:tcPr/>
@@ -6079,7 +6174,7 @@
                     <a:p>
                       <a:r>
                         <a:rPr lang="en-US" sz="1600" dirty="0"/>
-                        <a:t>(“Blade Runner", 8.5)</a:t>
+                        <a:t>("Blade Runner", 8.5)</a:t>
                       </a:r>
                     </a:p>
                   </a:txBody>
@@ -6130,7 +6225,7 @@
           <p:nvPr>
             <p:extLst>
               <p:ext uri="{D42A27DB-BD31-4B8C-83A1-F6EECF244321}">
-                <p14:modId xmlns:p14="http://schemas.microsoft.com/office/powerpoint/2010/main" val="3222191515"/>
+                <p14:modId xmlns:p14="http://schemas.microsoft.com/office/powerpoint/2010/main" val="2058402142"/>
               </p:ext>
             </p:extLst>
           </p:nvPr>
@@ -6160,11 +6255,20 @@
                     <a:bodyPr/>
                     <a:lstStyle/>
                     <a:p>
-                      <a:r>
-                        <a:rPr lang="fr-FR" sz="1600" dirty="0"/>
-                        <a:t>Row</a:t>
-                      </a:r>
-                      <a:endParaRPr lang="en-US" sz="1600" dirty="0"/>
+                      <a:pPr lvl="0">
+                        <a:buNone/>
+                      </a:pPr>
+                      <a:r>
+                        <a:rPr lang="fr-FR" sz="1600" b="1" i="0" u="none" strike="noStrike" noProof="0" dirty="0">
+                          <a:latin typeface="Calibri"/>
+                        </a:rPr>
+                        <a:t>RDD</a:t>
+                      </a:r>
+                      <a:r>
+                        <a:rPr lang="fr-FR" sz="1600" b="1" i="0" u="none" strike="noStrike" noProof="0" dirty="0"/>
+                        <a:t> of (K, V) pairs</a:t>
+                      </a:r>
+                      <a:endParaRPr lang="en-US" dirty="0"/>
                     </a:p>
                   </a:txBody>
                   <a:tcPr/>
@@ -6183,7 +6287,7 @@
                     <a:p>
                       <a:r>
                         <a:rPr lang="en-US" sz="1600" dirty="0"/>
-                        <a:t>(“Blade Runner", 5.0)</a:t>
+                        <a:t>("Blade Runner", 5.0)</a:t>
                       </a:r>
                     </a:p>
                   </a:txBody>
@@ -6240,7 +6344,17 @@
                       </a:pPr>
                       <a:r>
                         <a:rPr lang="en-US" sz="1600" dirty="0"/>
-                        <a:t>(“Blade Runner“, 3.5)</a:t>
+                        <a:t>("Blade Runner</a:t>
+                      </a:r>
+                      <a:r>
+                        <a:rPr lang="en-US" sz="1600" b="0" i="0" u="none" strike="noStrike" noProof="0" dirty="0">
+                          <a:latin typeface="Calibri"/>
+                        </a:rPr>
+                        <a:t>"</a:t>
+                      </a:r>
+                      <a:r>
+                        <a:rPr lang="en-US" sz="1600" dirty="0"/>
+                        <a:t>, 3.5)</a:t>
                       </a:r>
                     </a:p>
                   </a:txBody>
@@ -6256,6 +6370,42 @@
           </a:graphicData>
         </a:graphic>
       </p:graphicFrame>
+      <p:sp>
+        <p:nvSpPr>
+          <p:cNvPr id="4" name="TextBox 3">
+            <a:extLst>
+              <a:ext uri="{FF2B5EF4-FFF2-40B4-BE49-F238E27FC236}">
+                <a16:creationId xmlns:a16="http://schemas.microsoft.com/office/drawing/2014/main" id="{9832D1CA-FCCC-636E-E2FF-61F08779E5EF}"/>
+              </a:ext>
+            </a:extLst>
+          </p:cNvPr>
+          <p:cNvSpPr txBox="1"/>
+          <p:nvPr/>
+        </p:nvSpPr>
+        <p:spPr>
+          <a:xfrm>
+            <a:off x="9326971" y="1972720"/>
+            <a:ext cx="732893" cy="461665"/>
+          </a:xfrm>
+          <a:prstGeom prst="rect">
+            <a:avLst/>
+          </a:prstGeom>
+          <a:noFill/>
+        </p:spPr>
+        <p:txBody>
+          <a:bodyPr wrap="none" lIns="91440" tIns="45720" rIns="91440" bIns="45720" rtlCol="0" anchor="t">
+            <a:spAutoFit/>
+          </a:bodyPr>
+          <a:lstStyle/>
+          <a:p>
+            <a:r>
+              <a:rPr lang="fr-FR" sz="2400" b="1" dirty="0"/>
+              <a:t>13.5</a:t>
+            </a:r>
+            <a:endParaRPr lang="en-US" sz="2400" b="1" dirty="0"/>
+          </a:p>
+        </p:txBody>
+      </p:sp>
     </p:spTree>
     <p:extLst>
       <p:ext uri="{BB962C8B-B14F-4D97-AF65-F5344CB8AC3E}">
@@ -6880,7 +7030,7 @@
         </p:blipFill>
         <p:spPr>
           <a:xfrm>
-            <a:off x="1876369" y="1046376"/>
+            <a:off x="1876369" y="1335411"/>
             <a:ext cx="8439262" cy="5002584"/>
           </a:xfrm>
           <a:prstGeom prst="rect">
@@ -7879,7 +8029,12 @@
             <p:ph type="title"/>
           </p:nvPr>
         </p:nvSpPr>
-        <p:spPr/>
+        <p:spPr>
+          <a:xfrm>
+            <a:off x="715579" y="233746"/>
+            <a:ext cx="10515600" cy="1325563"/>
+          </a:xfrm>
+        </p:spPr>
         <p:txBody>
           <a:bodyPr/>
           <a:lstStyle/>
@@ -8245,13 +8400,13 @@
           </a:fontRef>
         </p:style>
         <p:txBody>
-          <a:bodyPr rtlCol="0" anchor="ctr"/>
+          <a:bodyPr lIns="91440" tIns="45720" rIns="91440" bIns="45720" rtlCol="0" anchor="ctr"/>
           <a:lstStyle/>
           <a:p>
             <a:pPr algn="ctr"/>
             <a:r>
               <a:rPr lang="fr-FR" dirty="0"/>
-              <a:t>count</a:t>
+              <a:t>count()</a:t>
             </a:r>
             <a:endParaRPr lang="en-US" dirty="0"/>
           </a:p>
@@ -8351,7 +8506,13 @@
           <p:cNvGraphicFramePr>
             <a:graphicFrameLocks noGrp="1"/>
           </p:cNvGraphicFramePr>
-          <p:nvPr/>
+          <p:nvPr>
+            <p:extLst>
+              <p:ext uri="{D42A27DB-BD31-4B8C-83A1-F6EECF244321}">
+                <p14:modId xmlns:p14="http://schemas.microsoft.com/office/powerpoint/2010/main" val="3946583363"/>
+              </p:ext>
+            </p:extLst>
+          </p:nvPr>
         </p:nvGraphicFramePr>
         <p:xfrm>
           <a:off x="336282" y="1371359"/>
@@ -8380,7 +8541,7 @@
                     <a:p>
                       <a:r>
                         <a:rPr lang="fr-FR" sz="1600" dirty="0"/>
-                        <a:t>Row</a:t>
+                        <a:t>RDD</a:t>
                       </a:r>
                       <a:endParaRPr lang="en-US" sz="1600" dirty="0"/>
                     </a:p>
@@ -8494,7 +8655,17 @@
                       </a:r>
                       <a:r>
                         <a:rPr lang="en-US" sz="1600" dirty="0" err="1"/>
-                        <a:t>user":“Sam</a:t>
+                        <a:t>user":</a:t>
+                      </a:r>
+                      <a:r>
+                        <a:rPr lang="en-US" sz="1600" b="0" i="0" u="none" strike="noStrike" noProof="0" dirty="0" err="1">
+                          <a:latin typeface="Calibri"/>
+                        </a:rPr>
+                        <a:t>"</a:t>
+                      </a:r>
+                      <a:r>
+                        <a:rPr lang="en-US" sz="1600" dirty="0" err="1"/>
+                        <a:t>Sam</a:t>
                       </a:r>
                       <a:r>
                         <a:rPr lang="en-US" sz="1600" dirty="0"/>
@@ -8502,7 +8673,17 @@
                       </a:r>
                       <a:r>
                         <a:rPr lang="en-US" sz="1600" dirty="0" err="1"/>
-                        <a:t>movie":“Blade</a:t>
+                        <a:t>movie":</a:t>
+                      </a:r>
+                      <a:r>
+                        <a:rPr lang="en-US" sz="1600" b="0" i="0" u="none" strike="noStrike" noProof="0" dirty="0" err="1">
+                          <a:latin typeface="Calibri"/>
+                        </a:rPr>
+                        <a:t>"</a:t>
+                      </a:r>
+                      <a:r>
+                        <a:rPr lang="en-US" sz="1600" dirty="0" err="1"/>
+                        <a:t>Blade</a:t>
                       </a:r>
                       <a:r>
                         <a:rPr lang="en-US" sz="1600" dirty="0"/>
@@ -8560,7 +8741,7 @@
           </a:fontRef>
         </p:style>
         <p:txBody>
-          <a:bodyPr rtlCol="0" anchor="ctr"/>
+          <a:bodyPr lIns="91440" tIns="45720" rIns="91440" bIns="45720" rtlCol="0" anchor="ctr"/>
           <a:lstStyle/>
           <a:p>
             <a:pPr algn="ctr"/>
@@ -8572,7 +8753,9 @@
               <a:rPr lang="fr-FR" dirty="0"/>
               <a:t>(2)</a:t>
             </a:r>
-            <a:endParaRPr lang="en-US" dirty="0"/>
+            <a:endParaRPr lang="en-US" dirty="0">
+              <a:cs typeface="Calibri"/>
+            </a:endParaRPr>
           </a:p>
         </p:txBody>
       </p:sp>
@@ -8673,7 +8856,7 @@
           <p:nvPr>
             <p:extLst>
               <p:ext uri="{D42A27DB-BD31-4B8C-83A1-F6EECF244321}">
-                <p14:modId xmlns:p14="http://schemas.microsoft.com/office/powerpoint/2010/main" val="1976910992"/>
+                <p14:modId xmlns:p14="http://schemas.microsoft.com/office/powerpoint/2010/main" val="3634846452"/>
               </p:ext>
             </p:extLst>
           </p:nvPr>
@@ -8704,10 +8887,10 @@
                     <a:lstStyle/>
                     <a:p>
                       <a:r>
-                        <a:rPr lang="fr-FR" sz="1600" dirty="0"/>
-                        <a:t>Row</a:t>
-                      </a:r>
-                      <a:endParaRPr lang="en-US" sz="1600" dirty="0"/>
+                        <a:rPr lang="fr-FR" sz="1600" dirty="0" err="1"/>
+                        <a:t>list</a:t>
+                      </a:r>
+                      <a:endParaRPr lang="en-US" sz="1600" dirty="0" err="1"/>
                     </a:p>
                   </a:txBody>
                   <a:tcPr/>
@@ -8733,8 +8916,14 @@
                         <a:t>user":"John</a:t>
                       </a:r>
                       <a:r>
+                        <a:rPr lang="en-US" sz="1600" b="0" i="0" u="none" strike="noStrike" noProof="0" dirty="0">
+                          <a:latin typeface="Calibri"/>
+                        </a:rPr>
+                        <a:t>"</a:t>
+                      </a:r>
+                      <a:r>
                         <a:rPr lang="en-US" sz="1600" dirty="0"/>
-                        <a:t>“}</a:t>
+                        <a:t>}</a:t>
                       </a:r>
                     </a:p>
                   </a:txBody>
@@ -8761,8 +8950,14 @@
                         <a:t>user":"Louise</a:t>
                       </a:r>
                       <a:r>
+                        <a:rPr lang="en-US" sz="1600" b="0" i="0" u="none" strike="noStrike" noProof="0" dirty="0">
+                          <a:latin typeface="Calibri"/>
+                        </a:rPr>
+                        <a:t>"</a:t>
+                      </a:r>
+                      <a:r>
                         <a:rPr lang="en-US" sz="1600" dirty="0"/>
-                        <a:t>“}</a:t>
+                        <a:t>}</a:t>
                       </a:r>
                     </a:p>
                   </a:txBody>
@@ -8793,7 +8988,7 @@
           <p:nvPr>
             <p:extLst>
               <p:ext uri="{D42A27DB-BD31-4B8C-83A1-F6EECF244321}">
-                <p14:modId xmlns:p14="http://schemas.microsoft.com/office/powerpoint/2010/main" val="3203822827"/>
+                <p14:modId xmlns:p14="http://schemas.microsoft.com/office/powerpoint/2010/main" val="1276620535"/>
               </p:ext>
             </p:extLst>
           </p:nvPr>
@@ -8823,11 +9018,16 @@
                     <a:bodyPr/>
                     <a:lstStyle/>
                     <a:p>
-                      <a:r>
-                        <a:rPr lang="fr-FR" sz="1600" dirty="0"/>
-                        <a:t>Row</a:t>
-                      </a:r>
-                      <a:endParaRPr lang="en-US" sz="1600" dirty="0"/>
+                      <a:pPr lvl="0">
+                        <a:buNone/>
+                      </a:pPr>
+                      <a:r>
+                        <a:rPr lang="fr-FR" sz="1600" b="1" i="0" u="none" strike="noStrike" noProof="0" dirty="0">
+                          <a:latin typeface="Calibri"/>
+                        </a:rPr>
+                        <a:t>RDD</a:t>
+                      </a:r>
+                      <a:endParaRPr lang="en-US" dirty="0"/>
                     </a:p>
                   </a:txBody>
                   <a:tcPr/>
@@ -8853,9 +9053,16 @@
                         <a:t>user":"John</a:t>
                       </a:r>
                       <a:r>
+                        <a:rPr lang="en-US" sz="1600" b="0" i="0" u="none" strike="noStrike" noProof="0" dirty="0">
+                          <a:latin typeface="Calibri"/>
+                        </a:rPr>
+                        <a:t>"</a:t>
+                      </a:r>
+                      <a:r>
                         <a:rPr lang="en-US" sz="1600" dirty="0"/>
-                        <a:t>“}</a:t>
-                      </a:r>
+                        <a:t>}</a:t>
+                      </a:r>
+                      <a:endParaRPr lang="en-US" dirty="0"/>
                     </a:p>
                   </a:txBody>
                   <a:tcPr/>
@@ -8881,8 +9088,14 @@
                         <a:t>user":"Louise</a:t>
                       </a:r>
                       <a:r>
+                        <a:rPr lang="en-US" sz="1600" b="0" i="0" u="none" strike="noStrike" noProof="0" dirty="0">
+                          <a:latin typeface="Calibri"/>
+                        </a:rPr>
+                        <a:t>"</a:t>
+                      </a:r>
+                      <a:r>
                         <a:rPr lang="en-US" sz="1600" dirty="0"/>
-                        <a:t>“}</a:t>
+                        <a:t>}</a:t>
                       </a:r>
                     </a:p>
                   </a:txBody>
@@ -8923,11 +9136,27 @@
                       </a:r>
                       <a:r>
                         <a:rPr lang="en-US" sz="1600" dirty="0" err="1"/>
-                        <a:t>user":“Sam</a:t>
+                        <a:t>user":</a:t>
+                      </a:r>
+                      <a:r>
+                        <a:rPr lang="en-US" sz="1600" b="0" i="0" u="none" strike="noStrike" noProof="0" dirty="0" err="1">
+                          <a:latin typeface="Calibri"/>
+                        </a:rPr>
+                        <a:t>"</a:t>
+                      </a:r>
+                      <a:r>
+                        <a:rPr lang="en-US" sz="1600" dirty="0" err="1"/>
+                        <a:t>Sam</a:t>
+                      </a:r>
+                      <a:r>
+                        <a:rPr lang="en-US" sz="1600" b="0" i="0" u="none" strike="noStrike" noProof="0" dirty="0">
+                          <a:latin typeface="Calibri"/>
+                        </a:rPr>
+                        <a:t>"</a:t>
                       </a:r>
                       <a:r>
                         <a:rPr lang="en-US" sz="1600" dirty="0"/>
-                        <a:t>“}</a:t>
+                        <a:t>}</a:t>
                       </a:r>
                     </a:p>
                   </a:txBody>
@@ -9017,7 +9246,7 @@
           </a:fontRef>
         </p:style>
         <p:txBody>
-          <a:bodyPr rtlCol="0" anchor="ctr"/>
+          <a:bodyPr lIns="91440" tIns="45720" rIns="91440" bIns="45720" rtlCol="0" anchor="ctr"/>
           <a:lstStyle/>
           <a:p>
             <a:pPr algn="ctr"/>
@@ -9029,7 +9258,9 @@
               <a:rPr lang="fr-FR" dirty="0"/>
               <a:t>()</a:t>
             </a:r>
-            <a:endParaRPr lang="en-US" dirty="0"/>
+            <a:endParaRPr lang="en-US" dirty="0">
+              <a:cs typeface="Calibri"/>
+            </a:endParaRPr>
           </a:p>
         </p:txBody>
       </p:sp>
@@ -9130,7 +9361,7 @@
           <p:nvPr>
             <p:extLst>
               <p:ext uri="{D42A27DB-BD31-4B8C-83A1-F6EECF244321}">
-                <p14:modId xmlns:p14="http://schemas.microsoft.com/office/powerpoint/2010/main" val="2817214379"/>
+                <p14:modId xmlns:p14="http://schemas.microsoft.com/office/powerpoint/2010/main" val="944900450"/>
               </p:ext>
             </p:extLst>
           </p:nvPr>
@@ -9160,11 +9391,16 @@
                     <a:bodyPr/>
                     <a:lstStyle/>
                     <a:p>
-                      <a:r>
-                        <a:rPr lang="fr-FR" sz="1600" dirty="0"/>
-                        <a:t>Row</a:t>
-                      </a:r>
-                      <a:endParaRPr lang="en-US" sz="1600" dirty="0"/>
+                      <a:pPr lvl="0">
+                        <a:buNone/>
+                      </a:pPr>
+                      <a:r>
+                        <a:rPr lang="fr-FR" sz="1600" b="1" i="0" u="none" strike="noStrike" noProof="0" dirty="0">
+                          <a:latin typeface="Calibri"/>
+                        </a:rPr>
+                        <a:t>RDD</a:t>
+                      </a:r>
+                      <a:endParaRPr lang="en-US" dirty="0"/>
                     </a:p>
                   </a:txBody>
                   <a:tcPr/>
@@ -9190,8 +9426,14 @@
                         <a:t>user":"John</a:t>
                       </a:r>
                       <a:r>
+                        <a:rPr lang="en-US" sz="1600" b="0" i="0" u="none" strike="noStrike" noProof="0" dirty="0">
+                          <a:latin typeface="Calibri"/>
+                        </a:rPr>
+                        <a:t>"</a:t>
+                      </a:r>
+                      <a:r>
                         <a:rPr lang="en-US" sz="1600" dirty="0"/>
-                        <a:t>“}</a:t>
+                        <a:t>}</a:t>
                       </a:r>
                     </a:p>
                   </a:txBody>
@@ -9252,11 +9494,27 @@
                       </a:r>
                       <a:r>
                         <a:rPr lang="en-US" sz="1600" dirty="0" err="1"/>
-                        <a:t>user":“Sam</a:t>
+                        <a:t>user":</a:t>
+                      </a:r>
+                      <a:r>
+                        <a:rPr lang="en-US" sz="1600" b="0" i="0" u="none" strike="noStrike" noProof="0" dirty="0" err="1">
+                          <a:latin typeface="Calibri"/>
+                        </a:rPr>
+                        <a:t>"</a:t>
+                      </a:r>
+                      <a:r>
+                        <a:rPr lang="en-US" sz="1600" dirty="0" err="1"/>
+                        <a:t>Sam</a:t>
+                      </a:r>
+                      <a:r>
+                        <a:rPr lang="en-US" sz="1600" b="0" i="0" u="none" strike="noStrike" noProof="0" dirty="0">
+                          <a:latin typeface="Calibri"/>
+                        </a:rPr>
+                        <a:t>"</a:t>
                       </a:r>
                       <a:r>
                         <a:rPr lang="en-US" sz="1600" dirty="0"/>
-                        <a:t>“}</a:t>
+                        <a:t>}</a:t>
                       </a:r>
                     </a:p>
                   </a:txBody>
@@ -9287,14 +9545,14 @@
           <p:nvPr>
             <p:extLst>
               <p:ext uri="{D42A27DB-BD31-4B8C-83A1-F6EECF244321}">
-                <p14:modId xmlns:p14="http://schemas.microsoft.com/office/powerpoint/2010/main" val="1945901971"/>
+                <p14:modId xmlns:p14="http://schemas.microsoft.com/office/powerpoint/2010/main" val="3512230028"/>
               </p:ext>
             </p:extLst>
           </p:nvPr>
         </p:nvGraphicFramePr>
         <p:xfrm>
-          <a:off x="9167069" y="4877663"/>
-          <a:ext cx="1658900" cy="1479749"/>
+          <a:off x="9170275" y="4948620"/>
+          <a:ext cx="1658900" cy="1409368"/>
         </p:xfrm>
         <a:graphic>
           <a:graphicData uri="http://schemas.openxmlformats.org/drawingml/2006/table">
@@ -9311,17 +9569,17 @@
                   </a:extLst>
                 </a:gridCol>
               </a:tblGrid>
-              <a:tr h="473909">
+              <a:tr h="403528">
                 <a:tc>
                   <a:txBody>
                     <a:bodyPr/>
                     <a:lstStyle/>
                     <a:p>
                       <a:r>
-                        <a:rPr lang="fr-FR" sz="1600" dirty="0"/>
-                        <a:t>Row</a:t>
-                      </a:r>
-                      <a:endParaRPr lang="en-US" sz="1600" dirty="0"/>
+                        <a:rPr lang="fr-FR" sz="1600" dirty="0" err="1"/>
+                        <a:t>list</a:t>
+                      </a:r>
+                      <a:endParaRPr lang="en-US" sz="1600" dirty="0" err="1"/>
                     </a:p>
                   </a:txBody>
                   <a:tcPr/>
@@ -9332,7 +9590,7 @@
                   </a:ext>
                 </a:extLst>
               </a:tr>
-              <a:tr h="283885">
+              <a:tr h="306681">
                 <a:tc>
                   <a:txBody>
                     <a:bodyPr/>
@@ -9347,8 +9605,14 @@
                         <a:t>user":"John</a:t>
                       </a:r>
                       <a:r>
+                        <a:rPr lang="en-US" sz="1600" b="0" i="0" u="none" strike="noStrike" noProof="0" dirty="0">
+                          <a:latin typeface="Calibri"/>
+                        </a:rPr>
+                        <a:t>"</a:t>
+                      </a:r>
+                      <a:r>
                         <a:rPr lang="en-US" sz="1600" dirty="0"/>
-                        <a:t>“}</a:t>
+                        <a:t>}</a:t>
                       </a:r>
                     </a:p>
                   </a:txBody>
@@ -9360,7 +9624,7 @@
                   </a:ext>
                 </a:extLst>
               </a:tr>
-              <a:tr h="283885">
+              <a:tr h="306681">
                 <a:tc>
                   <a:txBody>
                     <a:bodyPr/>
@@ -9380,7 +9644,7 @@
                   </a:ext>
                 </a:extLst>
               </a:tr>
-              <a:tr h="283885">
+              <a:tr h="306681">
                 <a:tc>
                   <a:txBody>
                     <a:bodyPr/>
@@ -9409,11 +9673,27 @@
                       </a:r>
                       <a:r>
                         <a:rPr lang="en-US" sz="1600" dirty="0" err="1"/>
-                        <a:t>user":“Sam</a:t>
+                        <a:t>user":</a:t>
+                      </a:r>
+                      <a:r>
+                        <a:rPr lang="en-US" sz="1600" b="0" i="0" u="none" strike="noStrike" noProof="0" dirty="0" err="1">
+                          <a:latin typeface="Calibri"/>
+                        </a:rPr>
+                        <a:t>"</a:t>
+                      </a:r>
+                      <a:r>
+                        <a:rPr lang="en-US" sz="1600" dirty="0" err="1"/>
+                        <a:t>Sam</a:t>
+                      </a:r>
+                      <a:r>
+                        <a:rPr lang="en-US" sz="1600" b="0" i="0" u="none" strike="noStrike" noProof="0" dirty="0">
+                          <a:latin typeface="Calibri"/>
+                        </a:rPr>
+                        <a:t>"</a:t>
                       </a:r>
                       <a:r>
                         <a:rPr lang="en-US" sz="1600" dirty="0"/>
-                        <a:t>“}</a:t>
+                        <a:t>}</a:t>
                       </a:r>
                     </a:p>
                   </a:txBody>
@@ -9461,35 +9741,6 @@
       </p:grpSpPr>
       <p:sp>
         <p:nvSpPr>
-          <p:cNvPr id="2" name="Title 1">
-            <a:extLst>
-              <a:ext uri="{FF2B5EF4-FFF2-40B4-BE49-F238E27FC236}">
-                <a16:creationId xmlns:a16="http://schemas.microsoft.com/office/drawing/2014/main" id="{1EF77BFB-B82D-46E7-9ED3-A723BCC0A39C}"/>
-              </a:ext>
-            </a:extLst>
-          </p:cNvPr>
-          <p:cNvSpPr>
-            <a:spLocks noGrp="1"/>
-          </p:cNvSpPr>
-          <p:nvPr>
-            <p:ph type="title"/>
-          </p:nvPr>
-        </p:nvSpPr>
-        <p:spPr/>
-        <p:txBody>
-          <a:bodyPr/>
-          <a:lstStyle/>
-          <a:p>
-            <a:r>
-              <a:rPr lang="fr-FR" dirty="0"/>
-              <a:t>RDD API</a:t>
-            </a:r>
-            <a:endParaRPr lang="en-US" dirty="0"/>
-          </a:p>
-        </p:txBody>
-      </p:sp>
-      <p:sp>
-        <p:nvSpPr>
           <p:cNvPr id="8" name="Rectangle: Rounded Corners 7">
             <a:extLst>
               <a:ext uri="{FF2B5EF4-FFF2-40B4-BE49-F238E27FC236}">
@@ -9526,37 +9777,60 @@
           </a:fontRef>
         </p:style>
         <p:txBody>
-          <a:bodyPr rtlCol="0" anchor="ctr"/>
+          <a:bodyPr lIns="91440" tIns="45720" rIns="91440" bIns="45720" rtlCol="0" anchor="ctr"/>
           <a:lstStyle/>
           <a:p>
             <a:pPr algn="ctr"/>
             <a:r>
-              <a:rPr lang="fr-FR" dirty="0" err="1"/>
+              <a:rPr lang="fr-FR" b="1" dirty="0" err="1"/>
               <a:t>map</a:t>
             </a:r>
             <a:r>
-              <a:rPr lang="fr-FR" dirty="0"/>
-              <a:t>(x </a:t>
-            </a:r>
-            <a:r>
-              <a:rPr lang="fr-FR" dirty="0">
+              <a:rPr lang="fr-FR" b="1" dirty="0"/>
+              <a:t>(</a:t>
+            </a:r>
+            <a:r>
+              <a:rPr lang="fr-FR" b="1" dirty="0">
+                <a:ea typeface="+mn-lt"/>
+                <a:cs typeface="+mn-lt"/>
+              </a:rPr>
+              <a:t>lambda </a:t>
+            </a:r>
+            <a:r>
+              <a:rPr lang="fr-FR" b="1" dirty="0"/>
+              <a:t>x: </a:t>
+            </a:r>
+            <a:endParaRPr lang="en-US" b="1">
+              <a:cs typeface="Calibri"/>
+            </a:endParaRPr>
+          </a:p>
+          <a:p>
+            <a:pPr algn="ctr"/>
+            <a:r>
+              <a:rPr lang="fr-FR" b="1" dirty="0"/>
+              <a:t>x</a:t>
+            </a:r>
+            <a:r>
+              <a:rPr lang="fr-FR" b="1" dirty="0">
                 <a:sym typeface="Wingdings" panose="05000000000000000000" pitchFamily="2" charset="2"/>
               </a:rPr>
-              <a:t> x[‘</a:t>
-            </a:r>
-            <a:r>
-              <a:rPr lang="fr-FR" dirty="0" err="1">
+              <a:t>['</a:t>
+            </a:r>
+            <a:r>
+              <a:rPr lang="fr-FR" b="1" dirty="0" err="1">
                 <a:sym typeface="Wingdings" panose="05000000000000000000" pitchFamily="2" charset="2"/>
               </a:rPr>
               <a:t>movie</a:t>
             </a:r>
             <a:r>
-              <a:rPr lang="fr-FR" dirty="0">
+              <a:rPr lang="fr-FR" b="1" dirty="0">
                 <a:sym typeface="Wingdings" panose="05000000000000000000" pitchFamily="2" charset="2"/>
               </a:rPr>
-              <a:t>’])</a:t>
-            </a:r>
-            <a:endParaRPr lang="en-US" dirty="0"/>
+              <a:t>'])</a:t>
+            </a:r>
+            <a:endParaRPr lang="en-US" b="1" dirty="0">
+              <a:cs typeface="Calibri"/>
+            </a:endParaRPr>
           </a:p>
         </p:txBody>
       </p:sp>
@@ -9657,14 +9931,14 @@
           <p:nvPr>
             <p:extLst>
               <p:ext uri="{D42A27DB-BD31-4B8C-83A1-F6EECF244321}">
-                <p14:modId xmlns:p14="http://schemas.microsoft.com/office/powerpoint/2010/main" val="2515917153"/>
+                <p14:modId xmlns:p14="http://schemas.microsoft.com/office/powerpoint/2010/main" val="1263456653"/>
               </p:ext>
             </p:extLst>
           </p:nvPr>
         </p:nvGraphicFramePr>
         <p:xfrm>
           <a:off x="9167069" y="1377072"/>
-          <a:ext cx="1435267" cy="1479749"/>
+          <a:ext cx="1733077" cy="1479749"/>
         </p:xfrm>
         <a:graphic>
           <a:graphicData uri="http://schemas.openxmlformats.org/drawingml/2006/table">
@@ -9673,7 +9947,7 @@
                 <a:tableStyleId>{5C22544A-7EE6-4342-B048-85BDC9FD1C3A}</a:tableStyleId>
               </a:tblPr>
               <a:tblGrid>
-                <a:gridCol w="1435267">
+                <a:gridCol w="1733077">
                   <a:extLst>
                     <a:ext uri="{9D8B030D-6E8A-4147-A177-3AD203B41FA5}">
                       <a16:colId xmlns:a16="http://schemas.microsoft.com/office/drawing/2014/main" val="2061391393"/>
@@ -9687,11 +9961,16 @@
                     <a:bodyPr/>
                     <a:lstStyle/>
                     <a:p>
-                      <a:r>
-                        <a:rPr lang="fr-FR" sz="1600" dirty="0"/>
-                        <a:t>Row</a:t>
-                      </a:r>
-                      <a:endParaRPr lang="en-US" sz="1600" dirty="0"/>
+                      <a:pPr lvl="0">
+                        <a:buNone/>
+                      </a:pPr>
+                      <a:r>
+                        <a:rPr lang="fr-FR" sz="1600" b="1" i="0" u="none" strike="noStrike" noProof="0" dirty="0">
+                          <a:latin typeface="Calibri"/>
+                        </a:rPr>
+                        <a:t>RDD</a:t>
+                      </a:r>
+                      <a:endParaRPr lang="en-US" dirty="0"/>
                     </a:p>
                   </a:txBody>
                   <a:tcPr/>
@@ -9710,7 +9989,7 @@
                     <a:p>
                       <a:r>
                         <a:rPr lang="fr-FR" sz="1600" dirty="0"/>
-                        <a:t>Blade Runner</a:t>
+                        <a:t>"Blade Runner"</a:t>
                       </a:r>
                       <a:endParaRPr lang="en-US" sz="1600" dirty="0"/>
                     </a:p>
@@ -9731,7 +10010,7 @@
                     <a:p>
                       <a:r>
                         <a:rPr lang="fr-FR" sz="1600" dirty="0"/>
-                        <a:t>Dirty Dancing</a:t>
+                        <a:t>"Dirty Dancing"</a:t>
                       </a:r>
                       <a:endParaRPr lang="en-US" sz="1600" dirty="0"/>
                     </a:p>
@@ -9769,7 +10048,7 @@
                       </a:pPr>
                       <a:r>
                         <a:rPr lang="fr-FR" sz="1600" dirty="0"/>
-                        <a:t>Blade Runner</a:t>
+                        <a:t>"Blade Runner"</a:t>
                       </a:r>
                       <a:endParaRPr lang="en-US" sz="1600" dirty="0"/>
                     </a:p>
@@ -9801,7 +10080,7 @@
           <p:nvPr>
             <p:extLst>
               <p:ext uri="{D42A27DB-BD31-4B8C-83A1-F6EECF244321}">
-                <p14:modId xmlns:p14="http://schemas.microsoft.com/office/powerpoint/2010/main" val="3266313943"/>
+                <p14:modId xmlns:p14="http://schemas.microsoft.com/office/powerpoint/2010/main" val="183955838"/>
               </p:ext>
             </p:extLst>
           </p:nvPr>
@@ -9831,11 +10110,16 @@
                     <a:bodyPr/>
                     <a:lstStyle/>
                     <a:p>
-                      <a:r>
-                        <a:rPr lang="fr-FR" sz="1600" dirty="0"/>
-                        <a:t>Row</a:t>
-                      </a:r>
-                      <a:endParaRPr lang="en-US" sz="1600" dirty="0"/>
+                      <a:pPr lvl="0">
+                        <a:buNone/>
+                      </a:pPr>
+                      <a:r>
+                        <a:rPr lang="fr-FR" sz="1600" b="1" i="0" u="none" strike="noStrike" noProof="0" dirty="0">
+                          <a:latin typeface="Calibri"/>
+                        </a:rPr>
+                        <a:t>RDD</a:t>
+                      </a:r>
+                      <a:endParaRPr lang="en-US" dirty="0"/>
                     </a:p>
                   </a:txBody>
                   <a:tcPr/>
@@ -10013,25 +10297,50 @@
           </a:fontRef>
         </p:style>
         <p:txBody>
-          <a:bodyPr rtlCol="0" anchor="ctr"/>
+          <a:bodyPr lIns="91440" tIns="45720" rIns="91440" bIns="45720" rtlCol="0" anchor="ctr"/>
           <a:lstStyle/>
           <a:p>
             <a:pPr algn="ctr"/>
             <a:r>
-              <a:rPr lang="fr-FR" dirty="0" err="1"/>
+              <a:rPr lang="fr-FR" b="1" dirty="0" err="1"/>
               <a:t>keyBy</a:t>
             </a:r>
             <a:r>
-              <a:rPr lang="fr-FR" dirty="0"/>
-              <a:t>(x </a:t>
-            </a:r>
-            <a:r>
-              <a:rPr lang="fr-FR" dirty="0">
+              <a:rPr lang="fr-FR" b="1" dirty="0"/>
+              <a:t>(</a:t>
+            </a:r>
+            <a:r>
+              <a:rPr lang="fr-FR" b="1" dirty="0">
+                <a:ea typeface="+mn-lt"/>
+                <a:cs typeface="+mn-lt"/>
+              </a:rPr>
+              <a:t>lambda </a:t>
+            </a:r>
+            <a:r>
+              <a:rPr lang="fr-FR" b="1" dirty="0"/>
+              <a:t>x:</a:t>
+            </a:r>
+            <a:r>
+              <a:rPr lang="fr-FR" b="1" dirty="0">
                 <a:sym typeface="Wingdings" panose="05000000000000000000" pitchFamily="2" charset="2"/>
               </a:rPr>
-              <a:t> x[‘user’])</a:t>
-            </a:r>
-            <a:endParaRPr lang="en-US" dirty="0"/>
+              <a:t> </a:t>
+            </a:r>
+            <a:endParaRPr lang="en-US" b="1" dirty="0">
+              <a:sym typeface="Wingdings" panose="05000000000000000000" pitchFamily="2" charset="2"/>
+            </a:endParaRPr>
+          </a:p>
+          <a:p>
+            <a:pPr algn="ctr"/>
+            <a:r>
+              <a:rPr lang="fr-FR" b="1" dirty="0">
+                <a:sym typeface="Wingdings" panose="05000000000000000000" pitchFamily="2" charset="2"/>
+              </a:rPr>
+              <a:t>x['user'])</a:t>
+            </a:r>
+            <a:endParaRPr lang="en-US" b="1" dirty="0">
+              <a:cs typeface="Calibri"/>
+            </a:endParaRPr>
           </a:p>
         </p:txBody>
       </p:sp>
@@ -10132,14 +10441,14 @@
           <p:nvPr>
             <p:extLst>
               <p:ext uri="{D42A27DB-BD31-4B8C-83A1-F6EECF244321}">
-                <p14:modId xmlns:p14="http://schemas.microsoft.com/office/powerpoint/2010/main" val="3585856284"/>
+                <p14:modId xmlns:p14="http://schemas.microsoft.com/office/powerpoint/2010/main" val="250746547"/>
               </p:ext>
             </p:extLst>
           </p:nvPr>
         </p:nvGraphicFramePr>
         <p:xfrm>
           <a:off x="9167069" y="3123180"/>
-          <a:ext cx="1435267" cy="1479749"/>
+          <a:ext cx="2013370" cy="1479749"/>
         </p:xfrm>
         <a:graphic>
           <a:graphicData uri="http://schemas.openxmlformats.org/drawingml/2006/table">
@@ -10148,7 +10457,7 @@
                 <a:tableStyleId>{5C22544A-7EE6-4342-B048-85BDC9FD1C3A}</a:tableStyleId>
               </a:tblPr>
               <a:tblGrid>
-                <a:gridCol w="1435267">
+                <a:gridCol w="2013370">
                   <a:extLst>
                     <a:ext uri="{9D8B030D-6E8A-4147-A177-3AD203B41FA5}">
                       <a16:colId xmlns:a16="http://schemas.microsoft.com/office/drawing/2014/main" val="2061391393"/>
@@ -10162,11 +10471,20 @@
                     <a:bodyPr/>
                     <a:lstStyle/>
                     <a:p>
-                      <a:r>
-                        <a:rPr lang="fr-FR" sz="1600" dirty="0"/>
-                        <a:t>Row</a:t>
-                      </a:r>
-                      <a:endParaRPr lang="en-US" sz="1600" dirty="0"/>
+                      <a:pPr lvl="0">
+                        <a:buNone/>
+                      </a:pPr>
+                      <a:r>
+                        <a:rPr lang="fr-FR" sz="1600" b="1" i="0" u="none" strike="noStrike" noProof="0" dirty="0">
+                          <a:latin typeface="Calibri"/>
+                        </a:rPr>
+                        <a:t>RDD </a:t>
+                      </a:r>
+                      <a:r>
+                        <a:rPr lang="fr-FR" sz="1600" b="1" i="0" u="none" strike="noStrike" noProof="0" dirty="0"/>
+                        <a:t>of (K, V) pairs</a:t>
+                      </a:r>
+                      <a:endParaRPr lang="en-US" b="1" dirty="0"/>
                     </a:p>
                   </a:txBody>
                   <a:tcPr/>
@@ -10189,7 +10507,17 @@
                       </a:r>
                       <a:r>
                         <a:rPr lang="en-US" sz="1600" dirty="0"/>
-                        <a:t>"John“, …)</a:t>
+                        <a:t>"John</a:t>
+                      </a:r>
+                      <a:r>
+                        <a:rPr lang="en-US" sz="1600" b="0" i="0" u="none" strike="noStrike" noProof="0" dirty="0">
+                          <a:latin typeface="Calibri"/>
+                        </a:rPr>
+                        <a:t>"</a:t>
+                      </a:r>
+                      <a:r>
+                        <a:rPr lang="en-US" sz="1600" dirty="0"/>
+                        <a:t>, …)</a:t>
                       </a:r>
                     </a:p>
                   </a:txBody>
@@ -10212,8 +10540,24 @@
                         <a:t>(</a:t>
                       </a:r>
                       <a:r>
+                        <a:rPr lang="en-US" sz="1600" b="0" i="0" u="none" strike="noStrike" noProof="0" dirty="0">
+                          <a:latin typeface="Calibri"/>
+                        </a:rPr>
+                        <a:t>"</a:t>
+                      </a:r>
+                      <a:r>
                         <a:rPr lang="en-US" sz="1600" dirty="0"/>
-                        <a:t>“Louise“, …)</a:t>
+                        <a:t>Louise</a:t>
+                      </a:r>
+                      <a:r>
+                        <a:rPr lang="en-US" sz="1600" b="0" i="0" u="none" strike="noStrike" noProof="0" dirty="0">
+                          <a:latin typeface="Calibri"/>
+                        </a:rPr>
+                        <a:t>"</a:t>
+                      </a:r>
+                      <a:r>
+                        <a:rPr lang="en-US" sz="1600" dirty="0"/>
+                        <a:t>, …)</a:t>
                       </a:r>
                     </a:p>
                   </a:txBody>
@@ -10236,8 +10580,24 @@
                         <a:t>(</a:t>
                       </a:r>
                       <a:r>
+                        <a:rPr lang="en-US" sz="1600" b="0" i="0" u="none" strike="noStrike" noProof="0" dirty="0">
+                          <a:latin typeface="Calibri"/>
+                        </a:rPr>
+                        <a:t>"</a:t>
+                      </a:r>
+                      <a:r>
                         <a:rPr lang="en-US" sz="1600" dirty="0"/>
-                        <a:t>“Sam“, …)</a:t>
+                        <a:t>Sam</a:t>
+                      </a:r>
+                      <a:r>
+                        <a:rPr lang="en-US" sz="1600" b="0" i="0" u="none" strike="noStrike" noProof="0" dirty="0">
+                          <a:latin typeface="Calibri"/>
+                        </a:rPr>
+                        <a:t>"</a:t>
+                      </a:r>
+                      <a:r>
+                        <a:rPr lang="en-US" sz="1600" dirty="0"/>
+                        <a:t>, …)</a:t>
                       </a:r>
                     </a:p>
                   </a:txBody>
@@ -10268,7 +10628,7 @@
           <p:nvPr>
             <p:extLst>
               <p:ext uri="{D42A27DB-BD31-4B8C-83A1-F6EECF244321}">
-                <p14:modId xmlns:p14="http://schemas.microsoft.com/office/powerpoint/2010/main" val="1401191290"/>
+                <p14:modId xmlns:p14="http://schemas.microsoft.com/office/powerpoint/2010/main" val="1650043729"/>
               </p:ext>
             </p:extLst>
           </p:nvPr>
@@ -10298,11 +10658,16 @@
                     <a:bodyPr/>
                     <a:lstStyle/>
                     <a:p>
-                      <a:r>
-                        <a:rPr lang="fr-FR" sz="1600" dirty="0"/>
-                        <a:t>Row</a:t>
-                      </a:r>
-                      <a:endParaRPr lang="en-US" sz="1600" dirty="0"/>
+                      <a:pPr lvl="0">
+                        <a:buNone/>
+                      </a:pPr>
+                      <a:r>
+                        <a:rPr lang="fr-FR" sz="1600" b="1" i="0" u="none" strike="noStrike" noProof="0" dirty="0">
+                          <a:latin typeface="Calibri"/>
+                        </a:rPr>
+                        <a:t>RDD</a:t>
+                      </a:r>
+                      <a:endParaRPr lang="en-US" dirty="0"/>
                     </a:p>
                   </a:txBody>
                   <a:tcPr/>
@@ -10414,7 +10779,17 @@
                       </a:r>
                       <a:r>
                         <a:rPr lang="en-US" sz="1600" dirty="0" err="1"/>
-                        <a:t>user":“Sam</a:t>
+                        <a:t>user":</a:t>
+                      </a:r>
+                      <a:r>
+                        <a:rPr lang="en-US" sz="1600" b="0" i="0" u="none" strike="noStrike" noProof="0" dirty="0" err="1">
+                          <a:latin typeface="Calibri"/>
+                        </a:rPr>
+                        <a:t>"</a:t>
+                      </a:r>
+                      <a:r>
+                        <a:rPr lang="en-US" sz="1600" dirty="0" err="1"/>
+                        <a:t>Sam</a:t>
                       </a:r>
                       <a:r>
                         <a:rPr lang="en-US" sz="1600" dirty="0"/>
@@ -10422,7 +10797,17 @@
                       </a:r>
                       <a:r>
                         <a:rPr lang="en-US" sz="1600" dirty="0" err="1"/>
-                        <a:t>movie":“Blade</a:t>
+                        <a:t>movie":</a:t>
+                      </a:r>
+                      <a:r>
+                        <a:rPr lang="en-US" sz="1600" b="0" i="0" u="none" strike="noStrike" noProof="0" dirty="0" err="1">
+                          <a:latin typeface="Calibri"/>
+                        </a:rPr>
+                        <a:t>"</a:t>
+                      </a:r>
+                      <a:r>
+                        <a:rPr lang="en-US" sz="1600" dirty="0" err="1"/>
+                        <a:t>Blade</a:t>
                       </a:r>
                       <a:r>
                         <a:rPr lang="en-US" sz="1600" dirty="0"/>
@@ -10480,37 +10865,50 @@
           </a:fontRef>
         </p:style>
         <p:txBody>
-          <a:bodyPr rtlCol="0" anchor="ctr"/>
+          <a:bodyPr lIns="91440" tIns="45720" rIns="91440" bIns="45720" rtlCol="0" anchor="ctr"/>
           <a:lstStyle/>
           <a:p>
             <a:pPr algn="ctr"/>
             <a:r>
-              <a:rPr lang="fr-FR" dirty="0" err="1"/>
+              <a:rPr lang="fr-FR" b="1" dirty="0" err="1"/>
               <a:t>mapValues</a:t>
             </a:r>
             <a:r>
-              <a:rPr lang="fr-FR" dirty="0"/>
-              <a:t>(x </a:t>
-            </a:r>
-            <a:r>
-              <a:rPr lang="fr-FR" dirty="0">
-                <a:sym typeface="Wingdings" panose="05000000000000000000" pitchFamily="2" charset="2"/>
+              <a:rPr lang="fr-FR" b="1" dirty="0"/>
+              <a:t>(</a:t>
+            </a:r>
+            <a:r>
+              <a:rPr lang="fr-FR" b="1" dirty="0">
+                <a:ea typeface="+mn-lt"/>
+                <a:cs typeface="+mn-lt"/>
               </a:rPr>
-              <a:t> </a:t>
-            </a:r>
-            <a:r>
-              <a:rPr lang="fr-FR" dirty="0" err="1">
+              <a:t>lambda </a:t>
+            </a:r>
+            <a:r>
+              <a:rPr lang="fr-FR" b="1" dirty="0"/>
+              <a:t>x:</a:t>
+            </a:r>
+            <a:endParaRPr lang="en-US" b="1" dirty="0">
+              <a:sym typeface="Wingdings" panose="05000000000000000000" pitchFamily="2" charset="2"/>
+            </a:endParaRPr>
+          </a:p>
+          <a:p>
+            <a:pPr algn="ctr"/>
+            <a:r>
+              <a:rPr lang="fr-FR" b="1" dirty="0" err="1">
                 <a:sym typeface="Wingdings" panose="05000000000000000000" pitchFamily="2" charset="2"/>
               </a:rPr>
               <a:t>len</a:t>
             </a:r>
             <a:r>
-              <a:rPr lang="fr-FR" dirty="0">
+              <a:rPr lang="fr-FR" b="1" dirty="0">
                 <a:sym typeface="Wingdings" panose="05000000000000000000" pitchFamily="2" charset="2"/>
               </a:rPr>
               <a:t>(x[1]))</a:t>
             </a:r>
-            <a:endParaRPr lang="en-US" dirty="0"/>
+            <a:endParaRPr lang="en-US" b="1" dirty="0">
+              <a:cs typeface="Calibri"/>
+            </a:endParaRPr>
           </a:p>
         </p:txBody>
       </p:sp>
@@ -10611,14 +11009,14 @@
           <p:nvPr>
             <p:extLst>
               <p:ext uri="{D42A27DB-BD31-4B8C-83A1-F6EECF244321}">
-                <p14:modId xmlns:p14="http://schemas.microsoft.com/office/powerpoint/2010/main" val="735603161"/>
+                <p14:modId xmlns:p14="http://schemas.microsoft.com/office/powerpoint/2010/main" val="4024594632"/>
               </p:ext>
             </p:extLst>
           </p:nvPr>
         </p:nvGraphicFramePr>
         <p:xfrm>
           <a:off x="9167069" y="4905942"/>
-          <a:ext cx="1435267" cy="1479749"/>
+          <a:ext cx="2013370" cy="1479749"/>
         </p:xfrm>
         <a:graphic>
           <a:graphicData uri="http://schemas.openxmlformats.org/drawingml/2006/table">
@@ -10627,7 +11025,7 @@
                 <a:tableStyleId>{5C22544A-7EE6-4342-B048-85BDC9FD1C3A}</a:tableStyleId>
               </a:tblPr>
               <a:tblGrid>
-                <a:gridCol w="1435267">
+                <a:gridCol w="2013370">
                   <a:extLst>
                     <a:ext uri="{9D8B030D-6E8A-4147-A177-3AD203B41FA5}">
                       <a16:colId xmlns:a16="http://schemas.microsoft.com/office/drawing/2014/main" val="2061391393"/>
@@ -10641,11 +11039,20 @@
                     <a:bodyPr/>
                     <a:lstStyle/>
                     <a:p>
-                      <a:r>
-                        <a:rPr lang="fr-FR" sz="1600" dirty="0"/>
-                        <a:t>Row</a:t>
-                      </a:r>
-                      <a:endParaRPr lang="en-US" sz="1600" dirty="0"/>
+                      <a:pPr lvl="0">
+                        <a:buNone/>
+                      </a:pPr>
+                      <a:r>
+                        <a:rPr lang="fr-FR" sz="1600" b="1" i="0" u="none" strike="noStrike" noProof="0" dirty="0">
+                          <a:latin typeface="Calibri"/>
+                        </a:rPr>
+                        <a:t>RDD </a:t>
+                      </a:r>
+                      <a:r>
+                        <a:rPr lang="fr-FR" sz="1600" b="1" i="0" u="none" strike="noStrike" noProof="0" dirty="0"/>
+                        <a:t> of (K, V) pairs</a:t>
+                      </a:r>
+                      <a:endParaRPr lang="en-US" dirty="0"/>
                     </a:p>
                   </a:txBody>
                   <a:tcPr/>
@@ -10668,7 +11075,17 @@
                       </a:r>
                       <a:r>
                         <a:rPr lang="en-US" sz="1600" dirty="0"/>
-                        <a:t>"John“, 12)</a:t>
+                        <a:t>"John</a:t>
+                      </a:r>
+                      <a:r>
+                        <a:rPr lang="en-US" sz="1600" b="0" i="0" u="none" strike="noStrike" noProof="0" dirty="0">
+                          <a:latin typeface="Calibri"/>
+                        </a:rPr>
+                        <a:t>"</a:t>
+                      </a:r>
+                      <a:r>
+                        <a:rPr lang="en-US" sz="1600" dirty="0"/>
+                        <a:t>, 12)</a:t>
                       </a:r>
                     </a:p>
                   </a:txBody>
@@ -10691,8 +11108,24 @@
                         <a:t>(</a:t>
                       </a:r>
                       <a:r>
+                        <a:rPr lang="en-US" sz="1600" b="0" i="0" u="none" strike="noStrike" noProof="0" dirty="0">
+                          <a:latin typeface="Calibri"/>
+                        </a:rPr>
+                        <a:t>"</a:t>
+                      </a:r>
+                      <a:r>
                         <a:rPr lang="en-US" sz="1600" dirty="0"/>
-                        <a:t>“Louise“, 13)</a:t>
+                        <a:t>Louise</a:t>
+                      </a:r>
+                      <a:r>
+                        <a:rPr lang="en-US" sz="1600" b="0" i="0" u="none" strike="noStrike" noProof="0" dirty="0">
+                          <a:latin typeface="Calibri"/>
+                        </a:rPr>
+                        <a:t>"</a:t>
+                      </a:r>
+                      <a:r>
+                        <a:rPr lang="en-US" sz="1600" dirty="0"/>
+                        <a:t>, 13)</a:t>
                       </a:r>
                     </a:p>
                   </a:txBody>
@@ -10715,8 +11148,24 @@
                         <a:t>(</a:t>
                       </a:r>
                       <a:r>
+                        <a:rPr lang="en-US" sz="1600" b="0" i="0" u="none" strike="noStrike" noProof="0" dirty="0">
+                          <a:latin typeface="Calibri"/>
+                        </a:rPr>
+                        <a:t>"</a:t>
+                      </a:r>
+                      <a:r>
                         <a:rPr lang="en-US" sz="1600" dirty="0"/>
-                        <a:t>“Sam“, 12)</a:t>
+                        <a:t>Sam</a:t>
+                      </a:r>
+                      <a:r>
+                        <a:rPr lang="en-US" sz="1600" b="0" i="0" u="none" strike="noStrike" noProof="0" dirty="0">
+                          <a:latin typeface="Calibri"/>
+                        </a:rPr>
+                        <a:t>"</a:t>
+                      </a:r>
+                      <a:r>
+                        <a:rPr lang="en-US" sz="1600" dirty="0"/>
+                        <a:t>, 12)</a:t>
                       </a:r>
                     </a:p>
                   </a:txBody>
@@ -10747,7 +11196,7 @@
           <p:nvPr>
             <p:extLst>
               <p:ext uri="{D42A27DB-BD31-4B8C-83A1-F6EECF244321}">
-                <p14:modId xmlns:p14="http://schemas.microsoft.com/office/powerpoint/2010/main" val="3029869776"/>
+                <p14:modId xmlns:p14="http://schemas.microsoft.com/office/powerpoint/2010/main" val="4084348548"/>
               </p:ext>
             </p:extLst>
           </p:nvPr>
@@ -10777,11 +11226,20 @@
                     <a:bodyPr/>
                     <a:lstStyle/>
                     <a:p>
-                      <a:r>
-                        <a:rPr lang="fr-FR" sz="1600" dirty="0"/>
-                        <a:t>Row</a:t>
-                      </a:r>
-                      <a:endParaRPr lang="en-US" sz="1600" dirty="0"/>
+                      <a:pPr lvl="0">
+                        <a:buNone/>
+                      </a:pPr>
+                      <a:r>
+                        <a:rPr lang="fr-FR" sz="1600" b="1" i="0" u="none" strike="noStrike" noProof="0" dirty="0">
+                          <a:latin typeface="Calibri"/>
+                        </a:rPr>
+                        <a:t>RDD </a:t>
+                      </a:r>
+                      <a:r>
+                        <a:rPr lang="fr-FR" sz="1600" b="1" i="0" u="none" strike="noStrike" noProof="0" dirty="0"/>
+                        <a:t>of (K, V) pairs</a:t>
+                      </a:r>
+                      <a:endParaRPr lang="en-US" dirty="0"/>
                     </a:p>
                   </a:txBody>
                   <a:tcPr/>
@@ -10820,7 +11278,17 @@
                     <a:p>
                       <a:r>
                         <a:rPr lang="en-US" sz="1600" dirty="0"/>
-                        <a:t>("Louise“, "Dirty dancing")</a:t>
+                        <a:t>("Louise</a:t>
+                      </a:r>
+                      <a:r>
+                        <a:rPr lang="en-US" sz="1600" b="0" i="0" u="none" strike="noStrike" noProof="0" dirty="0">
+                          <a:latin typeface="Calibri"/>
+                        </a:rPr>
+                        <a:t>"</a:t>
+                      </a:r>
+                      <a:r>
+                        <a:rPr lang="en-US" sz="1600" dirty="0"/>
+                        <a:t>, "Dirty dancing")</a:t>
                       </a:r>
                     </a:p>
                   </a:txBody>
@@ -10838,7 +11306,7 @@
                     <a:bodyPr/>
                     <a:lstStyle/>
                     <a:p>
-                      <a:pPr marL="0" marR="0" lvl="0" indent="0" algn="l" defTabSz="914400" rtl="0" eaLnBrk="1" fontAlgn="auto" latinLnBrk="0" hangingPunct="1">
+                      <a:pPr marL="0" marR="0" lvl="0" indent="0" algn="l" rtl="0" eaLnBrk="1" fontAlgn="auto" latinLnBrk="0" hangingPunct="1">
                         <a:lnSpc>
                           <a:spcPct val="100000"/>
                         </a:lnSpc>
@@ -10852,12 +11320,40 @@
                         <a:buSzTx/>
                         <a:buFontTx/>
                         <a:buNone/>
-                        <a:tabLst/>
-                        <a:defRPr/>
                       </a:pPr>
                       <a:r>
                         <a:rPr lang="en-US" sz="1600" dirty="0"/>
-                        <a:t>(“Sam“, “Blade Runner")</a:t>
+                        <a:t>(</a:t>
+                      </a:r>
+                      <a:r>
+                        <a:rPr lang="en-US" sz="1600" b="0" i="0" u="none" strike="noStrike" noProof="0" dirty="0">
+                          <a:latin typeface="Calibri"/>
+                        </a:rPr>
+                        <a:t>"</a:t>
+                      </a:r>
+                      <a:r>
+                        <a:rPr lang="en-US" sz="1600" dirty="0"/>
+                        <a:t>Sam</a:t>
+                      </a:r>
+                      <a:r>
+                        <a:rPr lang="en-US" sz="1600" b="0" i="0" u="none" strike="noStrike" noProof="0" dirty="0">
+                          <a:latin typeface="Calibri"/>
+                        </a:rPr>
+                        <a:t>",</a:t>
+                      </a:r>
+                      <a:r>
+                        <a:rPr lang="en-US" sz="1600" dirty="0"/>
+                        <a:t> </a:t>
+                      </a:r>
+                      <a:r>
+                        <a:rPr lang="en-US" sz="1600" b="0" i="0" u="none" strike="noStrike" noProof="0" dirty="0">
+                          <a:latin typeface="Calibri"/>
+                        </a:rPr>
+                        <a:t>"</a:t>
+                      </a:r>
+                      <a:r>
+                        <a:rPr lang="en-US" sz="1600" dirty="0"/>
+                        <a:t>Blade Runner")</a:t>
                       </a:r>
                     </a:p>
                   </a:txBody>
@@ -10873,6 +11369,42 @@
           </a:graphicData>
         </a:graphic>
       </p:graphicFrame>
+      <p:sp>
+        <p:nvSpPr>
+          <p:cNvPr id="7" name="Title 1">
+            <a:extLst>
+              <a:ext uri="{FF2B5EF4-FFF2-40B4-BE49-F238E27FC236}">
+                <a16:creationId xmlns:a16="http://schemas.microsoft.com/office/drawing/2014/main" id="{7F20ABE9-AD04-FAC3-35CC-8A9633386589}"/>
+              </a:ext>
+            </a:extLst>
+          </p:cNvPr>
+          <p:cNvSpPr>
+            <a:spLocks noGrp="1"/>
+          </p:cNvSpPr>
+          <p:nvPr>
+            <p:ph type="title"/>
+          </p:nvPr>
+        </p:nvSpPr>
+        <p:spPr>
+          <a:xfrm>
+            <a:off x="838200" y="365125"/>
+            <a:ext cx="10515600" cy="1325563"/>
+          </a:xfrm>
+        </p:spPr>
+        <p:txBody>
+          <a:bodyPr/>
+          <a:lstStyle/>
+          <a:p>
+            <a:r>
+              <a:rPr lang="fr-FR" dirty="0">
+                <a:ea typeface="+mj-lt"/>
+                <a:cs typeface="+mj-lt"/>
+              </a:rPr>
+              <a:t>RDD API - Transformations</a:t>
+            </a:r>
+          </a:p>
+        </p:txBody>
+      </p:sp>
     </p:spTree>
     <p:extLst>
       <p:ext uri="{BB962C8B-B14F-4D97-AF65-F5344CB8AC3E}">

</xml_diff>

<commit_message>
[Module 4] Update the slides of TD1 (#34)
</commit_message>
<xml_diff>
--- a/module4/td1/td1-spark-rdd.pptx
+++ b/module4/td1/td1-spark-rdd.pptx
@@ -127,6 +127,14 @@
 </p:presentation>
 </file>
 
+<file path=ppt/revisionInfo.xml><?xml version="1.0" encoding="utf-8"?>
+<p1510:revInfo xmlns:a="http://schemas.openxmlformats.org/drawingml/2006/main" xmlns:r="http://schemas.openxmlformats.org/officeDocument/2006/relationships" xmlns:p1510="http://schemas.microsoft.com/office/powerpoint/2015/10/main">
+  <p1510:revLst>
+    <p1510:client id="{1537914A-0B49-494C-7AAE-13EE3912A367}" v="559" dt="2022-12-09T08:40:36.219"/>
+  </p1510:revLst>
+</p1510:revInfo>
+</file>
+
 <file path=ppt/notesMasters/notesMaster1.xml><?xml version="1.0" encoding="utf-8"?>
 <p:notesMaster xmlns:a="http://schemas.openxmlformats.org/drawingml/2006/main" xmlns:r="http://schemas.openxmlformats.org/officeDocument/2006/relationships" xmlns:p="http://schemas.openxmlformats.org/presentationml/2006/main">
   <p:cSld>
@@ -209,7 +217,7 @@
           <a:p>
             <a:fld id="{029E00FF-157E-4E67-8269-A10CC622D7A6}" type="datetimeFigureOut">
               <a:rPr lang="fr-FR" smtClean="0"/>
-              <a:t>14/01/2022</a:t>
+              <a:t>14/12/2022</a:t>
             </a:fld>
             <a:endParaRPr lang="fr-FR"/>
           </a:p>
@@ -367,7 +375,7 @@
           <a:p>
             <a:fld id="{32DDDBA6-C58A-4FE7-89EE-251EB0240D98}" type="slidenum">
               <a:rPr lang="fr-FR" smtClean="0"/>
-              <a:t>‹N°›</a:t>
+              <a:t>‹#›</a:t>
             </a:fld>
             <a:endParaRPr lang="fr-FR"/>
           </a:p>
@@ -1211,7 +1219,7 @@
           <a:p>
             <a:fld id="{97D5A493-CCC9-418E-861C-802A9D3B9980}" type="datetimeFigureOut">
               <a:rPr lang="en-US" smtClean="0"/>
-              <a:t>1/14/2022</a:t>
+              <a:t>12/14/2022</a:t>
             </a:fld>
             <a:endParaRPr lang="en-US"/>
           </a:p>
@@ -1265,7 +1273,7 @@
           <a:p>
             <a:fld id="{EAF0293D-07D2-48DC-BE8F-8E4761C07219}" type="slidenum">
               <a:rPr lang="en-US" smtClean="0"/>
-              <a:t>‹N°›</a:t>
+              <a:t>‹#›</a:t>
             </a:fld>
             <a:endParaRPr lang="en-US"/>
           </a:p>
@@ -1409,7 +1417,7 @@
           <a:p>
             <a:fld id="{97D5A493-CCC9-418E-861C-802A9D3B9980}" type="datetimeFigureOut">
               <a:rPr lang="en-US" smtClean="0"/>
-              <a:t>1/14/2022</a:t>
+              <a:t>12/14/2022</a:t>
             </a:fld>
             <a:endParaRPr lang="en-US"/>
           </a:p>
@@ -1463,7 +1471,7 @@
           <a:p>
             <a:fld id="{EAF0293D-07D2-48DC-BE8F-8E4761C07219}" type="slidenum">
               <a:rPr lang="en-US" smtClean="0"/>
-              <a:t>‹N°›</a:t>
+              <a:t>‹#›</a:t>
             </a:fld>
             <a:endParaRPr lang="en-US"/>
           </a:p>
@@ -1617,7 +1625,7 @@
           <a:p>
             <a:fld id="{97D5A493-CCC9-418E-861C-802A9D3B9980}" type="datetimeFigureOut">
               <a:rPr lang="en-US" smtClean="0"/>
-              <a:t>1/14/2022</a:t>
+              <a:t>12/14/2022</a:t>
             </a:fld>
             <a:endParaRPr lang="en-US"/>
           </a:p>
@@ -1671,7 +1679,7 @@
           <a:p>
             <a:fld id="{EAF0293D-07D2-48DC-BE8F-8E4761C07219}" type="slidenum">
               <a:rPr lang="en-US" smtClean="0"/>
-              <a:t>‹N°›</a:t>
+              <a:t>‹#›</a:t>
             </a:fld>
             <a:endParaRPr lang="en-US"/>
           </a:p>
@@ -1815,7 +1823,7 @@
           <a:p>
             <a:fld id="{97D5A493-CCC9-418E-861C-802A9D3B9980}" type="datetimeFigureOut">
               <a:rPr lang="en-US" smtClean="0"/>
-              <a:t>1/14/2022</a:t>
+              <a:t>12/14/2022</a:t>
             </a:fld>
             <a:endParaRPr lang="en-US"/>
           </a:p>
@@ -1869,7 +1877,7 @@
           <a:p>
             <a:fld id="{EAF0293D-07D2-48DC-BE8F-8E4761C07219}" type="slidenum">
               <a:rPr lang="en-US" smtClean="0"/>
-              <a:t>‹N°›</a:t>
+              <a:t>‹#›</a:t>
             </a:fld>
             <a:endParaRPr lang="en-US"/>
           </a:p>
@@ -2090,7 +2098,7 @@
           <a:p>
             <a:fld id="{97D5A493-CCC9-418E-861C-802A9D3B9980}" type="datetimeFigureOut">
               <a:rPr lang="en-US" smtClean="0"/>
-              <a:t>1/14/2022</a:t>
+              <a:t>12/14/2022</a:t>
             </a:fld>
             <a:endParaRPr lang="en-US"/>
           </a:p>
@@ -2144,7 +2152,7 @@
           <a:p>
             <a:fld id="{EAF0293D-07D2-48DC-BE8F-8E4761C07219}" type="slidenum">
               <a:rPr lang="en-US" smtClean="0"/>
-              <a:t>‹N°›</a:t>
+              <a:t>‹#›</a:t>
             </a:fld>
             <a:endParaRPr lang="en-US"/>
           </a:p>
@@ -2355,7 +2363,7 @@
           <a:p>
             <a:fld id="{97D5A493-CCC9-418E-861C-802A9D3B9980}" type="datetimeFigureOut">
               <a:rPr lang="en-US" smtClean="0"/>
-              <a:t>1/14/2022</a:t>
+              <a:t>12/14/2022</a:t>
             </a:fld>
             <a:endParaRPr lang="en-US"/>
           </a:p>
@@ -2409,7 +2417,7 @@
           <a:p>
             <a:fld id="{EAF0293D-07D2-48DC-BE8F-8E4761C07219}" type="slidenum">
               <a:rPr lang="en-US" smtClean="0"/>
-              <a:t>‹N°›</a:t>
+              <a:t>‹#›</a:t>
             </a:fld>
             <a:endParaRPr lang="en-US"/>
           </a:p>
@@ -2767,7 +2775,7 @@
           <a:p>
             <a:fld id="{97D5A493-CCC9-418E-861C-802A9D3B9980}" type="datetimeFigureOut">
               <a:rPr lang="en-US" smtClean="0"/>
-              <a:t>1/14/2022</a:t>
+              <a:t>12/14/2022</a:t>
             </a:fld>
             <a:endParaRPr lang="en-US"/>
           </a:p>
@@ -2821,7 +2829,7 @@
           <a:p>
             <a:fld id="{EAF0293D-07D2-48DC-BE8F-8E4761C07219}" type="slidenum">
               <a:rPr lang="en-US" smtClean="0"/>
-              <a:t>‹N°›</a:t>
+              <a:t>‹#›</a:t>
             </a:fld>
             <a:endParaRPr lang="en-US"/>
           </a:p>
@@ -2908,7 +2916,7 @@
           <a:p>
             <a:fld id="{97D5A493-CCC9-418E-861C-802A9D3B9980}" type="datetimeFigureOut">
               <a:rPr lang="en-US" smtClean="0"/>
-              <a:t>1/14/2022</a:t>
+              <a:t>12/14/2022</a:t>
             </a:fld>
             <a:endParaRPr lang="en-US"/>
           </a:p>
@@ -2962,7 +2970,7 @@
           <a:p>
             <a:fld id="{EAF0293D-07D2-48DC-BE8F-8E4761C07219}" type="slidenum">
               <a:rPr lang="en-US" smtClean="0"/>
-              <a:t>‹N°›</a:t>
+              <a:t>‹#›</a:t>
             </a:fld>
             <a:endParaRPr lang="en-US"/>
           </a:p>
@@ -3021,7 +3029,7 @@
           <a:p>
             <a:fld id="{97D5A493-CCC9-418E-861C-802A9D3B9980}" type="datetimeFigureOut">
               <a:rPr lang="en-US" smtClean="0"/>
-              <a:t>1/14/2022</a:t>
+              <a:t>12/14/2022</a:t>
             </a:fld>
             <a:endParaRPr lang="en-US"/>
           </a:p>
@@ -3075,7 +3083,7 @@
           <a:p>
             <a:fld id="{EAF0293D-07D2-48DC-BE8F-8E4761C07219}" type="slidenum">
               <a:rPr lang="en-US" smtClean="0"/>
-              <a:t>‹N°›</a:t>
+              <a:t>‹#›</a:t>
             </a:fld>
             <a:endParaRPr lang="en-US"/>
           </a:p>
@@ -3332,7 +3340,7 @@
           <a:p>
             <a:fld id="{97D5A493-CCC9-418E-861C-802A9D3B9980}" type="datetimeFigureOut">
               <a:rPr lang="en-US" smtClean="0"/>
-              <a:t>1/14/2022</a:t>
+              <a:t>12/14/2022</a:t>
             </a:fld>
             <a:endParaRPr lang="en-US"/>
           </a:p>
@@ -3386,7 +3394,7 @@
           <a:p>
             <a:fld id="{EAF0293D-07D2-48DC-BE8F-8E4761C07219}" type="slidenum">
               <a:rPr lang="en-US" smtClean="0"/>
-              <a:t>‹N°›</a:t>
+              <a:t>‹#›</a:t>
             </a:fld>
             <a:endParaRPr lang="en-US"/>
           </a:p>
@@ -3620,7 +3628,7 @@
           <a:p>
             <a:fld id="{97D5A493-CCC9-418E-861C-802A9D3B9980}" type="datetimeFigureOut">
               <a:rPr lang="en-US" smtClean="0"/>
-              <a:t>1/14/2022</a:t>
+              <a:t>12/14/2022</a:t>
             </a:fld>
             <a:endParaRPr lang="en-US"/>
           </a:p>
@@ -3674,7 +3682,7 @@
           <a:p>
             <a:fld id="{EAF0293D-07D2-48DC-BE8F-8E4761C07219}" type="slidenum">
               <a:rPr lang="en-US" smtClean="0"/>
-              <a:t>‹N°›</a:t>
+              <a:t>‹#›</a:t>
             </a:fld>
             <a:endParaRPr lang="en-US"/>
           </a:p>
@@ -3861,7 +3869,7 @@
           <a:p>
             <a:fld id="{97D5A493-CCC9-418E-861C-802A9D3B9980}" type="datetimeFigureOut">
               <a:rPr lang="en-US" smtClean="0"/>
-              <a:t>1/14/2022</a:t>
+              <a:t>12/14/2022</a:t>
             </a:fld>
             <a:endParaRPr lang="en-US"/>
           </a:p>
@@ -3951,7 +3959,7 @@
           <a:p>
             <a:fld id="{EAF0293D-07D2-48DC-BE8F-8E4761C07219}" type="slidenum">
               <a:rPr lang="en-US" smtClean="0"/>
-              <a:t>‹N°›</a:t>
+              <a:t>‹#›</a:t>
             </a:fld>
             <a:endParaRPr lang="en-US"/>
           </a:p>
@@ -4385,10 +4393,12 @@
           <a:lstStyle/>
           <a:p>
             <a:r>
-              <a:rPr lang="fr-FR" dirty="0"/>
-              <a:t>RDD API</a:t>
-            </a:r>
-            <a:endParaRPr lang="en-US" dirty="0"/>
+              <a:rPr lang="fr-FR" dirty="0">
+                <a:ea typeface="+mj-lt"/>
+                <a:cs typeface="+mj-lt"/>
+              </a:rPr>
+              <a:t>RDD API - Transformations</a:t>
+            </a:r>
           </a:p>
         </p:txBody>
       </p:sp>
@@ -4430,25 +4440,44 @@
           </a:fontRef>
         </p:style>
         <p:txBody>
-          <a:bodyPr rtlCol="0" anchor="ctr"/>
+          <a:bodyPr lIns="91440" tIns="45720" rIns="91440" bIns="45720" rtlCol="0" anchor="ctr"/>
           <a:lstStyle/>
           <a:p>
             <a:pPr algn="ctr"/>
             <a:r>
-              <a:rPr lang="fr-FR" dirty="0" err="1"/>
+              <a:rPr lang="fr-FR" b="1" dirty="0" err="1"/>
               <a:t>flatmap</a:t>
             </a:r>
             <a:r>
-              <a:rPr lang="fr-FR" dirty="0"/>
-              <a:t>(x </a:t>
-            </a:r>
-            <a:r>
-              <a:rPr lang="fr-FR" dirty="0">
+              <a:rPr lang="fr-FR" b="1" dirty="0"/>
+              <a:t>(</a:t>
+            </a:r>
+            <a:r>
+              <a:rPr lang="fr-FR" b="1" dirty="0">
+                <a:ea typeface="+mn-lt"/>
+                <a:cs typeface="+mn-lt"/>
+              </a:rPr>
+              <a:t>lambda x:</a:t>
+            </a:r>
+            <a:r>
+              <a:rPr lang="fr-FR" b="1" dirty="0"/>
+              <a:t> </a:t>
+            </a:r>
+            <a:endParaRPr lang="en-US" b="1" dirty="0">
+              <a:cs typeface="Calibri"/>
+            </a:endParaRPr>
+          </a:p>
+          <a:p>
+            <a:pPr algn="ctr"/>
+            <a:r>
+              <a:rPr lang="fr-FR" b="1" dirty="0">
                 <a:sym typeface="Wingdings" panose="05000000000000000000" pitchFamily="2" charset="2"/>
               </a:rPr>
-              <a:t> x[‘genres’].split(‘;’))</a:t>
-            </a:r>
-            <a:endParaRPr lang="en-US" dirty="0"/>
+              <a:t>x[‘genres’].split(';'))</a:t>
+            </a:r>
+            <a:endParaRPr lang="en-US" b="1" dirty="0">
+              <a:cs typeface="Calibri" panose="020F0502020204030204"/>
+            </a:endParaRPr>
           </a:p>
         </p:txBody>
       </p:sp>
@@ -4549,7 +4578,7 @@
           <p:nvPr>
             <p:extLst>
               <p:ext uri="{D42A27DB-BD31-4B8C-83A1-F6EECF244321}">
-                <p14:modId xmlns:p14="http://schemas.microsoft.com/office/powerpoint/2010/main" val="3247897374"/>
+                <p14:modId xmlns:p14="http://schemas.microsoft.com/office/powerpoint/2010/main" val="103659150"/>
               </p:ext>
             </p:extLst>
           </p:nvPr>
@@ -4579,11 +4608,16 @@
                     <a:bodyPr/>
                     <a:lstStyle/>
                     <a:p>
-                      <a:r>
-                        <a:rPr lang="fr-FR" sz="1600" dirty="0"/>
-                        <a:t>Row</a:t>
-                      </a:r>
-                      <a:endParaRPr lang="en-US" sz="1600" dirty="0"/>
+                      <a:pPr lvl="0">
+                        <a:buNone/>
+                      </a:pPr>
+                      <a:r>
+                        <a:rPr lang="fr-FR" sz="1600" b="1" i="0" u="none" strike="noStrike" noProof="0" dirty="0">
+                          <a:latin typeface="Calibri"/>
+                        </a:rPr>
+                        <a:t>RDD</a:t>
+                      </a:r>
+                      <a:endParaRPr lang="en-US" dirty="0"/>
                     </a:p>
                   </a:txBody>
                   <a:tcPr/>
@@ -4602,7 +4636,7 @@
                     <a:p>
                       <a:r>
                         <a:rPr lang="fr-FR" sz="1600" dirty="0"/>
-                        <a:t>cyberpunk</a:t>
+                        <a:t>"cyberpunk"</a:t>
                       </a:r>
                       <a:endParaRPr lang="en-US" sz="1600" dirty="0"/>
                     </a:p>
@@ -4621,9 +4655,24 @@
                     <a:bodyPr/>
                     <a:lstStyle/>
                     <a:p>
+                      <a:pPr lvl="0">
+                        <a:buNone/>
+                      </a:pPr>
+                      <a:r>
+                        <a:rPr lang="fr-FR" sz="1600" b="0" i="0" u="none" strike="noStrike" noProof="0" dirty="0">
+                          <a:latin typeface="Calibri"/>
+                        </a:rPr>
+                        <a:t>"</a:t>
+                      </a:r>
                       <a:r>
                         <a:rPr lang="fr-FR" sz="1600" dirty="0" err="1"/>
                         <a:t>scifi</a:t>
+                      </a:r>
+                      <a:r>
+                        <a:rPr lang="fr-FR" sz="1600" b="0" i="0" u="none" strike="noStrike" noProof="0" dirty="0">
+                          <a:latin typeface="Calibri"/>
+                        </a:rPr>
+                        <a:t>"</a:t>
                       </a:r>
                       <a:endParaRPr lang="en-US" sz="1600" dirty="0"/>
                     </a:p>
@@ -4642,7 +4691,7 @@
                     <a:bodyPr/>
                     <a:lstStyle/>
                     <a:p>
-                      <a:pPr marL="0" marR="0" lvl="0" indent="0" algn="l" defTabSz="914400" rtl="0" eaLnBrk="1" fontAlgn="auto" latinLnBrk="0" hangingPunct="1">
+                      <a:pPr marL="0" marR="0" lvl="0" indent="0" algn="l" defTabSz="914400">
                         <a:lnSpc>
                           <a:spcPct val="100000"/>
                         </a:lnSpc>
@@ -4652,16 +4701,25 @@
                         <a:spcAft>
                           <a:spcPts val="0"/>
                         </a:spcAft>
-                        <a:buClrTx/>
-                        <a:buSzTx/>
-                        <a:buFontTx/>
                         <a:buNone/>
                         <a:tabLst/>
                         <a:defRPr/>
                       </a:pPr>
                       <a:r>
+                        <a:rPr lang="fr-FR" sz="1600" b="0" i="0" u="none" strike="noStrike" noProof="0" dirty="0">
+                          <a:latin typeface="Calibri"/>
+                        </a:rPr>
+                        <a:t>"</a:t>
+                      </a:r>
+                      <a:r>
                         <a:rPr lang="fr-FR" sz="1600" dirty="0"/>
                         <a:t>action</a:t>
+                      </a:r>
+                      <a:r>
+                        <a:rPr lang="fr-FR" sz="1600" b="0" i="0" u="none" strike="noStrike" noProof="0" dirty="0">
+                          <a:latin typeface="Calibri"/>
+                        </a:rPr>
+                        <a:t>"</a:t>
                       </a:r>
                       <a:endParaRPr lang="en-US" sz="1600" dirty="0"/>
                     </a:p>
@@ -4701,6 +4759,12 @@
                         <a:rPr lang="fr-FR" sz="1600" dirty="0"/>
                         <a:t>music</a:t>
                       </a:r>
+                      <a:r>
+                        <a:rPr lang="fr-FR" sz="1600" b="0" i="0" u="none" strike="noStrike" noProof="0" dirty="0">
+                          <a:latin typeface="Calibri"/>
+                        </a:rPr>
+                        <a:t>"</a:t>
+                      </a:r>
                       <a:endParaRPr lang="en-US" sz="1600" dirty="0"/>
                     </a:p>
                   </a:txBody>
@@ -4718,7 +4782,7 @@
                     <a:bodyPr/>
                     <a:lstStyle/>
                     <a:p>
-                      <a:pPr marL="0" marR="0" lvl="0" indent="0" algn="l" defTabSz="914400" rtl="0" eaLnBrk="1" fontAlgn="auto" latinLnBrk="0" hangingPunct="1">
+                      <a:pPr marL="0" marR="0" lvl="0" indent="0" algn="l" defTabSz="914400">
                         <a:lnSpc>
                           <a:spcPct val="100000"/>
                         </a:lnSpc>
@@ -4728,16 +4792,25 @@
                         <a:spcAft>
                           <a:spcPts val="0"/>
                         </a:spcAft>
-                        <a:buClrTx/>
-                        <a:buSzTx/>
-                        <a:buFontTx/>
                         <a:buNone/>
                         <a:tabLst/>
                         <a:defRPr/>
                       </a:pPr>
                       <a:r>
+                        <a:rPr lang="fr-FR" sz="1600" b="0" i="0" u="none" strike="noStrike" noProof="0" dirty="0">
+                          <a:latin typeface="Calibri"/>
+                        </a:rPr>
+                        <a:t>"</a:t>
+                      </a:r>
+                      <a:r>
                         <a:rPr lang="fr-FR" sz="1600" dirty="0"/>
                         <a:t>danse</a:t>
+                      </a:r>
+                      <a:r>
+                        <a:rPr lang="fr-FR" sz="1600" b="0" i="0" u="none" strike="noStrike" noProof="0" dirty="0">
+                          <a:latin typeface="Calibri"/>
+                        </a:rPr>
+                        <a:t>"</a:t>
                       </a:r>
                       <a:endParaRPr lang="en-US" sz="1600" dirty="0"/>
                     </a:p>
@@ -4756,7 +4829,7 @@
                     <a:bodyPr/>
                     <a:lstStyle/>
                     <a:p>
-                      <a:pPr marL="0" marR="0" lvl="0" indent="0" algn="l" defTabSz="914400" rtl="0" eaLnBrk="1" fontAlgn="auto" latinLnBrk="0" hangingPunct="1">
+                      <a:pPr marL="0" marR="0" lvl="0" indent="0" algn="l" defTabSz="914400">
                         <a:lnSpc>
                           <a:spcPct val="100000"/>
                         </a:lnSpc>
@@ -4766,16 +4839,25 @@
                         <a:spcAft>
                           <a:spcPts val="0"/>
                         </a:spcAft>
-                        <a:buClrTx/>
-                        <a:buSzTx/>
-                        <a:buFontTx/>
                         <a:buNone/>
                         <a:tabLst/>
                         <a:defRPr/>
                       </a:pPr>
                       <a:r>
+                        <a:rPr lang="fr-FR" sz="1600" b="0" i="0" u="none" strike="noStrike" noProof="0" dirty="0">
+                          <a:latin typeface="Calibri"/>
+                        </a:rPr>
+                        <a:t>"</a:t>
+                      </a:r>
+                      <a:r>
                         <a:rPr lang="fr-FR" sz="1600" dirty="0"/>
                         <a:t>romance</a:t>
+                      </a:r>
+                      <a:r>
+                        <a:rPr lang="fr-FR" sz="1600" b="0" i="0" u="none" strike="noStrike" noProof="0" dirty="0">
+                          <a:latin typeface="Calibri"/>
+                        </a:rPr>
+                        <a:t>"</a:t>
                       </a:r>
                       <a:endParaRPr lang="en-US" sz="1600" dirty="0"/>
                     </a:p>
@@ -4807,7 +4889,7 @@
           <p:nvPr>
             <p:extLst>
               <p:ext uri="{D42A27DB-BD31-4B8C-83A1-F6EECF244321}">
-                <p14:modId xmlns:p14="http://schemas.microsoft.com/office/powerpoint/2010/main" val="3626838375"/>
+                <p14:modId xmlns:p14="http://schemas.microsoft.com/office/powerpoint/2010/main" val="1877307008"/>
               </p:ext>
             </p:extLst>
           </p:nvPr>
@@ -4837,11 +4919,16 @@
                     <a:bodyPr/>
                     <a:lstStyle/>
                     <a:p>
-                      <a:r>
-                        <a:rPr lang="fr-FR" sz="1600" dirty="0"/>
-                        <a:t>Row</a:t>
-                      </a:r>
-                      <a:endParaRPr lang="en-US" sz="1600" dirty="0"/>
+                      <a:pPr lvl="0">
+                        <a:buNone/>
+                      </a:pPr>
+                      <a:r>
+                        <a:rPr lang="fr-FR" sz="1600" b="1" i="0" u="none" strike="noStrike" noProof="0" dirty="0">
+                          <a:latin typeface="Calibri"/>
+                        </a:rPr>
+                        <a:t>RDD</a:t>
+                      </a:r>
+                      <a:endParaRPr lang="en-US" dirty="0"/>
                     </a:p>
                   </a:txBody>
                   <a:tcPr/>
@@ -4868,15 +4955,37 @@
                       </a:r>
                       <a:r>
                         <a:rPr lang="en-US" sz="1600" dirty="0"/>
-                        <a:t> Runner", “genres":”</a:t>
+                        <a:t> Runner", </a:t>
+                      </a:r>
+                      <a:r>
+                        <a:rPr lang="en-US" sz="1600" b="0" i="0" u="none" strike="noStrike" noProof="0" dirty="0">
+                          <a:latin typeface="Calibri"/>
+                        </a:rPr>
+                        <a:t>"</a:t>
+                      </a:r>
+                      <a:r>
+                        <a:rPr lang="en-US" sz="1600" dirty="0"/>
+                        <a:t>genres":</a:t>
+                      </a:r>
+                      <a:r>
+                        <a:rPr lang="en-US" sz="1600" b="0" i="0" u="none" strike="noStrike" noProof="0" dirty="0">
+                          <a:latin typeface="Calibri"/>
+                        </a:rPr>
+                        <a:t>"</a:t>
                       </a:r>
                       <a:r>
                         <a:rPr lang="en-US" sz="1600" dirty="0" err="1"/>
                         <a:t>cyberpunk;scifi;action</a:t>
                       </a:r>
                       <a:r>
+                        <a:rPr lang="en-US" sz="1600" b="0" i="0" u="none" strike="noStrike" noProof="0" dirty="0">
+                          <a:latin typeface="Calibri"/>
+                        </a:rPr>
+                        <a:t>"</a:t>
+                      </a:r>
+                      <a:r>
                         <a:rPr lang="en-US" sz="1600" dirty="0"/>
-                        <a:t>”}</a:t>
+                        <a:t>}</a:t>
                       </a:r>
                     </a:p>
                   </a:txBody>
@@ -4904,15 +5013,37 @@
                       </a:r>
                       <a:r>
                         <a:rPr lang="en-US" sz="1600" dirty="0"/>
-                        <a:t> dancing", “genres":”</a:t>
+                        <a:t> dancing", </a:t>
+                      </a:r>
+                      <a:r>
+                        <a:rPr lang="en-US" sz="1600" b="0" i="0" u="none" strike="noStrike" noProof="0" dirty="0">
+                          <a:latin typeface="Calibri"/>
+                        </a:rPr>
+                        <a:t>"</a:t>
+                      </a:r>
+                      <a:r>
+                        <a:rPr lang="en-US" sz="1600" dirty="0"/>
+                        <a:t>genres":</a:t>
+                      </a:r>
+                      <a:r>
+                        <a:rPr lang="en-US" sz="1600" b="0" i="0" u="none" strike="noStrike" noProof="0" dirty="0">
+                          <a:latin typeface="Calibri"/>
+                        </a:rPr>
+                        <a:t>"</a:t>
                       </a:r>
                       <a:r>
                         <a:rPr lang="en-US" sz="1600" dirty="0" err="1"/>
                         <a:t>music;danse;romance</a:t>
                       </a:r>
                       <a:r>
+                        <a:rPr lang="en-US" sz="1600" b="0" i="0" u="none" strike="noStrike" noProof="0" dirty="0">
+                          <a:latin typeface="Calibri"/>
+                        </a:rPr>
+                        <a:t>"</a:t>
+                      </a:r>
+                      <a:r>
                         <a:rPr lang="en-US" sz="1600" dirty="0"/>
-                        <a:t>”}</a:t>
+                        <a:t>}</a:t>
                       </a:r>
                     </a:p>
                   </a:txBody>
@@ -4966,25 +5097,47 @@
           </a:fontRef>
         </p:style>
         <p:txBody>
-          <a:bodyPr rtlCol="0" anchor="ctr"/>
+          <a:bodyPr lIns="91440" tIns="45720" rIns="91440" bIns="45720" rtlCol="0" anchor="ctr"/>
           <a:lstStyle/>
           <a:p>
             <a:pPr algn="ctr"/>
             <a:r>
-              <a:rPr lang="fr-FR" dirty="0" err="1"/>
+              <a:rPr lang="fr-FR" b="1" dirty="0" err="1"/>
               <a:t>filter</a:t>
             </a:r>
             <a:r>
-              <a:rPr lang="fr-FR" dirty="0"/>
-              <a:t>(x </a:t>
-            </a:r>
-            <a:r>
-              <a:rPr lang="fr-FR" dirty="0">
+              <a:rPr lang="fr-FR" b="1" dirty="0"/>
+              <a:t>(</a:t>
+            </a:r>
+            <a:r>
+              <a:rPr lang="fr-FR" b="1" dirty="0">
+                <a:ea typeface="+mn-lt"/>
+                <a:cs typeface="+mn-lt"/>
                 <a:sym typeface="Wingdings" panose="05000000000000000000" pitchFamily="2" charset="2"/>
               </a:rPr>
-              <a:t> x[‘rating’]&gt;4.0)</a:t>
-            </a:r>
-            <a:endParaRPr lang="en-US" dirty="0"/>
+              <a:t>lambda x:</a:t>
+            </a:r>
+            <a:r>
+              <a:rPr lang="fr-FR" b="1" dirty="0">
+                <a:sym typeface="Wingdings" panose="05000000000000000000" pitchFamily="2" charset="2"/>
+              </a:rPr>
+              <a:t> </a:t>
+            </a:r>
+            <a:endParaRPr lang="en-US" b="1" dirty="0">
+              <a:cs typeface="Calibri"/>
+            </a:endParaRPr>
+          </a:p>
+          <a:p>
+            <a:pPr algn="ctr"/>
+            <a:r>
+              <a:rPr lang="fr-FR" b="1" dirty="0">
+                <a:sym typeface="Wingdings" panose="05000000000000000000" pitchFamily="2" charset="2"/>
+              </a:rPr>
+              <a:t>x['rating']&gt;4.0)</a:t>
+            </a:r>
+            <a:endParaRPr lang="en-US" b="1" dirty="0">
+              <a:cs typeface="Calibri"/>
+            </a:endParaRPr>
           </a:p>
         </p:txBody>
       </p:sp>
@@ -5085,7 +5238,7 @@
           <p:nvPr>
             <p:extLst>
               <p:ext uri="{D42A27DB-BD31-4B8C-83A1-F6EECF244321}">
-                <p14:modId xmlns:p14="http://schemas.microsoft.com/office/powerpoint/2010/main" val="54888848"/>
+                <p14:modId xmlns:p14="http://schemas.microsoft.com/office/powerpoint/2010/main" val="4059399256"/>
               </p:ext>
             </p:extLst>
           </p:nvPr>
@@ -5115,11 +5268,16 @@
                     <a:bodyPr/>
                     <a:lstStyle/>
                     <a:p>
-                      <a:r>
-                        <a:rPr lang="fr-FR" sz="1600" dirty="0"/>
-                        <a:t>Row</a:t>
-                      </a:r>
-                      <a:endParaRPr lang="en-US" sz="1600" dirty="0"/>
+                      <a:pPr lvl="0">
+                        <a:buNone/>
+                      </a:pPr>
+                      <a:r>
+                        <a:rPr lang="fr-FR" sz="1600" b="1" i="0" u="none" strike="noStrike" noProof="0" dirty="0">
+                          <a:latin typeface="Calibri"/>
+                        </a:rPr>
+                        <a:t>RDD</a:t>
+                      </a:r>
+                      <a:endParaRPr lang="en-US" dirty="0"/>
                     </a:p>
                   </a:txBody>
                   <a:tcPr/>
@@ -5221,7 +5379,7 @@
           <p:nvPr>
             <p:extLst>
               <p:ext uri="{D42A27DB-BD31-4B8C-83A1-F6EECF244321}">
-                <p14:modId xmlns:p14="http://schemas.microsoft.com/office/powerpoint/2010/main" val="3214289153"/>
+                <p14:modId xmlns:p14="http://schemas.microsoft.com/office/powerpoint/2010/main" val="1196572337"/>
               </p:ext>
             </p:extLst>
           </p:nvPr>
@@ -5251,11 +5409,16 @@
                     <a:bodyPr/>
                     <a:lstStyle/>
                     <a:p>
-                      <a:r>
-                        <a:rPr lang="fr-FR" sz="1600" dirty="0"/>
-                        <a:t>Row</a:t>
-                      </a:r>
-                      <a:endParaRPr lang="en-US" sz="1600" dirty="0"/>
+                      <a:pPr lvl="0">
+                        <a:buNone/>
+                      </a:pPr>
+                      <a:r>
+                        <a:rPr lang="fr-FR" sz="1600" b="1" i="0" u="none" strike="noStrike" noProof="0" dirty="0">
+                          <a:latin typeface="Calibri"/>
+                        </a:rPr>
+                        <a:t>RDD</a:t>
+                      </a:r>
+                      <a:endParaRPr lang="en-US" dirty="0"/>
                     </a:p>
                   </a:txBody>
                   <a:tcPr/>
@@ -5448,13 +5611,18 @@
           <a:p>
             <a:r>
               <a:rPr lang="fr-FR" dirty="0"/>
-              <a:t>RDD API - </a:t>
-            </a:r>
-            <a:r>
-              <a:rPr lang="fr-FR" dirty="0" err="1"/>
-              <a:t>Aggregations</a:t>
-            </a:r>
-            <a:endParaRPr lang="en-US" dirty="0"/>
+              <a:t>RDD API – </a:t>
+            </a:r>
+            <a:r>
+              <a:rPr lang="fr-FR" dirty="0">
+                <a:ea typeface="+mj-lt"/>
+                <a:cs typeface="+mj-lt"/>
+              </a:rPr>
+              <a:t>Actions</a:t>
+            </a:r>
+            <a:endParaRPr lang="fr-FR" dirty="0">
+              <a:cs typeface="Calibri Light"/>
+            </a:endParaRPr>
           </a:p>
         </p:txBody>
       </p:sp>
@@ -5496,45 +5664,53 @@
           </a:fontRef>
         </p:style>
         <p:txBody>
-          <a:bodyPr rtlCol="0" anchor="ctr"/>
+          <a:bodyPr lIns="91440" tIns="45720" rIns="91440" bIns="45720" rtlCol="0" anchor="ctr"/>
           <a:lstStyle/>
           <a:p>
             <a:pPr algn="ctr"/>
-            <a:r>
-              <a:rPr lang="fr-FR" dirty="0" err="1"/>
-              <a:t>Reduce</a:t>
-            </a:r>
-            <a:r>
-              <a:rPr lang="fr-FR" dirty="0"/>
-              <a:t>(</a:t>
-            </a:r>
-            <a:r>
-              <a:rPr lang="fr-FR" dirty="0" err="1"/>
-              <a:t>x,y</a:t>
-            </a:r>
-            <a:r>
-              <a:rPr lang="fr-FR" dirty="0"/>
-              <a:t> </a:t>
-            </a:r>
-            <a:r>
-              <a:rPr lang="fr-FR" dirty="0">
-                <a:sym typeface="Wingdings" panose="05000000000000000000" pitchFamily="2" charset="2"/>
+            <a:br>
+              <a:rPr lang="fr-FR" b="1" dirty="0">
+                <a:ea typeface="+mn-lt"/>
+                <a:cs typeface="+mn-lt"/>
               </a:rPr>
-              <a:t> </a:t>
-            </a:r>
-            <a:r>
-              <a:rPr lang="fr-FR" dirty="0" err="1">
-                <a:sym typeface="Wingdings" panose="05000000000000000000" pitchFamily="2" charset="2"/>
+            </a:br>
+            <a:r>
+              <a:rPr lang="fr-FR" b="1" dirty="0" err="1">
+                <a:ea typeface="+mn-lt"/>
+                <a:cs typeface="+mn-lt"/>
+              </a:rPr>
+              <a:t>reduce</a:t>
+            </a:r>
+            <a:r>
+              <a:rPr lang="fr-FR" b="1" dirty="0">
+                <a:ea typeface="+mn-lt"/>
+                <a:cs typeface="+mn-lt"/>
+              </a:rPr>
+              <a:t>(lambda x, y: </a:t>
+            </a:r>
+            <a:r>
+              <a:rPr lang="fr-FR" b="1" dirty="0" err="1">
+                <a:ea typeface="+mn-lt"/>
+                <a:cs typeface="+mn-lt"/>
               </a:rPr>
               <a:t>x+y</a:t>
             </a:r>
             <a:r>
-              <a:rPr lang="fr-FR" dirty="0">
-                <a:sym typeface="Wingdings" panose="05000000000000000000" pitchFamily="2" charset="2"/>
+              <a:rPr lang="fr-FR" b="1" dirty="0">
+                <a:ea typeface="+mn-lt"/>
+                <a:cs typeface="+mn-lt"/>
               </a:rPr>
               <a:t>)</a:t>
             </a:r>
-            <a:endParaRPr lang="en-US" dirty="0"/>
+            <a:endParaRPr lang="en-US" b="1">
+              <a:cs typeface="Calibri"/>
+            </a:endParaRPr>
+          </a:p>
+          <a:p>
+            <a:pPr algn="ctr"/>
+            <a:endParaRPr lang="fr-FR" dirty="0">
+              <a:cs typeface="Calibri"/>
+            </a:endParaRPr>
           </a:p>
         </p:txBody>
       </p:sp>
@@ -5622,10 +5798,10 @@
       </p:cxnSp>
       <p:graphicFrame>
         <p:nvGraphicFramePr>
-          <p:cNvPr id="21" name="Table 6">
-            <a:extLst>
-              <a:ext uri="{FF2B5EF4-FFF2-40B4-BE49-F238E27FC236}">
-                <a16:creationId xmlns:a16="http://schemas.microsoft.com/office/drawing/2014/main" id="{3B363A25-A424-4A7F-AC1C-675D5AA95527}"/>
+          <p:cNvPr id="22" name="Table 6">
+            <a:extLst>
+              <a:ext uri="{FF2B5EF4-FFF2-40B4-BE49-F238E27FC236}">
+                <a16:creationId xmlns:a16="http://schemas.microsoft.com/office/drawing/2014/main" id="{14F2891B-DE06-4BA6-B53E-8E439C13B6B4}"/>
               </a:ext>
             </a:extLst>
           </p:cNvPr>
@@ -5635,91 +5811,7 @@
           <p:nvPr>
             <p:extLst>
               <p:ext uri="{D42A27DB-BD31-4B8C-83A1-F6EECF244321}">
-                <p14:modId xmlns:p14="http://schemas.microsoft.com/office/powerpoint/2010/main" val="643400388"/>
-              </p:ext>
-            </p:extLst>
-          </p:nvPr>
-        </p:nvGraphicFramePr>
-        <p:xfrm>
-          <a:off x="9118809" y="1661301"/>
-          <a:ext cx="2804021" cy="797871"/>
-        </p:xfrm>
-        <a:graphic>
-          <a:graphicData uri="http://schemas.openxmlformats.org/drawingml/2006/table">
-            <a:tbl>
-              <a:tblPr firstRow="1" bandRow="1">
-                <a:tableStyleId>{5C22544A-7EE6-4342-B048-85BDC9FD1C3A}</a:tableStyleId>
-              </a:tblPr>
-              <a:tblGrid>
-                <a:gridCol w="2804021">
-                  <a:extLst>
-                    <a:ext uri="{9D8B030D-6E8A-4147-A177-3AD203B41FA5}">
-                      <a16:colId xmlns:a16="http://schemas.microsoft.com/office/drawing/2014/main" val="2061391393"/>
-                    </a:ext>
-                  </a:extLst>
-                </a:gridCol>
-              </a:tblGrid>
-              <a:tr h="462591">
-                <a:tc>
-                  <a:txBody>
-                    <a:bodyPr/>
-                    <a:lstStyle/>
-                    <a:p>
-                      <a:r>
-                        <a:rPr lang="fr-FR" sz="1600" dirty="0"/>
-                        <a:t>Row</a:t>
-                      </a:r>
-                      <a:endParaRPr lang="en-US" sz="1600" dirty="0"/>
-                    </a:p>
-                  </a:txBody>
-                  <a:tcPr/>
-                </a:tc>
-                <a:extLst>
-                  <a:ext uri="{0D108BD9-81ED-4DB2-BD59-A6C34878D82A}">
-                    <a16:rowId xmlns:a16="http://schemas.microsoft.com/office/drawing/2014/main" val="235972142"/>
-                  </a:ext>
-                </a:extLst>
-              </a:tr>
-              <a:tr h="283885">
-                <a:tc>
-                  <a:txBody>
-                    <a:bodyPr/>
-                    <a:lstStyle/>
-                    <a:p>
-                      <a:r>
-                        <a:rPr lang="en-US" sz="1600" dirty="0"/>
-                        <a:t>13.5</a:t>
-                      </a:r>
-                    </a:p>
-                  </a:txBody>
-                  <a:tcPr/>
-                </a:tc>
-                <a:extLst>
-                  <a:ext uri="{0D108BD9-81ED-4DB2-BD59-A6C34878D82A}">
-                    <a16:rowId xmlns:a16="http://schemas.microsoft.com/office/drawing/2014/main" val="1215558195"/>
-                  </a:ext>
-                </a:extLst>
-              </a:tr>
-            </a:tbl>
-          </a:graphicData>
-        </a:graphic>
-      </p:graphicFrame>
-      <p:graphicFrame>
-        <p:nvGraphicFramePr>
-          <p:cNvPr id="22" name="Table 6">
-            <a:extLst>
-              <a:ext uri="{FF2B5EF4-FFF2-40B4-BE49-F238E27FC236}">
-                <a16:creationId xmlns:a16="http://schemas.microsoft.com/office/drawing/2014/main" id="{14F2891B-DE06-4BA6-B53E-8E439C13B6B4}"/>
-              </a:ext>
-            </a:extLst>
-          </p:cNvPr>
-          <p:cNvGraphicFramePr>
-            <a:graphicFrameLocks noGrp="1"/>
-          </p:cNvGraphicFramePr>
-          <p:nvPr>
-            <p:extLst>
-              <p:ext uri="{D42A27DB-BD31-4B8C-83A1-F6EECF244321}">
-                <p14:modId xmlns:p14="http://schemas.microsoft.com/office/powerpoint/2010/main" val="3615470561"/>
+                <p14:modId xmlns:p14="http://schemas.microsoft.com/office/powerpoint/2010/main" val="2800062869"/>
               </p:ext>
             </p:extLst>
           </p:nvPr>
@@ -5751,9 +5843,8 @@
                     <a:p>
                       <a:r>
                         <a:rPr lang="fr-FR" sz="1600" dirty="0"/>
-                        <a:t>Row</a:t>
-                      </a:r>
-                      <a:endParaRPr lang="en-US" sz="1600" dirty="0"/>
+                        <a:t>RDD</a:t>
+                      </a:r>
                     </a:p>
                   </a:txBody>
                   <a:tcPr/>
@@ -5863,8 +5954,8 @@
         </p:nvSpPr>
         <p:spPr>
           <a:xfrm>
-            <a:off x="6087611" y="4035399"/>
-            <a:ext cx="2374085" cy="780176"/>
+            <a:off x="5938715" y="4035399"/>
+            <a:ext cx="2750705" cy="780176"/>
           </a:xfrm>
           <a:prstGeom prst="roundRect">
             <a:avLst/>
@@ -5887,45 +5978,40 @@
           </a:fontRef>
         </p:style>
         <p:txBody>
-          <a:bodyPr rtlCol="0" anchor="ctr"/>
+          <a:bodyPr lIns="91440" tIns="45720" rIns="91440" bIns="45720" rtlCol="0" anchor="ctr"/>
           <a:lstStyle/>
           <a:p>
             <a:pPr algn="ctr"/>
             <a:r>
-              <a:rPr lang="fr-FR" dirty="0" err="1"/>
+              <a:rPr lang="fr-FR" b="1" dirty="0" err="1">
+                <a:cs typeface="Calibri"/>
+              </a:rPr>
               <a:t>reduceByKey</a:t>
             </a:r>
             <a:r>
-              <a:rPr lang="fr-FR" dirty="0"/>
-              <a:t>(</a:t>
-            </a:r>
-            <a:r>
-              <a:rPr lang="fr-FR" dirty="0" err="1"/>
-              <a:t>x,y</a:t>
-            </a:r>
-            <a:r>
-              <a:rPr lang="fr-FR" dirty="0"/>
-              <a:t> </a:t>
-            </a:r>
-            <a:r>
-              <a:rPr lang="fr-FR" dirty="0">
-                <a:sym typeface="Wingdings" panose="05000000000000000000" pitchFamily="2" charset="2"/>
+              <a:rPr lang="fr-FR" b="1" dirty="0">
+                <a:ea typeface="+mn-lt"/>
+                <a:cs typeface="+mn-lt"/>
               </a:rPr>
-              <a:t> </a:t>
-            </a:r>
-            <a:r>
-              <a:rPr lang="fr-FR" dirty="0" err="1">
-                <a:sym typeface="Wingdings" panose="05000000000000000000" pitchFamily="2" charset="2"/>
+              <a:t>(lambda x, y: </a:t>
+            </a:r>
+            <a:r>
+              <a:rPr lang="fr-FR" b="1" dirty="0" err="1">
+                <a:ea typeface="+mn-lt"/>
+                <a:cs typeface="+mn-lt"/>
               </a:rPr>
               <a:t>x+y</a:t>
             </a:r>
             <a:r>
-              <a:rPr lang="fr-FR" dirty="0">
-                <a:sym typeface="Wingdings" panose="05000000000000000000" pitchFamily="2" charset="2"/>
+              <a:rPr lang="fr-FR" b="1" dirty="0">
+                <a:ea typeface="+mn-lt"/>
+                <a:cs typeface="+mn-lt"/>
               </a:rPr>
               <a:t>)</a:t>
             </a:r>
-            <a:endParaRPr lang="en-US" dirty="0"/>
+            <a:endParaRPr lang="fr-FR" b="1">
+              <a:cs typeface="Calibri"/>
+            </a:endParaRPr>
           </a:p>
         </p:txBody>
       </p:sp>
@@ -5945,7 +6031,7 @@
         </p:nvCxnSpPr>
         <p:spPr>
           <a:xfrm>
-            <a:off x="5617828" y="4450960"/>
+            <a:off x="5468931" y="4468477"/>
             <a:ext cx="469783" cy="0"/>
           </a:xfrm>
           <a:prstGeom prst="straightConnector1">
@@ -5986,7 +6072,7 @@
         </p:nvCxnSpPr>
         <p:spPr>
           <a:xfrm>
-            <a:off x="8461696" y="4442265"/>
+            <a:off x="8593075" y="4424748"/>
             <a:ext cx="469783" cy="0"/>
           </a:xfrm>
           <a:prstGeom prst="straightConnector1">
@@ -6026,7 +6112,7 @@
           <p:nvPr>
             <p:extLst>
               <p:ext uri="{D42A27DB-BD31-4B8C-83A1-F6EECF244321}">
-                <p14:modId xmlns:p14="http://schemas.microsoft.com/office/powerpoint/2010/main" val="2762088367"/>
+                <p14:modId xmlns:p14="http://schemas.microsoft.com/office/powerpoint/2010/main" val="1995673279"/>
               </p:ext>
             </p:extLst>
           </p:nvPr>
@@ -6056,11 +6142,20 @@
                     <a:bodyPr/>
                     <a:lstStyle/>
                     <a:p>
-                      <a:r>
-                        <a:rPr lang="fr-FR" sz="1600" dirty="0"/>
-                        <a:t>Row</a:t>
-                      </a:r>
-                      <a:endParaRPr lang="en-US" sz="1600" dirty="0"/>
+                      <a:pPr lvl="0">
+                        <a:buNone/>
+                      </a:pPr>
+                      <a:r>
+                        <a:rPr lang="fr-FR" sz="1600" b="1" i="0" u="none" strike="noStrike" noProof="0" dirty="0">
+                          <a:latin typeface="Calibri"/>
+                        </a:rPr>
+                        <a:t>RDD </a:t>
+                      </a:r>
+                      <a:r>
+                        <a:rPr lang="fr-FR" sz="1600" b="1" i="0" u="none" strike="noStrike" noProof="0" dirty="0"/>
+                        <a:t>of (K, V) pairs</a:t>
+                      </a:r>
+                      <a:endParaRPr lang="en-US" dirty="0"/>
                     </a:p>
                   </a:txBody>
                   <a:tcPr/>
@@ -6079,7 +6174,7 @@
                     <a:p>
                       <a:r>
                         <a:rPr lang="en-US" sz="1600" dirty="0"/>
-                        <a:t>(“Blade Runner", 8.5)</a:t>
+                        <a:t>("Blade Runner", 8.5)</a:t>
                       </a:r>
                     </a:p>
                   </a:txBody>
@@ -6130,7 +6225,7 @@
           <p:nvPr>
             <p:extLst>
               <p:ext uri="{D42A27DB-BD31-4B8C-83A1-F6EECF244321}">
-                <p14:modId xmlns:p14="http://schemas.microsoft.com/office/powerpoint/2010/main" val="3222191515"/>
+                <p14:modId xmlns:p14="http://schemas.microsoft.com/office/powerpoint/2010/main" val="2058402142"/>
               </p:ext>
             </p:extLst>
           </p:nvPr>
@@ -6160,11 +6255,20 @@
                     <a:bodyPr/>
                     <a:lstStyle/>
                     <a:p>
-                      <a:r>
-                        <a:rPr lang="fr-FR" sz="1600" dirty="0"/>
-                        <a:t>Row</a:t>
-                      </a:r>
-                      <a:endParaRPr lang="en-US" sz="1600" dirty="0"/>
+                      <a:pPr lvl="0">
+                        <a:buNone/>
+                      </a:pPr>
+                      <a:r>
+                        <a:rPr lang="fr-FR" sz="1600" b="1" i="0" u="none" strike="noStrike" noProof="0" dirty="0">
+                          <a:latin typeface="Calibri"/>
+                        </a:rPr>
+                        <a:t>RDD</a:t>
+                      </a:r>
+                      <a:r>
+                        <a:rPr lang="fr-FR" sz="1600" b="1" i="0" u="none" strike="noStrike" noProof="0" dirty="0"/>
+                        <a:t> of (K, V) pairs</a:t>
+                      </a:r>
+                      <a:endParaRPr lang="en-US" dirty="0"/>
                     </a:p>
                   </a:txBody>
                   <a:tcPr/>
@@ -6183,7 +6287,7 @@
                     <a:p>
                       <a:r>
                         <a:rPr lang="en-US" sz="1600" dirty="0"/>
-                        <a:t>(“Blade Runner", 5.0)</a:t>
+                        <a:t>("Blade Runner", 5.0)</a:t>
                       </a:r>
                     </a:p>
                   </a:txBody>
@@ -6240,7 +6344,17 @@
                       </a:pPr>
                       <a:r>
                         <a:rPr lang="en-US" sz="1600" dirty="0"/>
-                        <a:t>(“Blade Runner“, 3.5)</a:t>
+                        <a:t>("Blade Runner</a:t>
+                      </a:r>
+                      <a:r>
+                        <a:rPr lang="en-US" sz="1600" b="0" i="0" u="none" strike="noStrike" noProof="0" dirty="0">
+                          <a:latin typeface="Calibri"/>
+                        </a:rPr>
+                        <a:t>"</a:t>
+                      </a:r>
+                      <a:r>
+                        <a:rPr lang="en-US" sz="1600" dirty="0"/>
+                        <a:t>, 3.5)</a:t>
                       </a:r>
                     </a:p>
                   </a:txBody>
@@ -6256,6 +6370,42 @@
           </a:graphicData>
         </a:graphic>
       </p:graphicFrame>
+      <p:sp>
+        <p:nvSpPr>
+          <p:cNvPr id="4" name="TextBox 3">
+            <a:extLst>
+              <a:ext uri="{FF2B5EF4-FFF2-40B4-BE49-F238E27FC236}">
+                <a16:creationId xmlns:a16="http://schemas.microsoft.com/office/drawing/2014/main" id="{9832D1CA-FCCC-636E-E2FF-61F08779E5EF}"/>
+              </a:ext>
+            </a:extLst>
+          </p:cNvPr>
+          <p:cNvSpPr txBox="1"/>
+          <p:nvPr/>
+        </p:nvSpPr>
+        <p:spPr>
+          <a:xfrm>
+            <a:off x="9326971" y="1972720"/>
+            <a:ext cx="732893" cy="461665"/>
+          </a:xfrm>
+          <a:prstGeom prst="rect">
+            <a:avLst/>
+          </a:prstGeom>
+          <a:noFill/>
+        </p:spPr>
+        <p:txBody>
+          <a:bodyPr wrap="none" lIns="91440" tIns="45720" rIns="91440" bIns="45720" rtlCol="0" anchor="t">
+            <a:spAutoFit/>
+          </a:bodyPr>
+          <a:lstStyle/>
+          <a:p>
+            <a:r>
+              <a:rPr lang="fr-FR" sz="2400" b="1" dirty="0"/>
+              <a:t>13.5</a:t>
+            </a:r>
+            <a:endParaRPr lang="en-US" sz="2400" b="1" dirty="0"/>
+          </a:p>
+        </p:txBody>
+      </p:sp>
     </p:spTree>
     <p:extLst>
       <p:ext uri="{BB962C8B-B14F-4D97-AF65-F5344CB8AC3E}">
@@ -6880,7 +7030,7 @@
         </p:blipFill>
         <p:spPr>
           <a:xfrm>
-            <a:off x="1876369" y="1046376"/>
+            <a:off x="1876369" y="1335411"/>
             <a:ext cx="8439262" cy="5002584"/>
           </a:xfrm>
           <a:prstGeom prst="rect">
@@ -7879,7 +8029,12 @@
             <p:ph type="title"/>
           </p:nvPr>
         </p:nvSpPr>
-        <p:spPr/>
+        <p:spPr>
+          <a:xfrm>
+            <a:off x="715579" y="233746"/>
+            <a:ext cx="10515600" cy="1325563"/>
+          </a:xfrm>
+        </p:spPr>
         <p:txBody>
           <a:bodyPr/>
           <a:lstStyle/>
@@ -8245,13 +8400,13 @@
           </a:fontRef>
         </p:style>
         <p:txBody>
-          <a:bodyPr rtlCol="0" anchor="ctr"/>
+          <a:bodyPr lIns="91440" tIns="45720" rIns="91440" bIns="45720" rtlCol="0" anchor="ctr"/>
           <a:lstStyle/>
           <a:p>
             <a:pPr algn="ctr"/>
             <a:r>
               <a:rPr lang="fr-FR" dirty="0"/>
-              <a:t>count</a:t>
+              <a:t>count()</a:t>
             </a:r>
             <a:endParaRPr lang="en-US" dirty="0"/>
           </a:p>
@@ -8351,7 +8506,13 @@
           <p:cNvGraphicFramePr>
             <a:graphicFrameLocks noGrp="1"/>
           </p:cNvGraphicFramePr>
-          <p:nvPr/>
+          <p:nvPr>
+            <p:extLst>
+              <p:ext uri="{D42A27DB-BD31-4B8C-83A1-F6EECF244321}">
+                <p14:modId xmlns:p14="http://schemas.microsoft.com/office/powerpoint/2010/main" val="3946583363"/>
+              </p:ext>
+            </p:extLst>
+          </p:nvPr>
         </p:nvGraphicFramePr>
         <p:xfrm>
           <a:off x="336282" y="1371359"/>
@@ -8380,7 +8541,7 @@
                     <a:p>
                       <a:r>
                         <a:rPr lang="fr-FR" sz="1600" dirty="0"/>
-                        <a:t>Row</a:t>
+                        <a:t>RDD</a:t>
                       </a:r>
                       <a:endParaRPr lang="en-US" sz="1600" dirty="0"/>
                     </a:p>
@@ -8494,7 +8655,17 @@
                       </a:r>
                       <a:r>
                         <a:rPr lang="en-US" sz="1600" dirty="0" err="1"/>
-                        <a:t>user":“Sam</a:t>
+                        <a:t>user":</a:t>
+                      </a:r>
+                      <a:r>
+                        <a:rPr lang="en-US" sz="1600" b="0" i="0" u="none" strike="noStrike" noProof="0" dirty="0" err="1">
+                          <a:latin typeface="Calibri"/>
+                        </a:rPr>
+                        <a:t>"</a:t>
+                      </a:r>
+                      <a:r>
+                        <a:rPr lang="en-US" sz="1600" dirty="0" err="1"/>
+                        <a:t>Sam</a:t>
                       </a:r>
                       <a:r>
                         <a:rPr lang="en-US" sz="1600" dirty="0"/>
@@ -8502,7 +8673,17 @@
                       </a:r>
                       <a:r>
                         <a:rPr lang="en-US" sz="1600" dirty="0" err="1"/>
-                        <a:t>movie":“Blade</a:t>
+                        <a:t>movie":</a:t>
+                      </a:r>
+                      <a:r>
+                        <a:rPr lang="en-US" sz="1600" b="0" i="0" u="none" strike="noStrike" noProof="0" dirty="0" err="1">
+                          <a:latin typeface="Calibri"/>
+                        </a:rPr>
+                        <a:t>"</a:t>
+                      </a:r>
+                      <a:r>
+                        <a:rPr lang="en-US" sz="1600" dirty="0" err="1"/>
+                        <a:t>Blade</a:t>
                       </a:r>
                       <a:r>
                         <a:rPr lang="en-US" sz="1600" dirty="0"/>
@@ -8560,7 +8741,7 @@
           </a:fontRef>
         </p:style>
         <p:txBody>
-          <a:bodyPr rtlCol="0" anchor="ctr"/>
+          <a:bodyPr lIns="91440" tIns="45720" rIns="91440" bIns="45720" rtlCol="0" anchor="ctr"/>
           <a:lstStyle/>
           <a:p>
             <a:pPr algn="ctr"/>
@@ -8572,7 +8753,9 @@
               <a:rPr lang="fr-FR" dirty="0"/>
               <a:t>(2)</a:t>
             </a:r>
-            <a:endParaRPr lang="en-US" dirty="0"/>
+            <a:endParaRPr lang="en-US" dirty="0">
+              <a:cs typeface="Calibri"/>
+            </a:endParaRPr>
           </a:p>
         </p:txBody>
       </p:sp>
@@ -8673,7 +8856,7 @@
           <p:nvPr>
             <p:extLst>
               <p:ext uri="{D42A27DB-BD31-4B8C-83A1-F6EECF244321}">
-                <p14:modId xmlns:p14="http://schemas.microsoft.com/office/powerpoint/2010/main" val="1976910992"/>
+                <p14:modId xmlns:p14="http://schemas.microsoft.com/office/powerpoint/2010/main" val="3634846452"/>
               </p:ext>
             </p:extLst>
           </p:nvPr>
@@ -8704,10 +8887,10 @@
                     <a:lstStyle/>
                     <a:p>
                       <a:r>
-                        <a:rPr lang="fr-FR" sz="1600" dirty="0"/>
-                        <a:t>Row</a:t>
-                      </a:r>
-                      <a:endParaRPr lang="en-US" sz="1600" dirty="0"/>
+                        <a:rPr lang="fr-FR" sz="1600" dirty="0" err="1"/>
+                        <a:t>list</a:t>
+                      </a:r>
+                      <a:endParaRPr lang="en-US" sz="1600" dirty="0" err="1"/>
                     </a:p>
                   </a:txBody>
                   <a:tcPr/>
@@ -8733,8 +8916,14 @@
                         <a:t>user":"John</a:t>
                       </a:r>
                       <a:r>
+                        <a:rPr lang="en-US" sz="1600" b="0" i="0" u="none" strike="noStrike" noProof="0" dirty="0">
+                          <a:latin typeface="Calibri"/>
+                        </a:rPr>
+                        <a:t>"</a:t>
+                      </a:r>
+                      <a:r>
                         <a:rPr lang="en-US" sz="1600" dirty="0"/>
-                        <a:t>“}</a:t>
+                        <a:t>}</a:t>
                       </a:r>
                     </a:p>
                   </a:txBody>
@@ -8761,8 +8950,14 @@
                         <a:t>user":"Louise</a:t>
                       </a:r>
                       <a:r>
+                        <a:rPr lang="en-US" sz="1600" b="0" i="0" u="none" strike="noStrike" noProof="0" dirty="0">
+                          <a:latin typeface="Calibri"/>
+                        </a:rPr>
+                        <a:t>"</a:t>
+                      </a:r>
+                      <a:r>
                         <a:rPr lang="en-US" sz="1600" dirty="0"/>
-                        <a:t>“}</a:t>
+                        <a:t>}</a:t>
                       </a:r>
                     </a:p>
                   </a:txBody>
@@ -8793,7 +8988,7 @@
           <p:nvPr>
             <p:extLst>
               <p:ext uri="{D42A27DB-BD31-4B8C-83A1-F6EECF244321}">
-                <p14:modId xmlns:p14="http://schemas.microsoft.com/office/powerpoint/2010/main" val="3203822827"/>
+                <p14:modId xmlns:p14="http://schemas.microsoft.com/office/powerpoint/2010/main" val="1276620535"/>
               </p:ext>
             </p:extLst>
           </p:nvPr>
@@ -8823,11 +9018,16 @@
                     <a:bodyPr/>
                     <a:lstStyle/>
                     <a:p>
-                      <a:r>
-                        <a:rPr lang="fr-FR" sz="1600" dirty="0"/>
-                        <a:t>Row</a:t>
-                      </a:r>
-                      <a:endParaRPr lang="en-US" sz="1600" dirty="0"/>
+                      <a:pPr lvl="0">
+                        <a:buNone/>
+                      </a:pPr>
+                      <a:r>
+                        <a:rPr lang="fr-FR" sz="1600" b="1" i="0" u="none" strike="noStrike" noProof="0" dirty="0">
+                          <a:latin typeface="Calibri"/>
+                        </a:rPr>
+                        <a:t>RDD</a:t>
+                      </a:r>
+                      <a:endParaRPr lang="en-US" dirty="0"/>
                     </a:p>
                   </a:txBody>
                   <a:tcPr/>
@@ -8853,9 +9053,16 @@
                         <a:t>user":"John</a:t>
                       </a:r>
                       <a:r>
+                        <a:rPr lang="en-US" sz="1600" b="0" i="0" u="none" strike="noStrike" noProof="0" dirty="0">
+                          <a:latin typeface="Calibri"/>
+                        </a:rPr>
+                        <a:t>"</a:t>
+                      </a:r>
+                      <a:r>
                         <a:rPr lang="en-US" sz="1600" dirty="0"/>
-                        <a:t>“}</a:t>
-                      </a:r>
+                        <a:t>}</a:t>
+                      </a:r>
+                      <a:endParaRPr lang="en-US" dirty="0"/>
                     </a:p>
                   </a:txBody>
                   <a:tcPr/>
@@ -8881,8 +9088,14 @@
                         <a:t>user":"Louise</a:t>
                       </a:r>
                       <a:r>
+                        <a:rPr lang="en-US" sz="1600" b="0" i="0" u="none" strike="noStrike" noProof="0" dirty="0">
+                          <a:latin typeface="Calibri"/>
+                        </a:rPr>
+                        <a:t>"</a:t>
+                      </a:r>
+                      <a:r>
                         <a:rPr lang="en-US" sz="1600" dirty="0"/>
-                        <a:t>“}</a:t>
+                        <a:t>}</a:t>
                       </a:r>
                     </a:p>
                   </a:txBody>
@@ -8923,11 +9136,27 @@
                       </a:r>
                       <a:r>
                         <a:rPr lang="en-US" sz="1600" dirty="0" err="1"/>
-                        <a:t>user":“Sam</a:t>
+                        <a:t>user":</a:t>
+                      </a:r>
+                      <a:r>
+                        <a:rPr lang="en-US" sz="1600" b="0" i="0" u="none" strike="noStrike" noProof="0" dirty="0" err="1">
+                          <a:latin typeface="Calibri"/>
+                        </a:rPr>
+                        <a:t>"</a:t>
+                      </a:r>
+                      <a:r>
+                        <a:rPr lang="en-US" sz="1600" dirty="0" err="1"/>
+                        <a:t>Sam</a:t>
+                      </a:r>
+                      <a:r>
+                        <a:rPr lang="en-US" sz="1600" b="0" i="0" u="none" strike="noStrike" noProof="0" dirty="0">
+                          <a:latin typeface="Calibri"/>
+                        </a:rPr>
+                        <a:t>"</a:t>
                       </a:r>
                       <a:r>
                         <a:rPr lang="en-US" sz="1600" dirty="0"/>
-                        <a:t>“}</a:t>
+                        <a:t>}</a:t>
                       </a:r>
                     </a:p>
                   </a:txBody>
@@ -9017,7 +9246,7 @@
           </a:fontRef>
         </p:style>
         <p:txBody>
-          <a:bodyPr rtlCol="0" anchor="ctr"/>
+          <a:bodyPr lIns="91440" tIns="45720" rIns="91440" bIns="45720" rtlCol="0" anchor="ctr"/>
           <a:lstStyle/>
           <a:p>
             <a:pPr algn="ctr"/>
@@ -9029,7 +9258,9 @@
               <a:rPr lang="fr-FR" dirty="0"/>
               <a:t>()</a:t>
             </a:r>
-            <a:endParaRPr lang="en-US" dirty="0"/>
+            <a:endParaRPr lang="en-US" dirty="0">
+              <a:cs typeface="Calibri"/>
+            </a:endParaRPr>
           </a:p>
         </p:txBody>
       </p:sp>
@@ -9130,7 +9361,7 @@
           <p:nvPr>
             <p:extLst>
               <p:ext uri="{D42A27DB-BD31-4B8C-83A1-F6EECF244321}">
-                <p14:modId xmlns:p14="http://schemas.microsoft.com/office/powerpoint/2010/main" val="2817214379"/>
+                <p14:modId xmlns:p14="http://schemas.microsoft.com/office/powerpoint/2010/main" val="944900450"/>
               </p:ext>
             </p:extLst>
           </p:nvPr>
@@ -9160,11 +9391,16 @@
                     <a:bodyPr/>
                     <a:lstStyle/>
                     <a:p>
-                      <a:r>
-                        <a:rPr lang="fr-FR" sz="1600" dirty="0"/>
-                        <a:t>Row</a:t>
-                      </a:r>
-                      <a:endParaRPr lang="en-US" sz="1600" dirty="0"/>
+                      <a:pPr lvl="0">
+                        <a:buNone/>
+                      </a:pPr>
+                      <a:r>
+                        <a:rPr lang="fr-FR" sz="1600" b="1" i="0" u="none" strike="noStrike" noProof="0" dirty="0">
+                          <a:latin typeface="Calibri"/>
+                        </a:rPr>
+                        <a:t>RDD</a:t>
+                      </a:r>
+                      <a:endParaRPr lang="en-US" dirty="0"/>
                     </a:p>
                   </a:txBody>
                   <a:tcPr/>
@@ -9190,8 +9426,14 @@
                         <a:t>user":"John</a:t>
                       </a:r>
                       <a:r>
+                        <a:rPr lang="en-US" sz="1600" b="0" i="0" u="none" strike="noStrike" noProof="0" dirty="0">
+                          <a:latin typeface="Calibri"/>
+                        </a:rPr>
+                        <a:t>"</a:t>
+                      </a:r>
+                      <a:r>
                         <a:rPr lang="en-US" sz="1600" dirty="0"/>
-                        <a:t>“}</a:t>
+                        <a:t>}</a:t>
                       </a:r>
                     </a:p>
                   </a:txBody>
@@ -9252,11 +9494,27 @@
                       </a:r>
                       <a:r>
                         <a:rPr lang="en-US" sz="1600" dirty="0" err="1"/>
-                        <a:t>user":“Sam</a:t>
+                        <a:t>user":</a:t>
+                      </a:r>
+                      <a:r>
+                        <a:rPr lang="en-US" sz="1600" b="0" i="0" u="none" strike="noStrike" noProof="0" dirty="0" err="1">
+                          <a:latin typeface="Calibri"/>
+                        </a:rPr>
+                        <a:t>"</a:t>
+                      </a:r>
+                      <a:r>
+                        <a:rPr lang="en-US" sz="1600" dirty="0" err="1"/>
+                        <a:t>Sam</a:t>
+                      </a:r>
+                      <a:r>
+                        <a:rPr lang="en-US" sz="1600" b="0" i="0" u="none" strike="noStrike" noProof="0" dirty="0">
+                          <a:latin typeface="Calibri"/>
+                        </a:rPr>
+                        <a:t>"</a:t>
                       </a:r>
                       <a:r>
                         <a:rPr lang="en-US" sz="1600" dirty="0"/>
-                        <a:t>“}</a:t>
+                        <a:t>}</a:t>
                       </a:r>
                     </a:p>
                   </a:txBody>
@@ -9287,14 +9545,14 @@
           <p:nvPr>
             <p:extLst>
               <p:ext uri="{D42A27DB-BD31-4B8C-83A1-F6EECF244321}">
-                <p14:modId xmlns:p14="http://schemas.microsoft.com/office/powerpoint/2010/main" val="1945901971"/>
+                <p14:modId xmlns:p14="http://schemas.microsoft.com/office/powerpoint/2010/main" val="3512230028"/>
               </p:ext>
             </p:extLst>
           </p:nvPr>
         </p:nvGraphicFramePr>
         <p:xfrm>
-          <a:off x="9167069" y="4877663"/>
-          <a:ext cx="1658900" cy="1479749"/>
+          <a:off x="9170275" y="4948620"/>
+          <a:ext cx="1658900" cy="1409368"/>
         </p:xfrm>
         <a:graphic>
           <a:graphicData uri="http://schemas.openxmlformats.org/drawingml/2006/table">
@@ -9311,17 +9569,17 @@
                   </a:extLst>
                 </a:gridCol>
               </a:tblGrid>
-              <a:tr h="473909">
+              <a:tr h="403528">
                 <a:tc>
                   <a:txBody>
                     <a:bodyPr/>
                     <a:lstStyle/>
                     <a:p>
                       <a:r>
-                        <a:rPr lang="fr-FR" sz="1600" dirty="0"/>
-                        <a:t>Row</a:t>
-                      </a:r>
-                      <a:endParaRPr lang="en-US" sz="1600" dirty="0"/>
+                        <a:rPr lang="fr-FR" sz="1600" dirty="0" err="1"/>
+                        <a:t>list</a:t>
+                      </a:r>
+                      <a:endParaRPr lang="en-US" sz="1600" dirty="0" err="1"/>
                     </a:p>
                   </a:txBody>
                   <a:tcPr/>
@@ -9332,7 +9590,7 @@
                   </a:ext>
                 </a:extLst>
               </a:tr>
-              <a:tr h="283885">
+              <a:tr h="306681">
                 <a:tc>
                   <a:txBody>
                     <a:bodyPr/>
@@ -9347,8 +9605,14 @@
                         <a:t>user":"John</a:t>
                       </a:r>
                       <a:r>
+                        <a:rPr lang="en-US" sz="1600" b="0" i="0" u="none" strike="noStrike" noProof="0" dirty="0">
+                          <a:latin typeface="Calibri"/>
+                        </a:rPr>
+                        <a:t>"</a:t>
+                      </a:r>
+                      <a:r>
                         <a:rPr lang="en-US" sz="1600" dirty="0"/>
-                        <a:t>“}</a:t>
+                        <a:t>}</a:t>
                       </a:r>
                     </a:p>
                   </a:txBody>
@@ -9360,7 +9624,7 @@
                   </a:ext>
                 </a:extLst>
               </a:tr>
-              <a:tr h="283885">
+              <a:tr h="306681">
                 <a:tc>
                   <a:txBody>
                     <a:bodyPr/>
@@ -9380,7 +9644,7 @@
                   </a:ext>
                 </a:extLst>
               </a:tr>
-              <a:tr h="283885">
+              <a:tr h="306681">
                 <a:tc>
                   <a:txBody>
                     <a:bodyPr/>
@@ -9409,11 +9673,27 @@
                       </a:r>
                       <a:r>
                         <a:rPr lang="en-US" sz="1600" dirty="0" err="1"/>
-                        <a:t>user":“Sam</a:t>
+                        <a:t>user":</a:t>
+                      </a:r>
+                      <a:r>
+                        <a:rPr lang="en-US" sz="1600" b="0" i="0" u="none" strike="noStrike" noProof="0" dirty="0" err="1">
+                          <a:latin typeface="Calibri"/>
+                        </a:rPr>
+                        <a:t>"</a:t>
+                      </a:r>
+                      <a:r>
+                        <a:rPr lang="en-US" sz="1600" dirty="0" err="1"/>
+                        <a:t>Sam</a:t>
+                      </a:r>
+                      <a:r>
+                        <a:rPr lang="en-US" sz="1600" b="0" i="0" u="none" strike="noStrike" noProof="0" dirty="0">
+                          <a:latin typeface="Calibri"/>
+                        </a:rPr>
+                        <a:t>"</a:t>
                       </a:r>
                       <a:r>
                         <a:rPr lang="en-US" sz="1600" dirty="0"/>
-                        <a:t>“}</a:t>
+                        <a:t>}</a:t>
                       </a:r>
                     </a:p>
                   </a:txBody>
@@ -9461,35 +9741,6 @@
       </p:grpSpPr>
       <p:sp>
         <p:nvSpPr>
-          <p:cNvPr id="2" name="Title 1">
-            <a:extLst>
-              <a:ext uri="{FF2B5EF4-FFF2-40B4-BE49-F238E27FC236}">
-                <a16:creationId xmlns:a16="http://schemas.microsoft.com/office/drawing/2014/main" id="{1EF77BFB-B82D-46E7-9ED3-A723BCC0A39C}"/>
-              </a:ext>
-            </a:extLst>
-          </p:cNvPr>
-          <p:cNvSpPr>
-            <a:spLocks noGrp="1"/>
-          </p:cNvSpPr>
-          <p:nvPr>
-            <p:ph type="title"/>
-          </p:nvPr>
-        </p:nvSpPr>
-        <p:spPr/>
-        <p:txBody>
-          <a:bodyPr/>
-          <a:lstStyle/>
-          <a:p>
-            <a:r>
-              <a:rPr lang="fr-FR" dirty="0"/>
-              <a:t>RDD API</a:t>
-            </a:r>
-            <a:endParaRPr lang="en-US" dirty="0"/>
-          </a:p>
-        </p:txBody>
-      </p:sp>
-      <p:sp>
-        <p:nvSpPr>
           <p:cNvPr id="8" name="Rectangle: Rounded Corners 7">
             <a:extLst>
               <a:ext uri="{FF2B5EF4-FFF2-40B4-BE49-F238E27FC236}">
@@ -9526,37 +9777,60 @@
           </a:fontRef>
         </p:style>
         <p:txBody>
-          <a:bodyPr rtlCol="0" anchor="ctr"/>
+          <a:bodyPr lIns="91440" tIns="45720" rIns="91440" bIns="45720" rtlCol="0" anchor="ctr"/>
           <a:lstStyle/>
           <a:p>
             <a:pPr algn="ctr"/>
             <a:r>
-              <a:rPr lang="fr-FR" dirty="0" err="1"/>
+              <a:rPr lang="fr-FR" b="1" dirty="0" err="1"/>
               <a:t>map</a:t>
             </a:r>
             <a:r>
-              <a:rPr lang="fr-FR" dirty="0"/>
-              <a:t>(x </a:t>
-            </a:r>
-            <a:r>
-              <a:rPr lang="fr-FR" dirty="0">
+              <a:rPr lang="fr-FR" b="1" dirty="0"/>
+              <a:t>(</a:t>
+            </a:r>
+            <a:r>
+              <a:rPr lang="fr-FR" b="1" dirty="0">
+                <a:ea typeface="+mn-lt"/>
+                <a:cs typeface="+mn-lt"/>
+              </a:rPr>
+              <a:t>lambda </a:t>
+            </a:r>
+            <a:r>
+              <a:rPr lang="fr-FR" b="1" dirty="0"/>
+              <a:t>x: </a:t>
+            </a:r>
+            <a:endParaRPr lang="en-US" b="1">
+              <a:cs typeface="Calibri"/>
+            </a:endParaRPr>
+          </a:p>
+          <a:p>
+            <a:pPr algn="ctr"/>
+            <a:r>
+              <a:rPr lang="fr-FR" b="1" dirty="0"/>
+              <a:t>x</a:t>
+            </a:r>
+            <a:r>
+              <a:rPr lang="fr-FR" b="1" dirty="0">
                 <a:sym typeface="Wingdings" panose="05000000000000000000" pitchFamily="2" charset="2"/>
               </a:rPr>
-              <a:t> x[‘</a:t>
-            </a:r>
-            <a:r>
-              <a:rPr lang="fr-FR" dirty="0" err="1">
+              <a:t>['</a:t>
+            </a:r>
+            <a:r>
+              <a:rPr lang="fr-FR" b="1" dirty="0" err="1">
                 <a:sym typeface="Wingdings" panose="05000000000000000000" pitchFamily="2" charset="2"/>
               </a:rPr>
               <a:t>movie</a:t>
             </a:r>
             <a:r>
-              <a:rPr lang="fr-FR" dirty="0">
+              <a:rPr lang="fr-FR" b="1" dirty="0">
                 <a:sym typeface="Wingdings" panose="05000000000000000000" pitchFamily="2" charset="2"/>
               </a:rPr>
-              <a:t>’])</a:t>
-            </a:r>
-            <a:endParaRPr lang="en-US" dirty="0"/>
+              <a:t>'])</a:t>
+            </a:r>
+            <a:endParaRPr lang="en-US" b="1" dirty="0">
+              <a:cs typeface="Calibri"/>
+            </a:endParaRPr>
           </a:p>
         </p:txBody>
       </p:sp>
@@ -9657,14 +9931,14 @@
           <p:nvPr>
             <p:extLst>
               <p:ext uri="{D42A27DB-BD31-4B8C-83A1-F6EECF244321}">
-                <p14:modId xmlns:p14="http://schemas.microsoft.com/office/powerpoint/2010/main" val="2515917153"/>
+                <p14:modId xmlns:p14="http://schemas.microsoft.com/office/powerpoint/2010/main" val="1263456653"/>
               </p:ext>
             </p:extLst>
           </p:nvPr>
         </p:nvGraphicFramePr>
         <p:xfrm>
           <a:off x="9167069" y="1377072"/>
-          <a:ext cx="1435267" cy="1479749"/>
+          <a:ext cx="1733077" cy="1479749"/>
         </p:xfrm>
         <a:graphic>
           <a:graphicData uri="http://schemas.openxmlformats.org/drawingml/2006/table">
@@ -9673,7 +9947,7 @@
                 <a:tableStyleId>{5C22544A-7EE6-4342-B048-85BDC9FD1C3A}</a:tableStyleId>
               </a:tblPr>
               <a:tblGrid>
-                <a:gridCol w="1435267">
+                <a:gridCol w="1733077">
                   <a:extLst>
                     <a:ext uri="{9D8B030D-6E8A-4147-A177-3AD203B41FA5}">
                       <a16:colId xmlns:a16="http://schemas.microsoft.com/office/drawing/2014/main" val="2061391393"/>
@@ -9687,11 +9961,16 @@
                     <a:bodyPr/>
                     <a:lstStyle/>
                     <a:p>
-                      <a:r>
-                        <a:rPr lang="fr-FR" sz="1600" dirty="0"/>
-                        <a:t>Row</a:t>
-                      </a:r>
-                      <a:endParaRPr lang="en-US" sz="1600" dirty="0"/>
+                      <a:pPr lvl="0">
+                        <a:buNone/>
+                      </a:pPr>
+                      <a:r>
+                        <a:rPr lang="fr-FR" sz="1600" b="1" i="0" u="none" strike="noStrike" noProof="0" dirty="0">
+                          <a:latin typeface="Calibri"/>
+                        </a:rPr>
+                        <a:t>RDD</a:t>
+                      </a:r>
+                      <a:endParaRPr lang="en-US" dirty="0"/>
                     </a:p>
                   </a:txBody>
                   <a:tcPr/>
@@ -9710,7 +9989,7 @@
                     <a:p>
                       <a:r>
                         <a:rPr lang="fr-FR" sz="1600" dirty="0"/>
-                        <a:t>Blade Runner</a:t>
+                        <a:t>"Blade Runner"</a:t>
                       </a:r>
                       <a:endParaRPr lang="en-US" sz="1600" dirty="0"/>
                     </a:p>
@@ -9731,7 +10010,7 @@
                     <a:p>
                       <a:r>
                         <a:rPr lang="fr-FR" sz="1600" dirty="0"/>
-                        <a:t>Dirty Dancing</a:t>
+                        <a:t>"Dirty Dancing"</a:t>
                       </a:r>
                       <a:endParaRPr lang="en-US" sz="1600" dirty="0"/>
                     </a:p>
@@ -9769,7 +10048,7 @@
                       </a:pPr>
                       <a:r>
                         <a:rPr lang="fr-FR" sz="1600" dirty="0"/>
-                        <a:t>Blade Runner</a:t>
+                        <a:t>"Blade Runner"</a:t>
                       </a:r>
                       <a:endParaRPr lang="en-US" sz="1600" dirty="0"/>
                     </a:p>
@@ -9801,7 +10080,7 @@
           <p:nvPr>
             <p:extLst>
               <p:ext uri="{D42A27DB-BD31-4B8C-83A1-F6EECF244321}">
-                <p14:modId xmlns:p14="http://schemas.microsoft.com/office/powerpoint/2010/main" val="3266313943"/>
+                <p14:modId xmlns:p14="http://schemas.microsoft.com/office/powerpoint/2010/main" val="183955838"/>
               </p:ext>
             </p:extLst>
           </p:nvPr>
@@ -9831,11 +10110,16 @@
                     <a:bodyPr/>
                     <a:lstStyle/>
                     <a:p>
-                      <a:r>
-                        <a:rPr lang="fr-FR" sz="1600" dirty="0"/>
-                        <a:t>Row</a:t>
-                      </a:r>
-                      <a:endParaRPr lang="en-US" sz="1600" dirty="0"/>
+                      <a:pPr lvl="0">
+                        <a:buNone/>
+                      </a:pPr>
+                      <a:r>
+                        <a:rPr lang="fr-FR" sz="1600" b="1" i="0" u="none" strike="noStrike" noProof="0" dirty="0">
+                          <a:latin typeface="Calibri"/>
+                        </a:rPr>
+                        <a:t>RDD</a:t>
+                      </a:r>
+                      <a:endParaRPr lang="en-US" dirty="0"/>
                     </a:p>
                   </a:txBody>
                   <a:tcPr/>
@@ -10013,25 +10297,50 @@
           </a:fontRef>
         </p:style>
         <p:txBody>
-          <a:bodyPr rtlCol="0" anchor="ctr"/>
+          <a:bodyPr lIns="91440" tIns="45720" rIns="91440" bIns="45720" rtlCol="0" anchor="ctr"/>
           <a:lstStyle/>
           <a:p>
             <a:pPr algn="ctr"/>
             <a:r>
-              <a:rPr lang="fr-FR" dirty="0" err="1"/>
+              <a:rPr lang="fr-FR" b="1" dirty="0" err="1"/>
               <a:t>keyBy</a:t>
             </a:r>
             <a:r>
-              <a:rPr lang="fr-FR" dirty="0"/>
-              <a:t>(x </a:t>
-            </a:r>
-            <a:r>
-              <a:rPr lang="fr-FR" dirty="0">
+              <a:rPr lang="fr-FR" b="1" dirty="0"/>
+              <a:t>(</a:t>
+            </a:r>
+            <a:r>
+              <a:rPr lang="fr-FR" b="1" dirty="0">
+                <a:ea typeface="+mn-lt"/>
+                <a:cs typeface="+mn-lt"/>
+              </a:rPr>
+              <a:t>lambda </a:t>
+            </a:r>
+            <a:r>
+              <a:rPr lang="fr-FR" b="1" dirty="0"/>
+              <a:t>x:</a:t>
+            </a:r>
+            <a:r>
+              <a:rPr lang="fr-FR" b="1" dirty="0">
                 <a:sym typeface="Wingdings" panose="05000000000000000000" pitchFamily="2" charset="2"/>
               </a:rPr>
-              <a:t> x[‘user’])</a:t>
-            </a:r>
-            <a:endParaRPr lang="en-US" dirty="0"/>
+              <a:t> </a:t>
+            </a:r>
+            <a:endParaRPr lang="en-US" b="1" dirty="0">
+              <a:sym typeface="Wingdings" panose="05000000000000000000" pitchFamily="2" charset="2"/>
+            </a:endParaRPr>
+          </a:p>
+          <a:p>
+            <a:pPr algn="ctr"/>
+            <a:r>
+              <a:rPr lang="fr-FR" b="1" dirty="0">
+                <a:sym typeface="Wingdings" panose="05000000000000000000" pitchFamily="2" charset="2"/>
+              </a:rPr>
+              <a:t>x['user'])</a:t>
+            </a:r>
+            <a:endParaRPr lang="en-US" b="1" dirty="0">
+              <a:cs typeface="Calibri"/>
+            </a:endParaRPr>
           </a:p>
         </p:txBody>
       </p:sp>
@@ -10132,14 +10441,14 @@
           <p:nvPr>
             <p:extLst>
               <p:ext uri="{D42A27DB-BD31-4B8C-83A1-F6EECF244321}">
-                <p14:modId xmlns:p14="http://schemas.microsoft.com/office/powerpoint/2010/main" val="3585856284"/>
+                <p14:modId xmlns:p14="http://schemas.microsoft.com/office/powerpoint/2010/main" val="250746547"/>
               </p:ext>
             </p:extLst>
           </p:nvPr>
         </p:nvGraphicFramePr>
         <p:xfrm>
           <a:off x="9167069" y="3123180"/>
-          <a:ext cx="1435267" cy="1479749"/>
+          <a:ext cx="2013370" cy="1479749"/>
         </p:xfrm>
         <a:graphic>
           <a:graphicData uri="http://schemas.openxmlformats.org/drawingml/2006/table">
@@ -10148,7 +10457,7 @@
                 <a:tableStyleId>{5C22544A-7EE6-4342-B048-85BDC9FD1C3A}</a:tableStyleId>
               </a:tblPr>
               <a:tblGrid>
-                <a:gridCol w="1435267">
+                <a:gridCol w="2013370">
                   <a:extLst>
                     <a:ext uri="{9D8B030D-6E8A-4147-A177-3AD203B41FA5}">
                       <a16:colId xmlns:a16="http://schemas.microsoft.com/office/drawing/2014/main" val="2061391393"/>
@@ -10162,11 +10471,20 @@
                     <a:bodyPr/>
                     <a:lstStyle/>
                     <a:p>
-                      <a:r>
-                        <a:rPr lang="fr-FR" sz="1600" dirty="0"/>
-                        <a:t>Row</a:t>
-                      </a:r>
-                      <a:endParaRPr lang="en-US" sz="1600" dirty="0"/>
+                      <a:pPr lvl="0">
+                        <a:buNone/>
+                      </a:pPr>
+                      <a:r>
+                        <a:rPr lang="fr-FR" sz="1600" b="1" i="0" u="none" strike="noStrike" noProof="0" dirty="0">
+                          <a:latin typeface="Calibri"/>
+                        </a:rPr>
+                        <a:t>RDD </a:t>
+                      </a:r>
+                      <a:r>
+                        <a:rPr lang="fr-FR" sz="1600" b="1" i="0" u="none" strike="noStrike" noProof="0" dirty="0"/>
+                        <a:t>of (K, V) pairs</a:t>
+                      </a:r>
+                      <a:endParaRPr lang="en-US" b="1" dirty="0"/>
                     </a:p>
                   </a:txBody>
                   <a:tcPr/>
@@ -10189,7 +10507,17 @@
                       </a:r>
                       <a:r>
                         <a:rPr lang="en-US" sz="1600" dirty="0"/>
-                        <a:t>"John“, …)</a:t>
+                        <a:t>"John</a:t>
+                      </a:r>
+                      <a:r>
+                        <a:rPr lang="en-US" sz="1600" b="0" i="0" u="none" strike="noStrike" noProof="0" dirty="0">
+                          <a:latin typeface="Calibri"/>
+                        </a:rPr>
+                        <a:t>"</a:t>
+                      </a:r>
+                      <a:r>
+                        <a:rPr lang="en-US" sz="1600" dirty="0"/>
+                        <a:t>, …)</a:t>
                       </a:r>
                     </a:p>
                   </a:txBody>
@@ -10212,8 +10540,24 @@
                         <a:t>(</a:t>
                       </a:r>
                       <a:r>
+                        <a:rPr lang="en-US" sz="1600" b="0" i="0" u="none" strike="noStrike" noProof="0" dirty="0">
+                          <a:latin typeface="Calibri"/>
+                        </a:rPr>
+                        <a:t>"</a:t>
+                      </a:r>
+                      <a:r>
                         <a:rPr lang="en-US" sz="1600" dirty="0"/>
-                        <a:t>“Louise“, …)</a:t>
+                        <a:t>Louise</a:t>
+                      </a:r>
+                      <a:r>
+                        <a:rPr lang="en-US" sz="1600" b="0" i="0" u="none" strike="noStrike" noProof="0" dirty="0">
+                          <a:latin typeface="Calibri"/>
+                        </a:rPr>
+                        <a:t>"</a:t>
+                      </a:r>
+                      <a:r>
+                        <a:rPr lang="en-US" sz="1600" dirty="0"/>
+                        <a:t>, …)</a:t>
                       </a:r>
                     </a:p>
                   </a:txBody>
@@ -10236,8 +10580,24 @@
                         <a:t>(</a:t>
                       </a:r>
                       <a:r>
+                        <a:rPr lang="en-US" sz="1600" b="0" i="0" u="none" strike="noStrike" noProof="0" dirty="0">
+                          <a:latin typeface="Calibri"/>
+                        </a:rPr>
+                        <a:t>"</a:t>
+                      </a:r>
+                      <a:r>
                         <a:rPr lang="en-US" sz="1600" dirty="0"/>
-                        <a:t>“Sam“, …)</a:t>
+                        <a:t>Sam</a:t>
+                      </a:r>
+                      <a:r>
+                        <a:rPr lang="en-US" sz="1600" b="0" i="0" u="none" strike="noStrike" noProof="0" dirty="0">
+                          <a:latin typeface="Calibri"/>
+                        </a:rPr>
+                        <a:t>"</a:t>
+                      </a:r>
+                      <a:r>
+                        <a:rPr lang="en-US" sz="1600" dirty="0"/>
+                        <a:t>, …)</a:t>
                       </a:r>
                     </a:p>
                   </a:txBody>
@@ -10268,7 +10628,7 @@
           <p:nvPr>
             <p:extLst>
               <p:ext uri="{D42A27DB-BD31-4B8C-83A1-F6EECF244321}">
-                <p14:modId xmlns:p14="http://schemas.microsoft.com/office/powerpoint/2010/main" val="1401191290"/>
+                <p14:modId xmlns:p14="http://schemas.microsoft.com/office/powerpoint/2010/main" val="1650043729"/>
               </p:ext>
             </p:extLst>
           </p:nvPr>
@@ -10298,11 +10658,16 @@
                     <a:bodyPr/>
                     <a:lstStyle/>
                     <a:p>
-                      <a:r>
-                        <a:rPr lang="fr-FR" sz="1600" dirty="0"/>
-                        <a:t>Row</a:t>
-                      </a:r>
-                      <a:endParaRPr lang="en-US" sz="1600" dirty="0"/>
+                      <a:pPr lvl="0">
+                        <a:buNone/>
+                      </a:pPr>
+                      <a:r>
+                        <a:rPr lang="fr-FR" sz="1600" b="1" i="0" u="none" strike="noStrike" noProof="0" dirty="0">
+                          <a:latin typeface="Calibri"/>
+                        </a:rPr>
+                        <a:t>RDD</a:t>
+                      </a:r>
+                      <a:endParaRPr lang="en-US" dirty="0"/>
                     </a:p>
                   </a:txBody>
                   <a:tcPr/>
@@ -10414,7 +10779,17 @@
                       </a:r>
                       <a:r>
                         <a:rPr lang="en-US" sz="1600" dirty="0" err="1"/>
-                        <a:t>user":“Sam</a:t>
+                        <a:t>user":</a:t>
+                      </a:r>
+                      <a:r>
+                        <a:rPr lang="en-US" sz="1600" b="0" i="0" u="none" strike="noStrike" noProof="0" dirty="0" err="1">
+                          <a:latin typeface="Calibri"/>
+                        </a:rPr>
+                        <a:t>"</a:t>
+                      </a:r>
+                      <a:r>
+                        <a:rPr lang="en-US" sz="1600" dirty="0" err="1"/>
+                        <a:t>Sam</a:t>
                       </a:r>
                       <a:r>
                         <a:rPr lang="en-US" sz="1600" dirty="0"/>
@@ -10422,7 +10797,17 @@
                       </a:r>
                       <a:r>
                         <a:rPr lang="en-US" sz="1600" dirty="0" err="1"/>
-                        <a:t>movie":“Blade</a:t>
+                        <a:t>movie":</a:t>
+                      </a:r>
+                      <a:r>
+                        <a:rPr lang="en-US" sz="1600" b="0" i="0" u="none" strike="noStrike" noProof="0" dirty="0" err="1">
+                          <a:latin typeface="Calibri"/>
+                        </a:rPr>
+                        <a:t>"</a:t>
+                      </a:r>
+                      <a:r>
+                        <a:rPr lang="en-US" sz="1600" dirty="0" err="1"/>
+                        <a:t>Blade</a:t>
                       </a:r>
                       <a:r>
                         <a:rPr lang="en-US" sz="1600" dirty="0"/>
@@ -10480,37 +10865,50 @@
           </a:fontRef>
         </p:style>
         <p:txBody>
-          <a:bodyPr rtlCol="0" anchor="ctr"/>
+          <a:bodyPr lIns="91440" tIns="45720" rIns="91440" bIns="45720" rtlCol="0" anchor="ctr"/>
           <a:lstStyle/>
           <a:p>
             <a:pPr algn="ctr"/>
             <a:r>
-              <a:rPr lang="fr-FR" dirty="0" err="1"/>
+              <a:rPr lang="fr-FR" b="1" dirty="0" err="1"/>
               <a:t>mapValues</a:t>
             </a:r>
             <a:r>
-              <a:rPr lang="fr-FR" dirty="0"/>
-              <a:t>(x </a:t>
-            </a:r>
-            <a:r>
-              <a:rPr lang="fr-FR" dirty="0">
-                <a:sym typeface="Wingdings" panose="05000000000000000000" pitchFamily="2" charset="2"/>
+              <a:rPr lang="fr-FR" b="1" dirty="0"/>
+              <a:t>(</a:t>
+            </a:r>
+            <a:r>
+              <a:rPr lang="fr-FR" b="1" dirty="0">
+                <a:ea typeface="+mn-lt"/>
+                <a:cs typeface="+mn-lt"/>
               </a:rPr>
-              <a:t> </a:t>
-            </a:r>
-            <a:r>
-              <a:rPr lang="fr-FR" dirty="0" err="1">
+              <a:t>lambda </a:t>
+            </a:r>
+            <a:r>
+              <a:rPr lang="fr-FR" b="1" dirty="0"/>
+              <a:t>x:</a:t>
+            </a:r>
+            <a:endParaRPr lang="en-US" b="1" dirty="0">
+              <a:sym typeface="Wingdings" panose="05000000000000000000" pitchFamily="2" charset="2"/>
+            </a:endParaRPr>
+          </a:p>
+          <a:p>
+            <a:pPr algn="ctr"/>
+            <a:r>
+              <a:rPr lang="fr-FR" b="1" dirty="0" err="1">
                 <a:sym typeface="Wingdings" panose="05000000000000000000" pitchFamily="2" charset="2"/>
               </a:rPr>
               <a:t>len</a:t>
             </a:r>
             <a:r>
-              <a:rPr lang="fr-FR" dirty="0">
+              <a:rPr lang="fr-FR" b="1" dirty="0">
                 <a:sym typeface="Wingdings" panose="05000000000000000000" pitchFamily="2" charset="2"/>
               </a:rPr>
               <a:t>(x[1]))</a:t>
             </a:r>
-            <a:endParaRPr lang="en-US" dirty="0"/>
+            <a:endParaRPr lang="en-US" b="1" dirty="0">
+              <a:cs typeface="Calibri"/>
+            </a:endParaRPr>
           </a:p>
         </p:txBody>
       </p:sp>
@@ -10611,14 +11009,14 @@
           <p:nvPr>
             <p:extLst>
               <p:ext uri="{D42A27DB-BD31-4B8C-83A1-F6EECF244321}">
-                <p14:modId xmlns:p14="http://schemas.microsoft.com/office/powerpoint/2010/main" val="735603161"/>
+                <p14:modId xmlns:p14="http://schemas.microsoft.com/office/powerpoint/2010/main" val="4024594632"/>
               </p:ext>
             </p:extLst>
           </p:nvPr>
         </p:nvGraphicFramePr>
         <p:xfrm>
           <a:off x="9167069" y="4905942"/>
-          <a:ext cx="1435267" cy="1479749"/>
+          <a:ext cx="2013370" cy="1479749"/>
         </p:xfrm>
         <a:graphic>
           <a:graphicData uri="http://schemas.openxmlformats.org/drawingml/2006/table">
@@ -10627,7 +11025,7 @@
                 <a:tableStyleId>{5C22544A-7EE6-4342-B048-85BDC9FD1C3A}</a:tableStyleId>
               </a:tblPr>
               <a:tblGrid>
-                <a:gridCol w="1435267">
+                <a:gridCol w="2013370">
                   <a:extLst>
                     <a:ext uri="{9D8B030D-6E8A-4147-A177-3AD203B41FA5}">
                       <a16:colId xmlns:a16="http://schemas.microsoft.com/office/drawing/2014/main" val="2061391393"/>
@@ -10641,11 +11039,20 @@
                     <a:bodyPr/>
                     <a:lstStyle/>
                     <a:p>
-                      <a:r>
-                        <a:rPr lang="fr-FR" sz="1600" dirty="0"/>
-                        <a:t>Row</a:t>
-                      </a:r>
-                      <a:endParaRPr lang="en-US" sz="1600" dirty="0"/>
+                      <a:pPr lvl="0">
+                        <a:buNone/>
+                      </a:pPr>
+                      <a:r>
+                        <a:rPr lang="fr-FR" sz="1600" b="1" i="0" u="none" strike="noStrike" noProof="0" dirty="0">
+                          <a:latin typeface="Calibri"/>
+                        </a:rPr>
+                        <a:t>RDD </a:t>
+                      </a:r>
+                      <a:r>
+                        <a:rPr lang="fr-FR" sz="1600" b="1" i="0" u="none" strike="noStrike" noProof="0" dirty="0"/>
+                        <a:t> of (K, V) pairs</a:t>
+                      </a:r>
+                      <a:endParaRPr lang="en-US" dirty="0"/>
                     </a:p>
                   </a:txBody>
                   <a:tcPr/>
@@ -10668,7 +11075,17 @@
                       </a:r>
                       <a:r>
                         <a:rPr lang="en-US" sz="1600" dirty="0"/>
-                        <a:t>"John“, 12)</a:t>
+                        <a:t>"John</a:t>
+                      </a:r>
+                      <a:r>
+                        <a:rPr lang="en-US" sz="1600" b="0" i="0" u="none" strike="noStrike" noProof="0" dirty="0">
+                          <a:latin typeface="Calibri"/>
+                        </a:rPr>
+                        <a:t>"</a:t>
+                      </a:r>
+                      <a:r>
+                        <a:rPr lang="en-US" sz="1600" dirty="0"/>
+                        <a:t>, 12)</a:t>
                       </a:r>
                     </a:p>
                   </a:txBody>
@@ -10691,8 +11108,24 @@
                         <a:t>(</a:t>
                       </a:r>
                       <a:r>
+                        <a:rPr lang="en-US" sz="1600" b="0" i="0" u="none" strike="noStrike" noProof="0" dirty="0">
+                          <a:latin typeface="Calibri"/>
+                        </a:rPr>
+                        <a:t>"</a:t>
+                      </a:r>
+                      <a:r>
                         <a:rPr lang="en-US" sz="1600" dirty="0"/>
-                        <a:t>“Louise“, 13)</a:t>
+                        <a:t>Louise</a:t>
+                      </a:r>
+                      <a:r>
+                        <a:rPr lang="en-US" sz="1600" b="0" i="0" u="none" strike="noStrike" noProof="0" dirty="0">
+                          <a:latin typeface="Calibri"/>
+                        </a:rPr>
+                        <a:t>"</a:t>
+                      </a:r>
+                      <a:r>
+                        <a:rPr lang="en-US" sz="1600" dirty="0"/>
+                        <a:t>, 13)</a:t>
                       </a:r>
                     </a:p>
                   </a:txBody>
@@ -10715,8 +11148,24 @@
                         <a:t>(</a:t>
                       </a:r>
                       <a:r>
+                        <a:rPr lang="en-US" sz="1600" b="0" i="0" u="none" strike="noStrike" noProof="0" dirty="0">
+                          <a:latin typeface="Calibri"/>
+                        </a:rPr>
+                        <a:t>"</a:t>
+                      </a:r>
+                      <a:r>
                         <a:rPr lang="en-US" sz="1600" dirty="0"/>
-                        <a:t>“Sam“, 12)</a:t>
+                        <a:t>Sam</a:t>
+                      </a:r>
+                      <a:r>
+                        <a:rPr lang="en-US" sz="1600" b="0" i="0" u="none" strike="noStrike" noProof="0" dirty="0">
+                          <a:latin typeface="Calibri"/>
+                        </a:rPr>
+                        <a:t>"</a:t>
+                      </a:r>
+                      <a:r>
+                        <a:rPr lang="en-US" sz="1600" dirty="0"/>
+                        <a:t>, 12)</a:t>
                       </a:r>
                     </a:p>
                   </a:txBody>
@@ -10747,7 +11196,7 @@
           <p:nvPr>
             <p:extLst>
               <p:ext uri="{D42A27DB-BD31-4B8C-83A1-F6EECF244321}">
-                <p14:modId xmlns:p14="http://schemas.microsoft.com/office/powerpoint/2010/main" val="3029869776"/>
+                <p14:modId xmlns:p14="http://schemas.microsoft.com/office/powerpoint/2010/main" val="4084348548"/>
               </p:ext>
             </p:extLst>
           </p:nvPr>
@@ -10777,11 +11226,20 @@
                     <a:bodyPr/>
                     <a:lstStyle/>
                     <a:p>
-                      <a:r>
-                        <a:rPr lang="fr-FR" sz="1600" dirty="0"/>
-                        <a:t>Row</a:t>
-                      </a:r>
-                      <a:endParaRPr lang="en-US" sz="1600" dirty="0"/>
+                      <a:pPr lvl="0">
+                        <a:buNone/>
+                      </a:pPr>
+                      <a:r>
+                        <a:rPr lang="fr-FR" sz="1600" b="1" i="0" u="none" strike="noStrike" noProof="0" dirty="0">
+                          <a:latin typeface="Calibri"/>
+                        </a:rPr>
+                        <a:t>RDD </a:t>
+                      </a:r>
+                      <a:r>
+                        <a:rPr lang="fr-FR" sz="1600" b="1" i="0" u="none" strike="noStrike" noProof="0" dirty="0"/>
+                        <a:t>of (K, V) pairs</a:t>
+                      </a:r>
+                      <a:endParaRPr lang="en-US" dirty="0"/>
                     </a:p>
                   </a:txBody>
                   <a:tcPr/>
@@ -10820,7 +11278,17 @@
                     <a:p>
                       <a:r>
                         <a:rPr lang="en-US" sz="1600" dirty="0"/>
-                        <a:t>("Louise“, "Dirty dancing")</a:t>
+                        <a:t>("Louise</a:t>
+                      </a:r>
+                      <a:r>
+                        <a:rPr lang="en-US" sz="1600" b="0" i="0" u="none" strike="noStrike" noProof="0" dirty="0">
+                          <a:latin typeface="Calibri"/>
+                        </a:rPr>
+                        <a:t>"</a:t>
+                      </a:r>
+                      <a:r>
+                        <a:rPr lang="en-US" sz="1600" dirty="0"/>
+                        <a:t>, "Dirty dancing")</a:t>
                       </a:r>
                     </a:p>
                   </a:txBody>
@@ -10838,7 +11306,7 @@
                     <a:bodyPr/>
                     <a:lstStyle/>
                     <a:p>
-                      <a:pPr marL="0" marR="0" lvl="0" indent="0" algn="l" defTabSz="914400" rtl="0" eaLnBrk="1" fontAlgn="auto" latinLnBrk="0" hangingPunct="1">
+                      <a:pPr marL="0" marR="0" lvl="0" indent="0" algn="l" rtl="0" eaLnBrk="1" fontAlgn="auto" latinLnBrk="0" hangingPunct="1">
                         <a:lnSpc>
                           <a:spcPct val="100000"/>
                         </a:lnSpc>
@@ -10852,12 +11320,40 @@
                         <a:buSzTx/>
                         <a:buFontTx/>
                         <a:buNone/>
-                        <a:tabLst/>
-                        <a:defRPr/>
                       </a:pPr>
                       <a:r>
                         <a:rPr lang="en-US" sz="1600" dirty="0"/>
-                        <a:t>(“Sam“, “Blade Runner")</a:t>
+                        <a:t>(</a:t>
+                      </a:r>
+                      <a:r>
+                        <a:rPr lang="en-US" sz="1600" b="0" i="0" u="none" strike="noStrike" noProof="0" dirty="0">
+                          <a:latin typeface="Calibri"/>
+                        </a:rPr>
+                        <a:t>"</a:t>
+                      </a:r>
+                      <a:r>
+                        <a:rPr lang="en-US" sz="1600" dirty="0"/>
+                        <a:t>Sam</a:t>
+                      </a:r>
+                      <a:r>
+                        <a:rPr lang="en-US" sz="1600" b="0" i="0" u="none" strike="noStrike" noProof="0" dirty="0">
+                          <a:latin typeface="Calibri"/>
+                        </a:rPr>
+                        <a:t>",</a:t>
+                      </a:r>
+                      <a:r>
+                        <a:rPr lang="en-US" sz="1600" dirty="0"/>
+                        <a:t> </a:t>
+                      </a:r>
+                      <a:r>
+                        <a:rPr lang="en-US" sz="1600" b="0" i="0" u="none" strike="noStrike" noProof="0" dirty="0">
+                          <a:latin typeface="Calibri"/>
+                        </a:rPr>
+                        <a:t>"</a:t>
+                      </a:r>
+                      <a:r>
+                        <a:rPr lang="en-US" sz="1600" dirty="0"/>
+                        <a:t>Blade Runner")</a:t>
                       </a:r>
                     </a:p>
                   </a:txBody>
@@ -10873,6 +11369,42 @@
           </a:graphicData>
         </a:graphic>
       </p:graphicFrame>
+      <p:sp>
+        <p:nvSpPr>
+          <p:cNvPr id="7" name="Title 1">
+            <a:extLst>
+              <a:ext uri="{FF2B5EF4-FFF2-40B4-BE49-F238E27FC236}">
+                <a16:creationId xmlns:a16="http://schemas.microsoft.com/office/drawing/2014/main" id="{7F20ABE9-AD04-FAC3-35CC-8A9633386589}"/>
+              </a:ext>
+            </a:extLst>
+          </p:cNvPr>
+          <p:cNvSpPr>
+            <a:spLocks noGrp="1"/>
+          </p:cNvSpPr>
+          <p:nvPr>
+            <p:ph type="title"/>
+          </p:nvPr>
+        </p:nvSpPr>
+        <p:spPr>
+          <a:xfrm>
+            <a:off x="838200" y="365125"/>
+            <a:ext cx="10515600" cy="1325563"/>
+          </a:xfrm>
+        </p:spPr>
+        <p:txBody>
+          <a:bodyPr/>
+          <a:lstStyle/>
+          <a:p>
+            <a:r>
+              <a:rPr lang="fr-FR" dirty="0">
+                <a:ea typeface="+mj-lt"/>
+                <a:cs typeface="+mj-lt"/>
+              </a:rPr>
+              <a:t>RDD API - Transformations</a:t>
+            </a:r>
+          </a:p>
+        </p:txBody>
+      </p:sp>
     </p:spTree>
     <p:extLst>
       <p:ext uri="{BB962C8B-B14F-4D97-AF65-F5344CB8AC3E}">

</xml_diff>